<commit_message>
Finished Presentation 02 slides
</commit_message>
<xml_diff>
--- a/Presentations/Presentation02/Townes_SOC6100_Presentation02.pptx
+++ b/Presentations/Presentation02/Townes_SOC6100_Presentation02.pptx
@@ -5,7 +5,7 @@
     <p:sldMasterId id="2147483648" r:id="rId1"/>
   </p:sldMasterIdLst>
   <p:notesMasterIdLst>
-    <p:notesMasterId r:id="rId29"/>
+    <p:notesMasterId r:id="rId30"/>
   </p:notesMasterIdLst>
   <p:sldIdLst>
     <p:sldId id="256" r:id="rId2"/>
@@ -35,6 +35,7 @@
     <p:sldId id="277" r:id="rId26"/>
     <p:sldId id="278" r:id="rId27"/>
     <p:sldId id="279" r:id="rId28"/>
+    <p:sldId id="284" r:id="rId29"/>
   </p:sldIdLst>
   <p:sldSz cx="9144000" cy="5715000" type="screen16x10"/>
   <p:notesSz cx="6858000" cy="9144000"/>
@@ -595,6 +596,406 @@
 </p:notes>
 </file>
 
+<file path=ppt/notesSlides/notesSlide10.xml><?xml version="1.0" encoding="utf-8"?>
+<p:notes xmlns:a="http://schemas.openxmlformats.org/drawingml/2006/main" xmlns:r="http://schemas.openxmlformats.org/officeDocument/2006/relationships" xmlns:p="http://schemas.openxmlformats.org/presentationml/2006/main">
+  <p:cSld>
+    <p:spTree>
+      <p:nvGrpSpPr>
+        <p:cNvPr id="1" name=""/>
+        <p:cNvGrpSpPr/>
+        <p:nvPr/>
+      </p:nvGrpSpPr>
+      <p:grpSpPr>
+        <a:xfrm>
+          <a:off x="0" y="0"/>
+          <a:ext cx="0" cy="0"/>
+          <a:chOff x="0" y="0"/>
+          <a:chExt cx="0" cy="0"/>
+        </a:xfrm>
+      </p:grpSpPr>
+      <p:sp>
+        <p:nvSpPr>
+          <p:cNvPr id="2" name="Slide Image Placeholder 1"/>
+          <p:cNvSpPr>
+            <a:spLocks noGrp="1" noRot="1" noChangeAspect="1"/>
+          </p:cNvSpPr>
+          <p:nvPr>
+            <p:ph type="sldImg"/>
+          </p:nvPr>
+        </p:nvSpPr>
+        <p:spPr/>
+      </p:sp>
+      <p:sp>
+        <p:nvSpPr>
+          <p:cNvPr id="3" name="Notes Placeholder 2"/>
+          <p:cNvSpPr>
+            <a:spLocks noGrp="1"/>
+          </p:cNvSpPr>
+          <p:nvPr>
+            <p:ph type="body" idx="1"/>
+          </p:nvPr>
+        </p:nvSpPr>
+        <p:spPr/>
+        <p:txBody>
+          <a:bodyPr/>
+          <a:lstStyle/>
+          <a:p>
+            <a:r>
+              <a:rPr lang="en-US" dirty="0" smtClean="0"/>
+              <a:t>Removed</a:t>
+            </a:r>
+            <a:r>
+              <a:rPr lang="en-US" baseline="0" dirty="0" smtClean="0"/>
+              <a:t> path between RATIOCIT and CLAIMS because doing so simplified the model without significantly reducing the R</a:t>
+            </a:r>
+            <a:r>
+              <a:rPr lang="en-US" baseline="30000" dirty="0" smtClean="0"/>
+              <a:t>2</a:t>
+            </a:r>
+            <a:r>
+              <a:rPr lang="en-US" baseline="0" dirty="0" smtClean="0"/>
+              <a:t> value the CLAIMS variable.</a:t>
+            </a:r>
+            <a:endParaRPr lang="en-US" dirty="0"/>
+          </a:p>
+        </p:txBody>
+      </p:sp>
+      <p:sp>
+        <p:nvSpPr>
+          <p:cNvPr id="4" name="Slide Number Placeholder 3"/>
+          <p:cNvSpPr>
+            <a:spLocks noGrp="1"/>
+          </p:cNvSpPr>
+          <p:nvPr>
+            <p:ph type="sldNum" sz="quarter" idx="10"/>
+          </p:nvPr>
+        </p:nvSpPr>
+        <p:spPr/>
+        <p:txBody>
+          <a:bodyPr/>
+          <a:lstStyle/>
+          <a:p>
+            <a:fld id="{76C7EBE9-FBA5-4606-B4BF-D5A892555425}" type="slidenum">
+              <a:rPr lang="en-US" smtClean="0"/>
+              <a:t>18</a:t>
+            </a:fld>
+            <a:endParaRPr lang="en-US"/>
+          </a:p>
+        </p:txBody>
+      </p:sp>
+    </p:spTree>
+    <p:extLst>
+      <p:ext uri="{BB962C8B-B14F-4D97-AF65-F5344CB8AC3E}">
+        <p14:creationId xmlns:p14="http://schemas.microsoft.com/office/powerpoint/2010/main" val="275401902"/>
+      </p:ext>
+    </p:extLst>
+  </p:cSld>
+  <p:clrMapOvr>
+    <a:masterClrMapping/>
+  </p:clrMapOvr>
+</p:notes>
+</file>
+
+<file path=ppt/notesSlides/notesSlide11.xml><?xml version="1.0" encoding="utf-8"?>
+<p:notes xmlns:a="http://schemas.openxmlformats.org/drawingml/2006/main" xmlns:r="http://schemas.openxmlformats.org/officeDocument/2006/relationships" xmlns:p="http://schemas.openxmlformats.org/presentationml/2006/main">
+  <p:cSld>
+    <p:spTree>
+      <p:nvGrpSpPr>
+        <p:cNvPr id="1" name=""/>
+        <p:cNvGrpSpPr/>
+        <p:nvPr/>
+      </p:nvGrpSpPr>
+      <p:grpSpPr>
+        <a:xfrm>
+          <a:off x="0" y="0"/>
+          <a:ext cx="0" cy="0"/>
+          <a:chOff x="0" y="0"/>
+          <a:chExt cx="0" cy="0"/>
+        </a:xfrm>
+      </p:grpSpPr>
+      <p:sp>
+        <p:nvSpPr>
+          <p:cNvPr id="2" name="Slide Image Placeholder 1"/>
+          <p:cNvSpPr>
+            <a:spLocks noGrp="1" noRot="1" noChangeAspect="1"/>
+          </p:cNvSpPr>
+          <p:nvPr>
+            <p:ph type="sldImg"/>
+          </p:nvPr>
+        </p:nvSpPr>
+        <p:spPr/>
+      </p:sp>
+      <p:sp>
+        <p:nvSpPr>
+          <p:cNvPr id="3" name="Notes Placeholder 2"/>
+          <p:cNvSpPr>
+            <a:spLocks noGrp="1"/>
+          </p:cNvSpPr>
+          <p:nvPr>
+            <p:ph type="body" idx="1"/>
+          </p:nvPr>
+        </p:nvSpPr>
+        <p:spPr/>
+        <p:txBody>
+          <a:bodyPr/>
+          <a:lstStyle/>
+          <a:p>
+            <a:r>
+              <a:rPr lang="en-US" dirty="0" smtClean="0"/>
+              <a:t>The result of the Omnibus test indicates that including the CLAIMS, GYEAR, GENERAL, and ORIGINAL variables improved the model fit.  </a:t>
+            </a:r>
+          </a:p>
+          <a:p>
+            <a:pPr marL="171450" indent="-171450">
+              <a:buFont typeface="Arial" panose="020B0604020202020204" pitchFamily="34" charset="0"/>
+              <a:buChar char="•"/>
+            </a:pPr>
+            <a:r>
+              <a:rPr lang="en-US" dirty="0" smtClean="0"/>
+              <a:t>One or more of these IVs predict the dependent variable.  </a:t>
+            </a:r>
+          </a:p>
+          <a:p>
+            <a:pPr marL="171450" indent="-171450">
+              <a:buFont typeface="Arial" panose="020B0604020202020204" pitchFamily="34" charset="0"/>
+              <a:buChar char="•"/>
+            </a:pPr>
+            <a:r>
+              <a:rPr lang="en-US" dirty="0" smtClean="0"/>
+              <a:t>The p-value was less than 0.001, which was significant.  </a:t>
+            </a:r>
+          </a:p>
+          <a:p>
+            <a:pPr marL="171450" indent="-171450">
+              <a:buFont typeface="Arial" panose="020B0604020202020204" pitchFamily="34" charset="0"/>
+              <a:buChar char="•"/>
+            </a:pPr>
+            <a:r>
+              <a:rPr lang="en-US" dirty="0" smtClean="0"/>
+              <a:t>The -2 Log likelihood was reduced from 2,623.109 to 1,906.867, which was a decrease of 716.242.  </a:t>
+            </a:r>
+          </a:p>
+          <a:p>
+            <a:pPr marL="171450" indent="-171450">
+              <a:buFont typeface="Arial" panose="020B0604020202020204" pitchFamily="34" charset="0"/>
+              <a:buChar char="•"/>
+            </a:pPr>
+            <a:r>
+              <a:rPr lang="en-US" dirty="0" smtClean="0"/>
+              <a:t>The </a:t>
+            </a:r>
+            <a:r>
+              <a:rPr lang="en-US" dirty="0" err="1" smtClean="0"/>
+              <a:t>Nagelkerke</a:t>
+            </a:r>
+            <a:r>
+              <a:rPr lang="en-US" dirty="0" smtClean="0"/>
+              <a:t> R</a:t>
+            </a:r>
+            <a:r>
+              <a:rPr lang="en-US" baseline="30000" dirty="0" smtClean="0"/>
+              <a:t>2</a:t>
+            </a:r>
+            <a:r>
+              <a:rPr lang="en-US" dirty="0" smtClean="0"/>
+              <a:t> was 0.415, which indicates that 41.5 percent of the probability that a patent received more than 2 citations was explained by the IVs included in the model. </a:t>
+            </a:r>
+          </a:p>
+          <a:p>
+            <a:pPr marL="0" indent="0">
+              <a:buFont typeface="Arial" panose="020B0604020202020204" pitchFamily="34" charset="0"/>
+              <a:buNone/>
+            </a:pPr>
+            <a:endParaRPr lang="en-US" dirty="0" smtClean="0"/>
+          </a:p>
+          <a:p>
+            <a:pPr marL="0" indent="0">
+              <a:buFont typeface="Arial" panose="020B0604020202020204" pitchFamily="34" charset="0"/>
+              <a:buNone/>
+            </a:pPr>
+            <a:r>
+              <a:rPr lang="en-US" dirty="0" smtClean="0"/>
+              <a:t>Hosmer-</a:t>
+            </a:r>
+            <a:r>
+              <a:rPr lang="en-US" dirty="0" err="1" smtClean="0"/>
+              <a:t>Lemeshow</a:t>
+            </a:r>
+            <a:r>
+              <a:rPr lang="en-US" baseline="0" dirty="0" smtClean="0"/>
+              <a:t> Test results suggest a lack of fit for the model.</a:t>
+            </a:r>
+          </a:p>
+          <a:p>
+            <a:pPr marL="171450" indent="-171450">
+              <a:buFont typeface="Arial" panose="020B0604020202020204" pitchFamily="34" charset="0"/>
+              <a:buChar char="•"/>
+            </a:pPr>
+            <a:r>
+              <a:rPr lang="en-US" dirty="0" smtClean="0"/>
+              <a:t>The chi-square value was 23.671, which does not seem very small.  </a:t>
+            </a:r>
+          </a:p>
+          <a:p>
+            <a:pPr marL="171450" indent="-171450">
+              <a:buFont typeface="Arial" panose="020B0604020202020204" pitchFamily="34" charset="0"/>
+              <a:buChar char="•"/>
+            </a:pPr>
+            <a:r>
+              <a:rPr lang="en-US" dirty="0" smtClean="0"/>
+              <a:t>The p-value was 0.003 which is not much above the 0.001 significance level. </a:t>
+            </a:r>
+          </a:p>
+        </p:txBody>
+      </p:sp>
+      <p:sp>
+        <p:nvSpPr>
+          <p:cNvPr id="4" name="Slide Number Placeholder 3"/>
+          <p:cNvSpPr>
+            <a:spLocks noGrp="1"/>
+          </p:cNvSpPr>
+          <p:nvPr>
+            <p:ph type="sldNum" sz="quarter" idx="10"/>
+          </p:nvPr>
+        </p:nvSpPr>
+        <p:spPr/>
+        <p:txBody>
+          <a:bodyPr/>
+          <a:lstStyle/>
+          <a:p>
+            <a:fld id="{76C7EBE9-FBA5-4606-B4BF-D5A892555425}" type="slidenum">
+              <a:rPr lang="en-US" smtClean="0"/>
+              <a:t>20</a:t>
+            </a:fld>
+            <a:endParaRPr lang="en-US"/>
+          </a:p>
+        </p:txBody>
+      </p:sp>
+    </p:spTree>
+    <p:extLst>
+      <p:ext uri="{BB962C8B-B14F-4D97-AF65-F5344CB8AC3E}">
+        <p14:creationId xmlns:p14="http://schemas.microsoft.com/office/powerpoint/2010/main" val="2230387569"/>
+      </p:ext>
+    </p:extLst>
+  </p:cSld>
+  <p:clrMapOvr>
+    <a:masterClrMapping/>
+  </p:clrMapOvr>
+</p:notes>
+</file>
+
+<file path=ppt/notesSlides/notesSlide12.xml><?xml version="1.0" encoding="utf-8"?>
+<p:notes xmlns:a="http://schemas.openxmlformats.org/drawingml/2006/main" xmlns:r="http://schemas.openxmlformats.org/officeDocument/2006/relationships" xmlns:p="http://schemas.openxmlformats.org/presentationml/2006/main">
+  <p:cSld>
+    <p:spTree>
+      <p:nvGrpSpPr>
+        <p:cNvPr id="1" name=""/>
+        <p:cNvGrpSpPr/>
+        <p:nvPr/>
+      </p:nvGrpSpPr>
+      <p:grpSpPr>
+        <a:xfrm>
+          <a:off x="0" y="0"/>
+          <a:ext cx="0" cy="0"/>
+          <a:chOff x="0" y="0"/>
+          <a:chExt cx="0" cy="0"/>
+        </a:xfrm>
+      </p:grpSpPr>
+      <p:sp>
+        <p:nvSpPr>
+          <p:cNvPr id="2" name="Slide Image Placeholder 1"/>
+          <p:cNvSpPr>
+            <a:spLocks noGrp="1" noRot="1" noChangeAspect="1"/>
+          </p:cNvSpPr>
+          <p:nvPr>
+            <p:ph type="sldImg"/>
+          </p:nvPr>
+        </p:nvSpPr>
+        <p:spPr/>
+      </p:sp>
+      <p:sp>
+        <p:nvSpPr>
+          <p:cNvPr id="3" name="Notes Placeholder 2"/>
+          <p:cNvSpPr>
+            <a:spLocks noGrp="1"/>
+          </p:cNvSpPr>
+          <p:nvPr>
+            <p:ph type="body" idx="1"/>
+          </p:nvPr>
+        </p:nvSpPr>
+        <p:spPr/>
+        <p:txBody>
+          <a:bodyPr/>
+          <a:lstStyle/>
+          <a:p>
+            <a:r>
+              <a:rPr lang="en-US" dirty="0" smtClean="0"/>
+              <a:t>The GENERAL variable had the strongest association with the DV.  </a:t>
+            </a:r>
+          </a:p>
+          <a:p>
+            <a:r>
+              <a:rPr lang="en-US" dirty="0" smtClean="0"/>
+              <a:t>For a one unit increase in the GENERAL variable, the patent was 113.6 times more likely to have been cited by 3 or more times</a:t>
+            </a:r>
+            <a:r>
+              <a:rPr lang="en-US" baseline="0" dirty="0" smtClean="0"/>
+              <a:t> by </a:t>
+            </a:r>
+            <a:r>
+              <a:rPr lang="en-US" dirty="0" smtClean="0"/>
+              <a:t>other patents. </a:t>
+            </a:r>
+          </a:p>
+          <a:p>
+            <a:r>
+              <a:rPr lang="en-US" dirty="0" smtClean="0"/>
+              <a:t>Influence of the GENERAL</a:t>
+            </a:r>
+            <a:r>
+              <a:rPr lang="en-US" baseline="0" dirty="0" smtClean="0"/>
+              <a:t> variable was much higher than expected.</a:t>
+            </a:r>
+            <a:endParaRPr lang="en-US" dirty="0"/>
+          </a:p>
+        </p:txBody>
+      </p:sp>
+      <p:sp>
+        <p:nvSpPr>
+          <p:cNvPr id="4" name="Slide Number Placeholder 3"/>
+          <p:cNvSpPr>
+            <a:spLocks noGrp="1"/>
+          </p:cNvSpPr>
+          <p:nvPr>
+            <p:ph type="sldNum" sz="quarter" idx="10"/>
+          </p:nvPr>
+        </p:nvSpPr>
+        <p:spPr/>
+        <p:txBody>
+          <a:bodyPr/>
+          <a:lstStyle/>
+          <a:p>
+            <a:fld id="{76C7EBE9-FBA5-4606-B4BF-D5A892555425}" type="slidenum">
+              <a:rPr lang="en-US" smtClean="0"/>
+              <a:t>21</a:t>
+            </a:fld>
+            <a:endParaRPr lang="en-US"/>
+          </a:p>
+        </p:txBody>
+      </p:sp>
+    </p:spTree>
+    <p:extLst>
+      <p:ext uri="{BB962C8B-B14F-4D97-AF65-F5344CB8AC3E}">
+        <p14:creationId xmlns:p14="http://schemas.microsoft.com/office/powerpoint/2010/main" val="4292587423"/>
+      </p:ext>
+    </p:extLst>
+  </p:cSld>
+  <p:clrMapOvr>
+    <a:masterClrMapping/>
+  </p:clrMapOvr>
+</p:notes>
+</file>
+
 <file path=ppt/notesSlides/notesSlide2.xml><?xml version="1.0" encoding="utf-8"?>
 <p:notes xmlns:a="http://schemas.openxmlformats.org/drawingml/2006/main" xmlns:r="http://schemas.openxmlformats.org/officeDocument/2006/relationships" xmlns:p="http://schemas.openxmlformats.org/presentationml/2006/main">
   <p:cSld>
@@ -641,29 +1042,23 @@
           <a:p>
             <a:r>
               <a:rPr lang="en-US" dirty="0" smtClean="0"/>
-              <a:t>All utility patents granted in the U.S. from January 1, 1963 to December 30, 1999.</a:t>
+              <a:t>Previous analyses</a:t>
+            </a:r>
+            <a:r>
+              <a:rPr lang="en-US" baseline="0" dirty="0" smtClean="0"/>
+              <a:t> focus on asset-based measures of technology transfer, which are typically transactional.</a:t>
             </a:r>
           </a:p>
           <a:p>
             <a:r>
-              <a:rPr lang="en-US" dirty="0" smtClean="0"/>
-              <a:t>Listed in the Technology Assessment and Forecast (TAF) database of the United States Patent and Trademark Office (USPTO).  </a:t>
+              <a:rPr lang="en-US" baseline="0" dirty="0" smtClean="0"/>
+              <a:t>I theorize that a significant amount of technology transfer is non-transactional, information-based.</a:t>
             </a:r>
           </a:p>
           <a:p>
             <a:r>
-              <a:rPr lang="en-US" dirty="0" smtClean="0"/>
-              <a:t>The file contained data on 2,923,922 patents across 23 variables. </a:t>
-            </a:r>
-          </a:p>
-          <a:p>
-            <a:r>
-              <a:rPr lang="en-US" dirty="0" smtClean="0"/>
-              <a:t>Random sample of 2,000</a:t>
-            </a:r>
-            <a:r>
               <a:rPr lang="en-US" baseline="0" dirty="0" smtClean="0"/>
-              <a:t> observations from a subset of 253,328 observations for the period January 1, 1995 to December 31, 1999.</a:t>
+              <a:t>Focus on asset-based measures of technology transfer suggests that construct validity (i.e., content validity) may be lacking.</a:t>
             </a:r>
             <a:endParaRPr lang="en-US" dirty="0"/>
           </a:p>
@@ -686,7 +1081,7 @@
           <a:p>
             <a:fld id="{76C7EBE9-FBA5-4606-B4BF-D5A892555425}" type="slidenum">
               <a:rPr lang="en-US" smtClean="0"/>
-              <a:t>8</a:t>
+              <a:t>4</a:t>
             </a:fld>
             <a:endParaRPr lang="en-US"/>
           </a:p>
@@ -695,7 +1090,7 @@
     </p:spTree>
     <p:extLst>
       <p:ext uri="{BB962C8B-B14F-4D97-AF65-F5344CB8AC3E}">
-        <p14:creationId xmlns:p14="http://schemas.microsoft.com/office/powerpoint/2010/main" val="3788470147"/>
+        <p14:creationId xmlns:p14="http://schemas.microsoft.com/office/powerpoint/2010/main" val="3522200654"/>
       </p:ext>
     </p:extLst>
   </p:cSld>
@@ -749,20 +1144,6 @@
           <a:bodyPr/>
           <a:lstStyle/>
           <a:p>
-            <a:r>
-              <a:rPr lang="en-US" dirty="0" smtClean="0"/>
-              <a:t>Excluded</a:t>
-            </a:r>
-            <a:r>
-              <a:rPr lang="en-US" baseline="0" dirty="0" smtClean="0"/>
-              <a:t> CMADE and RATIOCIT because of logical reasoning.</a:t>
-            </a:r>
-          </a:p>
-          <a:p>
-            <a:r>
-              <a:rPr lang="en-US" baseline="0" dirty="0" smtClean="0"/>
-              <a:t>Excluded other predictor variables that were not continuous interval. </a:t>
-            </a:r>
             <a:endParaRPr lang="en-US" dirty="0"/>
           </a:p>
         </p:txBody>
@@ -784,7 +1165,7 @@
           <a:p>
             <a:fld id="{76C7EBE9-FBA5-4606-B4BF-D5A892555425}" type="slidenum">
               <a:rPr lang="en-US" smtClean="0"/>
-              <a:t>10</a:t>
+              <a:t>5</a:t>
             </a:fld>
             <a:endParaRPr lang="en-US"/>
           </a:p>
@@ -793,7 +1174,7 @@
     </p:spTree>
     <p:extLst>
       <p:ext uri="{BB962C8B-B14F-4D97-AF65-F5344CB8AC3E}">
-        <p14:creationId xmlns:p14="http://schemas.microsoft.com/office/powerpoint/2010/main" val="3042111759"/>
+        <p14:creationId xmlns:p14="http://schemas.microsoft.com/office/powerpoint/2010/main" val="810233029"/>
       </p:ext>
     </p:extLst>
   </p:cSld>
@@ -849,7 +1230,370 @@
           <a:p>
             <a:r>
               <a:rPr lang="en-US" dirty="0" smtClean="0"/>
-              <a:t>I created a product term called CLAIMSORIGINAL using the CLAIMS variable and ORIGINAL variable to test for possible interaction. </a:t>
+              <a:t>All utility patents granted in the U.S. from January 1, 1963 to December 30, 1999.</a:t>
+            </a:r>
+          </a:p>
+          <a:p>
+            <a:r>
+              <a:rPr lang="en-US" dirty="0" smtClean="0"/>
+              <a:t>Listed in the Technology Assessment and Forecast (TAF) database of the United States Patent and Trademark Office (USPTO).  </a:t>
+            </a:r>
+          </a:p>
+          <a:p>
+            <a:r>
+              <a:rPr lang="en-US" dirty="0" smtClean="0"/>
+              <a:t>The file contained data on 2,923,922 patents across 23 variables. </a:t>
+            </a:r>
+          </a:p>
+          <a:p>
+            <a:r>
+              <a:rPr lang="en-US" dirty="0" smtClean="0"/>
+              <a:t>Random sample of 2,000</a:t>
+            </a:r>
+            <a:r>
+              <a:rPr lang="en-US" baseline="0" dirty="0" smtClean="0"/>
+              <a:t> </a:t>
+            </a:r>
+            <a:r>
+              <a:rPr lang="en-US" baseline="0" dirty="0" smtClean="0"/>
+              <a:t>patents </a:t>
+            </a:r>
+            <a:r>
+              <a:rPr lang="en-US" baseline="0" dirty="0" smtClean="0"/>
+              <a:t>from a subset of 253,328 </a:t>
+            </a:r>
+            <a:r>
+              <a:rPr lang="en-US" baseline="0" dirty="0" smtClean="0"/>
+              <a:t>patents </a:t>
+            </a:r>
+            <a:r>
+              <a:rPr lang="en-US" baseline="0" dirty="0" smtClean="0"/>
+              <a:t>for the period January 1, 1995 to December 31, 1999.</a:t>
+            </a:r>
+            <a:endParaRPr lang="en-US" dirty="0"/>
+          </a:p>
+        </p:txBody>
+      </p:sp>
+      <p:sp>
+        <p:nvSpPr>
+          <p:cNvPr id="4" name="Slide Number Placeholder 3"/>
+          <p:cNvSpPr>
+            <a:spLocks noGrp="1"/>
+          </p:cNvSpPr>
+          <p:nvPr>
+            <p:ph type="sldNum" sz="quarter" idx="10"/>
+          </p:nvPr>
+        </p:nvSpPr>
+        <p:spPr/>
+        <p:txBody>
+          <a:bodyPr/>
+          <a:lstStyle/>
+          <a:p>
+            <a:fld id="{76C7EBE9-FBA5-4606-B4BF-D5A892555425}" type="slidenum">
+              <a:rPr lang="en-US" smtClean="0"/>
+              <a:t>8</a:t>
+            </a:fld>
+            <a:endParaRPr lang="en-US"/>
+          </a:p>
+        </p:txBody>
+      </p:sp>
+    </p:spTree>
+    <p:extLst>
+      <p:ext uri="{BB962C8B-B14F-4D97-AF65-F5344CB8AC3E}">
+        <p14:creationId xmlns:p14="http://schemas.microsoft.com/office/powerpoint/2010/main" val="3788470147"/>
+      </p:ext>
+    </p:extLst>
+  </p:cSld>
+  <p:clrMapOvr>
+    <a:masterClrMapping/>
+  </p:clrMapOvr>
+</p:notes>
+</file>
+
+<file path=ppt/notesSlides/notesSlide5.xml><?xml version="1.0" encoding="utf-8"?>
+<p:notes xmlns:a="http://schemas.openxmlformats.org/drawingml/2006/main" xmlns:r="http://schemas.openxmlformats.org/officeDocument/2006/relationships" xmlns:p="http://schemas.openxmlformats.org/presentationml/2006/main">
+  <p:cSld>
+    <p:spTree>
+      <p:nvGrpSpPr>
+        <p:cNvPr id="1" name=""/>
+        <p:cNvGrpSpPr/>
+        <p:nvPr/>
+      </p:nvGrpSpPr>
+      <p:grpSpPr>
+        <a:xfrm>
+          <a:off x="0" y="0"/>
+          <a:ext cx="0" cy="0"/>
+          <a:chOff x="0" y="0"/>
+          <a:chExt cx="0" cy="0"/>
+        </a:xfrm>
+      </p:grpSpPr>
+      <p:sp>
+        <p:nvSpPr>
+          <p:cNvPr id="2" name="Slide Image Placeholder 1"/>
+          <p:cNvSpPr>
+            <a:spLocks noGrp="1" noRot="1" noChangeAspect="1"/>
+          </p:cNvSpPr>
+          <p:nvPr>
+            <p:ph type="sldImg"/>
+          </p:nvPr>
+        </p:nvSpPr>
+        <p:spPr/>
+      </p:sp>
+      <p:sp>
+        <p:nvSpPr>
+          <p:cNvPr id="3" name="Notes Placeholder 2"/>
+          <p:cNvSpPr>
+            <a:spLocks noGrp="1"/>
+          </p:cNvSpPr>
+          <p:nvPr>
+            <p:ph type="body" idx="1"/>
+          </p:nvPr>
+        </p:nvSpPr>
+        <p:spPr/>
+        <p:txBody>
+          <a:bodyPr/>
+          <a:lstStyle/>
+          <a:p>
+            <a:r>
+              <a:rPr lang="en-US" dirty="0" smtClean="0"/>
+              <a:t>Excluded</a:t>
+            </a:r>
+            <a:r>
+              <a:rPr lang="en-US" baseline="0" dirty="0" smtClean="0"/>
+              <a:t> CMADE and RATIOCIT because of logical reasoning.</a:t>
+            </a:r>
+          </a:p>
+          <a:p>
+            <a:r>
+              <a:rPr lang="en-US" baseline="0" dirty="0" smtClean="0"/>
+              <a:t>Excluded other predictor variables that were not continuous interval. </a:t>
+            </a:r>
+            <a:endParaRPr lang="en-US" dirty="0"/>
+          </a:p>
+        </p:txBody>
+      </p:sp>
+      <p:sp>
+        <p:nvSpPr>
+          <p:cNvPr id="4" name="Slide Number Placeholder 3"/>
+          <p:cNvSpPr>
+            <a:spLocks noGrp="1"/>
+          </p:cNvSpPr>
+          <p:nvPr>
+            <p:ph type="sldNum" sz="quarter" idx="10"/>
+          </p:nvPr>
+        </p:nvSpPr>
+        <p:spPr/>
+        <p:txBody>
+          <a:bodyPr/>
+          <a:lstStyle/>
+          <a:p>
+            <a:fld id="{76C7EBE9-FBA5-4606-B4BF-D5A892555425}" type="slidenum">
+              <a:rPr lang="en-US" smtClean="0"/>
+              <a:t>10</a:t>
+            </a:fld>
+            <a:endParaRPr lang="en-US"/>
+          </a:p>
+        </p:txBody>
+      </p:sp>
+    </p:spTree>
+    <p:extLst>
+      <p:ext uri="{BB962C8B-B14F-4D97-AF65-F5344CB8AC3E}">
+        <p14:creationId xmlns:p14="http://schemas.microsoft.com/office/powerpoint/2010/main" val="3042111759"/>
+      </p:ext>
+    </p:extLst>
+  </p:cSld>
+  <p:clrMapOvr>
+    <a:masterClrMapping/>
+  </p:clrMapOvr>
+</p:notes>
+</file>
+
+<file path=ppt/notesSlides/notesSlide6.xml><?xml version="1.0" encoding="utf-8"?>
+<p:notes xmlns:a="http://schemas.openxmlformats.org/drawingml/2006/main" xmlns:r="http://schemas.openxmlformats.org/officeDocument/2006/relationships" xmlns:p="http://schemas.openxmlformats.org/presentationml/2006/main">
+  <p:cSld>
+    <p:spTree>
+      <p:nvGrpSpPr>
+        <p:cNvPr id="1" name=""/>
+        <p:cNvGrpSpPr/>
+        <p:nvPr/>
+      </p:nvGrpSpPr>
+      <p:grpSpPr>
+        <a:xfrm>
+          <a:off x="0" y="0"/>
+          <a:ext cx="0" cy="0"/>
+          <a:chOff x="0" y="0"/>
+          <a:chExt cx="0" cy="0"/>
+        </a:xfrm>
+      </p:grpSpPr>
+      <p:sp>
+        <p:nvSpPr>
+          <p:cNvPr id="2" name="Slide Image Placeholder 1"/>
+          <p:cNvSpPr>
+            <a:spLocks noGrp="1" noRot="1" noChangeAspect="1"/>
+          </p:cNvSpPr>
+          <p:nvPr>
+            <p:ph type="sldImg"/>
+          </p:nvPr>
+        </p:nvSpPr>
+        <p:spPr/>
+      </p:sp>
+      <p:sp>
+        <p:nvSpPr>
+          <p:cNvPr id="3" name="Notes Placeholder 2"/>
+          <p:cNvSpPr>
+            <a:spLocks noGrp="1"/>
+          </p:cNvSpPr>
+          <p:nvPr>
+            <p:ph type="body" idx="1"/>
+          </p:nvPr>
+        </p:nvSpPr>
+        <p:spPr/>
+        <p:txBody>
+          <a:bodyPr/>
+          <a:lstStyle/>
+          <a:p>
+            <a:r>
+              <a:rPr lang="en-US" dirty="0" smtClean="0"/>
+              <a:t>GENERAL variable had the greatest influence.</a:t>
+            </a:r>
+          </a:p>
+          <a:p>
+            <a:r>
+              <a:rPr lang="en-US" dirty="0" smtClean="0"/>
+              <a:t>GYEAR and</a:t>
+            </a:r>
+            <a:r>
+              <a:rPr lang="en-US" baseline="0" dirty="0" smtClean="0"/>
+              <a:t> ORIGINAL were negatively associated with the number of citations received.</a:t>
+            </a:r>
+            <a:endParaRPr lang="en-US" dirty="0" smtClean="0"/>
+          </a:p>
+          <a:p>
+            <a:r>
+              <a:rPr lang="en-US" dirty="0" smtClean="0"/>
+              <a:t>Most constructed variables were not significant with the exception of BCKGTLAG.</a:t>
+            </a:r>
+          </a:p>
+          <a:p>
+            <a:r>
+              <a:rPr lang="en-US" dirty="0" smtClean="0"/>
+              <a:t>APPYEAR was not significant but GYEAR was significant.</a:t>
+            </a:r>
+          </a:p>
+          <a:p>
+            <a:r>
+              <a:rPr lang="en-US" dirty="0" smtClean="0"/>
+              <a:t>Constructed</a:t>
+            </a:r>
+            <a:r>
+              <a:rPr lang="en-US" baseline="0" dirty="0" smtClean="0"/>
+              <a:t> variables had high degrees of multicollinearity.</a:t>
+            </a:r>
+            <a:endParaRPr lang="en-US" dirty="0"/>
+          </a:p>
+        </p:txBody>
+      </p:sp>
+      <p:sp>
+        <p:nvSpPr>
+          <p:cNvPr id="4" name="Slide Number Placeholder 3"/>
+          <p:cNvSpPr>
+            <a:spLocks noGrp="1"/>
+          </p:cNvSpPr>
+          <p:nvPr>
+            <p:ph type="sldNum" sz="quarter" idx="10"/>
+          </p:nvPr>
+        </p:nvSpPr>
+        <p:spPr/>
+        <p:txBody>
+          <a:bodyPr/>
+          <a:lstStyle/>
+          <a:p>
+            <a:fld id="{76C7EBE9-FBA5-4606-B4BF-D5A892555425}" type="slidenum">
+              <a:rPr lang="en-US" smtClean="0"/>
+              <a:t>11</a:t>
+            </a:fld>
+            <a:endParaRPr lang="en-US"/>
+          </a:p>
+        </p:txBody>
+      </p:sp>
+    </p:spTree>
+    <p:extLst>
+      <p:ext uri="{BB962C8B-B14F-4D97-AF65-F5344CB8AC3E}">
+        <p14:creationId xmlns:p14="http://schemas.microsoft.com/office/powerpoint/2010/main" val="4209112722"/>
+      </p:ext>
+    </p:extLst>
+  </p:cSld>
+  <p:clrMapOvr>
+    <a:masterClrMapping/>
+  </p:clrMapOvr>
+</p:notes>
+</file>
+
+<file path=ppt/notesSlides/notesSlide7.xml><?xml version="1.0" encoding="utf-8"?>
+<p:notes xmlns:a="http://schemas.openxmlformats.org/drawingml/2006/main" xmlns:r="http://schemas.openxmlformats.org/officeDocument/2006/relationships" xmlns:p="http://schemas.openxmlformats.org/presentationml/2006/main">
+  <p:cSld>
+    <p:spTree>
+      <p:nvGrpSpPr>
+        <p:cNvPr id="1" name=""/>
+        <p:cNvGrpSpPr/>
+        <p:nvPr/>
+      </p:nvGrpSpPr>
+      <p:grpSpPr>
+        <a:xfrm>
+          <a:off x="0" y="0"/>
+          <a:ext cx="0" cy="0"/>
+          <a:chOff x="0" y="0"/>
+          <a:chExt cx="0" cy="0"/>
+        </a:xfrm>
+      </p:grpSpPr>
+      <p:sp>
+        <p:nvSpPr>
+          <p:cNvPr id="2" name="Slide Image Placeholder 1"/>
+          <p:cNvSpPr>
+            <a:spLocks noGrp="1" noRot="1" noChangeAspect="1"/>
+          </p:cNvSpPr>
+          <p:nvPr>
+            <p:ph type="sldImg"/>
+          </p:nvPr>
+        </p:nvSpPr>
+        <p:spPr/>
+      </p:sp>
+      <p:sp>
+        <p:nvSpPr>
+          <p:cNvPr id="3" name="Notes Placeholder 2"/>
+          <p:cNvSpPr>
+            <a:spLocks noGrp="1"/>
+          </p:cNvSpPr>
+          <p:nvPr>
+            <p:ph type="body" idx="1"/>
+          </p:nvPr>
+        </p:nvSpPr>
+        <p:spPr/>
+        <p:txBody>
+          <a:bodyPr/>
+          <a:lstStyle/>
+          <a:p>
+            <a:r>
+              <a:rPr lang="en-US" dirty="0" smtClean="0"/>
+              <a:t>I used </a:t>
+            </a:r>
+            <a:r>
+              <a:rPr lang="en-US" dirty="0" err="1" smtClean="0"/>
+              <a:t>logCRECEIVE</a:t>
+            </a:r>
+            <a:r>
+              <a:rPr lang="en-US" dirty="0" smtClean="0"/>
+              <a:t> as the dependent variable.</a:t>
+            </a:r>
+          </a:p>
+          <a:p>
+            <a:r>
+              <a:rPr lang="en-US" dirty="0" smtClean="0"/>
+              <a:t>I </a:t>
+            </a:r>
+            <a:r>
+              <a:rPr lang="en-US" dirty="0" smtClean="0"/>
+              <a:t>created a product term called CLAIMSORIGINAL using the CLAIMS variable and ORIGINAL variable to test for possible interaction. </a:t>
             </a:r>
           </a:p>
           <a:p>
@@ -903,7 +1647,7 @@
 </p:notes>
 </file>
 
-<file path=ppt/notesSlides/notesSlide5.xml><?xml version="1.0" encoding="utf-8"?>
+<file path=ppt/notesSlides/notesSlide8.xml><?xml version="1.0" encoding="utf-8"?>
 <p:notes xmlns:a="http://schemas.openxmlformats.org/drawingml/2006/main" xmlns:r="http://schemas.openxmlformats.org/officeDocument/2006/relationships" xmlns:p="http://schemas.openxmlformats.org/presentationml/2006/main">
   <p:cSld>
     <p:spTree>
@@ -1090,7 +1834,7 @@
 </p:notes>
 </file>
 
-<file path=ppt/notesSlides/notesSlide6.xml><?xml version="1.0" encoding="utf-8"?>
+<file path=ppt/notesSlides/notesSlide9.xml><?xml version="1.0" encoding="utf-8"?>
 <p:notes xmlns:a="http://schemas.openxmlformats.org/drawingml/2006/main" xmlns:r="http://schemas.openxmlformats.org/officeDocument/2006/relationships" xmlns:p="http://schemas.openxmlformats.org/presentationml/2006/main">
   <p:cSld>
     <p:spTree>
@@ -1330,406 +2074,6 @@
     <p:extLst>
       <p:ext uri="{BB962C8B-B14F-4D97-AF65-F5344CB8AC3E}">
         <p14:creationId xmlns:p14="http://schemas.microsoft.com/office/powerpoint/2010/main" val="3897298184"/>
-      </p:ext>
-    </p:extLst>
-  </p:cSld>
-  <p:clrMapOvr>
-    <a:masterClrMapping/>
-  </p:clrMapOvr>
-</p:notes>
-</file>
-
-<file path=ppt/notesSlides/notesSlide7.xml><?xml version="1.0" encoding="utf-8"?>
-<p:notes xmlns:a="http://schemas.openxmlformats.org/drawingml/2006/main" xmlns:r="http://schemas.openxmlformats.org/officeDocument/2006/relationships" xmlns:p="http://schemas.openxmlformats.org/presentationml/2006/main">
-  <p:cSld>
-    <p:spTree>
-      <p:nvGrpSpPr>
-        <p:cNvPr id="1" name=""/>
-        <p:cNvGrpSpPr/>
-        <p:nvPr/>
-      </p:nvGrpSpPr>
-      <p:grpSpPr>
-        <a:xfrm>
-          <a:off x="0" y="0"/>
-          <a:ext cx="0" cy="0"/>
-          <a:chOff x="0" y="0"/>
-          <a:chExt cx="0" cy="0"/>
-        </a:xfrm>
-      </p:grpSpPr>
-      <p:sp>
-        <p:nvSpPr>
-          <p:cNvPr id="2" name="Slide Image Placeholder 1"/>
-          <p:cNvSpPr>
-            <a:spLocks noGrp="1" noRot="1" noChangeAspect="1"/>
-          </p:cNvSpPr>
-          <p:nvPr>
-            <p:ph type="sldImg"/>
-          </p:nvPr>
-        </p:nvSpPr>
-        <p:spPr/>
-      </p:sp>
-      <p:sp>
-        <p:nvSpPr>
-          <p:cNvPr id="3" name="Notes Placeholder 2"/>
-          <p:cNvSpPr>
-            <a:spLocks noGrp="1"/>
-          </p:cNvSpPr>
-          <p:nvPr>
-            <p:ph type="body" idx="1"/>
-          </p:nvPr>
-        </p:nvSpPr>
-        <p:spPr/>
-        <p:txBody>
-          <a:bodyPr/>
-          <a:lstStyle/>
-          <a:p>
-            <a:r>
-              <a:rPr lang="en-US" dirty="0" smtClean="0"/>
-              <a:t>Removed</a:t>
-            </a:r>
-            <a:r>
-              <a:rPr lang="en-US" baseline="0" dirty="0" smtClean="0"/>
-              <a:t> path between RATIOCIT and CLAIMS because doing so simplified the model without significantly reducing the R</a:t>
-            </a:r>
-            <a:r>
-              <a:rPr lang="en-US" baseline="30000" dirty="0" smtClean="0"/>
-              <a:t>2</a:t>
-            </a:r>
-            <a:r>
-              <a:rPr lang="en-US" baseline="0" dirty="0" smtClean="0"/>
-              <a:t> value the CLAIMS variable.</a:t>
-            </a:r>
-            <a:endParaRPr lang="en-US" dirty="0"/>
-          </a:p>
-        </p:txBody>
-      </p:sp>
-      <p:sp>
-        <p:nvSpPr>
-          <p:cNvPr id="4" name="Slide Number Placeholder 3"/>
-          <p:cNvSpPr>
-            <a:spLocks noGrp="1"/>
-          </p:cNvSpPr>
-          <p:nvPr>
-            <p:ph type="sldNum" sz="quarter" idx="10"/>
-          </p:nvPr>
-        </p:nvSpPr>
-        <p:spPr/>
-        <p:txBody>
-          <a:bodyPr/>
-          <a:lstStyle/>
-          <a:p>
-            <a:fld id="{76C7EBE9-FBA5-4606-B4BF-D5A892555425}" type="slidenum">
-              <a:rPr lang="en-US" smtClean="0"/>
-              <a:t>18</a:t>
-            </a:fld>
-            <a:endParaRPr lang="en-US"/>
-          </a:p>
-        </p:txBody>
-      </p:sp>
-    </p:spTree>
-    <p:extLst>
-      <p:ext uri="{BB962C8B-B14F-4D97-AF65-F5344CB8AC3E}">
-        <p14:creationId xmlns:p14="http://schemas.microsoft.com/office/powerpoint/2010/main" val="275401902"/>
-      </p:ext>
-    </p:extLst>
-  </p:cSld>
-  <p:clrMapOvr>
-    <a:masterClrMapping/>
-  </p:clrMapOvr>
-</p:notes>
-</file>
-
-<file path=ppt/notesSlides/notesSlide8.xml><?xml version="1.0" encoding="utf-8"?>
-<p:notes xmlns:a="http://schemas.openxmlformats.org/drawingml/2006/main" xmlns:r="http://schemas.openxmlformats.org/officeDocument/2006/relationships" xmlns:p="http://schemas.openxmlformats.org/presentationml/2006/main">
-  <p:cSld>
-    <p:spTree>
-      <p:nvGrpSpPr>
-        <p:cNvPr id="1" name=""/>
-        <p:cNvGrpSpPr/>
-        <p:nvPr/>
-      </p:nvGrpSpPr>
-      <p:grpSpPr>
-        <a:xfrm>
-          <a:off x="0" y="0"/>
-          <a:ext cx="0" cy="0"/>
-          <a:chOff x="0" y="0"/>
-          <a:chExt cx="0" cy="0"/>
-        </a:xfrm>
-      </p:grpSpPr>
-      <p:sp>
-        <p:nvSpPr>
-          <p:cNvPr id="2" name="Slide Image Placeholder 1"/>
-          <p:cNvSpPr>
-            <a:spLocks noGrp="1" noRot="1" noChangeAspect="1"/>
-          </p:cNvSpPr>
-          <p:nvPr>
-            <p:ph type="sldImg"/>
-          </p:nvPr>
-        </p:nvSpPr>
-        <p:spPr/>
-      </p:sp>
-      <p:sp>
-        <p:nvSpPr>
-          <p:cNvPr id="3" name="Notes Placeholder 2"/>
-          <p:cNvSpPr>
-            <a:spLocks noGrp="1"/>
-          </p:cNvSpPr>
-          <p:nvPr>
-            <p:ph type="body" idx="1"/>
-          </p:nvPr>
-        </p:nvSpPr>
-        <p:spPr/>
-        <p:txBody>
-          <a:bodyPr/>
-          <a:lstStyle/>
-          <a:p>
-            <a:r>
-              <a:rPr lang="en-US" dirty="0" smtClean="0"/>
-              <a:t>The result of the Omnibus test indicates that including the CLAIMS, GYEAR, GENERAL, and ORIGINAL variables improved the model fit.  </a:t>
-            </a:r>
-          </a:p>
-          <a:p>
-            <a:pPr marL="171450" indent="-171450">
-              <a:buFont typeface="Arial" panose="020B0604020202020204" pitchFamily="34" charset="0"/>
-              <a:buChar char="•"/>
-            </a:pPr>
-            <a:r>
-              <a:rPr lang="en-US" dirty="0" smtClean="0"/>
-              <a:t>One or more of these IVs predict the dependent variable.  </a:t>
-            </a:r>
-          </a:p>
-          <a:p>
-            <a:pPr marL="171450" indent="-171450">
-              <a:buFont typeface="Arial" panose="020B0604020202020204" pitchFamily="34" charset="0"/>
-              <a:buChar char="•"/>
-            </a:pPr>
-            <a:r>
-              <a:rPr lang="en-US" dirty="0" smtClean="0"/>
-              <a:t>The p-value was less than 0.001, which was significant.  </a:t>
-            </a:r>
-          </a:p>
-          <a:p>
-            <a:pPr marL="171450" indent="-171450">
-              <a:buFont typeface="Arial" panose="020B0604020202020204" pitchFamily="34" charset="0"/>
-              <a:buChar char="•"/>
-            </a:pPr>
-            <a:r>
-              <a:rPr lang="en-US" dirty="0" smtClean="0"/>
-              <a:t>The -2 Log likelihood was reduced from 2,623.109 to 1,906.867, which was a decrease of 716.242.  </a:t>
-            </a:r>
-          </a:p>
-          <a:p>
-            <a:pPr marL="171450" indent="-171450">
-              <a:buFont typeface="Arial" panose="020B0604020202020204" pitchFamily="34" charset="0"/>
-              <a:buChar char="•"/>
-            </a:pPr>
-            <a:r>
-              <a:rPr lang="en-US" dirty="0" smtClean="0"/>
-              <a:t>The </a:t>
-            </a:r>
-            <a:r>
-              <a:rPr lang="en-US" dirty="0" err="1" smtClean="0"/>
-              <a:t>Nagelkerke</a:t>
-            </a:r>
-            <a:r>
-              <a:rPr lang="en-US" dirty="0" smtClean="0"/>
-              <a:t> R</a:t>
-            </a:r>
-            <a:r>
-              <a:rPr lang="en-US" baseline="30000" dirty="0" smtClean="0"/>
-              <a:t>2</a:t>
-            </a:r>
-            <a:r>
-              <a:rPr lang="en-US" dirty="0" smtClean="0"/>
-              <a:t> was 0.415, which indicates that 41.5 percent of the probability that a patent received more than 2 citations was explained by the IVs included in the model. </a:t>
-            </a:r>
-          </a:p>
-          <a:p>
-            <a:pPr marL="0" indent="0">
-              <a:buFont typeface="Arial" panose="020B0604020202020204" pitchFamily="34" charset="0"/>
-              <a:buNone/>
-            </a:pPr>
-            <a:endParaRPr lang="en-US" dirty="0" smtClean="0"/>
-          </a:p>
-          <a:p>
-            <a:pPr marL="0" indent="0">
-              <a:buFont typeface="Arial" panose="020B0604020202020204" pitchFamily="34" charset="0"/>
-              <a:buNone/>
-            </a:pPr>
-            <a:r>
-              <a:rPr lang="en-US" dirty="0" smtClean="0"/>
-              <a:t>Hosmer-</a:t>
-            </a:r>
-            <a:r>
-              <a:rPr lang="en-US" dirty="0" err="1" smtClean="0"/>
-              <a:t>Lemeshow</a:t>
-            </a:r>
-            <a:r>
-              <a:rPr lang="en-US" baseline="0" dirty="0" smtClean="0"/>
-              <a:t> Test results suggest a lack of fit for the model.</a:t>
-            </a:r>
-          </a:p>
-          <a:p>
-            <a:pPr marL="171450" indent="-171450">
-              <a:buFont typeface="Arial" panose="020B0604020202020204" pitchFamily="34" charset="0"/>
-              <a:buChar char="•"/>
-            </a:pPr>
-            <a:r>
-              <a:rPr lang="en-US" dirty="0" smtClean="0"/>
-              <a:t>The chi-square value was 23.671, which does not seem very small.  </a:t>
-            </a:r>
-          </a:p>
-          <a:p>
-            <a:pPr marL="171450" indent="-171450">
-              <a:buFont typeface="Arial" panose="020B0604020202020204" pitchFamily="34" charset="0"/>
-              <a:buChar char="•"/>
-            </a:pPr>
-            <a:r>
-              <a:rPr lang="en-US" dirty="0" smtClean="0"/>
-              <a:t>The p-value was 0.003 which is not much above the 0.001 significance level. </a:t>
-            </a:r>
-          </a:p>
-        </p:txBody>
-      </p:sp>
-      <p:sp>
-        <p:nvSpPr>
-          <p:cNvPr id="4" name="Slide Number Placeholder 3"/>
-          <p:cNvSpPr>
-            <a:spLocks noGrp="1"/>
-          </p:cNvSpPr>
-          <p:nvPr>
-            <p:ph type="sldNum" sz="quarter" idx="10"/>
-          </p:nvPr>
-        </p:nvSpPr>
-        <p:spPr/>
-        <p:txBody>
-          <a:bodyPr/>
-          <a:lstStyle/>
-          <a:p>
-            <a:fld id="{76C7EBE9-FBA5-4606-B4BF-D5A892555425}" type="slidenum">
-              <a:rPr lang="en-US" smtClean="0"/>
-              <a:t>20</a:t>
-            </a:fld>
-            <a:endParaRPr lang="en-US"/>
-          </a:p>
-        </p:txBody>
-      </p:sp>
-    </p:spTree>
-    <p:extLst>
-      <p:ext uri="{BB962C8B-B14F-4D97-AF65-F5344CB8AC3E}">
-        <p14:creationId xmlns:p14="http://schemas.microsoft.com/office/powerpoint/2010/main" val="2230387569"/>
-      </p:ext>
-    </p:extLst>
-  </p:cSld>
-  <p:clrMapOvr>
-    <a:masterClrMapping/>
-  </p:clrMapOvr>
-</p:notes>
-</file>
-
-<file path=ppt/notesSlides/notesSlide9.xml><?xml version="1.0" encoding="utf-8"?>
-<p:notes xmlns:a="http://schemas.openxmlformats.org/drawingml/2006/main" xmlns:r="http://schemas.openxmlformats.org/officeDocument/2006/relationships" xmlns:p="http://schemas.openxmlformats.org/presentationml/2006/main">
-  <p:cSld>
-    <p:spTree>
-      <p:nvGrpSpPr>
-        <p:cNvPr id="1" name=""/>
-        <p:cNvGrpSpPr/>
-        <p:nvPr/>
-      </p:nvGrpSpPr>
-      <p:grpSpPr>
-        <a:xfrm>
-          <a:off x="0" y="0"/>
-          <a:ext cx="0" cy="0"/>
-          <a:chOff x="0" y="0"/>
-          <a:chExt cx="0" cy="0"/>
-        </a:xfrm>
-      </p:grpSpPr>
-      <p:sp>
-        <p:nvSpPr>
-          <p:cNvPr id="2" name="Slide Image Placeholder 1"/>
-          <p:cNvSpPr>
-            <a:spLocks noGrp="1" noRot="1" noChangeAspect="1"/>
-          </p:cNvSpPr>
-          <p:nvPr>
-            <p:ph type="sldImg"/>
-          </p:nvPr>
-        </p:nvSpPr>
-        <p:spPr/>
-      </p:sp>
-      <p:sp>
-        <p:nvSpPr>
-          <p:cNvPr id="3" name="Notes Placeholder 2"/>
-          <p:cNvSpPr>
-            <a:spLocks noGrp="1"/>
-          </p:cNvSpPr>
-          <p:nvPr>
-            <p:ph type="body" idx="1"/>
-          </p:nvPr>
-        </p:nvSpPr>
-        <p:spPr/>
-        <p:txBody>
-          <a:bodyPr/>
-          <a:lstStyle/>
-          <a:p>
-            <a:r>
-              <a:rPr lang="en-US" dirty="0" smtClean="0"/>
-              <a:t>The GENERAL variable had the strongest association with the DV.  </a:t>
-            </a:r>
-          </a:p>
-          <a:p>
-            <a:r>
-              <a:rPr lang="en-US" dirty="0" smtClean="0"/>
-              <a:t>For a one unit increase in the GENERAL variable, the patent was 113.6 times more likely to have been cited by 3 or more times</a:t>
-            </a:r>
-            <a:r>
-              <a:rPr lang="en-US" baseline="0" dirty="0" smtClean="0"/>
-              <a:t> by </a:t>
-            </a:r>
-            <a:r>
-              <a:rPr lang="en-US" dirty="0" smtClean="0"/>
-              <a:t>other patents. </a:t>
-            </a:r>
-          </a:p>
-          <a:p>
-            <a:r>
-              <a:rPr lang="en-US" dirty="0" smtClean="0"/>
-              <a:t>Influence of the GENERAL</a:t>
-            </a:r>
-            <a:r>
-              <a:rPr lang="en-US" baseline="0" dirty="0" smtClean="0"/>
-              <a:t> variable was much higher than expected.</a:t>
-            </a:r>
-            <a:endParaRPr lang="en-US" dirty="0"/>
-          </a:p>
-        </p:txBody>
-      </p:sp>
-      <p:sp>
-        <p:nvSpPr>
-          <p:cNvPr id="4" name="Slide Number Placeholder 3"/>
-          <p:cNvSpPr>
-            <a:spLocks noGrp="1"/>
-          </p:cNvSpPr>
-          <p:nvPr>
-            <p:ph type="sldNum" sz="quarter" idx="10"/>
-          </p:nvPr>
-        </p:nvSpPr>
-        <p:spPr/>
-        <p:txBody>
-          <a:bodyPr/>
-          <a:lstStyle/>
-          <a:p>
-            <a:fld id="{76C7EBE9-FBA5-4606-B4BF-D5A892555425}" type="slidenum">
-              <a:rPr lang="en-US" smtClean="0"/>
-              <a:t>21</a:t>
-            </a:fld>
-            <a:endParaRPr lang="en-US"/>
-          </a:p>
-        </p:txBody>
-      </p:sp>
-    </p:spTree>
-    <p:extLst>
-      <p:ext uri="{BB962C8B-B14F-4D97-AF65-F5344CB8AC3E}">
-        <p14:creationId xmlns:p14="http://schemas.microsoft.com/office/powerpoint/2010/main" val="4292587423"/>
       </p:ext>
     </p:extLst>
   </p:cSld>
@@ -4757,14 +5101,27 @@
             <a:pPr algn="ctr"/>
             <a:r>
               <a:rPr lang="en-US" sz="2800" b="1" dirty="0" smtClean="0"/>
-              <a:t>Investigating the Feasibility of Using Patent Citations to </a:t>
-            </a:r>
+              <a:t>Investigating the Feasibility of Using </a:t>
+            </a:r>
+            <a:endParaRPr lang="en-US" sz="2800" b="1" dirty="0" smtClean="0"/>
           </a:p>
           <a:p>
             <a:pPr algn="ctr"/>
             <a:r>
               <a:rPr lang="en-US" sz="2800" b="1" dirty="0" smtClean="0"/>
-              <a:t>Assess Technology Transfer Outcomes</a:t>
+              <a:t>Patent </a:t>
+            </a:r>
+            <a:r>
+              <a:rPr lang="en-US" sz="2800" b="1" dirty="0" smtClean="0"/>
+              <a:t>Citations </a:t>
+            </a:r>
+            <a:r>
+              <a:rPr lang="en-US" sz="2800" b="1" dirty="0" smtClean="0"/>
+              <a:t>as a Measure of </a:t>
+            </a:r>
+            <a:r>
+              <a:rPr lang="en-US" sz="2800" b="1" dirty="0" smtClean="0"/>
+              <a:t>Technology Transfer</a:t>
             </a:r>
             <a:endParaRPr lang="en-US" sz="2800" b="1" dirty="0"/>
           </a:p>
@@ -5167,7 +5524,47 @@
                 <a:ea typeface="Calibri"/>
                 <a:cs typeface="Times New Roman"/>
               </a:rPr>
-              <a:t>	</a:t>
+              <a:t>	β</a:t>
+            </a:r>
+            <a:r>
+              <a:rPr lang="en-US" baseline="-25000" dirty="0">
+                <a:latin typeface="Times New Roman"/>
+                <a:ea typeface="Calibri"/>
+                <a:cs typeface="Times New Roman"/>
+              </a:rPr>
+              <a:t>7</a:t>
+            </a:r>
+            <a:r>
+              <a:rPr lang="en-US" dirty="0" smtClean="0">
+                <a:latin typeface="Times New Roman"/>
+                <a:ea typeface="Calibri"/>
+                <a:cs typeface="Times New Roman"/>
+              </a:rPr>
+              <a:t>(</a:t>
+            </a:r>
+            <a:r>
+              <a:rPr lang="en-US" dirty="0" smtClean="0">
+                <a:latin typeface="Courier New"/>
+                <a:ea typeface="Calibri"/>
+                <a:cs typeface="Times New Roman"/>
+              </a:rPr>
+              <a:t>FWDAPLAG</a:t>
+            </a:r>
+            <a:r>
+              <a:rPr lang="en-US" dirty="0">
+                <a:latin typeface="Courier New"/>
+                <a:ea typeface="Calibri"/>
+                <a:cs typeface="Times New Roman"/>
+              </a:rPr>
+              <a:t>)</a:t>
+            </a:r>
+            <a:r>
+              <a:rPr lang="en-US" dirty="0">
+                <a:latin typeface="Times New Roman"/>
+                <a:ea typeface="Calibri"/>
+                <a:cs typeface="Times New Roman"/>
+              </a:rPr>
+              <a:t> + </a:t>
             </a:r>
             <a:r>
               <a:rPr lang="en-US" dirty="0" smtClean="0">
@@ -5183,7 +5580,7 @@
                 <a:ea typeface="Calibri"/>
                 <a:cs typeface="Times New Roman"/>
               </a:rPr>
-              <a:t>7</a:t>
+              <a:t>8</a:t>
             </a:r>
             <a:r>
               <a:rPr lang="en-US" dirty="0" smtClean="0">
@@ -5199,7 +5596,7 @@
                 <a:ea typeface="Calibri"/>
                 <a:cs typeface="Times New Roman"/>
               </a:rPr>
-              <a:t>FWDAPLAG</a:t>
+              <a:t>SELFCTUB</a:t>
             </a:r>
             <a:r>
               <a:rPr lang="en-US" dirty="0">
@@ -5223,7 +5620,7 @@
                 <a:ea typeface="Calibri"/>
                 <a:cs typeface="Times New Roman"/>
               </a:rPr>
-              <a:t>β</a:t>
+              <a:t>		β</a:t>
             </a:r>
             <a:r>
               <a:rPr lang="en-US" baseline="-25000" dirty="0">
@@ -5231,7 +5628,7 @@
                 <a:ea typeface="Calibri"/>
                 <a:cs typeface="Times New Roman"/>
               </a:rPr>
-              <a:t>8</a:t>
+              <a:t>9</a:t>
             </a:r>
             <a:r>
               <a:rPr lang="en-US" dirty="0" smtClean="0">
@@ -5247,54 +5644,6 @@
                 <a:ea typeface="Calibri"/>
                 <a:cs typeface="Times New Roman"/>
               </a:rPr>
-              <a:t>SELFCTUB</a:t>
-            </a:r>
-            <a:r>
-              <a:rPr lang="en-US" dirty="0">
-                <a:latin typeface="Courier New"/>
-                <a:ea typeface="Calibri"/>
-                <a:cs typeface="Times New Roman"/>
-              </a:rPr>
-              <a:t>)</a:t>
-            </a:r>
-            <a:r>
-              <a:rPr lang="en-US" dirty="0">
-                <a:latin typeface="Times New Roman"/>
-                <a:ea typeface="Calibri"/>
-                <a:cs typeface="Times New Roman"/>
-              </a:rPr>
-              <a:t> + </a:t>
-            </a:r>
-            <a:r>
-              <a:rPr lang="en-US" dirty="0" smtClean="0">
-                <a:latin typeface="Times New Roman"/>
-                <a:ea typeface="Calibri"/>
-                <a:cs typeface="Times New Roman"/>
-              </a:rPr>
-              <a:t>		β</a:t>
-            </a:r>
-            <a:r>
-              <a:rPr lang="en-US" baseline="-25000" dirty="0">
-                <a:latin typeface="Times New Roman"/>
-                <a:ea typeface="Calibri"/>
-                <a:cs typeface="Times New Roman"/>
-              </a:rPr>
-              <a:t>9</a:t>
-            </a:r>
-            <a:r>
-              <a:rPr lang="en-US" dirty="0" smtClean="0">
-                <a:latin typeface="Times New Roman"/>
-                <a:ea typeface="Calibri"/>
-                <a:cs typeface="Times New Roman"/>
-              </a:rPr>
-              <a:t>(</a:t>
-            </a:r>
-            <a:r>
-              <a:rPr lang="en-US" dirty="0" smtClean="0">
-                <a:latin typeface="Courier New"/>
-                <a:ea typeface="Calibri"/>
-                <a:cs typeface="Times New Roman"/>
-              </a:rPr>
               <a:t>SELFCTLB</a:t>
             </a:r>
             <a:r>
@@ -5343,15 +5692,7 @@
                 <a:ea typeface="Calibri"/>
                 <a:cs typeface="Times New Roman"/>
               </a:rPr>
-              <a:t> + </a:t>
-            </a:r>
-            <a:r>
-              <a:rPr lang="en-US" dirty="0">
-                <a:latin typeface="Times New Roman"/>
-                <a:ea typeface="Calibri"/>
-                <a:cs typeface="Times New Roman"/>
-              </a:rPr>
-              <a:t> </a:t>
+              <a:t> +  </a:t>
             </a:r>
             <a:r>
               <a:rPr lang="en-US" dirty="0" smtClean="0">
@@ -5414,7 +5755,7 @@
         </p:nvSpPr>
         <p:spPr>
           <a:xfrm>
-            <a:off x="226286" y="1597075"/>
+            <a:off x="226286" y="1446947"/>
             <a:ext cx="2343014" cy="408125"/>
           </a:xfrm>
           <a:prstGeom prst="rect">
@@ -5535,7 +5876,7 @@
         </p:nvSpPr>
         <p:spPr>
           <a:xfrm>
-            <a:off x="3152040" y="1597074"/>
+            <a:off x="3152040" y="1446946"/>
             <a:ext cx="4469493" cy="388633"/>
           </a:xfrm>
           <a:prstGeom prst="rect">
@@ -5848,406 +6189,421 @@
           <a:chExt cx="0" cy="0"/>
         </a:xfrm>
       </p:grpSpPr>
-      <p:pic>
-        <p:nvPicPr>
-          <p:cNvPr id="5124" name="Picture 4"/>
-          <p:cNvPicPr>
-            <a:picLocks noChangeAspect="1" noChangeArrowheads="1"/>
-          </p:cNvPicPr>
+      <p:grpSp>
+        <p:nvGrpSpPr>
+          <p:cNvPr id="3" name="Group 2"/>
+          <p:cNvGrpSpPr/>
           <p:nvPr/>
-        </p:nvPicPr>
-        <p:blipFill>
-          <a:blip r:embed="rId2">
-            <a:extLst>
-              <a:ext uri="{28A0092B-C50C-407E-A947-70E740481C1C}">
-                <a14:useLocalDpi xmlns:a14="http://schemas.microsoft.com/office/drawing/2010/main" val="0"/>
-              </a:ext>
-            </a:extLst>
-          </a:blip>
-          <a:srcRect/>
-          <a:stretch>
-            <a:fillRect/>
-          </a:stretch>
-        </p:blipFill>
-        <p:spPr bwMode="auto">
+        </p:nvGrpSpPr>
+        <p:grpSpPr>
           <a:xfrm>
             <a:off x="0" y="958215"/>
             <a:ext cx="9144000" cy="3189956"/>
+            <a:chOff x="0" y="958215"/>
+            <a:chExt cx="9144000" cy="3189956"/>
           </a:xfrm>
-          <a:prstGeom prst="rect">
-            <a:avLst/>
-          </a:prstGeom>
-          <a:noFill/>
-          <a:ln>
+        </p:grpSpPr>
+        <p:pic>
+          <p:nvPicPr>
+            <p:cNvPr id="5124" name="Picture 4"/>
+            <p:cNvPicPr>
+              <a:picLocks noChangeAspect="1" noChangeArrowheads="1"/>
+            </p:cNvPicPr>
+            <p:nvPr/>
+          </p:nvPicPr>
+          <p:blipFill>
+            <a:blip r:embed="rId3">
+              <a:extLst>
+                <a:ext uri="{28A0092B-C50C-407E-A947-70E740481C1C}">
+                  <a14:useLocalDpi xmlns:a14="http://schemas.microsoft.com/office/drawing/2010/main" val="0"/>
+                </a:ext>
+              </a:extLst>
+            </a:blip>
+            <a:srcRect/>
+            <a:stretch>
+              <a:fillRect/>
+            </a:stretch>
+          </p:blipFill>
+          <p:spPr bwMode="auto">
+            <a:xfrm>
+              <a:off x="0" y="958215"/>
+              <a:ext cx="9144000" cy="3189956"/>
+            </a:xfrm>
+            <a:prstGeom prst="rect">
+              <a:avLst/>
+            </a:prstGeom>
             <a:noFill/>
-          </a:ln>
-          <a:effectLst/>
-          <a:extLst>
-            <a:ext uri="{909E8E84-426E-40DD-AFC4-6F175D3DCCD1}">
-              <a14:hiddenFill xmlns:a14="http://schemas.microsoft.com/office/drawing/2010/main">
-                <a:solidFill>
-                  <a:schemeClr val="accent1"/>
-                </a:solidFill>
-              </a14:hiddenFill>
-            </a:ext>
-            <a:ext uri="{91240B29-F687-4F45-9708-019B960494DF}">
-              <a14:hiddenLine xmlns:a14="http://schemas.microsoft.com/office/drawing/2010/main" w="9525">
-                <a:solidFill>
-                  <a:schemeClr val="tx1"/>
-                </a:solidFill>
-                <a:miter lim="800000"/>
-                <a:headEnd/>
-                <a:tailEnd/>
-              </a14:hiddenLine>
-            </a:ext>
-            <a:ext uri="{AF507438-7753-43E0-B8FC-AC1667EBCBE1}">
-              <a14:hiddenEffects xmlns:a14="http://schemas.microsoft.com/office/drawing/2010/main">
-                <a:effectLst>
-                  <a:outerShdw dist="35921" dir="2700000" algn="ctr" rotWithShape="0">
-                    <a:schemeClr val="bg2"/>
-                  </a:outerShdw>
-                </a:effectLst>
-              </a14:hiddenEffects>
-            </a:ext>
-          </a:extLst>
-        </p:spPr>
-      </p:pic>
-      <p:sp>
-        <p:nvSpPr>
-          <p:cNvPr id="2" name="Rectangle 1"/>
-          <p:cNvSpPr/>
-          <p:nvPr/>
-        </p:nvSpPr>
-        <p:spPr>
-          <a:xfrm>
-            <a:off x="7898130" y="3177540"/>
-            <a:ext cx="617220" cy="737235"/>
-          </a:xfrm>
-          <a:prstGeom prst="rect">
-            <a:avLst/>
-          </a:prstGeom>
-          <a:solidFill>
-            <a:srgbClr val="FFFF00">
-              <a:alpha val="30000"/>
-            </a:srgbClr>
-          </a:solidFill>
-          <a:ln>
-            <a:noFill/>
-          </a:ln>
-        </p:spPr>
-        <p:style>
-          <a:lnRef idx="2">
-            <a:schemeClr val="accent1">
-              <a:shade val="50000"/>
-            </a:schemeClr>
-          </a:lnRef>
-          <a:fillRef idx="1">
-            <a:schemeClr val="accent1"/>
-          </a:fillRef>
-          <a:effectRef idx="0">
-            <a:schemeClr val="accent1"/>
-          </a:effectRef>
-          <a:fontRef idx="minor">
-            <a:schemeClr val="lt1"/>
-          </a:fontRef>
-        </p:style>
-        <p:txBody>
-          <a:bodyPr rtlCol="0" anchor="ctr"/>
-          <a:lstStyle/>
-          <a:p>
-            <a:pPr algn="ctr"/>
-            <a:endParaRPr lang="en-US"/>
-          </a:p>
-        </p:txBody>
-      </p:sp>
-      <p:sp>
-        <p:nvSpPr>
-          <p:cNvPr id="6" name="Rectangle 5"/>
-          <p:cNvSpPr/>
-          <p:nvPr/>
-        </p:nvSpPr>
-        <p:spPr>
-          <a:xfrm>
-            <a:off x="7898130" y="1924051"/>
-            <a:ext cx="617220" cy="156210"/>
-          </a:xfrm>
-          <a:prstGeom prst="rect">
-            <a:avLst/>
-          </a:prstGeom>
-          <a:solidFill>
-            <a:srgbClr val="FFFF00">
-              <a:alpha val="30000"/>
-            </a:srgbClr>
-          </a:solidFill>
-          <a:ln>
-            <a:noFill/>
-          </a:ln>
-        </p:spPr>
-        <p:style>
-          <a:lnRef idx="2">
-            <a:schemeClr val="accent1">
-              <a:shade val="50000"/>
-            </a:schemeClr>
-          </a:lnRef>
-          <a:fillRef idx="1">
-            <a:schemeClr val="accent1"/>
-          </a:fillRef>
-          <a:effectRef idx="0">
-            <a:schemeClr val="accent1"/>
-          </a:effectRef>
-          <a:fontRef idx="minor">
-            <a:schemeClr val="lt1"/>
-          </a:fontRef>
-        </p:style>
-        <p:txBody>
-          <a:bodyPr rtlCol="0" anchor="ctr"/>
-          <a:lstStyle/>
-          <a:p>
-            <a:pPr algn="ctr"/>
-            <a:endParaRPr lang="en-US"/>
-          </a:p>
-        </p:txBody>
-      </p:sp>
-      <p:sp>
-        <p:nvSpPr>
-          <p:cNvPr id="7" name="Rectangle 6"/>
-          <p:cNvSpPr/>
-          <p:nvPr/>
-        </p:nvSpPr>
-        <p:spPr>
-          <a:xfrm>
-            <a:off x="7898130" y="2461038"/>
-            <a:ext cx="617220" cy="184309"/>
-          </a:xfrm>
-          <a:prstGeom prst="rect">
-            <a:avLst/>
-          </a:prstGeom>
-          <a:solidFill>
-            <a:srgbClr val="FFFF00">
-              <a:alpha val="30000"/>
-            </a:srgbClr>
-          </a:solidFill>
-          <a:ln>
-            <a:noFill/>
-          </a:ln>
-        </p:spPr>
-        <p:style>
-          <a:lnRef idx="2">
-            <a:schemeClr val="accent1">
-              <a:shade val="50000"/>
-            </a:schemeClr>
-          </a:lnRef>
-          <a:fillRef idx="1">
-            <a:schemeClr val="accent1"/>
-          </a:fillRef>
-          <a:effectRef idx="0">
-            <a:schemeClr val="accent1"/>
-          </a:effectRef>
-          <a:fontRef idx="minor">
-            <a:schemeClr val="lt1"/>
-          </a:fontRef>
-        </p:style>
-        <p:txBody>
-          <a:bodyPr rtlCol="0" anchor="ctr"/>
-          <a:lstStyle/>
-          <a:p>
-            <a:pPr algn="ctr"/>
-            <a:endParaRPr lang="en-US"/>
-          </a:p>
-        </p:txBody>
-      </p:sp>
-      <p:sp>
-        <p:nvSpPr>
-          <p:cNvPr id="8" name="Rectangle 7"/>
-          <p:cNvSpPr/>
-          <p:nvPr/>
-        </p:nvSpPr>
-        <p:spPr>
-          <a:xfrm>
-            <a:off x="7898130" y="2820607"/>
-            <a:ext cx="617220" cy="184309"/>
-          </a:xfrm>
-          <a:prstGeom prst="rect">
-            <a:avLst/>
-          </a:prstGeom>
-          <a:solidFill>
-            <a:srgbClr val="FFFF00">
-              <a:alpha val="30000"/>
-            </a:srgbClr>
-          </a:solidFill>
-          <a:ln>
-            <a:noFill/>
-          </a:ln>
-        </p:spPr>
-        <p:style>
-          <a:lnRef idx="2">
-            <a:schemeClr val="accent1">
-              <a:shade val="50000"/>
-            </a:schemeClr>
-          </a:lnRef>
-          <a:fillRef idx="1">
-            <a:schemeClr val="accent1"/>
-          </a:fillRef>
-          <a:effectRef idx="0">
-            <a:schemeClr val="accent1"/>
-          </a:effectRef>
-          <a:fontRef idx="minor">
-            <a:schemeClr val="lt1"/>
-          </a:fontRef>
-        </p:style>
-        <p:txBody>
-          <a:bodyPr rtlCol="0" anchor="ctr"/>
-          <a:lstStyle/>
-          <a:p>
-            <a:pPr algn="ctr"/>
-            <a:endParaRPr lang="en-US"/>
-          </a:p>
-        </p:txBody>
-      </p:sp>
-      <p:sp>
-        <p:nvSpPr>
-          <p:cNvPr id="9" name="Rectangle 8"/>
-          <p:cNvSpPr/>
-          <p:nvPr/>
-        </p:nvSpPr>
-        <p:spPr>
-          <a:xfrm>
-            <a:off x="3989070" y="3177540"/>
-            <a:ext cx="537210" cy="737235"/>
-          </a:xfrm>
-          <a:prstGeom prst="rect">
-            <a:avLst/>
-          </a:prstGeom>
-          <a:solidFill>
-            <a:srgbClr val="FFFF00">
-              <a:alpha val="30000"/>
-            </a:srgbClr>
-          </a:solidFill>
-          <a:ln>
-            <a:noFill/>
-          </a:ln>
-        </p:spPr>
-        <p:style>
-          <a:lnRef idx="2">
-            <a:schemeClr val="accent1">
-              <a:shade val="50000"/>
-            </a:schemeClr>
-          </a:lnRef>
-          <a:fillRef idx="1">
-            <a:schemeClr val="accent1"/>
-          </a:fillRef>
-          <a:effectRef idx="0">
-            <a:schemeClr val="accent1"/>
-          </a:effectRef>
-          <a:fontRef idx="minor">
-            <a:schemeClr val="lt1"/>
-          </a:fontRef>
-        </p:style>
-        <p:txBody>
-          <a:bodyPr rtlCol="0" anchor="ctr"/>
-          <a:lstStyle/>
-          <a:p>
-            <a:pPr algn="ctr"/>
-            <a:endParaRPr lang="en-US"/>
-          </a:p>
-        </p:txBody>
-      </p:sp>
-      <p:sp>
-        <p:nvSpPr>
-          <p:cNvPr id="10" name="Rectangle 9"/>
-          <p:cNvSpPr/>
-          <p:nvPr/>
-        </p:nvSpPr>
-        <p:spPr>
-          <a:xfrm>
-            <a:off x="3989070" y="2461038"/>
-            <a:ext cx="548640" cy="184309"/>
-          </a:xfrm>
-          <a:prstGeom prst="rect">
-            <a:avLst/>
-          </a:prstGeom>
-          <a:solidFill>
-            <a:srgbClr val="FFFF00">
-              <a:alpha val="30000"/>
-            </a:srgbClr>
-          </a:solidFill>
-          <a:ln>
-            <a:noFill/>
-          </a:ln>
-        </p:spPr>
-        <p:style>
-          <a:lnRef idx="2">
-            <a:schemeClr val="accent1">
-              <a:shade val="50000"/>
-            </a:schemeClr>
-          </a:lnRef>
-          <a:fillRef idx="1">
-            <a:schemeClr val="accent1"/>
-          </a:fillRef>
-          <a:effectRef idx="0">
-            <a:schemeClr val="accent1"/>
-          </a:effectRef>
-          <a:fontRef idx="minor">
-            <a:schemeClr val="lt1"/>
-          </a:fontRef>
-        </p:style>
-        <p:txBody>
-          <a:bodyPr rtlCol="0" anchor="ctr"/>
-          <a:lstStyle/>
-          <a:p>
-            <a:pPr algn="ctr"/>
-            <a:endParaRPr lang="en-US"/>
-          </a:p>
-        </p:txBody>
-      </p:sp>
-      <p:sp>
-        <p:nvSpPr>
-          <p:cNvPr id="11" name="Rectangle 10"/>
-          <p:cNvSpPr/>
-          <p:nvPr/>
-        </p:nvSpPr>
-        <p:spPr>
-          <a:xfrm>
-            <a:off x="3989070" y="1909303"/>
-            <a:ext cx="548640" cy="184309"/>
-          </a:xfrm>
-          <a:prstGeom prst="rect">
-            <a:avLst/>
-          </a:prstGeom>
-          <a:solidFill>
-            <a:srgbClr val="FFFF00">
-              <a:alpha val="30000"/>
-            </a:srgbClr>
-          </a:solidFill>
-          <a:ln>
-            <a:noFill/>
-          </a:ln>
-        </p:spPr>
-        <p:style>
-          <a:lnRef idx="2">
-            <a:schemeClr val="accent1">
-              <a:shade val="50000"/>
-            </a:schemeClr>
-          </a:lnRef>
-          <a:fillRef idx="1">
-            <a:schemeClr val="accent1"/>
-          </a:fillRef>
-          <a:effectRef idx="0">
-            <a:schemeClr val="accent1"/>
-          </a:effectRef>
-          <a:fontRef idx="minor">
-            <a:schemeClr val="lt1"/>
-          </a:fontRef>
-        </p:style>
-        <p:txBody>
-          <a:bodyPr rtlCol="0" anchor="ctr"/>
-          <a:lstStyle/>
-          <a:p>
-            <a:pPr algn="ctr"/>
-            <a:endParaRPr lang="en-US"/>
-          </a:p>
-        </p:txBody>
-      </p:sp>
+            <a:ln>
+              <a:noFill/>
+            </a:ln>
+            <a:effectLst/>
+            <a:extLst>
+              <a:ext uri="{909E8E84-426E-40DD-AFC4-6F175D3DCCD1}">
+                <a14:hiddenFill xmlns:a14="http://schemas.microsoft.com/office/drawing/2010/main">
+                  <a:solidFill>
+                    <a:schemeClr val="accent1"/>
+                  </a:solidFill>
+                </a14:hiddenFill>
+              </a:ext>
+              <a:ext uri="{91240B29-F687-4F45-9708-019B960494DF}">
+                <a14:hiddenLine xmlns:a14="http://schemas.microsoft.com/office/drawing/2010/main" w="9525">
+                  <a:solidFill>
+                    <a:schemeClr val="tx1"/>
+                  </a:solidFill>
+                  <a:miter lim="800000"/>
+                  <a:headEnd/>
+                  <a:tailEnd/>
+                </a14:hiddenLine>
+              </a:ext>
+              <a:ext uri="{AF507438-7753-43E0-B8FC-AC1667EBCBE1}">
+                <a14:hiddenEffects xmlns:a14="http://schemas.microsoft.com/office/drawing/2010/main">
+                  <a:effectLst>
+                    <a:outerShdw dist="35921" dir="2700000" algn="ctr" rotWithShape="0">
+                      <a:schemeClr val="bg2"/>
+                    </a:outerShdw>
+                  </a:effectLst>
+                </a14:hiddenEffects>
+              </a:ext>
+            </a:extLst>
+          </p:spPr>
+        </p:pic>
+        <p:sp>
+          <p:nvSpPr>
+            <p:cNvPr id="2" name="Rectangle 1"/>
+            <p:cNvSpPr/>
+            <p:nvPr/>
+          </p:nvSpPr>
+          <p:spPr>
+            <a:xfrm>
+              <a:off x="7898130" y="3177540"/>
+              <a:ext cx="617220" cy="737235"/>
+            </a:xfrm>
+            <a:prstGeom prst="rect">
+              <a:avLst/>
+            </a:prstGeom>
+            <a:solidFill>
+              <a:srgbClr val="FFFF00">
+                <a:alpha val="30000"/>
+              </a:srgbClr>
+            </a:solidFill>
+            <a:ln>
+              <a:noFill/>
+            </a:ln>
+          </p:spPr>
+          <p:style>
+            <a:lnRef idx="2">
+              <a:schemeClr val="accent1">
+                <a:shade val="50000"/>
+              </a:schemeClr>
+            </a:lnRef>
+            <a:fillRef idx="1">
+              <a:schemeClr val="accent1"/>
+            </a:fillRef>
+            <a:effectRef idx="0">
+              <a:schemeClr val="accent1"/>
+            </a:effectRef>
+            <a:fontRef idx="minor">
+              <a:schemeClr val="lt1"/>
+            </a:fontRef>
+          </p:style>
+          <p:txBody>
+            <a:bodyPr rtlCol="0" anchor="ctr"/>
+            <a:lstStyle/>
+            <a:p>
+              <a:pPr algn="ctr"/>
+              <a:endParaRPr lang="en-US"/>
+            </a:p>
+          </p:txBody>
+        </p:sp>
+        <p:sp>
+          <p:nvSpPr>
+            <p:cNvPr id="6" name="Rectangle 5"/>
+            <p:cNvSpPr/>
+            <p:nvPr/>
+          </p:nvSpPr>
+          <p:spPr>
+            <a:xfrm>
+              <a:off x="7898130" y="1924051"/>
+              <a:ext cx="617220" cy="156210"/>
+            </a:xfrm>
+            <a:prstGeom prst="rect">
+              <a:avLst/>
+            </a:prstGeom>
+            <a:solidFill>
+              <a:srgbClr val="FFFF00">
+                <a:alpha val="30000"/>
+              </a:srgbClr>
+            </a:solidFill>
+            <a:ln>
+              <a:noFill/>
+            </a:ln>
+          </p:spPr>
+          <p:style>
+            <a:lnRef idx="2">
+              <a:schemeClr val="accent1">
+                <a:shade val="50000"/>
+              </a:schemeClr>
+            </a:lnRef>
+            <a:fillRef idx="1">
+              <a:schemeClr val="accent1"/>
+            </a:fillRef>
+            <a:effectRef idx="0">
+              <a:schemeClr val="accent1"/>
+            </a:effectRef>
+            <a:fontRef idx="minor">
+              <a:schemeClr val="lt1"/>
+            </a:fontRef>
+          </p:style>
+          <p:txBody>
+            <a:bodyPr rtlCol="0" anchor="ctr"/>
+            <a:lstStyle/>
+            <a:p>
+              <a:pPr algn="ctr"/>
+              <a:endParaRPr lang="en-US"/>
+            </a:p>
+          </p:txBody>
+        </p:sp>
+        <p:sp>
+          <p:nvSpPr>
+            <p:cNvPr id="7" name="Rectangle 6"/>
+            <p:cNvSpPr/>
+            <p:nvPr/>
+          </p:nvSpPr>
+          <p:spPr>
+            <a:xfrm>
+              <a:off x="7898130" y="2461038"/>
+              <a:ext cx="617220" cy="184309"/>
+            </a:xfrm>
+            <a:prstGeom prst="rect">
+              <a:avLst/>
+            </a:prstGeom>
+            <a:solidFill>
+              <a:srgbClr val="FFFF00">
+                <a:alpha val="30000"/>
+              </a:srgbClr>
+            </a:solidFill>
+            <a:ln>
+              <a:noFill/>
+            </a:ln>
+          </p:spPr>
+          <p:style>
+            <a:lnRef idx="2">
+              <a:schemeClr val="accent1">
+                <a:shade val="50000"/>
+              </a:schemeClr>
+            </a:lnRef>
+            <a:fillRef idx="1">
+              <a:schemeClr val="accent1"/>
+            </a:fillRef>
+            <a:effectRef idx="0">
+              <a:schemeClr val="accent1"/>
+            </a:effectRef>
+            <a:fontRef idx="minor">
+              <a:schemeClr val="lt1"/>
+            </a:fontRef>
+          </p:style>
+          <p:txBody>
+            <a:bodyPr rtlCol="0" anchor="ctr"/>
+            <a:lstStyle/>
+            <a:p>
+              <a:pPr algn="ctr"/>
+              <a:endParaRPr lang="en-US"/>
+            </a:p>
+          </p:txBody>
+        </p:sp>
+        <p:sp>
+          <p:nvSpPr>
+            <p:cNvPr id="8" name="Rectangle 7"/>
+            <p:cNvSpPr/>
+            <p:nvPr/>
+          </p:nvSpPr>
+          <p:spPr>
+            <a:xfrm>
+              <a:off x="7898130" y="2820607"/>
+              <a:ext cx="617220" cy="184309"/>
+            </a:xfrm>
+            <a:prstGeom prst="rect">
+              <a:avLst/>
+            </a:prstGeom>
+            <a:solidFill>
+              <a:srgbClr val="FFFF00">
+                <a:alpha val="30000"/>
+              </a:srgbClr>
+            </a:solidFill>
+            <a:ln>
+              <a:noFill/>
+            </a:ln>
+          </p:spPr>
+          <p:style>
+            <a:lnRef idx="2">
+              <a:schemeClr val="accent1">
+                <a:shade val="50000"/>
+              </a:schemeClr>
+            </a:lnRef>
+            <a:fillRef idx="1">
+              <a:schemeClr val="accent1"/>
+            </a:fillRef>
+            <a:effectRef idx="0">
+              <a:schemeClr val="accent1"/>
+            </a:effectRef>
+            <a:fontRef idx="minor">
+              <a:schemeClr val="lt1"/>
+            </a:fontRef>
+          </p:style>
+          <p:txBody>
+            <a:bodyPr rtlCol="0" anchor="ctr"/>
+            <a:lstStyle/>
+            <a:p>
+              <a:pPr algn="ctr"/>
+              <a:endParaRPr lang="en-US"/>
+            </a:p>
+          </p:txBody>
+        </p:sp>
+        <p:sp>
+          <p:nvSpPr>
+            <p:cNvPr id="9" name="Rectangle 8"/>
+            <p:cNvSpPr/>
+            <p:nvPr/>
+          </p:nvSpPr>
+          <p:spPr>
+            <a:xfrm>
+              <a:off x="3989070" y="3177540"/>
+              <a:ext cx="537210" cy="737235"/>
+            </a:xfrm>
+            <a:prstGeom prst="rect">
+              <a:avLst/>
+            </a:prstGeom>
+            <a:solidFill>
+              <a:srgbClr val="FFFF00">
+                <a:alpha val="30000"/>
+              </a:srgbClr>
+            </a:solidFill>
+            <a:ln>
+              <a:noFill/>
+            </a:ln>
+          </p:spPr>
+          <p:style>
+            <a:lnRef idx="2">
+              <a:schemeClr val="accent1">
+                <a:shade val="50000"/>
+              </a:schemeClr>
+            </a:lnRef>
+            <a:fillRef idx="1">
+              <a:schemeClr val="accent1"/>
+            </a:fillRef>
+            <a:effectRef idx="0">
+              <a:schemeClr val="accent1"/>
+            </a:effectRef>
+            <a:fontRef idx="minor">
+              <a:schemeClr val="lt1"/>
+            </a:fontRef>
+          </p:style>
+          <p:txBody>
+            <a:bodyPr rtlCol="0" anchor="ctr"/>
+            <a:lstStyle/>
+            <a:p>
+              <a:pPr algn="ctr"/>
+              <a:endParaRPr lang="en-US"/>
+            </a:p>
+          </p:txBody>
+        </p:sp>
+        <p:sp>
+          <p:nvSpPr>
+            <p:cNvPr id="10" name="Rectangle 9"/>
+            <p:cNvSpPr/>
+            <p:nvPr/>
+          </p:nvSpPr>
+          <p:spPr>
+            <a:xfrm>
+              <a:off x="3989070" y="2461038"/>
+              <a:ext cx="548640" cy="184309"/>
+            </a:xfrm>
+            <a:prstGeom prst="rect">
+              <a:avLst/>
+            </a:prstGeom>
+            <a:solidFill>
+              <a:srgbClr val="FFFF00">
+                <a:alpha val="30000"/>
+              </a:srgbClr>
+            </a:solidFill>
+            <a:ln>
+              <a:noFill/>
+            </a:ln>
+          </p:spPr>
+          <p:style>
+            <a:lnRef idx="2">
+              <a:schemeClr val="accent1">
+                <a:shade val="50000"/>
+              </a:schemeClr>
+            </a:lnRef>
+            <a:fillRef idx="1">
+              <a:schemeClr val="accent1"/>
+            </a:fillRef>
+            <a:effectRef idx="0">
+              <a:schemeClr val="accent1"/>
+            </a:effectRef>
+            <a:fontRef idx="minor">
+              <a:schemeClr val="lt1"/>
+            </a:fontRef>
+          </p:style>
+          <p:txBody>
+            <a:bodyPr rtlCol="0" anchor="ctr"/>
+            <a:lstStyle/>
+            <a:p>
+              <a:pPr algn="ctr"/>
+              <a:endParaRPr lang="en-US"/>
+            </a:p>
+          </p:txBody>
+        </p:sp>
+        <p:sp>
+          <p:nvSpPr>
+            <p:cNvPr id="11" name="Rectangle 10"/>
+            <p:cNvSpPr/>
+            <p:nvPr/>
+          </p:nvSpPr>
+          <p:spPr>
+            <a:xfrm>
+              <a:off x="3989070" y="1909303"/>
+              <a:ext cx="548640" cy="184309"/>
+            </a:xfrm>
+            <a:prstGeom prst="rect">
+              <a:avLst/>
+            </a:prstGeom>
+            <a:solidFill>
+              <a:srgbClr val="FFFF00">
+                <a:alpha val="30000"/>
+              </a:srgbClr>
+            </a:solidFill>
+            <a:ln>
+              <a:noFill/>
+            </a:ln>
+          </p:spPr>
+          <p:style>
+            <a:lnRef idx="2">
+              <a:schemeClr val="accent1">
+                <a:shade val="50000"/>
+              </a:schemeClr>
+            </a:lnRef>
+            <a:fillRef idx="1">
+              <a:schemeClr val="accent1"/>
+            </a:fillRef>
+            <a:effectRef idx="0">
+              <a:schemeClr val="accent1"/>
+            </a:effectRef>
+            <a:fontRef idx="minor">
+              <a:schemeClr val="lt1"/>
+            </a:fontRef>
+          </p:style>
+          <p:txBody>
+            <a:bodyPr rtlCol="0" anchor="ctr"/>
+            <a:lstStyle/>
+            <a:p>
+              <a:pPr algn="ctr"/>
+              <a:endParaRPr lang="en-US"/>
+            </a:p>
+          </p:txBody>
+        </p:sp>
+      </p:grpSp>
     </p:spTree>
     <p:extLst>
       <p:ext uri="{BB962C8B-B14F-4D97-AF65-F5344CB8AC3E}">
@@ -16554,7 +16910,7 @@
         <p:spPr>
           <a:xfrm>
             <a:off x="620644" y="5084564"/>
-            <a:ext cx="2861681" cy="569515"/>
+            <a:ext cx="2531462" cy="496803"/>
           </a:xfrm>
           <a:prstGeom prst="rect">
             <a:avLst/>
@@ -16572,14 +16928,23 @@
               </a:lnSpc>
             </a:pPr>
             <a:r>
-              <a:rPr lang="en-US" sz="1400" dirty="0" smtClean="0"/>
+              <a:rPr lang="en-US" sz="1200" dirty="0" smtClean="0">
+                <a:latin typeface="Times New Roman" panose="02020603050405020304" pitchFamily="18" charset="0"/>
+                <a:cs typeface="Times New Roman" panose="02020603050405020304" pitchFamily="18" charset="0"/>
+              </a:rPr>
               <a:t>Dependent variable: </a:t>
             </a:r>
             <a:r>
-              <a:rPr lang="en-US" sz="1400" dirty="0" err="1" smtClean="0"/>
+              <a:rPr lang="en-US" sz="1200" dirty="0" err="1" smtClean="0">
+                <a:latin typeface="Times New Roman" panose="02020603050405020304" pitchFamily="18" charset="0"/>
+                <a:cs typeface="Times New Roman" panose="02020603050405020304" pitchFamily="18" charset="0"/>
+              </a:rPr>
               <a:t>logCRECEIVE</a:t>
             </a:r>
-            <a:endParaRPr lang="en-US" sz="1400" dirty="0" smtClean="0"/>
+            <a:endParaRPr lang="en-US" sz="1200" dirty="0" smtClean="0">
+              <a:latin typeface="Times New Roman" panose="02020603050405020304" pitchFamily="18" charset="0"/>
+              <a:cs typeface="Times New Roman" panose="02020603050405020304" pitchFamily="18" charset="0"/>
+            </a:endParaRPr>
           </a:p>
           <a:p>
             <a:pPr>
@@ -16588,18 +16953,30 @@
               </a:lnSpc>
             </a:pPr>
             <a:r>
-              <a:rPr lang="en-US" sz="1400" dirty="0" smtClean="0"/>
+              <a:rPr lang="en-US" sz="1200" dirty="0" smtClean="0">
+                <a:latin typeface="Times New Roman" panose="02020603050405020304" pitchFamily="18" charset="0"/>
+                <a:cs typeface="Times New Roman" panose="02020603050405020304" pitchFamily="18" charset="0"/>
+              </a:rPr>
               <a:t>* </a:t>
             </a:r>
             <a:r>
-              <a:rPr lang="en-US" sz="1400" dirty="0"/>
+              <a:rPr lang="en-US" sz="1200" dirty="0">
+                <a:latin typeface="Times New Roman" panose="02020603050405020304" pitchFamily="18" charset="0"/>
+                <a:cs typeface="Times New Roman" panose="02020603050405020304" pitchFamily="18" charset="0"/>
+              </a:rPr>
               <a:t>p</a:t>
             </a:r>
             <a:r>
-              <a:rPr lang="en-US" sz="1400" dirty="0" smtClean="0"/>
+              <a:rPr lang="en-US" sz="1200" dirty="0" smtClean="0">
+                <a:latin typeface="Times New Roman" panose="02020603050405020304" pitchFamily="18" charset="0"/>
+                <a:cs typeface="Times New Roman" panose="02020603050405020304" pitchFamily="18" charset="0"/>
+              </a:rPr>
               <a:t> &lt; 0.05; ** p &lt; 0.01; *** p &lt; 0.001</a:t>
             </a:r>
-            <a:endParaRPr lang="en-US" sz="1400" dirty="0"/>
+            <a:endParaRPr lang="en-US" sz="1200" dirty="0">
+              <a:latin typeface="Times New Roman" panose="02020603050405020304" pitchFamily="18" charset="0"/>
+              <a:cs typeface="Times New Roman" panose="02020603050405020304" pitchFamily="18" charset="0"/>
+            </a:endParaRPr>
           </a:p>
         </p:txBody>
       </p:sp>
@@ -17412,16 +17789,646 @@
           <a:chExt cx="0" cy="0"/>
         </a:xfrm>
       </p:grpSpPr>
+      <p:sp>
+        <p:nvSpPr>
+          <p:cNvPr id="3" name="TextBox 2"/>
+          <p:cNvSpPr txBox="1"/>
+          <p:nvPr/>
+        </p:nvSpPr>
+        <p:spPr>
+          <a:xfrm>
+            <a:off x="4513501" y="58653"/>
+            <a:ext cx="4572000" cy="1477328"/>
+          </a:xfrm>
+          <a:prstGeom prst="rect">
+            <a:avLst/>
+          </a:prstGeom>
+          <a:noFill/>
+        </p:spPr>
+        <p:txBody>
+          <a:bodyPr wrap="square" rtlCol="0">
+            <a:spAutoFit/>
+          </a:bodyPr>
+          <a:lstStyle/>
+          <a:p>
+            <a:r>
+              <a:rPr lang="en-US" b="1" dirty="0" smtClean="0"/>
+              <a:t>Technology Transfer</a:t>
+            </a:r>
+            <a:r>
+              <a:rPr lang="en-US" dirty="0" smtClean="0"/>
+              <a:t>: The conveyance </a:t>
+            </a:r>
+            <a:r>
+              <a:rPr lang="en-US" dirty="0"/>
+              <a:t>from one person or entity to another person or </a:t>
+            </a:r>
+            <a:r>
+              <a:rPr lang="en-US" dirty="0" smtClean="0"/>
+              <a:t>entity of a capability or ability to perform a useful task or replicate a beneficial accomplishment.</a:t>
+            </a:r>
+            <a:endParaRPr lang="en-US" dirty="0"/>
+          </a:p>
+        </p:txBody>
+      </p:sp>
+      <p:grpSp>
+        <p:nvGrpSpPr>
+          <p:cNvPr id="2" name="Group 1"/>
+          <p:cNvGrpSpPr/>
+          <p:nvPr/>
+        </p:nvGrpSpPr>
+        <p:grpSpPr>
+          <a:xfrm>
+            <a:off x="38637" y="25758"/>
+            <a:ext cx="4421810" cy="5669280"/>
+            <a:chOff x="38637" y="25758"/>
+            <a:chExt cx="4421810" cy="5669280"/>
+          </a:xfrm>
+        </p:grpSpPr>
+        <p:pic>
+          <p:nvPicPr>
+            <p:cNvPr id="4098" name="Picture 2"/>
+            <p:cNvPicPr>
+              <a:picLocks noChangeAspect="1" noChangeArrowheads="1"/>
+            </p:cNvPicPr>
+            <p:nvPr/>
+          </p:nvPicPr>
+          <p:blipFill>
+            <a:blip r:embed="rId2">
+              <a:extLst>
+                <a:ext uri="{28A0092B-C50C-407E-A947-70E740481C1C}">
+                  <a14:useLocalDpi xmlns:a14="http://schemas.microsoft.com/office/drawing/2010/main" val="0"/>
+                </a:ext>
+              </a:extLst>
+            </a:blip>
+            <a:srcRect/>
+            <a:stretch>
+              <a:fillRect/>
+            </a:stretch>
+          </p:blipFill>
+          <p:spPr bwMode="auto">
+            <a:xfrm>
+              <a:off x="38637" y="25758"/>
+              <a:ext cx="4421810" cy="5669280"/>
+            </a:xfrm>
+            <a:prstGeom prst="rect">
+              <a:avLst/>
+            </a:prstGeom>
+            <a:noFill/>
+            <a:ln>
+              <a:noFill/>
+            </a:ln>
+            <a:extLst>
+              <a:ext uri="{909E8E84-426E-40DD-AFC4-6F175D3DCCD1}">
+                <a14:hiddenFill xmlns:a14="http://schemas.microsoft.com/office/drawing/2010/main">
+                  <a:solidFill>
+                    <a:schemeClr val="accent1"/>
+                  </a:solidFill>
+                </a14:hiddenFill>
+              </a:ext>
+              <a:ext uri="{91240B29-F687-4F45-9708-019B960494DF}">
+                <a14:hiddenLine xmlns:a14="http://schemas.microsoft.com/office/drawing/2010/main" w="9525">
+                  <a:solidFill>
+                    <a:schemeClr val="tx1"/>
+                  </a:solidFill>
+                  <a:miter lim="800000"/>
+                  <a:headEnd/>
+                  <a:tailEnd/>
+                </a14:hiddenLine>
+              </a:ext>
+            </a:extLst>
+          </p:spPr>
+        </p:pic>
+        <p:sp>
+          <p:nvSpPr>
+            <p:cNvPr id="4" name="Rectangle 3"/>
+            <p:cNvSpPr/>
+            <p:nvPr/>
+          </p:nvSpPr>
+          <p:spPr>
+            <a:xfrm>
+              <a:off x="808602" y="3264905"/>
+              <a:ext cx="1280160" cy="92154"/>
+            </a:xfrm>
+            <a:prstGeom prst="rect">
+              <a:avLst/>
+            </a:prstGeom>
+            <a:solidFill>
+              <a:srgbClr val="FFFF00">
+                <a:alpha val="20000"/>
+              </a:srgbClr>
+            </a:solidFill>
+            <a:ln w="15875">
+              <a:solidFill>
+                <a:srgbClr val="FFC000"/>
+              </a:solidFill>
+            </a:ln>
+          </p:spPr>
+          <p:style>
+            <a:lnRef idx="2">
+              <a:schemeClr val="accent1">
+                <a:shade val="50000"/>
+              </a:schemeClr>
+            </a:lnRef>
+            <a:fillRef idx="1">
+              <a:schemeClr val="accent1"/>
+            </a:fillRef>
+            <a:effectRef idx="0">
+              <a:schemeClr val="accent1"/>
+            </a:effectRef>
+            <a:fontRef idx="minor">
+              <a:schemeClr val="lt1"/>
+            </a:fontRef>
+          </p:style>
+          <p:txBody>
+            <a:bodyPr rtlCol="0" anchor="ctr"/>
+            <a:lstStyle/>
+            <a:p>
+              <a:pPr algn="ctr"/>
+              <a:endParaRPr lang="en-US"/>
+            </a:p>
+          </p:txBody>
+        </p:sp>
+        <p:sp>
+          <p:nvSpPr>
+            <p:cNvPr id="5" name="Rectangle 4"/>
+            <p:cNvSpPr/>
+            <p:nvPr/>
+          </p:nvSpPr>
+          <p:spPr>
+            <a:xfrm>
+              <a:off x="640357" y="3577829"/>
+              <a:ext cx="1459106" cy="92154"/>
+            </a:xfrm>
+            <a:prstGeom prst="rect">
+              <a:avLst/>
+            </a:prstGeom>
+            <a:solidFill>
+              <a:srgbClr val="FFFF00">
+                <a:alpha val="20000"/>
+              </a:srgbClr>
+            </a:solidFill>
+            <a:ln w="15875">
+              <a:solidFill>
+                <a:srgbClr val="FFC000"/>
+              </a:solidFill>
+            </a:ln>
+          </p:spPr>
+          <p:style>
+            <a:lnRef idx="2">
+              <a:schemeClr val="accent1">
+                <a:shade val="50000"/>
+              </a:schemeClr>
+            </a:lnRef>
+            <a:fillRef idx="1">
+              <a:schemeClr val="accent1"/>
+            </a:fillRef>
+            <a:effectRef idx="0">
+              <a:schemeClr val="accent1"/>
+            </a:effectRef>
+            <a:fontRef idx="minor">
+              <a:schemeClr val="lt1"/>
+            </a:fontRef>
+          </p:style>
+          <p:txBody>
+            <a:bodyPr rtlCol="0" anchor="ctr"/>
+            <a:lstStyle/>
+            <a:p>
+              <a:pPr algn="ctr"/>
+              <a:endParaRPr lang="en-US"/>
+            </a:p>
+          </p:txBody>
+        </p:sp>
+        <p:sp>
+          <p:nvSpPr>
+            <p:cNvPr id="6" name="Rectangle 5"/>
+            <p:cNvSpPr/>
+            <p:nvPr/>
+          </p:nvSpPr>
+          <p:spPr>
+            <a:xfrm>
+              <a:off x="640357" y="3669522"/>
+              <a:ext cx="449608" cy="92154"/>
+            </a:xfrm>
+            <a:prstGeom prst="rect">
+              <a:avLst/>
+            </a:prstGeom>
+            <a:solidFill>
+              <a:srgbClr val="FFFF00">
+                <a:alpha val="20000"/>
+              </a:srgbClr>
+            </a:solidFill>
+            <a:ln w="15875">
+              <a:solidFill>
+                <a:srgbClr val="FFC000"/>
+              </a:solidFill>
+            </a:ln>
+          </p:spPr>
+          <p:style>
+            <a:lnRef idx="2">
+              <a:schemeClr val="accent1">
+                <a:shade val="50000"/>
+              </a:schemeClr>
+            </a:lnRef>
+            <a:fillRef idx="1">
+              <a:schemeClr val="accent1"/>
+            </a:fillRef>
+            <a:effectRef idx="0">
+              <a:schemeClr val="accent1"/>
+            </a:effectRef>
+            <a:fontRef idx="minor">
+              <a:schemeClr val="lt1"/>
+            </a:fontRef>
+          </p:style>
+          <p:txBody>
+            <a:bodyPr rtlCol="0" anchor="ctr"/>
+            <a:lstStyle/>
+            <a:p>
+              <a:pPr algn="ctr"/>
+              <a:endParaRPr lang="en-US"/>
+            </a:p>
+          </p:txBody>
+        </p:sp>
+        <p:sp>
+          <p:nvSpPr>
+            <p:cNvPr id="7" name="Rectangle 6"/>
+            <p:cNvSpPr/>
+            <p:nvPr/>
+          </p:nvSpPr>
+          <p:spPr>
+            <a:xfrm>
+              <a:off x="1431951" y="3484186"/>
+              <a:ext cx="667512" cy="93643"/>
+            </a:xfrm>
+            <a:prstGeom prst="rect">
+              <a:avLst/>
+            </a:prstGeom>
+            <a:solidFill>
+              <a:srgbClr val="FFFF00">
+                <a:alpha val="20000"/>
+              </a:srgbClr>
+            </a:solidFill>
+            <a:ln w="15875">
+              <a:solidFill>
+                <a:srgbClr val="FFC000"/>
+              </a:solidFill>
+            </a:ln>
+          </p:spPr>
+          <p:style>
+            <a:lnRef idx="2">
+              <a:schemeClr val="accent1">
+                <a:shade val="50000"/>
+              </a:schemeClr>
+            </a:lnRef>
+            <a:fillRef idx="1">
+              <a:schemeClr val="accent1"/>
+            </a:fillRef>
+            <a:effectRef idx="0">
+              <a:schemeClr val="accent1"/>
+            </a:effectRef>
+            <a:fontRef idx="minor">
+              <a:schemeClr val="lt1"/>
+            </a:fontRef>
+          </p:style>
+          <p:txBody>
+            <a:bodyPr rtlCol="0" anchor="ctr"/>
+            <a:lstStyle/>
+            <a:p>
+              <a:pPr algn="ctr"/>
+              <a:endParaRPr lang="en-US"/>
+            </a:p>
+          </p:txBody>
+        </p:sp>
+        <p:sp>
+          <p:nvSpPr>
+            <p:cNvPr id="8" name="Rectangle 7"/>
+            <p:cNvSpPr/>
+            <p:nvPr/>
+          </p:nvSpPr>
+          <p:spPr>
+            <a:xfrm>
+              <a:off x="646457" y="4074565"/>
+              <a:ext cx="1459106" cy="102413"/>
+            </a:xfrm>
+            <a:prstGeom prst="rect">
+              <a:avLst/>
+            </a:prstGeom>
+            <a:solidFill>
+              <a:srgbClr val="FFFF00">
+                <a:alpha val="20000"/>
+              </a:srgbClr>
+            </a:solidFill>
+            <a:ln w="15875">
+              <a:solidFill>
+                <a:srgbClr val="FFC000"/>
+              </a:solidFill>
+            </a:ln>
+          </p:spPr>
+          <p:style>
+            <a:lnRef idx="2">
+              <a:schemeClr val="accent1">
+                <a:shade val="50000"/>
+              </a:schemeClr>
+            </a:lnRef>
+            <a:fillRef idx="1">
+              <a:schemeClr val="accent1"/>
+            </a:fillRef>
+            <a:effectRef idx="0">
+              <a:schemeClr val="accent1"/>
+            </a:effectRef>
+            <a:fontRef idx="minor">
+              <a:schemeClr val="lt1"/>
+            </a:fontRef>
+          </p:style>
+          <p:txBody>
+            <a:bodyPr rtlCol="0" anchor="ctr"/>
+            <a:lstStyle/>
+            <a:p>
+              <a:pPr algn="ctr"/>
+              <a:endParaRPr lang="en-US"/>
+            </a:p>
+          </p:txBody>
+        </p:sp>
+        <p:sp>
+          <p:nvSpPr>
+            <p:cNvPr id="9" name="Rectangle 8"/>
+            <p:cNvSpPr/>
+            <p:nvPr/>
+          </p:nvSpPr>
+          <p:spPr>
+            <a:xfrm>
+              <a:off x="646457" y="3972152"/>
+              <a:ext cx="1459106" cy="102413"/>
+            </a:xfrm>
+            <a:prstGeom prst="rect">
+              <a:avLst/>
+            </a:prstGeom>
+            <a:solidFill>
+              <a:srgbClr val="FFFF00">
+                <a:alpha val="20000"/>
+              </a:srgbClr>
+            </a:solidFill>
+            <a:ln w="15875">
+              <a:solidFill>
+                <a:srgbClr val="FFC000"/>
+              </a:solidFill>
+            </a:ln>
+          </p:spPr>
+          <p:style>
+            <a:lnRef idx="2">
+              <a:schemeClr val="accent1">
+                <a:shade val="50000"/>
+              </a:schemeClr>
+            </a:lnRef>
+            <a:fillRef idx="1">
+              <a:schemeClr val="accent1"/>
+            </a:fillRef>
+            <a:effectRef idx="0">
+              <a:schemeClr val="accent1"/>
+            </a:effectRef>
+            <a:fontRef idx="minor">
+              <a:schemeClr val="lt1"/>
+            </a:fontRef>
+          </p:style>
+          <p:txBody>
+            <a:bodyPr rtlCol="0" anchor="ctr"/>
+            <a:lstStyle/>
+            <a:p>
+              <a:pPr algn="ctr"/>
+              <a:endParaRPr lang="en-US"/>
+            </a:p>
+          </p:txBody>
+        </p:sp>
+        <p:sp>
+          <p:nvSpPr>
+            <p:cNvPr id="10" name="Rectangle 9"/>
+            <p:cNvSpPr/>
+            <p:nvPr/>
+          </p:nvSpPr>
+          <p:spPr>
+            <a:xfrm>
+              <a:off x="1028839" y="3869739"/>
+              <a:ext cx="1078992" cy="102413"/>
+            </a:xfrm>
+            <a:prstGeom prst="rect">
+              <a:avLst/>
+            </a:prstGeom>
+            <a:solidFill>
+              <a:srgbClr val="FFFF00">
+                <a:alpha val="20000"/>
+              </a:srgbClr>
+            </a:solidFill>
+            <a:ln w="15875">
+              <a:solidFill>
+                <a:srgbClr val="FFC000"/>
+              </a:solidFill>
+            </a:ln>
+          </p:spPr>
+          <p:style>
+            <a:lnRef idx="2">
+              <a:schemeClr val="accent1">
+                <a:shade val="50000"/>
+              </a:schemeClr>
+            </a:lnRef>
+            <a:fillRef idx="1">
+              <a:schemeClr val="accent1"/>
+            </a:fillRef>
+            <a:effectRef idx="0">
+              <a:schemeClr val="accent1"/>
+            </a:effectRef>
+            <a:fontRef idx="minor">
+              <a:schemeClr val="lt1"/>
+            </a:fontRef>
+          </p:style>
+          <p:txBody>
+            <a:bodyPr rtlCol="0" anchor="ctr"/>
+            <a:lstStyle/>
+            <a:p>
+              <a:pPr algn="ctr"/>
+              <a:endParaRPr lang="en-US"/>
+            </a:p>
+          </p:txBody>
+        </p:sp>
+        <p:sp>
+          <p:nvSpPr>
+            <p:cNvPr id="11" name="Rectangle 10"/>
+            <p:cNvSpPr/>
+            <p:nvPr/>
+          </p:nvSpPr>
+          <p:spPr>
+            <a:xfrm>
+              <a:off x="640357" y="3353036"/>
+              <a:ext cx="548640" cy="92154"/>
+            </a:xfrm>
+            <a:prstGeom prst="rect">
+              <a:avLst/>
+            </a:prstGeom>
+            <a:solidFill>
+              <a:srgbClr val="FFFF00">
+                <a:alpha val="20000"/>
+              </a:srgbClr>
+            </a:solidFill>
+            <a:ln w="15875">
+              <a:solidFill>
+                <a:srgbClr val="FFC000"/>
+              </a:solidFill>
+            </a:ln>
+          </p:spPr>
+          <p:style>
+            <a:lnRef idx="2">
+              <a:schemeClr val="accent1">
+                <a:shade val="50000"/>
+              </a:schemeClr>
+            </a:lnRef>
+            <a:fillRef idx="1">
+              <a:schemeClr val="accent1"/>
+            </a:fillRef>
+            <a:effectRef idx="0">
+              <a:schemeClr val="accent1"/>
+            </a:effectRef>
+            <a:fontRef idx="minor">
+              <a:schemeClr val="lt1"/>
+            </a:fontRef>
+          </p:style>
+          <p:txBody>
+            <a:bodyPr rtlCol="0" anchor="ctr"/>
+            <a:lstStyle/>
+            <a:p>
+              <a:pPr algn="ctr"/>
+              <a:endParaRPr lang="en-US"/>
+            </a:p>
+          </p:txBody>
+        </p:sp>
+        <p:sp>
+          <p:nvSpPr>
+            <p:cNvPr id="12" name="Rectangle 11"/>
+            <p:cNvSpPr/>
+            <p:nvPr/>
+          </p:nvSpPr>
+          <p:spPr>
+            <a:xfrm>
+              <a:off x="537947" y="1743384"/>
+              <a:ext cx="1645920" cy="663317"/>
+            </a:xfrm>
+            <a:prstGeom prst="rect">
+              <a:avLst/>
+            </a:prstGeom>
+            <a:solidFill>
+              <a:srgbClr val="FFFF00">
+                <a:alpha val="20000"/>
+              </a:srgbClr>
+            </a:solidFill>
+            <a:ln w="15875">
+              <a:solidFill>
+                <a:srgbClr val="FFC000"/>
+              </a:solidFill>
+            </a:ln>
+          </p:spPr>
+          <p:style>
+            <a:lnRef idx="2">
+              <a:schemeClr val="accent1">
+                <a:shade val="50000"/>
+              </a:schemeClr>
+            </a:lnRef>
+            <a:fillRef idx="1">
+              <a:schemeClr val="accent1"/>
+            </a:fillRef>
+            <a:effectRef idx="0">
+              <a:schemeClr val="accent1"/>
+            </a:effectRef>
+            <a:fontRef idx="minor">
+              <a:schemeClr val="lt1"/>
+            </a:fontRef>
+          </p:style>
+          <p:txBody>
+            <a:bodyPr rtlCol="0" anchor="ctr"/>
+            <a:lstStyle/>
+            <a:p>
+              <a:pPr algn="ctr"/>
+              <a:endParaRPr lang="en-US"/>
+            </a:p>
+          </p:txBody>
+        </p:sp>
+      </p:grpSp>
+      <p:sp>
+        <p:nvSpPr>
+          <p:cNvPr id="13" name="TextBox 12"/>
+          <p:cNvSpPr txBox="1"/>
+          <p:nvPr/>
+        </p:nvSpPr>
+        <p:spPr>
+          <a:xfrm>
+            <a:off x="4776717" y="2251882"/>
+            <a:ext cx="4336080" cy="1200329"/>
+          </a:xfrm>
+          <a:prstGeom prst="rect">
+            <a:avLst/>
+          </a:prstGeom>
+          <a:noFill/>
+        </p:spPr>
+        <p:txBody>
+          <a:bodyPr wrap="square" rtlCol="0">
+            <a:spAutoFit/>
+          </a:bodyPr>
+          <a:lstStyle/>
+          <a:p>
+            <a:r>
+              <a:rPr lang="en-US" sz="2400" dirty="0" smtClean="0"/>
+              <a:t>…prior to 1980, only 5 percent of government owned patents had ever been used by industry.</a:t>
+            </a:r>
+            <a:endParaRPr lang="en-US" sz="2400" dirty="0"/>
+          </a:p>
+        </p:txBody>
+      </p:sp>
+      <p:sp>
+        <p:nvSpPr>
+          <p:cNvPr id="15" name="TextBox 14"/>
+          <p:cNvSpPr txBox="1"/>
+          <p:nvPr/>
+        </p:nvSpPr>
+        <p:spPr>
+          <a:xfrm>
+            <a:off x="5008729" y="3458838"/>
+            <a:ext cx="3998795" cy="307777"/>
+          </a:xfrm>
+          <a:prstGeom prst="rect">
+            <a:avLst/>
+          </a:prstGeom>
+          <a:noFill/>
+        </p:spPr>
+        <p:txBody>
+          <a:bodyPr wrap="square" rtlCol="0">
+            <a:spAutoFit/>
+          </a:bodyPr>
+          <a:lstStyle/>
+          <a:p>
+            <a:pPr algn="r"/>
+            <a:r>
+              <a:rPr lang="en-US" sz="1400" dirty="0" smtClean="0"/>
+              <a:t>Schact  (2012) as cited in Tseng &amp; </a:t>
+            </a:r>
+            <a:r>
+              <a:rPr lang="en-US" sz="1400" dirty="0" err="1" smtClean="0"/>
+              <a:t>Raudensky</a:t>
+            </a:r>
+            <a:r>
+              <a:rPr lang="en-US" sz="1400" dirty="0" smtClean="0"/>
+              <a:t>, 2014</a:t>
+            </a:r>
+            <a:endParaRPr lang="en-US" sz="1400" dirty="0"/>
+          </a:p>
+        </p:txBody>
+      </p:sp>
       <p:pic>
         <p:nvPicPr>
-          <p:cNvPr id="4098" name="Picture 2"/>
+          <p:cNvPr id="5122" name="Picture 2" descr="C:\Users\townesm\Downloads\kisspng-quotation-mark-symbol-icon-quotation-transparent-png-5a758275d3b618.8653046915176505498672.png"/>
           <p:cNvPicPr>
             <a:picLocks noChangeAspect="1" noChangeArrowheads="1"/>
           </p:cNvPicPr>
           <p:nvPr/>
         </p:nvPicPr>
         <p:blipFill>
-          <a:blip r:embed="rId2">
+          <a:blip r:embed="rId3" cstate="print">
             <a:extLst>
               <a:ext uri="{28A0092B-C50C-407E-A947-70E740481C1C}">
                 <a14:useLocalDpi xmlns:a14="http://schemas.microsoft.com/office/drawing/2010/main" val="0"/>
@@ -17435,95 +18442,65 @@
         </p:blipFill>
         <p:spPr bwMode="auto">
           <a:xfrm>
-            <a:off x="38637" y="25758"/>
-            <a:ext cx="4421810" cy="5669280"/>
+            <a:off x="4520821" y="2249757"/>
+            <a:ext cx="274320" cy="274320"/>
           </a:xfrm>
           <a:prstGeom prst="rect">
             <a:avLst/>
           </a:prstGeom>
           <a:noFill/>
-          <a:ln>
-            <a:noFill/>
-          </a:ln>
           <a:extLst>
             <a:ext uri="{909E8E84-426E-40DD-AFC4-6F175D3DCCD1}">
               <a14:hiddenFill xmlns:a14="http://schemas.microsoft.com/office/drawing/2010/main">
                 <a:solidFill>
-                  <a:schemeClr val="accent1"/>
+                  <a:srgbClr val="FFFFFF"/>
                 </a:solidFill>
               </a14:hiddenFill>
-            </a:ext>
-            <a:ext uri="{91240B29-F687-4F45-9708-019B960494DF}">
-              <a14:hiddenLine xmlns:a14="http://schemas.microsoft.com/office/drawing/2010/main" w="9525">
-                <a:solidFill>
-                  <a:schemeClr val="tx1"/>
-                </a:solidFill>
-                <a:miter lim="800000"/>
-                <a:headEnd/>
-                <a:tailEnd/>
-              </a14:hiddenLine>
             </a:ext>
           </a:extLst>
         </p:spPr>
       </p:pic>
-      <p:sp>
-        <p:nvSpPr>
-          <p:cNvPr id="3" name="TextBox 2"/>
-          <p:cNvSpPr txBox="1"/>
+      <p:pic>
+        <p:nvPicPr>
+          <p:cNvPr id="17" name="Picture 2" descr="C:\Users\townesm\Downloads\kisspng-quotation-mark-symbol-icon-quotation-transparent-png-5a758275d3b618.8653046915176505498672.png"/>
+          <p:cNvPicPr>
+            <a:picLocks noChangeAspect="1" noChangeArrowheads="1"/>
+          </p:cNvPicPr>
           <p:nvPr/>
-        </p:nvSpPr>
-        <p:spPr>
-          <a:xfrm>
-            <a:off x="4486205" y="58653"/>
-            <a:ext cx="4572000" cy="1477328"/>
+        </p:nvPicPr>
+        <p:blipFill>
+          <a:blip r:embed="rId3" cstate="print">
+            <a:extLst>
+              <a:ext uri="{28A0092B-C50C-407E-A947-70E740481C1C}">
+                <a14:useLocalDpi xmlns:a14="http://schemas.microsoft.com/office/drawing/2010/main" val="0"/>
+              </a:ext>
+            </a:extLst>
+          </a:blip>
+          <a:srcRect/>
+          <a:stretch>
+            <a:fillRect/>
+          </a:stretch>
+        </p:blipFill>
+        <p:spPr bwMode="auto">
+          <a:xfrm flipH="1" flipV="1">
+            <a:off x="8368996" y="3012559"/>
+            <a:ext cx="274320" cy="274320"/>
           </a:xfrm>
           <a:prstGeom prst="rect">
             <a:avLst/>
           </a:prstGeom>
           <a:noFill/>
+          <a:extLst>
+            <a:ext uri="{909E8E84-426E-40DD-AFC4-6F175D3DCCD1}">
+              <a14:hiddenFill xmlns:a14="http://schemas.microsoft.com/office/drawing/2010/main">
+                <a:solidFill>
+                  <a:srgbClr val="FFFFFF"/>
+                </a:solidFill>
+              </a14:hiddenFill>
+            </a:ext>
+          </a:extLst>
         </p:spPr>
-        <p:txBody>
-          <a:bodyPr wrap="square" rtlCol="0">
-            <a:spAutoFit/>
-          </a:bodyPr>
-          <a:lstStyle/>
-          <a:p>
-            <a:r>
-              <a:rPr lang="en-US" b="1" dirty="0" smtClean="0"/>
-              <a:t>Technology Transfer</a:t>
-            </a:r>
-            <a:r>
-              <a:rPr lang="en-US" dirty="0" smtClean="0"/>
-              <a:t>: The conveyance </a:t>
-            </a:r>
-            <a:r>
-              <a:rPr lang="en-US" dirty="0"/>
-              <a:t>from one person or entity to another person or </a:t>
-            </a:r>
-            <a:r>
-              <a:rPr lang="en-US" dirty="0" smtClean="0"/>
-              <a:t>entity of </a:t>
-            </a:r>
-            <a:r>
-              <a:rPr lang="en-US" dirty="0" smtClean="0"/>
-              <a:t>a capability or ability to perform a </a:t>
-            </a:r>
-            <a:r>
-              <a:rPr lang="en-US" dirty="0" smtClean="0"/>
-              <a:t>useful task </a:t>
-            </a:r>
-            <a:r>
-              <a:rPr lang="en-US" dirty="0" smtClean="0"/>
-              <a:t>or replicate </a:t>
-            </a:r>
-            <a:r>
-              <a:rPr lang="en-US" dirty="0" smtClean="0"/>
-              <a:t>a beneficial accomplishment.</a:t>
-            </a:r>
-            <a:endParaRPr lang="en-US" dirty="0"/>
-          </a:p>
-        </p:txBody>
-      </p:sp>
+      </p:pic>
     </p:spTree>
     <p:extLst>
       <p:ext uri="{BB962C8B-B14F-4D97-AF65-F5344CB8AC3E}">
@@ -18055,8 +19032,8 @@
           <a:chExt cx="0" cy="0"/>
         </a:xfrm>
       </p:grpSpPr>
-      <mc:AlternateContent xmlns:mc="http://schemas.openxmlformats.org/markup-compatibility/2006">
-        <mc:Choice xmlns:a14="http://schemas.microsoft.com/office/drawing/2010/main" Requires="a14">
+      <mc:AlternateContent xmlns:mc="http://schemas.openxmlformats.org/markup-compatibility/2006" xmlns:a14="http://schemas.microsoft.com/office/drawing/2010/main">
+        <mc:Choice Requires="a14">
           <p:sp>
             <p:nvSpPr>
               <p:cNvPr id="2" name="Rectangle 1"/>
@@ -18477,7 +19454,7 @@
             </p:txBody>
           </p:sp>
         </mc:Choice>
-        <mc:Fallback>
+        <mc:Fallback xmlns="">
           <p:sp>
             <p:nvSpPr>
               <p:cNvPr id="2" name="Rectangle 1"/>
@@ -18742,7 +19719,7 @@
         </p:nvSpPr>
         <p:spPr>
           <a:xfrm>
-            <a:off x="0" y="1920240"/>
+            <a:off x="0" y="365760"/>
             <a:ext cx="9144000" cy="523220"/>
           </a:xfrm>
           <a:prstGeom prst="rect">
@@ -18773,8 +19750,8 @@
         </p:nvSpPr>
         <p:spPr>
           <a:xfrm>
-            <a:off x="0" y="2743200"/>
-            <a:ext cx="9144000" cy="2492990"/>
+            <a:off x="0" y="1097280"/>
+            <a:ext cx="9144000" cy="3400931"/>
           </a:xfrm>
           <a:prstGeom prst="rect">
             <a:avLst/>
@@ -18795,8 +19772,43 @@
               <a:buChar char="•"/>
             </a:pPr>
             <a:r>
+              <a:rPr lang="en-US" dirty="0"/>
+              <a:t>Repeat multiple regression and hierarchical </a:t>
+            </a:r>
+            <a:r>
               <a:rPr lang="en-US" dirty="0" smtClean="0"/>
-              <a:t>Obtain more current data.</a:t>
+              <a:t>regression analyses </a:t>
+            </a:r>
+            <a:r>
+              <a:rPr lang="en-US" dirty="0"/>
+              <a:t>using </a:t>
+            </a:r>
+            <a:r>
+              <a:rPr lang="en-US" dirty="0" smtClean="0"/>
+              <a:t>the </a:t>
+            </a:r>
+            <a:br>
+              <a:rPr lang="en-US" dirty="0" smtClean="0"/>
+            </a:br>
+            <a:r>
+              <a:rPr lang="en-US" dirty="0" smtClean="0"/>
+              <a:t>natural </a:t>
+            </a:r>
+            <a:r>
+              <a:rPr lang="en-US" dirty="0"/>
+              <a:t>logarithm of </a:t>
+            </a:r>
+            <a:r>
+              <a:rPr lang="en-US" dirty="0" smtClean="0"/>
+              <a:t>the number of citations received </a:t>
+            </a:r>
+            <a:r>
+              <a:rPr lang="en-US" dirty="0"/>
+              <a:t>as dependent variable</a:t>
+            </a:r>
+            <a:r>
+              <a:rPr lang="en-US" dirty="0" smtClean="0"/>
+              <a:t>.</a:t>
             </a:r>
           </a:p>
           <a:p>
@@ -18809,8 +19821,9 @@
             </a:pPr>
             <a:r>
               <a:rPr lang="en-US" dirty="0" smtClean="0"/>
-              <a:t>Buffer the sample on the front and back time period to minimize truncation.</a:t>
-            </a:r>
+              <a:t>Modify path model using the measure of generality as the primary endogenous independent variable. </a:t>
+            </a:r>
+            <a:endParaRPr lang="en-US" dirty="0"/>
           </a:p>
           <a:p>
             <a:pPr marL="285750" indent="-285750">
@@ -18822,7 +19835,11 @@
             </a:pPr>
             <a:r>
               <a:rPr lang="en-US" dirty="0" smtClean="0"/>
-              <a:t>Separate dependent claims and independents claims in the variables.</a:t>
+              <a:t>Obtain </a:t>
+            </a:r>
+            <a:r>
+              <a:rPr lang="en-US" dirty="0" smtClean="0"/>
+              <a:t>more current data.</a:t>
             </a:r>
           </a:p>
           <a:p>
@@ -18835,7 +19852,15 @@
             </a:pPr>
             <a:r>
               <a:rPr lang="en-US" dirty="0" smtClean="0"/>
-              <a:t>Include patent classifications and sub-classifications as an indicator of generality.</a:t>
+              <a:t>Buffer the sample </a:t>
+            </a:r>
+            <a:r>
+              <a:rPr lang="en-US" dirty="0" smtClean="0"/>
+              <a:t>data on </a:t>
+            </a:r>
+            <a:r>
+              <a:rPr lang="en-US" dirty="0" smtClean="0"/>
+              <a:t>the front and back time period to minimize truncation.</a:t>
             </a:r>
           </a:p>
           <a:p>
@@ -18848,7 +19873,19 @@
             </a:pPr>
             <a:r>
               <a:rPr lang="en-US" dirty="0" smtClean="0"/>
-              <a:t>Control for the patent categories.</a:t>
+              <a:t>Separate dependent claims and independents claims </a:t>
+            </a:r>
+            <a:r>
+              <a:rPr lang="en-US" dirty="0" smtClean="0"/>
+              <a:t>as distinct </a:t>
+            </a:r>
+            <a:r>
+              <a:rPr lang="en-US" dirty="0" smtClean="0"/>
+              <a:t>variables</a:t>
+            </a:r>
+            <a:r>
+              <a:rPr lang="en-US" dirty="0" smtClean="0"/>
+              <a:t>.</a:t>
             </a:r>
           </a:p>
           <a:p>
@@ -18861,7 +19898,7 @@
             </a:pPr>
             <a:r>
               <a:rPr lang="en-US" dirty="0" smtClean="0"/>
-              <a:t>Consider the effects of technology readiness level (TRL).</a:t>
+              <a:t>Include patent classifications and sub-classifications as an indicator of generality.</a:t>
             </a:r>
           </a:p>
           <a:p>
@@ -18874,9 +19911,26 @@
             </a:pPr>
             <a:r>
               <a:rPr lang="en-US" dirty="0" smtClean="0"/>
-              <a:t>Repeat previous analyses using natural logarithm of CRECEIVE as dependent variable.</a:t>
-            </a:r>
-            <a:endParaRPr lang="en-US" dirty="0"/>
+              <a:t>Control for the patent categories.</a:t>
+            </a:r>
+          </a:p>
+          <a:p>
+            <a:pPr marL="285750" indent="-285750">
+              <a:spcAft>
+                <a:spcPts val="600"/>
+              </a:spcAft>
+              <a:buFont typeface="Arial" panose="020B0604020202020204" pitchFamily="34" charset="0"/>
+              <a:buChar char="•"/>
+            </a:pPr>
+            <a:r>
+              <a:rPr lang="en-US" dirty="0" smtClean="0"/>
+              <a:t>Consider the effects of technology readiness level (TRL</a:t>
+            </a:r>
+            <a:r>
+              <a:rPr lang="en-US" dirty="0" smtClean="0"/>
+              <a:t>).</a:t>
+            </a:r>
+            <a:endParaRPr lang="en-US" dirty="0" smtClean="0"/>
           </a:p>
         </p:txBody>
       </p:sp>
@@ -20223,7 +21277,7 @@
         <p:spPr>
           <a:xfrm>
             <a:off x="173844" y="399249"/>
-            <a:ext cx="8686800" cy="5355312"/>
+            <a:ext cx="8686800" cy="4247317"/>
           </a:xfrm>
           <a:prstGeom prst="rect">
             <a:avLst/>
@@ -20375,11 +21429,100 @@
                 <a:ea typeface="Calibri"/>
                 <a:cs typeface="Times New Roman"/>
               </a:rPr>
-              <a:t>, 51, 31–42. https://doi.org/10.1016/j.wpi.2017.11.002</a:t>
-            </a:r>
-            <a:endParaRPr lang="en-US" sz="1600" dirty="0">
+              <a:t>, 51, 31–42. https://</a:t>
+            </a:r>
+            <a:r>
+              <a:rPr lang="en-US" dirty="0" smtClean="0">
+                <a:latin typeface="Times New Roman"/>
+                <a:ea typeface="Calibri"/>
+                <a:cs typeface="Times New Roman"/>
+              </a:rPr>
+              <a:t>doi.org/10.1016/j.wpi.2017.11.002</a:t>
+            </a:r>
+          </a:p>
+          <a:p>
+            <a:pPr marL="457200" marR="0" indent="-457200">
+              <a:spcBef>
+                <a:spcPts val="0"/>
+              </a:spcBef>
+              <a:spcAft>
+                <a:spcPts val="0"/>
+              </a:spcAft>
+            </a:pPr>
+            <a:r>
+              <a:rPr lang="en-US" dirty="0">
+                <a:latin typeface="Times New Roman" panose="02020603050405020304" pitchFamily="18" charset="0"/>
+                <a:cs typeface="Times New Roman" panose="02020603050405020304" pitchFamily="18" charset="0"/>
+              </a:rPr>
+              <a:t>Tseng, A</a:t>
+            </a:r>
+            <a:r>
+              <a:rPr lang="en-US" dirty="0" smtClean="0">
+                <a:latin typeface="Times New Roman" panose="02020603050405020304" pitchFamily="18" charset="0"/>
+                <a:cs typeface="Times New Roman" panose="02020603050405020304" pitchFamily="18" charset="0"/>
+              </a:rPr>
+              <a:t>. </a:t>
+            </a:r>
+            <a:r>
+              <a:rPr lang="en-US" dirty="0">
+                <a:latin typeface="Times New Roman" panose="02020603050405020304" pitchFamily="18" charset="0"/>
+                <a:cs typeface="Times New Roman" panose="02020603050405020304" pitchFamily="18" charset="0"/>
+              </a:rPr>
+              <a:t>&amp; </a:t>
+            </a:r>
+            <a:r>
+              <a:rPr lang="en-US" dirty="0" err="1">
+                <a:latin typeface="Times New Roman" panose="02020603050405020304" pitchFamily="18" charset="0"/>
+                <a:cs typeface="Times New Roman" panose="02020603050405020304" pitchFamily="18" charset="0"/>
+              </a:rPr>
+              <a:t>Raudensky</a:t>
+            </a:r>
+            <a:r>
+              <a:rPr lang="en-US" dirty="0">
+                <a:latin typeface="Times New Roman" panose="02020603050405020304" pitchFamily="18" charset="0"/>
+                <a:cs typeface="Times New Roman" panose="02020603050405020304" pitchFamily="18" charset="0"/>
+              </a:rPr>
+              <a:t>, M. (2014). Assessments of technology transfer activities of </a:t>
+            </a:r>
+            <a:r>
+              <a:rPr lang="en-US" dirty="0" smtClean="0">
+                <a:latin typeface="Times New Roman" panose="02020603050405020304" pitchFamily="18" charset="0"/>
+                <a:cs typeface="Times New Roman" panose="02020603050405020304" pitchFamily="18" charset="0"/>
+              </a:rPr>
+              <a:t>U.S. </a:t>
+            </a:r>
+            <a:r>
+              <a:rPr lang="en-US" dirty="0">
+                <a:latin typeface="Times New Roman" panose="02020603050405020304" pitchFamily="18" charset="0"/>
+                <a:cs typeface="Times New Roman" panose="02020603050405020304" pitchFamily="18" charset="0"/>
+              </a:rPr>
+              <a:t>universities and associated impact of Bayh-Dole Act. </a:t>
+            </a:r>
+            <a:r>
+              <a:rPr lang="en-US" i="1" dirty="0" err="1">
+                <a:latin typeface="Times New Roman" panose="02020603050405020304" pitchFamily="18" charset="0"/>
+                <a:cs typeface="Times New Roman" panose="02020603050405020304" pitchFamily="18" charset="0"/>
+              </a:rPr>
+              <a:t>Scientometrics</a:t>
+            </a:r>
+            <a:r>
+              <a:rPr lang="en-US" i="1" dirty="0">
+                <a:latin typeface="Times New Roman" panose="02020603050405020304" pitchFamily="18" charset="0"/>
+                <a:cs typeface="Times New Roman" panose="02020603050405020304" pitchFamily="18" charset="0"/>
+              </a:rPr>
+              <a:t>, 101</a:t>
+            </a:r>
+            <a:r>
+              <a:rPr lang="en-US" dirty="0">
+                <a:latin typeface="Times New Roman" panose="02020603050405020304" pitchFamily="18" charset="0"/>
+                <a:cs typeface="Times New Roman" panose="02020603050405020304" pitchFamily="18" charset="0"/>
+              </a:rPr>
+              <a:t>(3), 1851-1869. </a:t>
+            </a:r>
+            <a:endParaRPr lang="en-US" dirty="0">
+              <a:latin typeface="Times New Roman" panose="02020603050405020304" pitchFamily="18" charset="0"/>
               <a:ea typeface="Calibri"/>
-              <a:cs typeface="Times New Roman"/>
+              <a:cs typeface="Times New Roman" panose="02020603050405020304" pitchFamily="18" charset="0"/>
             </a:endParaRPr>
           </a:p>
           <a:p>
@@ -20467,6 +21610,95 @@
               <a:cs typeface="Times New Roman"/>
             </a:endParaRPr>
           </a:p>
+        </p:txBody>
+      </p:sp>
+      <p:sp>
+        <p:nvSpPr>
+          <p:cNvPr id="3" name="TextBox 2"/>
+          <p:cNvSpPr txBox="1"/>
+          <p:nvPr/>
+        </p:nvSpPr>
+        <p:spPr>
+          <a:xfrm>
+            <a:off x="0" y="7136"/>
+            <a:ext cx="9144000" cy="369332"/>
+          </a:xfrm>
+          <a:prstGeom prst="rect">
+            <a:avLst/>
+          </a:prstGeom>
+          <a:noFill/>
+        </p:spPr>
+        <p:txBody>
+          <a:bodyPr wrap="square" rtlCol="0">
+            <a:spAutoFit/>
+          </a:bodyPr>
+          <a:lstStyle/>
+          <a:p>
+            <a:pPr algn="ctr"/>
+            <a:r>
+              <a:rPr lang="en-US" dirty="0" smtClean="0">
+                <a:latin typeface="Times New Roman" panose="02020603050405020304" pitchFamily="18" charset="0"/>
+                <a:cs typeface="Times New Roman" panose="02020603050405020304" pitchFamily="18" charset="0"/>
+              </a:rPr>
+              <a:t>References</a:t>
+            </a:r>
+            <a:endParaRPr lang="en-US" dirty="0">
+              <a:latin typeface="Times New Roman" panose="02020603050405020304" pitchFamily="18" charset="0"/>
+              <a:cs typeface="Times New Roman" panose="02020603050405020304" pitchFamily="18" charset="0"/>
+            </a:endParaRPr>
+          </a:p>
+        </p:txBody>
+      </p:sp>
+    </p:spTree>
+    <p:extLst>
+      <p:ext uri="{BB962C8B-B14F-4D97-AF65-F5344CB8AC3E}">
+        <p14:creationId xmlns:p14="http://schemas.microsoft.com/office/powerpoint/2010/main" val="3125866011"/>
+      </p:ext>
+    </p:extLst>
+  </p:cSld>
+  <p:clrMapOvr>
+    <a:masterClrMapping/>
+  </p:clrMapOvr>
+</p:sld>
+</file>
+
+<file path=ppt/slides/slide28.xml><?xml version="1.0" encoding="utf-8"?>
+<p:sld xmlns:a="http://schemas.openxmlformats.org/drawingml/2006/main" xmlns:r="http://schemas.openxmlformats.org/officeDocument/2006/relationships" xmlns:p="http://schemas.openxmlformats.org/presentationml/2006/main">
+  <p:cSld>
+    <p:spTree>
+      <p:nvGrpSpPr>
+        <p:cNvPr id="1" name=""/>
+        <p:cNvGrpSpPr/>
+        <p:nvPr/>
+      </p:nvGrpSpPr>
+      <p:grpSpPr>
+        <a:xfrm>
+          <a:off x="0" y="0"/>
+          <a:ext cx="0" cy="0"/>
+          <a:chOff x="0" y="0"/>
+          <a:chExt cx="0" cy="0"/>
+        </a:xfrm>
+      </p:grpSpPr>
+      <p:sp>
+        <p:nvSpPr>
+          <p:cNvPr id="2" name="Rectangle 1"/>
+          <p:cNvSpPr/>
+          <p:nvPr/>
+        </p:nvSpPr>
+        <p:spPr>
+          <a:xfrm>
+            <a:off x="173844" y="399249"/>
+            <a:ext cx="8686800" cy="2031325"/>
+          </a:xfrm>
+          <a:prstGeom prst="rect">
+            <a:avLst/>
+          </a:prstGeom>
+        </p:spPr>
+        <p:txBody>
+          <a:bodyPr>
+            <a:spAutoFit/>
+          </a:bodyPr>
+          <a:lstStyle/>
           <a:p>
             <a:pPr marL="457200" marR="0" indent="-457200">
               <a:spcBef>
@@ -20630,7 +21862,7 @@
     </p:spTree>
     <p:extLst>
       <p:ext uri="{BB962C8B-B14F-4D97-AF65-F5344CB8AC3E}">
-        <p14:creationId xmlns:p14="http://schemas.microsoft.com/office/powerpoint/2010/main" val="3125866011"/>
+        <p14:creationId xmlns:p14="http://schemas.microsoft.com/office/powerpoint/2010/main" val="4270090173"/>
       </p:ext>
     </p:extLst>
   </p:cSld>
@@ -20780,7 +22012,7 @@
           <a:graphicData uri="http://schemas.openxmlformats.org/presentationml/2006/ole">
             <mc:AlternateContent xmlns:mc="http://schemas.openxmlformats.org/markup-compatibility/2006">
               <mc:Choice xmlns:v="urn:schemas-microsoft-com:vml" Requires="v">
-                <p:oleObj spid="_x0000_s3151" name="Chart" r:id="rId4" imgW="7038854" imgH="4086180" progId="Excel.Chart.8">
+                <p:oleObj spid="_x0000_s3187" name="Chart" r:id="rId4" imgW="7038854" imgH="4086180" progId="Excel.Chart.8">
                   <p:embed followColorScheme="full"/>
                 </p:oleObj>
               </mc:Choice>
@@ -20854,44 +22086,14 @@
       </p:grpSpPr>
       <p:sp>
         <p:nvSpPr>
-          <p:cNvPr id="2" name="TextBox 1"/>
-          <p:cNvSpPr txBox="1"/>
-          <p:nvPr/>
-        </p:nvSpPr>
-        <p:spPr>
-          <a:xfrm>
-            <a:off x="0" y="4330683"/>
-            <a:ext cx="9144000" cy="369332"/>
-          </a:xfrm>
-          <a:prstGeom prst="rect">
-            <a:avLst/>
-          </a:prstGeom>
-          <a:noFill/>
-        </p:spPr>
-        <p:txBody>
-          <a:bodyPr wrap="square" rtlCol="0">
-            <a:spAutoFit/>
-          </a:bodyPr>
-          <a:lstStyle/>
-          <a:p>
-            <a:r>
-              <a:rPr lang="en-US" dirty="0" smtClean="0"/>
-              <a:t>Research Questions</a:t>
-            </a:r>
-            <a:endParaRPr lang="en-US" dirty="0"/>
-          </a:p>
-        </p:txBody>
-      </p:sp>
-      <p:sp>
-        <p:nvSpPr>
           <p:cNvPr id="3" name="Rectangle 2"/>
           <p:cNvSpPr/>
           <p:nvPr/>
         </p:nvSpPr>
         <p:spPr>
           <a:xfrm>
-            <a:off x="0" y="4720911"/>
-            <a:ext cx="9144000" cy="1000274"/>
+            <a:off x="0" y="4379711"/>
+            <a:ext cx="9144000" cy="1354217"/>
           </a:xfrm>
           <a:prstGeom prst="rect">
             <a:avLst/>
@@ -20910,15 +22112,42 @@
             </a:pPr>
             <a:r>
               <a:rPr lang="en-US" dirty="0" smtClean="0"/>
-              <a:t>1. 	Can </a:t>
+              <a:t>Research Questions</a:t>
+            </a:r>
+          </a:p>
+          <a:p>
+            <a:pPr marL="274320" indent="-457200">
+              <a:spcAft>
+                <a:spcPts val="600"/>
+              </a:spcAft>
+            </a:pPr>
+            <a:r>
+              <a:rPr lang="en-US" dirty="0" smtClean="0"/>
+              <a:t>1</a:t>
+            </a:r>
+            <a:r>
+              <a:rPr lang="en-US" dirty="0" smtClean="0"/>
+              <a:t>. 	</a:t>
+            </a:r>
+            <a:r>
+              <a:rPr lang="en-US" dirty="0" smtClean="0"/>
+              <a:t>Can </a:t>
             </a:r>
             <a:r>
               <a:rPr lang="en-US" dirty="0"/>
-              <a:t>patent citations data serve as a useful measure of technology transfer </a:t>
+              <a:t>patent citations </a:t>
             </a:r>
             <a:r>
               <a:rPr lang="en-US" dirty="0" smtClean="0"/>
-              <a:t>outcomes?</a:t>
+              <a:t>serve </a:t>
+            </a:r>
+            <a:r>
+              <a:rPr lang="en-US" dirty="0"/>
+              <a:t>as a useful measure of technology </a:t>
+            </a:r>
+            <a:r>
+              <a:rPr lang="en-US" dirty="0" smtClean="0"/>
+              <a:t>transfer?</a:t>
             </a:r>
             <a:endParaRPr lang="en-US" dirty="0"/>
           </a:p>
@@ -21279,21 +22508,27 @@
             <a:pPr algn="ctr"/>
             <a:r>
               <a:rPr lang="en-US" dirty="0" smtClean="0"/>
-              <a:t>License</a:t>
-            </a:r>
+              <a:t>License agreements</a:t>
+            </a:r>
+            <a:endParaRPr lang="en-US" dirty="0" smtClean="0"/>
           </a:p>
           <a:p>
             <a:pPr algn="ctr"/>
             <a:r>
               <a:rPr lang="en-US" dirty="0" smtClean="0"/>
-              <a:t>New venture</a:t>
-            </a:r>
+              <a:t>New </a:t>
+            </a:r>
+            <a:r>
+              <a:rPr lang="en-US" dirty="0" smtClean="0"/>
+              <a:t>ventures</a:t>
+            </a:r>
+            <a:endParaRPr lang="en-US" dirty="0" smtClean="0"/>
           </a:p>
           <a:p>
             <a:pPr algn="ctr"/>
             <a:r>
               <a:rPr lang="en-US" dirty="0" smtClean="0"/>
-              <a:t>Acquisition</a:t>
+              <a:t>Acquisitions</a:t>
             </a:r>
             <a:endParaRPr lang="en-US" dirty="0"/>
           </a:p>
@@ -21450,7 +22685,7 @@
             <a:pPr algn="ctr"/>
             <a:r>
               <a:rPr lang="en-US" dirty="0" smtClean="0"/>
-              <a:t>Mode</a:t>
+              <a:t>Category</a:t>
             </a:r>
             <a:endParaRPr lang="en-US" dirty="0"/>
           </a:p>
@@ -21494,7 +22729,7 @@
             <a:pPr algn="ctr"/>
             <a:r>
               <a:rPr lang="en-US" dirty="0" smtClean="0"/>
-              <a:t>Knowledge Form</a:t>
+              <a:t>Embodiment</a:t>
             </a:r>
             <a:endParaRPr lang="en-US" dirty="0"/>
           </a:p>
@@ -21544,6 +22779,88 @@
           </a:p>
         </p:txBody>
       </p:sp>
+      <p:pic>
+        <p:nvPicPr>
+          <p:cNvPr id="4099" name="Picture 3" descr="C:\Users\townesm\Downloads\clipart886407.png"/>
+          <p:cNvPicPr>
+            <a:picLocks noChangeArrowheads="1"/>
+          </p:cNvPicPr>
+          <p:nvPr/>
+        </p:nvPicPr>
+        <p:blipFill>
+          <a:blip r:embed="rId3">
+            <a:extLst>
+              <a:ext uri="{28A0092B-C50C-407E-A947-70E740481C1C}">
+                <a14:useLocalDpi xmlns:a14="http://schemas.microsoft.com/office/drawing/2010/main" val="0"/>
+              </a:ext>
+            </a:extLst>
+          </a:blip>
+          <a:srcRect/>
+          <a:stretch>
+            <a:fillRect/>
+          </a:stretch>
+        </p:blipFill>
+        <p:spPr bwMode="auto">
+          <a:xfrm>
+            <a:off x="5623559" y="584740"/>
+            <a:ext cx="2176467" cy="813235"/>
+          </a:xfrm>
+          <a:prstGeom prst="rect">
+            <a:avLst/>
+          </a:prstGeom>
+          <a:noFill/>
+          <a:extLst>
+            <a:ext uri="{909E8E84-426E-40DD-AFC4-6F175D3DCCD1}">
+              <a14:hiddenFill xmlns:a14="http://schemas.microsoft.com/office/drawing/2010/main">
+                <a:solidFill>
+                  <a:srgbClr val="FFFFFF"/>
+                </a:solidFill>
+              </a14:hiddenFill>
+            </a:ext>
+          </a:extLst>
+        </p:spPr>
+      </p:pic>
+      <p:pic>
+        <p:nvPicPr>
+          <p:cNvPr id="4100" name="Picture 4" descr="C:\Users\townesm\Downloads\kisspng-close-up-font-underline-5b0c091aeb9c10.6365625315275154189651.png"/>
+          <p:cNvPicPr>
+            <a:picLocks noChangeAspect="1" noChangeArrowheads="1"/>
+          </p:cNvPicPr>
+          <p:nvPr/>
+        </p:nvPicPr>
+        <p:blipFill>
+          <a:blip r:embed="rId4" cstate="print">
+            <a:extLst>
+              <a:ext uri="{28A0092B-C50C-407E-A947-70E740481C1C}">
+                <a14:useLocalDpi xmlns:a14="http://schemas.microsoft.com/office/drawing/2010/main" val="0"/>
+              </a:ext>
+            </a:extLst>
+          </a:blip>
+          <a:srcRect/>
+          <a:stretch>
+            <a:fillRect/>
+          </a:stretch>
+        </p:blipFill>
+        <p:spPr bwMode="auto">
+          <a:xfrm>
+            <a:off x="5971227" y="2057947"/>
+            <a:ext cx="1554480" cy="171097"/>
+          </a:xfrm>
+          <a:prstGeom prst="rect">
+            <a:avLst/>
+          </a:prstGeom>
+          <a:noFill/>
+          <a:extLst>
+            <a:ext uri="{909E8E84-426E-40DD-AFC4-6F175D3DCCD1}">
+              <a14:hiddenFill xmlns:a14="http://schemas.microsoft.com/office/drawing/2010/main">
+                <a:solidFill>
+                  <a:srgbClr val="FFFFFF"/>
+                </a:solidFill>
+              </a14:hiddenFill>
+            </a:ext>
+          </a:extLst>
+        </p:spPr>
+      </p:pic>
     </p:spTree>
     <p:extLst>
       <p:ext uri="{BB962C8B-B14F-4D97-AF65-F5344CB8AC3E}">
@@ -24664,7 +25981,7 @@
                       </a:txBody>
                       <a:tcPr marL="8927" marR="8927" marT="4466" marB="4466">
                         <a:blipFill rotWithShape="1">
-                          <a:blip r:embed="rId2"/>
+                          <a:blip r:embed="rId3"/>
                           <a:stretch>
                             <a:fillRect l="-144068" t="-404494" r="-339" b="-103371"/>
                           </a:stretch>
@@ -25048,6 +26365,129 @@
           </a:p>
         </p:txBody>
       </p:sp>
+      <p:pic>
+        <p:nvPicPr>
+          <p:cNvPr id="6" name="Picture 3" descr="C:\Users\townesm\Downloads\clipart886407.png"/>
+          <p:cNvPicPr>
+            <a:picLocks noChangeArrowheads="1"/>
+          </p:cNvPicPr>
+          <p:nvPr/>
+        </p:nvPicPr>
+        <p:blipFill>
+          <a:blip r:embed="rId4" cstate="print">
+            <a:extLst>
+              <a:ext uri="{28A0092B-C50C-407E-A947-70E740481C1C}">
+                <a14:useLocalDpi xmlns:a14="http://schemas.microsoft.com/office/drawing/2010/main" val="0"/>
+              </a:ext>
+            </a:extLst>
+          </a:blip>
+          <a:srcRect/>
+          <a:stretch>
+            <a:fillRect/>
+          </a:stretch>
+        </p:blipFill>
+        <p:spPr bwMode="auto">
+          <a:xfrm>
+            <a:off x="0" y="1267131"/>
+            <a:ext cx="548640" cy="365760"/>
+          </a:xfrm>
+          <a:prstGeom prst="rect">
+            <a:avLst/>
+          </a:prstGeom>
+          <a:noFill/>
+          <a:extLst>
+            <a:ext uri="{909E8E84-426E-40DD-AFC4-6F175D3DCCD1}">
+              <a14:hiddenFill xmlns:a14="http://schemas.microsoft.com/office/drawing/2010/main">
+                <a:solidFill>
+                  <a:srgbClr val="FFFFFF"/>
+                </a:solidFill>
+              </a14:hiddenFill>
+            </a:ext>
+          </a:extLst>
+        </p:spPr>
+      </p:pic>
+      <p:pic>
+        <p:nvPicPr>
+          <p:cNvPr id="7" name="Picture 3" descr="C:\Users\townesm\Downloads\clipart886407.png"/>
+          <p:cNvPicPr>
+            <a:picLocks noChangeArrowheads="1"/>
+          </p:cNvPicPr>
+          <p:nvPr/>
+        </p:nvPicPr>
+        <p:blipFill>
+          <a:blip r:embed="rId4" cstate="print">
+            <a:extLst>
+              <a:ext uri="{28A0092B-C50C-407E-A947-70E740481C1C}">
+                <a14:useLocalDpi xmlns:a14="http://schemas.microsoft.com/office/drawing/2010/main" val="0"/>
+              </a:ext>
+            </a:extLst>
+          </a:blip>
+          <a:srcRect/>
+          <a:stretch>
+            <a:fillRect/>
+          </a:stretch>
+        </p:blipFill>
+        <p:spPr bwMode="auto">
+          <a:xfrm>
+            <a:off x="4602025" y="2524999"/>
+            <a:ext cx="548640" cy="365760"/>
+          </a:xfrm>
+          <a:prstGeom prst="rect">
+            <a:avLst/>
+          </a:prstGeom>
+          <a:noFill/>
+          <a:extLst>
+            <a:ext uri="{909E8E84-426E-40DD-AFC4-6F175D3DCCD1}">
+              <a14:hiddenFill xmlns:a14="http://schemas.microsoft.com/office/drawing/2010/main">
+                <a:solidFill>
+                  <a:srgbClr val="FFFFFF"/>
+                </a:solidFill>
+              </a14:hiddenFill>
+            </a:ext>
+          </a:extLst>
+        </p:spPr>
+      </p:pic>
+      <p:pic>
+        <p:nvPicPr>
+          <p:cNvPr id="8" name="Picture 3" descr="C:\Users\townesm\Downloads\clipart886407.png"/>
+          <p:cNvPicPr>
+            <a:picLocks noChangeArrowheads="1"/>
+          </p:cNvPicPr>
+          <p:nvPr/>
+        </p:nvPicPr>
+        <p:blipFill>
+          <a:blip r:embed="rId4" cstate="print">
+            <a:extLst>
+              <a:ext uri="{28A0092B-C50C-407E-A947-70E740481C1C}">
+                <a14:useLocalDpi xmlns:a14="http://schemas.microsoft.com/office/drawing/2010/main" val="0"/>
+              </a:ext>
+            </a:extLst>
+          </a:blip>
+          <a:srcRect/>
+          <a:stretch>
+            <a:fillRect/>
+          </a:stretch>
+        </p:blipFill>
+        <p:spPr bwMode="auto">
+          <a:xfrm>
+            <a:off x="0" y="2790384"/>
+            <a:ext cx="548640" cy="365760"/>
+          </a:xfrm>
+          <a:prstGeom prst="rect">
+            <a:avLst/>
+          </a:prstGeom>
+          <a:noFill/>
+          <a:extLst>
+            <a:ext uri="{909E8E84-426E-40DD-AFC4-6F175D3DCCD1}">
+              <a14:hiddenFill xmlns:a14="http://schemas.microsoft.com/office/drawing/2010/main">
+                <a:solidFill>
+                  <a:srgbClr val="FFFFFF"/>
+                </a:solidFill>
+              </a14:hiddenFill>
+            </a:ext>
+          </a:extLst>
+        </p:spPr>
+      </p:pic>
     </p:spTree>
     <p:extLst>
       <p:ext uri="{BB962C8B-B14F-4D97-AF65-F5344CB8AC3E}">
@@ -28810,6 +30250,200 @@
           </a:p>
         </p:txBody>
       </p:sp>
+      <p:grpSp>
+        <p:nvGrpSpPr>
+          <p:cNvPr id="8" name="Group 7"/>
+          <p:cNvGrpSpPr/>
+          <p:nvPr/>
+        </p:nvGrpSpPr>
+        <p:grpSpPr>
+          <a:xfrm>
+            <a:off x="111892" y="1225609"/>
+            <a:ext cx="728639" cy="100494"/>
+            <a:chOff x="-79180" y="1252905"/>
+            <a:chExt cx="728639" cy="100494"/>
+          </a:xfrm>
+        </p:grpSpPr>
+        <p:pic>
+          <p:nvPicPr>
+            <p:cNvPr id="6" name="Picture 4" descr="C:\Users\townesm\Downloads\kisspng-close-up-font-underline-5b0c091aeb9c10.6365625315275154189651.png"/>
+            <p:cNvPicPr>
+              <a:picLocks noChangeArrowheads="1"/>
+            </p:cNvPicPr>
+            <p:nvPr/>
+          </p:nvPicPr>
+          <p:blipFill>
+            <a:blip r:embed="rId4" cstate="print">
+              <a:extLst>
+                <a:ext uri="{28A0092B-C50C-407E-A947-70E740481C1C}">
+                  <a14:useLocalDpi xmlns:a14="http://schemas.microsoft.com/office/drawing/2010/main" val="0"/>
+                </a:ext>
+              </a:extLst>
+            </a:blip>
+            <a:srcRect/>
+            <a:stretch>
+              <a:fillRect/>
+            </a:stretch>
+          </p:blipFill>
+          <p:spPr bwMode="auto">
+            <a:xfrm rot="1586846">
+              <a:off x="9379" y="1252905"/>
+              <a:ext cx="640080" cy="91440"/>
+            </a:xfrm>
+            <a:prstGeom prst="rect">
+              <a:avLst/>
+            </a:prstGeom>
+            <a:noFill/>
+            <a:extLst>
+              <a:ext uri="{909E8E84-426E-40DD-AFC4-6F175D3DCCD1}">
+                <a14:hiddenFill xmlns:a14="http://schemas.microsoft.com/office/drawing/2010/main">
+                  <a:solidFill>
+                    <a:srgbClr val="FFFFFF"/>
+                  </a:solidFill>
+                </a14:hiddenFill>
+              </a:ext>
+            </a:extLst>
+          </p:spPr>
+        </p:pic>
+        <p:pic>
+          <p:nvPicPr>
+            <p:cNvPr id="7" name="Picture 4" descr="C:\Users\townesm\Downloads\kisspng-close-up-font-underline-5b0c091aeb9c10.6365625315275154189651.png"/>
+            <p:cNvPicPr>
+              <a:picLocks noChangeArrowheads="1"/>
+            </p:cNvPicPr>
+            <p:nvPr/>
+          </p:nvPicPr>
+          <p:blipFill>
+            <a:blip r:embed="rId4" cstate="print">
+              <a:extLst>
+                <a:ext uri="{28A0092B-C50C-407E-A947-70E740481C1C}">
+                  <a14:useLocalDpi xmlns:a14="http://schemas.microsoft.com/office/drawing/2010/main" val="0"/>
+                </a:ext>
+              </a:extLst>
+            </a:blip>
+            <a:srcRect/>
+            <a:stretch>
+              <a:fillRect/>
+            </a:stretch>
+          </p:blipFill>
+          <p:spPr bwMode="auto">
+            <a:xfrm rot="19666543" flipH="1">
+              <a:off x="-79180" y="1262818"/>
+              <a:ext cx="640080" cy="90581"/>
+            </a:xfrm>
+            <a:prstGeom prst="rect">
+              <a:avLst/>
+            </a:prstGeom>
+            <a:noFill/>
+            <a:extLst>
+              <a:ext uri="{909E8E84-426E-40DD-AFC4-6F175D3DCCD1}">
+                <a14:hiddenFill xmlns:a14="http://schemas.microsoft.com/office/drawing/2010/main">
+                  <a:solidFill>
+                    <a:srgbClr val="FFFFFF"/>
+                  </a:solidFill>
+                </a14:hiddenFill>
+              </a:ext>
+            </a:extLst>
+          </p:spPr>
+        </p:pic>
+      </p:grpSp>
+      <p:grpSp>
+        <p:nvGrpSpPr>
+          <p:cNvPr id="9" name="Group 8"/>
+          <p:cNvGrpSpPr/>
+          <p:nvPr/>
+        </p:nvGrpSpPr>
+        <p:grpSpPr>
+          <a:xfrm>
+            <a:off x="-22316" y="613721"/>
+            <a:ext cx="728639" cy="100494"/>
+            <a:chOff x="-79180" y="1252905"/>
+            <a:chExt cx="728639" cy="100494"/>
+          </a:xfrm>
+        </p:grpSpPr>
+        <p:pic>
+          <p:nvPicPr>
+            <p:cNvPr id="10" name="Picture 4" descr="C:\Users\townesm\Downloads\kisspng-close-up-font-underline-5b0c091aeb9c10.6365625315275154189651.png"/>
+            <p:cNvPicPr>
+              <a:picLocks noChangeArrowheads="1"/>
+            </p:cNvPicPr>
+            <p:nvPr/>
+          </p:nvPicPr>
+          <p:blipFill>
+            <a:blip r:embed="rId4" cstate="print">
+              <a:extLst>
+                <a:ext uri="{28A0092B-C50C-407E-A947-70E740481C1C}">
+                  <a14:useLocalDpi xmlns:a14="http://schemas.microsoft.com/office/drawing/2010/main" val="0"/>
+                </a:ext>
+              </a:extLst>
+            </a:blip>
+            <a:srcRect/>
+            <a:stretch>
+              <a:fillRect/>
+            </a:stretch>
+          </p:blipFill>
+          <p:spPr bwMode="auto">
+            <a:xfrm rot="1586846">
+              <a:off x="9379" y="1252905"/>
+              <a:ext cx="640080" cy="91440"/>
+            </a:xfrm>
+            <a:prstGeom prst="rect">
+              <a:avLst/>
+            </a:prstGeom>
+            <a:noFill/>
+            <a:extLst>
+              <a:ext uri="{909E8E84-426E-40DD-AFC4-6F175D3DCCD1}">
+                <a14:hiddenFill xmlns:a14="http://schemas.microsoft.com/office/drawing/2010/main">
+                  <a:solidFill>
+                    <a:srgbClr val="FFFFFF"/>
+                  </a:solidFill>
+                </a14:hiddenFill>
+              </a:ext>
+            </a:extLst>
+          </p:spPr>
+        </p:pic>
+        <p:pic>
+          <p:nvPicPr>
+            <p:cNvPr id="11" name="Picture 4" descr="C:\Users\townesm\Downloads\kisspng-close-up-font-underline-5b0c091aeb9c10.6365625315275154189651.png"/>
+            <p:cNvPicPr>
+              <a:picLocks noChangeArrowheads="1"/>
+            </p:cNvPicPr>
+            <p:nvPr/>
+          </p:nvPicPr>
+          <p:blipFill>
+            <a:blip r:embed="rId4" cstate="print">
+              <a:extLst>
+                <a:ext uri="{28A0092B-C50C-407E-A947-70E740481C1C}">
+                  <a14:useLocalDpi xmlns:a14="http://schemas.microsoft.com/office/drawing/2010/main" val="0"/>
+                </a:ext>
+              </a:extLst>
+            </a:blip>
+            <a:srcRect/>
+            <a:stretch>
+              <a:fillRect/>
+            </a:stretch>
+          </p:blipFill>
+          <p:spPr bwMode="auto">
+            <a:xfrm rot="19666543" flipH="1">
+              <a:off x="-79180" y="1262818"/>
+              <a:ext cx="640080" cy="90581"/>
+            </a:xfrm>
+            <a:prstGeom prst="rect">
+              <a:avLst/>
+            </a:prstGeom>
+            <a:noFill/>
+            <a:extLst>
+              <a:ext uri="{909E8E84-426E-40DD-AFC4-6F175D3DCCD1}">
+                <a14:hiddenFill xmlns:a14="http://schemas.microsoft.com/office/drawing/2010/main">
+                  <a:solidFill>
+                    <a:srgbClr val="FFFFFF"/>
+                  </a:solidFill>
+                </a14:hiddenFill>
+              </a:ext>
+            </a:extLst>
+          </p:spPr>
+        </p:pic>
+      </p:grpSp>
     </p:spTree>
     <p:extLst>
       <p:ext uri="{BB962C8B-B14F-4D97-AF65-F5344CB8AC3E}">

</xml_diff>

<commit_message>
Finished slides for Presentation 02
</commit_message>
<xml_diff>
--- a/Presentations/Presentation02/Townes_SOC6100_Presentation02.pptx
+++ b/Presentations/Presentation02/Townes_SOC6100_Presentation02.pptx
@@ -5,37 +5,40 @@
     <p:sldMasterId id="2147483648" r:id="rId1"/>
   </p:sldMasterIdLst>
   <p:notesMasterIdLst>
-    <p:notesMasterId r:id="rId30"/>
+    <p:notesMasterId r:id="rId33"/>
   </p:notesMasterIdLst>
   <p:sldIdLst>
     <p:sldId id="256" r:id="rId2"/>
     <p:sldId id="280" r:id="rId3"/>
     <p:sldId id="260" r:id="rId4"/>
-    <p:sldId id="262" r:id="rId5"/>
-    <p:sldId id="257" r:id="rId6"/>
-    <p:sldId id="258" r:id="rId7"/>
-    <p:sldId id="259" r:id="rId8"/>
-    <p:sldId id="263" r:id="rId9"/>
-    <p:sldId id="275" r:id="rId10"/>
-    <p:sldId id="264" r:id="rId11"/>
-    <p:sldId id="265" r:id="rId12"/>
-    <p:sldId id="274" r:id="rId13"/>
-    <p:sldId id="266" r:id="rId14"/>
-    <p:sldId id="273" r:id="rId15"/>
-    <p:sldId id="269" r:id="rId16"/>
-    <p:sldId id="283" r:id="rId17"/>
-    <p:sldId id="267" r:id="rId18"/>
-    <p:sldId id="268" r:id="rId19"/>
-    <p:sldId id="272" r:id="rId20"/>
-    <p:sldId id="270" r:id="rId21"/>
-    <p:sldId id="271" r:id="rId22"/>
-    <p:sldId id="281" r:id="rId23"/>
-    <p:sldId id="282" r:id="rId24"/>
-    <p:sldId id="276" r:id="rId25"/>
-    <p:sldId id="277" r:id="rId26"/>
-    <p:sldId id="278" r:id="rId27"/>
-    <p:sldId id="279" r:id="rId28"/>
-    <p:sldId id="284" r:id="rId29"/>
+    <p:sldId id="285" r:id="rId5"/>
+    <p:sldId id="286" r:id="rId6"/>
+    <p:sldId id="262" r:id="rId7"/>
+    <p:sldId id="257" r:id="rId8"/>
+    <p:sldId id="258" r:id="rId9"/>
+    <p:sldId id="259" r:id="rId10"/>
+    <p:sldId id="263" r:id="rId11"/>
+    <p:sldId id="275" r:id="rId12"/>
+    <p:sldId id="264" r:id="rId13"/>
+    <p:sldId id="265" r:id="rId14"/>
+    <p:sldId id="274" r:id="rId15"/>
+    <p:sldId id="266" r:id="rId16"/>
+    <p:sldId id="273" r:id="rId17"/>
+    <p:sldId id="269" r:id="rId18"/>
+    <p:sldId id="283" r:id="rId19"/>
+    <p:sldId id="267" r:id="rId20"/>
+    <p:sldId id="268" r:id="rId21"/>
+    <p:sldId id="272" r:id="rId22"/>
+    <p:sldId id="270" r:id="rId23"/>
+    <p:sldId id="271" r:id="rId24"/>
+    <p:sldId id="281" r:id="rId25"/>
+    <p:sldId id="288" r:id="rId26"/>
+    <p:sldId id="282" r:id="rId27"/>
+    <p:sldId id="276" r:id="rId28"/>
+    <p:sldId id="277" r:id="rId29"/>
+    <p:sldId id="278" r:id="rId30"/>
+    <p:sldId id="279" r:id="rId31"/>
+    <p:sldId id="284" r:id="rId32"/>
   </p:sldIdLst>
   <p:sldSz cx="9144000" cy="5715000" type="screen16x10"/>
   <p:notesSz cx="6858000" cy="9144000"/>
@@ -677,7 +680,7 @@
           <a:p>
             <a:fld id="{76C7EBE9-FBA5-4606-B4BF-D5A892555425}" type="slidenum">
               <a:rPr lang="en-US" smtClean="0"/>
-              <a:t>18</a:t>
+              <a:t>20</a:t>
             </a:fld>
             <a:endParaRPr lang="en-US"/>
           </a:p>
@@ -865,7 +868,7 @@
           <a:p>
             <a:fld id="{76C7EBE9-FBA5-4606-B4BF-D5A892555425}" type="slidenum">
               <a:rPr lang="en-US" smtClean="0"/>
-              <a:t>20</a:t>
+              <a:t>22</a:t>
             </a:fld>
             <a:endParaRPr lang="en-US"/>
           </a:p>
@@ -977,7 +980,7 @@
           <a:p>
             <a:fld id="{76C7EBE9-FBA5-4606-B4BF-D5A892555425}" type="slidenum">
               <a:rPr lang="en-US" smtClean="0"/>
-              <a:t>21</a:t>
+              <a:t>23</a:t>
             </a:fld>
             <a:endParaRPr lang="en-US"/>
           </a:p>
@@ -1081,7 +1084,7 @@
           <a:p>
             <a:fld id="{76C7EBE9-FBA5-4606-B4BF-D5A892555425}" type="slidenum">
               <a:rPr lang="en-US" smtClean="0"/>
-              <a:t>4</a:t>
+              <a:t>6</a:t>
             </a:fld>
             <a:endParaRPr lang="en-US"/>
           </a:p>
@@ -1165,7 +1168,7 @@
           <a:p>
             <a:fld id="{76C7EBE9-FBA5-4606-B4BF-D5A892555425}" type="slidenum">
               <a:rPr lang="en-US" smtClean="0"/>
-              <a:t>5</a:t>
+              <a:t>7</a:t>
             </a:fld>
             <a:endParaRPr lang="en-US"/>
           </a:p>
@@ -1252,23 +1255,7 @@
             </a:r>
             <a:r>
               <a:rPr lang="en-US" baseline="0" dirty="0" smtClean="0"/>
-              <a:t> </a:t>
-            </a:r>
-            <a:r>
-              <a:rPr lang="en-US" baseline="0" dirty="0" smtClean="0"/>
-              <a:t>patents </a:t>
-            </a:r>
-            <a:r>
-              <a:rPr lang="en-US" baseline="0" dirty="0" smtClean="0"/>
-              <a:t>from a subset of 253,328 </a:t>
-            </a:r>
-            <a:r>
-              <a:rPr lang="en-US" baseline="0" dirty="0" smtClean="0"/>
-              <a:t>patents </a:t>
-            </a:r>
-            <a:r>
-              <a:rPr lang="en-US" baseline="0" dirty="0" smtClean="0"/>
-              <a:t>for the period January 1, 1995 to December 31, 1999.</a:t>
+              <a:t> patents from a subset of 253,328 patents for the period January 1, 1995 to December 31, 1999.</a:t>
             </a:r>
             <a:endParaRPr lang="en-US" dirty="0"/>
           </a:p>
@@ -1291,7 +1278,7 @@
           <a:p>
             <a:fld id="{76C7EBE9-FBA5-4606-B4BF-D5A892555425}" type="slidenum">
               <a:rPr lang="en-US" smtClean="0"/>
-              <a:t>8</a:t>
+              <a:t>10</a:t>
             </a:fld>
             <a:endParaRPr lang="en-US"/>
           </a:p>
@@ -1389,7 +1376,7 @@
           <a:p>
             <a:fld id="{76C7EBE9-FBA5-4606-B4BF-D5A892555425}" type="slidenum">
               <a:rPr lang="en-US" smtClean="0"/>
-              <a:t>10</a:t>
+              <a:t>12</a:t>
             </a:fld>
             <a:endParaRPr lang="en-US"/>
           </a:p>
@@ -1510,7 +1497,7 @@
           <a:p>
             <a:fld id="{76C7EBE9-FBA5-4606-B4BF-D5A892555425}" type="slidenum">
               <a:rPr lang="en-US" smtClean="0"/>
-              <a:t>11</a:t>
+              <a:t>13</a:t>
             </a:fld>
             <a:endParaRPr lang="en-US"/>
           </a:p>
@@ -1589,11 +1576,7 @@
           <a:p>
             <a:r>
               <a:rPr lang="en-US" dirty="0" smtClean="0"/>
-              <a:t>I </a:t>
-            </a:r>
-            <a:r>
-              <a:rPr lang="en-US" dirty="0" smtClean="0"/>
-              <a:t>created a product term called CLAIMSORIGINAL using the CLAIMS variable and ORIGINAL variable to test for possible interaction. </a:t>
+              <a:t>I created a product term called CLAIMSORIGINAL using the CLAIMS variable and ORIGINAL variable to test for possible interaction. </a:t>
             </a:r>
           </a:p>
           <a:p>
@@ -1628,7 +1611,7 @@
           <a:p>
             <a:fld id="{76C7EBE9-FBA5-4606-B4BF-D5A892555425}" type="slidenum">
               <a:rPr lang="en-US" smtClean="0"/>
-              <a:t>13</a:t>
+              <a:t>15</a:t>
             </a:fld>
             <a:endParaRPr lang="en-US"/>
           </a:p>
@@ -1815,7 +1798,7 @@
           <a:p>
             <a:fld id="{76C7EBE9-FBA5-4606-B4BF-D5A892555425}" type="slidenum">
               <a:rPr lang="en-US" smtClean="0"/>
-              <a:t>15</a:t>
+              <a:t>17</a:t>
             </a:fld>
             <a:endParaRPr lang="en-US"/>
           </a:p>
@@ -2064,7 +2047,7 @@
           <a:p>
             <a:fld id="{76C7EBE9-FBA5-4606-B4BF-D5A892555425}" type="slidenum">
               <a:rPr lang="en-US" smtClean="0"/>
-              <a:t>17</a:t>
+              <a:t>19</a:t>
             </a:fld>
             <a:endParaRPr lang="en-US"/>
           </a:p>
@@ -5103,25 +5086,12 @@
               <a:rPr lang="en-US" sz="2800" b="1" dirty="0" smtClean="0"/>
               <a:t>Investigating the Feasibility of Using </a:t>
             </a:r>
-            <a:endParaRPr lang="en-US" sz="2800" b="1" dirty="0" smtClean="0"/>
           </a:p>
           <a:p>
             <a:pPr algn="ctr"/>
             <a:r>
               <a:rPr lang="en-US" sz="2800" b="1" dirty="0" smtClean="0"/>
-              <a:t>Patent </a:t>
-            </a:r>
-            <a:r>
-              <a:rPr lang="en-US" sz="2800" b="1" dirty="0" smtClean="0"/>
-              <a:t>Citations </a:t>
-            </a:r>
-            <a:r>
-              <a:rPr lang="en-US" sz="2800" b="1" dirty="0" smtClean="0"/>
-              <a:t>as a Measure of </a:t>
-            </a:r>
-            <a:r>
-              <a:rPr lang="en-US" sz="2800" b="1" dirty="0" smtClean="0"/>
-              <a:t>Technology Transfer</a:t>
+              <a:t>Patent Citations as a Measure of Technology Transfer</a:t>
             </a:r>
             <a:endParaRPr lang="en-US" sz="2800" b="1" dirty="0"/>
           </a:p>
@@ -5190,6 +5160,301 @@
 </file>
 
 <file path=ppt/slides/slide10.xml><?xml version="1.0" encoding="utf-8"?>
+<p:sld xmlns:a="http://schemas.openxmlformats.org/drawingml/2006/main" xmlns:r="http://schemas.openxmlformats.org/officeDocument/2006/relationships" xmlns:p="http://schemas.openxmlformats.org/presentationml/2006/main">
+  <p:cSld>
+    <p:spTree>
+      <p:nvGrpSpPr>
+        <p:cNvPr id="1" name=""/>
+        <p:cNvGrpSpPr/>
+        <p:nvPr/>
+      </p:nvGrpSpPr>
+      <p:grpSpPr>
+        <a:xfrm>
+          <a:off x="0" y="0"/>
+          <a:ext cx="0" cy="0"/>
+          <a:chOff x="0" y="0"/>
+          <a:chExt cx="0" cy="0"/>
+        </a:xfrm>
+      </p:grpSpPr>
+      <p:pic>
+        <p:nvPicPr>
+          <p:cNvPr id="4099" name="Picture 3"/>
+          <p:cNvPicPr>
+            <a:picLocks noChangeAspect="1" noChangeArrowheads="1"/>
+          </p:cNvPicPr>
+          <p:nvPr/>
+        </p:nvPicPr>
+        <p:blipFill rotWithShape="1">
+          <a:blip r:embed="rId3">
+            <a:extLst>
+              <a:ext uri="{28A0092B-C50C-407E-A947-70E740481C1C}">
+                <a14:useLocalDpi xmlns:a14="http://schemas.microsoft.com/office/drawing/2010/main" val="0"/>
+              </a:ext>
+            </a:extLst>
+          </a:blip>
+          <a:srcRect r="12062"/>
+          <a:stretch/>
+        </p:blipFill>
+        <p:spPr bwMode="auto">
+          <a:xfrm>
+            <a:off x="3518530" y="83820"/>
+            <a:ext cx="4087590" cy="2743200"/>
+          </a:xfrm>
+          <a:prstGeom prst="rect">
+            <a:avLst/>
+          </a:prstGeom>
+          <a:noFill/>
+          <a:ln>
+            <a:noFill/>
+          </a:ln>
+          <a:effectLst/>
+          <a:extLst>
+            <a:ext uri="{909E8E84-426E-40DD-AFC4-6F175D3DCCD1}">
+              <a14:hiddenFill xmlns:a14="http://schemas.microsoft.com/office/drawing/2010/main">
+                <a:solidFill>
+                  <a:schemeClr val="accent1"/>
+                </a:solidFill>
+              </a14:hiddenFill>
+            </a:ext>
+            <a:ext uri="{91240B29-F687-4F45-9708-019B960494DF}">
+              <a14:hiddenLine xmlns:a14="http://schemas.microsoft.com/office/drawing/2010/main" w="9525">
+                <a:solidFill>
+                  <a:schemeClr val="tx1"/>
+                </a:solidFill>
+                <a:miter lim="800000"/>
+                <a:headEnd/>
+                <a:tailEnd/>
+              </a14:hiddenLine>
+            </a:ext>
+            <a:ext uri="{AF507438-7753-43E0-B8FC-AC1667EBCBE1}">
+              <a14:hiddenEffects xmlns:a14="http://schemas.microsoft.com/office/drawing/2010/main">
+                <a:effectLst>
+                  <a:outerShdw dist="35921" dir="2700000" algn="ctr" rotWithShape="0">
+                    <a:schemeClr val="bg2"/>
+                  </a:outerShdw>
+                </a:effectLst>
+              </a14:hiddenEffects>
+            </a:ext>
+          </a:extLst>
+        </p:spPr>
+      </p:pic>
+      <p:pic>
+        <p:nvPicPr>
+          <p:cNvPr id="4100" name="Picture 4"/>
+          <p:cNvPicPr>
+            <a:picLocks noChangeAspect="1" noChangeArrowheads="1"/>
+          </p:cNvPicPr>
+          <p:nvPr/>
+        </p:nvPicPr>
+        <p:blipFill>
+          <a:blip r:embed="rId4">
+            <a:extLst>
+              <a:ext uri="{28A0092B-C50C-407E-A947-70E740481C1C}">
+                <a14:useLocalDpi xmlns:a14="http://schemas.microsoft.com/office/drawing/2010/main" val="0"/>
+              </a:ext>
+            </a:extLst>
+          </a:blip>
+          <a:srcRect/>
+          <a:stretch>
+            <a:fillRect/>
+          </a:stretch>
+        </p:blipFill>
+        <p:spPr bwMode="auto">
+          <a:xfrm>
+            <a:off x="3518530" y="2899410"/>
+            <a:ext cx="4648209" cy="2743200"/>
+          </a:xfrm>
+          <a:prstGeom prst="rect">
+            <a:avLst/>
+          </a:prstGeom>
+          <a:noFill/>
+          <a:ln>
+            <a:noFill/>
+          </a:ln>
+          <a:effectLst/>
+          <a:extLst>
+            <a:ext uri="{909E8E84-426E-40DD-AFC4-6F175D3DCCD1}">
+              <a14:hiddenFill xmlns:a14="http://schemas.microsoft.com/office/drawing/2010/main">
+                <a:solidFill>
+                  <a:schemeClr val="accent1"/>
+                </a:solidFill>
+              </a14:hiddenFill>
+            </a:ext>
+            <a:ext uri="{91240B29-F687-4F45-9708-019B960494DF}">
+              <a14:hiddenLine xmlns:a14="http://schemas.microsoft.com/office/drawing/2010/main" w="9525">
+                <a:solidFill>
+                  <a:schemeClr val="tx1"/>
+                </a:solidFill>
+                <a:miter lim="800000"/>
+                <a:headEnd/>
+                <a:tailEnd/>
+              </a14:hiddenLine>
+            </a:ext>
+            <a:ext uri="{AF507438-7753-43E0-B8FC-AC1667EBCBE1}">
+              <a14:hiddenEffects xmlns:a14="http://schemas.microsoft.com/office/drawing/2010/main">
+                <a:effectLst>
+                  <a:outerShdw dist="35921" dir="2700000" algn="ctr" rotWithShape="0">
+                    <a:schemeClr val="bg2"/>
+                  </a:outerShdw>
+                </a:effectLst>
+              </a14:hiddenEffects>
+            </a:ext>
+          </a:extLst>
+        </p:spPr>
+      </p:pic>
+      <p:pic>
+        <p:nvPicPr>
+          <p:cNvPr id="4098" name="Picture 2"/>
+          <p:cNvPicPr>
+            <a:picLocks noChangeAspect="1" noChangeArrowheads="1"/>
+          </p:cNvPicPr>
+          <p:nvPr/>
+        </p:nvPicPr>
+        <p:blipFill>
+          <a:blip r:embed="rId5">
+            <a:extLst>
+              <a:ext uri="{28A0092B-C50C-407E-A947-70E740481C1C}">
+                <a14:useLocalDpi xmlns:a14="http://schemas.microsoft.com/office/drawing/2010/main" val="0"/>
+              </a:ext>
+            </a:extLst>
+          </a:blip>
+          <a:srcRect/>
+          <a:stretch>
+            <a:fillRect/>
+          </a:stretch>
+        </p:blipFill>
+        <p:spPr bwMode="auto">
+          <a:xfrm>
+            <a:off x="411478" y="800100"/>
+            <a:ext cx="2343739" cy="4114800"/>
+          </a:xfrm>
+          <a:prstGeom prst="rect">
+            <a:avLst/>
+          </a:prstGeom>
+          <a:noFill/>
+          <a:ln>
+            <a:noFill/>
+          </a:ln>
+          <a:effectLst/>
+          <a:extLst>
+            <a:ext uri="{909E8E84-426E-40DD-AFC4-6F175D3DCCD1}">
+              <a14:hiddenFill xmlns:a14="http://schemas.microsoft.com/office/drawing/2010/main">
+                <a:solidFill>
+                  <a:schemeClr val="accent1"/>
+                </a:solidFill>
+              </a14:hiddenFill>
+            </a:ext>
+            <a:ext uri="{91240B29-F687-4F45-9708-019B960494DF}">
+              <a14:hiddenLine xmlns:a14="http://schemas.microsoft.com/office/drawing/2010/main" w="9525">
+                <a:solidFill>
+                  <a:schemeClr val="tx1"/>
+                </a:solidFill>
+                <a:miter lim="800000"/>
+                <a:headEnd/>
+                <a:tailEnd/>
+              </a14:hiddenLine>
+            </a:ext>
+            <a:ext uri="{AF507438-7753-43E0-B8FC-AC1667EBCBE1}">
+              <a14:hiddenEffects xmlns:a14="http://schemas.microsoft.com/office/drawing/2010/main">
+                <a:effectLst>
+                  <a:outerShdw dist="35921" dir="2700000" algn="ctr" rotWithShape="0">
+                    <a:schemeClr val="bg2"/>
+                  </a:outerShdw>
+                </a:effectLst>
+              </a14:hiddenEffects>
+            </a:ext>
+          </a:extLst>
+        </p:spPr>
+      </p:pic>
+    </p:spTree>
+    <p:extLst>
+      <p:ext uri="{BB962C8B-B14F-4D97-AF65-F5344CB8AC3E}">
+        <p14:creationId xmlns:p14="http://schemas.microsoft.com/office/powerpoint/2010/main" val="727059619"/>
+      </p:ext>
+    </p:extLst>
+  </p:cSld>
+  <p:clrMapOvr>
+    <a:masterClrMapping/>
+  </p:clrMapOvr>
+  <p:timing>
+    <p:tnLst>
+      <p:par>
+        <p:cTn id="1" dur="indefinite" restart="never" nodeType="tmRoot"/>
+      </p:par>
+    </p:tnLst>
+  </p:timing>
+</p:sld>
+</file>
+
+<file path=ppt/slides/slide11.xml><?xml version="1.0" encoding="utf-8"?>
+<p:sld xmlns:a="http://schemas.openxmlformats.org/drawingml/2006/main" xmlns:r="http://schemas.openxmlformats.org/officeDocument/2006/relationships" xmlns:p="http://schemas.openxmlformats.org/presentationml/2006/main">
+  <p:cSld>
+    <p:spTree>
+      <p:nvGrpSpPr>
+        <p:cNvPr id="1" name=""/>
+        <p:cNvGrpSpPr/>
+        <p:nvPr/>
+      </p:nvGrpSpPr>
+      <p:grpSpPr>
+        <a:xfrm>
+          <a:off x="0" y="0"/>
+          <a:ext cx="0" cy="0"/>
+          <a:chOff x="0" y="0"/>
+          <a:chExt cx="0" cy="0"/>
+        </a:xfrm>
+      </p:grpSpPr>
+      <p:sp>
+        <p:nvSpPr>
+          <p:cNvPr id="2" name="TextBox 1"/>
+          <p:cNvSpPr txBox="1"/>
+          <p:nvPr/>
+        </p:nvSpPr>
+        <p:spPr>
+          <a:xfrm>
+            <a:off x="0" y="1920240"/>
+            <a:ext cx="9144000" cy="523220"/>
+          </a:xfrm>
+          <a:prstGeom prst="rect">
+            <a:avLst/>
+          </a:prstGeom>
+          <a:noFill/>
+        </p:spPr>
+        <p:txBody>
+          <a:bodyPr wrap="square" rtlCol="0">
+            <a:spAutoFit/>
+          </a:bodyPr>
+          <a:lstStyle/>
+          <a:p>
+            <a:pPr algn="ctr"/>
+            <a:r>
+              <a:rPr lang="en-US" sz="2800" b="1" dirty="0" smtClean="0"/>
+              <a:t>Multiple Regression Analysis</a:t>
+            </a:r>
+            <a:endParaRPr lang="en-US" sz="2800" b="1" dirty="0"/>
+          </a:p>
+        </p:txBody>
+      </p:sp>
+    </p:spTree>
+    <p:extLst>
+      <p:ext uri="{BB962C8B-B14F-4D97-AF65-F5344CB8AC3E}">
+        <p14:creationId xmlns:p14="http://schemas.microsoft.com/office/powerpoint/2010/main" val="397209135"/>
+      </p:ext>
+    </p:extLst>
+  </p:cSld>
+  <p:clrMapOvr>
+    <a:masterClrMapping/>
+  </p:clrMapOvr>
+  <p:timing>
+    <p:tnLst>
+      <p:par>
+        <p:cTn id="1" dur="indefinite" restart="never" nodeType="tmRoot"/>
+      </p:par>
+    </p:tnLst>
+  </p:timing>
+</p:sld>
+</file>
+
+<file path=ppt/slides/slide12.xml><?xml version="1.0" encoding="utf-8"?>
 <p:sld xmlns:a="http://schemas.openxmlformats.org/drawingml/2006/main" xmlns:r="http://schemas.openxmlformats.org/officeDocument/2006/relationships" xmlns:p="http://schemas.openxmlformats.org/presentationml/2006/main">
   <p:cSld>
     <p:spTree>
@@ -6172,7 +6437,7 @@
 </p:sld>
 </file>
 
-<file path=ppt/slides/slide11.xml><?xml version="1.0" encoding="utf-8"?>
+<file path=ppt/slides/slide13.xml><?xml version="1.0" encoding="utf-8"?>
 <p:sld xmlns:a="http://schemas.openxmlformats.org/drawingml/2006/main" xmlns:r="http://schemas.openxmlformats.org/officeDocument/2006/relationships" xmlns:p="http://schemas.openxmlformats.org/presentationml/2006/main">
   <p:cSld>
     <p:spTree>
@@ -6604,6 +6869,170 @@
           </p:txBody>
         </p:sp>
       </p:grpSp>
+      <p:pic>
+        <p:nvPicPr>
+          <p:cNvPr id="12" name="Picture 3" descr="C:\Users\townesm\Downloads\clipart886407.png"/>
+          <p:cNvPicPr>
+            <a:picLocks noChangeArrowheads="1"/>
+          </p:cNvPicPr>
+          <p:nvPr/>
+        </p:nvPicPr>
+        <p:blipFill>
+          <a:blip r:embed="rId4" cstate="print">
+            <a:extLst>
+              <a:ext uri="{28A0092B-C50C-407E-A947-70E740481C1C}">
+                <a14:useLocalDpi xmlns:a14="http://schemas.microsoft.com/office/drawing/2010/main" val="0"/>
+              </a:ext>
+            </a:extLst>
+          </a:blip>
+          <a:srcRect/>
+          <a:stretch>
+            <a:fillRect/>
+          </a:stretch>
+        </p:blipFill>
+        <p:spPr bwMode="auto">
+          <a:xfrm>
+            <a:off x="1392072" y="2574297"/>
+            <a:ext cx="548640" cy="274320"/>
+          </a:xfrm>
+          <a:prstGeom prst="rect">
+            <a:avLst/>
+          </a:prstGeom>
+          <a:noFill/>
+          <a:extLst>
+            <a:ext uri="{909E8E84-426E-40DD-AFC4-6F175D3DCCD1}">
+              <a14:hiddenFill xmlns:a14="http://schemas.microsoft.com/office/drawing/2010/main">
+                <a:solidFill>
+                  <a:srgbClr val="FFFFFF"/>
+                </a:solidFill>
+              </a14:hiddenFill>
+            </a:ext>
+          </a:extLst>
+        </p:spPr>
+      </p:pic>
+      <p:pic>
+        <p:nvPicPr>
+          <p:cNvPr id="13" name="Picture 3" descr="C:\Users\townesm\Downloads\clipart886407.png"/>
+          <p:cNvPicPr>
+            <a:picLocks noChangeArrowheads="1"/>
+          </p:cNvPicPr>
+          <p:nvPr/>
+        </p:nvPicPr>
+        <p:blipFill>
+          <a:blip r:embed="rId4" cstate="print">
+            <a:extLst>
+              <a:ext uri="{28A0092B-C50C-407E-A947-70E740481C1C}">
+                <a14:useLocalDpi xmlns:a14="http://schemas.microsoft.com/office/drawing/2010/main" val="0"/>
+              </a:ext>
+            </a:extLst>
+          </a:blip>
+          <a:srcRect/>
+          <a:stretch>
+            <a:fillRect/>
+          </a:stretch>
+        </p:blipFill>
+        <p:spPr bwMode="auto">
+          <a:xfrm>
+            <a:off x="1378424" y="2965862"/>
+            <a:ext cx="548640" cy="274320"/>
+          </a:xfrm>
+          <a:prstGeom prst="rect">
+            <a:avLst/>
+          </a:prstGeom>
+          <a:noFill/>
+          <a:extLst>
+            <a:ext uri="{909E8E84-426E-40DD-AFC4-6F175D3DCCD1}">
+              <a14:hiddenFill xmlns:a14="http://schemas.microsoft.com/office/drawing/2010/main">
+                <a:solidFill>
+                  <a:srgbClr val="FFFFFF"/>
+                </a:solidFill>
+              </a14:hiddenFill>
+            </a:ext>
+          </a:extLst>
+        </p:spPr>
+      </p:pic>
+      <p:pic>
+        <p:nvPicPr>
+          <p:cNvPr id="14" name="Picture 3" descr="C:\Users\townesm\Downloads\clipart886407.png"/>
+          <p:cNvPicPr>
+            <a:picLocks noChangeArrowheads="1"/>
+          </p:cNvPicPr>
+          <p:nvPr/>
+        </p:nvPicPr>
+        <p:blipFill>
+          <a:blip r:embed="rId4" cstate="print">
+            <a:extLst>
+              <a:ext uri="{28A0092B-C50C-407E-A947-70E740481C1C}">
+                <a14:useLocalDpi xmlns:a14="http://schemas.microsoft.com/office/drawing/2010/main" val="0"/>
+              </a:ext>
+            </a:extLst>
+          </a:blip>
+          <a:srcRect/>
+          <a:stretch>
+            <a:fillRect/>
+          </a:stretch>
+        </p:blipFill>
+        <p:spPr bwMode="auto">
+          <a:xfrm>
+            <a:off x="1392072" y="2204664"/>
+            <a:ext cx="548640" cy="274320"/>
+          </a:xfrm>
+          <a:prstGeom prst="rect">
+            <a:avLst/>
+          </a:prstGeom>
+          <a:noFill/>
+          <a:extLst>
+            <a:ext uri="{909E8E84-426E-40DD-AFC4-6F175D3DCCD1}">
+              <a14:hiddenFill xmlns:a14="http://schemas.microsoft.com/office/drawing/2010/main">
+                <a:solidFill>
+                  <a:srgbClr val="FFFFFF"/>
+                </a:solidFill>
+              </a14:hiddenFill>
+            </a:ext>
+          </a:extLst>
+        </p:spPr>
+      </p:pic>
+      <p:pic>
+        <p:nvPicPr>
+          <p:cNvPr id="15" name="Picture 3" descr="C:\Users\townesm\Downloads\clipart886407.png"/>
+          <p:cNvPicPr>
+            <a:picLocks noChangeArrowheads="1"/>
+          </p:cNvPicPr>
+          <p:nvPr/>
+        </p:nvPicPr>
+        <p:blipFill>
+          <a:blip r:embed="rId4" cstate="print">
+            <a:extLst>
+              <a:ext uri="{28A0092B-C50C-407E-A947-70E740481C1C}">
+                <a14:useLocalDpi xmlns:a14="http://schemas.microsoft.com/office/drawing/2010/main" val="0"/>
+              </a:ext>
+            </a:extLst>
+          </a:blip>
+          <a:srcRect/>
+          <a:stretch>
+            <a:fillRect/>
+          </a:stretch>
+        </p:blipFill>
+        <p:spPr bwMode="auto">
+          <a:xfrm>
+            <a:off x="1380696" y="2767641"/>
+            <a:ext cx="548640" cy="274320"/>
+          </a:xfrm>
+          <a:prstGeom prst="rect">
+            <a:avLst/>
+          </a:prstGeom>
+          <a:noFill/>
+          <a:extLst>
+            <a:ext uri="{909E8E84-426E-40DD-AFC4-6F175D3DCCD1}">
+              <a14:hiddenFill xmlns:a14="http://schemas.microsoft.com/office/drawing/2010/main">
+                <a:solidFill>
+                  <a:srgbClr val="FFFFFF"/>
+                </a:solidFill>
+              </a14:hiddenFill>
+            </a:ext>
+          </a:extLst>
+        </p:spPr>
+      </p:pic>
     </p:spTree>
     <p:extLst>
       <p:ext uri="{BB962C8B-B14F-4D97-AF65-F5344CB8AC3E}">
@@ -6624,7 +7053,7 @@
 </p:sld>
 </file>
 
-<file path=ppt/slides/slide12.xml><?xml version="1.0" encoding="utf-8"?>
+<file path=ppt/slides/slide14.xml><?xml version="1.0" encoding="utf-8"?>
 <p:sld xmlns:a="http://schemas.openxmlformats.org/drawingml/2006/main" xmlns:r="http://schemas.openxmlformats.org/officeDocument/2006/relationships" xmlns:p="http://schemas.openxmlformats.org/presentationml/2006/main">
   <p:cSld>
     <p:spTree>
@@ -6692,7 +7121,7 @@
 </p:sld>
 </file>
 
-<file path=ppt/slides/slide13.xml><?xml version="1.0" encoding="utf-8"?>
+<file path=ppt/slides/slide15.xml><?xml version="1.0" encoding="utf-8"?>
 <p:sld xmlns:a="http://schemas.openxmlformats.org/drawingml/2006/main" xmlns:r="http://schemas.openxmlformats.org/officeDocument/2006/relationships" xmlns:p="http://schemas.openxmlformats.org/presentationml/2006/main">
   <p:cSld>
     <p:spTree>
@@ -16980,6 +17409,170 @@
           </a:p>
         </p:txBody>
       </p:sp>
+      <p:pic>
+        <p:nvPicPr>
+          <p:cNvPr id="4" name="Picture 4" descr="C:\Users\townesm\Downloads\kisspng-close-up-font-underline-5b0c091aeb9c10.6365625315275154189651.png"/>
+          <p:cNvPicPr>
+            <a:picLocks noChangeArrowheads="1"/>
+          </p:cNvPicPr>
+          <p:nvPr/>
+        </p:nvPicPr>
+        <p:blipFill>
+          <a:blip r:embed="rId3" cstate="print">
+            <a:extLst>
+              <a:ext uri="{28A0092B-C50C-407E-A947-70E740481C1C}">
+                <a14:useLocalDpi xmlns:a14="http://schemas.microsoft.com/office/drawing/2010/main" val="0"/>
+              </a:ext>
+            </a:extLst>
+          </a:blip>
+          <a:srcRect/>
+          <a:stretch>
+            <a:fillRect/>
+          </a:stretch>
+        </p:blipFill>
+        <p:spPr bwMode="auto">
+          <a:xfrm>
+            <a:off x="620644" y="3299893"/>
+            <a:ext cx="1554480" cy="171097"/>
+          </a:xfrm>
+          <a:prstGeom prst="rect">
+            <a:avLst/>
+          </a:prstGeom>
+          <a:noFill/>
+          <a:extLst>
+            <a:ext uri="{909E8E84-426E-40DD-AFC4-6F175D3DCCD1}">
+              <a14:hiddenFill xmlns:a14="http://schemas.microsoft.com/office/drawing/2010/main">
+                <a:solidFill>
+                  <a:srgbClr val="FFFFFF"/>
+                </a:solidFill>
+              </a14:hiddenFill>
+            </a:ext>
+          </a:extLst>
+        </p:spPr>
+      </p:pic>
+      <p:pic>
+        <p:nvPicPr>
+          <p:cNvPr id="5" name="Picture 4" descr="C:\Users\townesm\Downloads\kisspng-close-up-font-underline-5b0c091aeb9c10.6365625315275154189651.png"/>
+          <p:cNvPicPr>
+            <a:picLocks noChangeArrowheads="1"/>
+          </p:cNvPicPr>
+          <p:nvPr/>
+        </p:nvPicPr>
+        <p:blipFill>
+          <a:blip r:embed="rId3" cstate="print">
+            <a:extLst>
+              <a:ext uri="{28A0092B-C50C-407E-A947-70E740481C1C}">
+                <a14:useLocalDpi xmlns:a14="http://schemas.microsoft.com/office/drawing/2010/main" val="0"/>
+              </a:ext>
+            </a:extLst>
+          </a:blip>
+          <a:srcRect/>
+          <a:stretch>
+            <a:fillRect/>
+          </a:stretch>
+        </p:blipFill>
+        <p:spPr bwMode="auto">
+          <a:xfrm>
+            <a:off x="620644" y="2467380"/>
+            <a:ext cx="1005840" cy="171097"/>
+          </a:xfrm>
+          <a:prstGeom prst="rect">
+            <a:avLst/>
+          </a:prstGeom>
+          <a:noFill/>
+          <a:extLst>
+            <a:ext uri="{909E8E84-426E-40DD-AFC4-6F175D3DCCD1}">
+              <a14:hiddenFill xmlns:a14="http://schemas.microsoft.com/office/drawing/2010/main">
+                <a:solidFill>
+                  <a:srgbClr val="FFFFFF"/>
+                </a:solidFill>
+              </a14:hiddenFill>
+            </a:ext>
+          </a:extLst>
+        </p:spPr>
+      </p:pic>
+      <p:pic>
+        <p:nvPicPr>
+          <p:cNvPr id="6" name="Picture 4" descr="C:\Users\townesm\Downloads\kisspng-close-up-font-underline-5b0c091aeb9c10.6365625315275154189651.png"/>
+          <p:cNvPicPr>
+            <a:picLocks noChangeArrowheads="1"/>
+          </p:cNvPicPr>
+          <p:nvPr/>
+        </p:nvPicPr>
+        <p:blipFill>
+          <a:blip r:embed="rId3" cstate="print">
+            <a:extLst>
+              <a:ext uri="{28A0092B-C50C-407E-A947-70E740481C1C}">
+                <a14:useLocalDpi xmlns:a14="http://schemas.microsoft.com/office/drawing/2010/main" val="0"/>
+              </a:ext>
+            </a:extLst>
+          </a:blip>
+          <a:srcRect/>
+          <a:stretch>
+            <a:fillRect/>
+          </a:stretch>
+        </p:blipFill>
+        <p:spPr bwMode="auto">
+          <a:xfrm>
+            <a:off x="620644" y="1361911"/>
+            <a:ext cx="1097280" cy="171097"/>
+          </a:xfrm>
+          <a:prstGeom prst="rect">
+            <a:avLst/>
+          </a:prstGeom>
+          <a:noFill/>
+          <a:extLst>
+            <a:ext uri="{909E8E84-426E-40DD-AFC4-6F175D3DCCD1}">
+              <a14:hiddenFill xmlns:a14="http://schemas.microsoft.com/office/drawing/2010/main">
+                <a:solidFill>
+                  <a:srgbClr val="FFFFFF"/>
+                </a:solidFill>
+              </a14:hiddenFill>
+            </a:ext>
+          </a:extLst>
+        </p:spPr>
+      </p:pic>
+      <p:pic>
+        <p:nvPicPr>
+          <p:cNvPr id="7" name="Picture 3" descr="C:\Users\townesm\Downloads\clipart886407.png"/>
+          <p:cNvPicPr>
+            <a:picLocks noChangeArrowheads="1"/>
+          </p:cNvPicPr>
+          <p:nvPr/>
+        </p:nvPicPr>
+        <p:blipFill>
+          <a:blip r:embed="rId4" cstate="print">
+            <a:extLst>
+              <a:ext uri="{28A0092B-C50C-407E-A947-70E740481C1C}">
+                <a14:useLocalDpi xmlns:a14="http://schemas.microsoft.com/office/drawing/2010/main" val="0"/>
+              </a:ext>
+            </a:extLst>
+          </a:blip>
+          <a:srcRect/>
+          <a:stretch>
+            <a:fillRect/>
+          </a:stretch>
+        </p:blipFill>
+        <p:spPr bwMode="auto">
+          <a:xfrm>
+            <a:off x="3302758" y="3610383"/>
+            <a:ext cx="640080" cy="365760"/>
+          </a:xfrm>
+          <a:prstGeom prst="rect">
+            <a:avLst/>
+          </a:prstGeom>
+          <a:noFill/>
+          <a:extLst>
+            <a:ext uri="{909E8E84-426E-40DD-AFC4-6F175D3DCCD1}">
+              <a14:hiddenFill xmlns:a14="http://schemas.microsoft.com/office/drawing/2010/main">
+                <a:solidFill>
+                  <a:srgbClr val="FFFFFF"/>
+                </a:solidFill>
+              </a14:hiddenFill>
+            </a:ext>
+          </a:extLst>
+        </p:spPr>
+      </p:pic>
     </p:spTree>
     <p:extLst>
       <p:ext uri="{BB962C8B-B14F-4D97-AF65-F5344CB8AC3E}">
@@ -17000,7 +17593,7 @@
 </p:sld>
 </file>
 
-<file path=ppt/slides/slide14.xml><?xml version="1.0" encoding="utf-8"?>
+<file path=ppt/slides/slide16.xml><?xml version="1.0" encoding="utf-8"?>
 <p:sld xmlns:a="http://schemas.openxmlformats.org/drawingml/2006/main" xmlns:r="http://schemas.openxmlformats.org/officeDocument/2006/relationships" xmlns:p="http://schemas.openxmlformats.org/presentationml/2006/main">
   <p:cSld>
     <p:spTree>
@@ -17068,7 +17661,7 @@
 </p:sld>
 </file>
 
-<file path=ppt/slides/slide15.xml><?xml version="1.0" encoding="utf-8"?>
+<file path=ppt/slides/slide17.xml><?xml version="1.0" encoding="utf-8"?>
 <p:sld xmlns:a="http://schemas.openxmlformats.org/drawingml/2006/main" xmlns:r="http://schemas.openxmlformats.org/officeDocument/2006/relationships" xmlns:p="http://schemas.openxmlformats.org/presentationml/2006/main">
   <p:cSld>
     <p:spTree>
@@ -17228,7 +17821,7 @@
 </p:sld>
 </file>
 
-<file path=ppt/slides/slide16.xml><?xml version="1.0" encoding="utf-8"?>
+<file path=ppt/slides/slide18.xml><?xml version="1.0" encoding="utf-8"?>
 <p:sld xmlns:a="http://schemas.openxmlformats.org/drawingml/2006/main" xmlns:r="http://schemas.openxmlformats.org/officeDocument/2006/relationships" xmlns:p="http://schemas.openxmlformats.org/presentationml/2006/main">
   <p:cSld>
     <p:spTree>
@@ -17379,10 +17972,17 @@
   <p:clrMapOvr>
     <a:masterClrMapping/>
   </p:clrMapOvr>
+  <p:timing>
+    <p:tnLst>
+      <p:par>
+        <p:cTn id="1" dur="indefinite" restart="never" nodeType="tmRoot"/>
+      </p:par>
+    </p:tnLst>
+  </p:timing>
 </p:sld>
 </file>
 
-<file path=ppt/slides/slide17.xml><?xml version="1.0" encoding="utf-8"?>
+<file path=ppt/slides/slide19.xml><?xml version="1.0" encoding="utf-8"?>
 <p:sld xmlns:a="http://schemas.openxmlformats.org/drawingml/2006/main" xmlns:r="http://schemas.openxmlformats.org/officeDocument/2006/relationships" xmlns:p="http://schemas.openxmlformats.org/presentationml/2006/main">
   <p:cSld>
     <p:spTree>
@@ -17485,293 +18085,6 @@
 </p:sld>
 </file>
 
-<file path=ppt/slides/slide18.xml><?xml version="1.0" encoding="utf-8"?>
-<p:sld xmlns:a="http://schemas.openxmlformats.org/drawingml/2006/main" xmlns:r="http://schemas.openxmlformats.org/officeDocument/2006/relationships" xmlns:p="http://schemas.openxmlformats.org/presentationml/2006/main">
-  <p:cSld>
-    <p:spTree>
-      <p:nvGrpSpPr>
-        <p:cNvPr id="1" name=""/>
-        <p:cNvGrpSpPr/>
-        <p:nvPr/>
-      </p:nvGrpSpPr>
-      <p:grpSpPr>
-        <a:xfrm>
-          <a:off x="0" y="0"/>
-          <a:ext cx="0" cy="0"/>
-          <a:chOff x="0" y="0"/>
-          <a:chExt cx="0" cy="0"/>
-        </a:xfrm>
-      </p:grpSpPr>
-      <p:pic>
-        <p:nvPicPr>
-          <p:cNvPr id="2" name="Picture 1"/>
-          <p:cNvPicPr>
-            <a:picLocks noChangeAspect="1"/>
-          </p:cNvPicPr>
-          <p:nvPr/>
-        </p:nvPicPr>
-        <p:blipFill>
-          <a:blip r:embed="rId3">
-            <a:extLst>
-              <a:ext uri="{28A0092B-C50C-407E-A947-70E740481C1C}">
-                <a14:useLocalDpi xmlns:a14="http://schemas.microsoft.com/office/drawing/2010/main" val="0"/>
-              </a:ext>
-            </a:extLst>
-          </a:blip>
-          <a:srcRect/>
-          <a:stretch>
-            <a:fillRect/>
-          </a:stretch>
-        </p:blipFill>
-        <p:spPr bwMode="auto">
-          <a:xfrm>
-            <a:off x="0" y="605802"/>
-            <a:ext cx="4572000" cy="2626460"/>
-          </a:xfrm>
-          <a:prstGeom prst="rect">
-            <a:avLst/>
-          </a:prstGeom>
-          <a:noFill/>
-          <a:ln>
-            <a:noFill/>
-          </a:ln>
-        </p:spPr>
-      </p:pic>
-      <p:pic>
-        <p:nvPicPr>
-          <p:cNvPr id="3" name="Picture 2"/>
-          <p:cNvPicPr>
-            <a:picLocks noChangeAspect="1"/>
-          </p:cNvPicPr>
-          <p:nvPr/>
-        </p:nvPicPr>
-        <p:blipFill>
-          <a:blip r:embed="rId4">
-            <a:extLst>
-              <a:ext uri="{28A0092B-C50C-407E-A947-70E740481C1C}">
-                <a14:useLocalDpi xmlns:a14="http://schemas.microsoft.com/office/drawing/2010/main" val="0"/>
-              </a:ext>
-            </a:extLst>
-          </a:blip>
-          <a:srcRect/>
-          <a:stretch>
-            <a:fillRect/>
-          </a:stretch>
-        </p:blipFill>
-        <p:spPr bwMode="auto">
-          <a:xfrm>
-            <a:off x="4572000" y="634137"/>
-            <a:ext cx="4572000" cy="2598125"/>
-          </a:xfrm>
-          <a:prstGeom prst="rect">
-            <a:avLst/>
-          </a:prstGeom>
-          <a:noFill/>
-          <a:ln>
-            <a:noFill/>
-          </a:ln>
-        </p:spPr>
-      </p:pic>
-      <p:pic>
-        <p:nvPicPr>
-          <p:cNvPr id="4" name="Picture 3"/>
-          <p:cNvPicPr>
-            <a:picLocks noChangeAspect="1"/>
-          </p:cNvPicPr>
-          <p:nvPr/>
-        </p:nvPicPr>
-        <p:blipFill>
-          <a:blip r:embed="rId5"/>
-          <a:stretch>
-            <a:fillRect/>
-          </a:stretch>
-        </p:blipFill>
-        <p:spPr>
-          <a:xfrm>
-            <a:off x="1143000" y="3564254"/>
-            <a:ext cx="6858000" cy="2020035"/>
-          </a:xfrm>
-          <a:prstGeom prst="rect">
-            <a:avLst/>
-          </a:prstGeom>
-        </p:spPr>
-      </p:pic>
-      <p:cxnSp>
-        <p:nvCxnSpPr>
-          <p:cNvPr id="6" name="Straight Connector 5"/>
-          <p:cNvCxnSpPr/>
-          <p:nvPr/>
-        </p:nvCxnSpPr>
-        <p:spPr>
-          <a:xfrm>
-            <a:off x="4537710" y="205740"/>
-            <a:ext cx="0" cy="3086100"/>
-          </a:xfrm>
-          <a:prstGeom prst="line">
-            <a:avLst/>
-          </a:prstGeom>
-          <a:ln w="19050">
-            <a:prstDash val="dash"/>
-          </a:ln>
-        </p:spPr>
-        <p:style>
-          <a:lnRef idx="1">
-            <a:schemeClr val="accent1"/>
-          </a:lnRef>
-          <a:fillRef idx="0">
-            <a:schemeClr val="accent1"/>
-          </a:fillRef>
-          <a:effectRef idx="0">
-            <a:schemeClr val="accent1"/>
-          </a:effectRef>
-          <a:fontRef idx="minor">
-            <a:schemeClr val="tx1"/>
-          </a:fontRef>
-        </p:style>
-      </p:cxnSp>
-      <p:sp>
-        <p:nvSpPr>
-          <p:cNvPr id="7" name="TextBox 6"/>
-          <p:cNvSpPr txBox="1"/>
-          <p:nvPr/>
-        </p:nvSpPr>
-        <p:spPr>
-          <a:xfrm>
-            <a:off x="1377315" y="32516"/>
-            <a:ext cx="1817370" cy="369332"/>
-          </a:xfrm>
-          <a:prstGeom prst="rect">
-            <a:avLst/>
-          </a:prstGeom>
-          <a:noFill/>
-        </p:spPr>
-        <p:txBody>
-          <a:bodyPr wrap="square" rtlCol="0">
-            <a:spAutoFit/>
-          </a:bodyPr>
-          <a:lstStyle/>
-          <a:p>
-            <a:pPr algn="ctr"/>
-            <a:r>
-              <a:rPr lang="en-US" dirty="0" smtClean="0"/>
-              <a:t>Original Model</a:t>
-            </a:r>
-            <a:endParaRPr lang="en-US" dirty="0"/>
-          </a:p>
-        </p:txBody>
-      </p:sp>
-      <p:sp>
-        <p:nvSpPr>
-          <p:cNvPr id="8" name="TextBox 7"/>
-          <p:cNvSpPr txBox="1"/>
-          <p:nvPr/>
-        </p:nvSpPr>
-        <p:spPr>
-          <a:xfrm>
-            <a:off x="5949315" y="32516"/>
-            <a:ext cx="1817370" cy="369332"/>
-          </a:xfrm>
-          <a:prstGeom prst="rect">
-            <a:avLst/>
-          </a:prstGeom>
-          <a:noFill/>
-        </p:spPr>
-        <p:txBody>
-          <a:bodyPr wrap="square" rtlCol="0">
-            <a:spAutoFit/>
-          </a:bodyPr>
-          <a:lstStyle/>
-          <a:p>
-            <a:pPr algn="ctr"/>
-            <a:r>
-              <a:rPr lang="en-US" dirty="0" smtClean="0"/>
-              <a:t>Revised Model</a:t>
-            </a:r>
-            <a:endParaRPr lang="en-US" dirty="0"/>
-          </a:p>
-        </p:txBody>
-      </p:sp>
-    </p:spTree>
-    <p:extLst>
-      <p:ext uri="{BB962C8B-B14F-4D97-AF65-F5344CB8AC3E}">
-        <p14:creationId xmlns:p14="http://schemas.microsoft.com/office/powerpoint/2010/main" val="350246097"/>
-      </p:ext>
-    </p:extLst>
-  </p:cSld>
-  <p:clrMapOvr>
-    <a:masterClrMapping/>
-  </p:clrMapOvr>
-  <p:timing>
-    <p:tnLst>
-      <p:par>
-        <p:cTn id="1" dur="indefinite" restart="never" nodeType="tmRoot"/>
-      </p:par>
-    </p:tnLst>
-  </p:timing>
-</p:sld>
-</file>
-
-<file path=ppt/slides/slide19.xml><?xml version="1.0" encoding="utf-8"?>
-<p:sld xmlns:a="http://schemas.openxmlformats.org/drawingml/2006/main" xmlns:r="http://schemas.openxmlformats.org/officeDocument/2006/relationships" xmlns:p="http://schemas.openxmlformats.org/presentationml/2006/main">
-  <p:cSld>
-    <p:spTree>
-      <p:nvGrpSpPr>
-        <p:cNvPr id="1" name=""/>
-        <p:cNvGrpSpPr/>
-        <p:nvPr/>
-      </p:nvGrpSpPr>
-      <p:grpSpPr>
-        <a:xfrm>
-          <a:off x="0" y="0"/>
-          <a:ext cx="0" cy="0"/>
-          <a:chOff x="0" y="0"/>
-          <a:chExt cx="0" cy="0"/>
-        </a:xfrm>
-      </p:grpSpPr>
-      <p:sp>
-        <p:nvSpPr>
-          <p:cNvPr id="2" name="TextBox 1"/>
-          <p:cNvSpPr txBox="1"/>
-          <p:nvPr/>
-        </p:nvSpPr>
-        <p:spPr>
-          <a:xfrm>
-            <a:off x="0" y="1920240"/>
-            <a:ext cx="9144000" cy="523220"/>
-          </a:xfrm>
-          <a:prstGeom prst="rect">
-            <a:avLst/>
-          </a:prstGeom>
-          <a:noFill/>
-        </p:spPr>
-        <p:txBody>
-          <a:bodyPr wrap="square" rtlCol="0">
-            <a:spAutoFit/>
-          </a:bodyPr>
-          <a:lstStyle/>
-          <a:p>
-            <a:pPr algn="ctr"/>
-            <a:r>
-              <a:rPr lang="en-US" sz="2800" b="1" dirty="0" smtClean="0"/>
-              <a:t>Binary Logistic Regression</a:t>
-            </a:r>
-            <a:endParaRPr lang="en-US" sz="2800" b="1" dirty="0"/>
-          </a:p>
-        </p:txBody>
-      </p:sp>
-    </p:spTree>
-    <p:extLst>
-      <p:ext uri="{BB962C8B-B14F-4D97-AF65-F5344CB8AC3E}">
-        <p14:creationId xmlns:p14="http://schemas.microsoft.com/office/powerpoint/2010/main" val="3648361403"/>
-      </p:ext>
-    </p:extLst>
-  </p:cSld>
-  <p:clrMapOvr>
-    <a:masterClrMapping/>
-  </p:clrMapOvr>
-</p:sld>
-</file>
-
 <file path=ppt/slides/slide2.xml><?xml version="1.0" encoding="utf-8"?>
 <p:sld xmlns:a="http://schemas.openxmlformats.org/drawingml/2006/main" xmlns:r="http://schemas.openxmlformats.org/officeDocument/2006/relationships" xmlns:p="http://schemas.openxmlformats.org/presentationml/2006/main">
   <p:cSld>
@@ -17798,7 +18111,7 @@
         <p:spPr>
           <a:xfrm>
             <a:off x="4513501" y="58653"/>
-            <a:ext cx="4572000" cy="1477328"/>
+            <a:ext cx="4572000" cy="1200329"/>
           </a:xfrm>
           <a:prstGeom prst="rect">
             <a:avLst/>
@@ -17825,7 +18138,15 @@
             </a:r>
             <a:r>
               <a:rPr lang="en-US" dirty="0" smtClean="0"/>
-              <a:t>entity of a capability or ability to perform a useful task or replicate a beneficial accomplishment.</a:t>
+              <a:t>entity of a capability </a:t>
+            </a:r>
+            <a:r>
+              <a:rPr lang="en-US" dirty="0" smtClean="0"/>
+              <a:t>to </a:t>
+            </a:r>
+            <a:r>
+              <a:rPr lang="en-US" dirty="0" smtClean="0"/>
+              <a:t>perform a useful task or replicate a beneficial accomplishment.</a:t>
             </a:r>
             <a:endParaRPr lang="en-US" dirty="0"/>
           </a:p>
@@ -18374,7 +18695,15 @@
           <a:p>
             <a:r>
               <a:rPr lang="en-US" sz="2400" dirty="0" smtClean="0"/>
-              <a:t>…prior to 1980, only 5 percent of government owned patents had ever been used by industry.</a:t>
+              <a:t>…prior to 1980, only 5 percent of </a:t>
+            </a:r>
+            <a:r>
+              <a:rPr lang="en-US" sz="2400" dirty="0" smtClean="0"/>
+              <a:t>government-owned </a:t>
+            </a:r>
+            <a:r>
+              <a:rPr lang="en-US" sz="2400" dirty="0" smtClean="0"/>
+              <a:t>patents had ever been used by industry.</a:t>
             </a:r>
             <a:endParaRPr lang="en-US" sz="2400" dirty="0"/>
           </a:p>
@@ -18522,6 +18851,300 @@
 </file>
 
 <file path=ppt/slides/slide20.xml><?xml version="1.0" encoding="utf-8"?>
+<p:sld xmlns:a="http://schemas.openxmlformats.org/drawingml/2006/main" xmlns:r="http://schemas.openxmlformats.org/officeDocument/2006/relationships" xmlns:p="http://schemas.openxmlformats.org/presentationml/2006/main">
+  <p:cSld>
+    <p:spTree>
+      <p:nvGrpSpPr>
+        <p:cNvPr id="1" name=""/>
+        <p:cNvGrpSpPr/>
+        <p:nvPr/>
+      </p:nvGrpSpPr>
+      <p:grpSpPr>
+        <a:xfrm>
+          <a:off x="0" y="0"/>
+          <a:ext cx="0" cy="0"/>
+          <a:chOff x="0" y="0"/>
+          <a:chExt cx="0" cy="0"/>
+        </a:xfrm>
+      </p:grpSpPr>
+      <p:pic>
+        <p:nvPicPr>
+          <p:cNvPr id="2" name="Picture 1"/>
+          <p:cNvPicPr>
+            <a:picLocks noChangeAspect="1"/>
+          </p:cNvPicPr>
+          <p:nvPr/>
+        </p:nvPicPr>
+        <p:blipFill>
+          <a:blip r:embed="rId3">
+            <a:extLst>
+              <a:ext uri="{28A0092B-C50C-407E-A947-70E740481C1C}">
+                <a14:useLocalDpi xmlns:a14="http://schemas.microsoft.com/office/drawing/2010/main" val="0"/>
+              </a:ext>
+            </a:extLst>
+          </a:blip>
+          <a:srcRect/>
+          <a:stretch>
+            <a:fillRect/>
+          </a:stretch>
+        </p:blipFill>
+        <p:spPr bwMode="auto">
+          <a:xfrm>
+            <a:off x="0" y="605802"/>
+            <a:ext cx="4572000" cy="2626460"/>
+          </a:xfrm>
+          <a:prstGeom prst="rect">
+            <a:avLst/>
+          </a:prstGeom>
+          <a:noFill/>
+          <a:ln>
+            <a:noFill/>
+          </a:ln>
+        </p:spPr>
+      </p:pic>
+      <p:pic>
+        <p:nvPicPr>
+          <p:cNvPr id="3" name="Picture 2"/>
+          <p:cNvPicPr>
+            <a:picLocks noChangeAspect="1"/>
+          </p:cNvPicPr>
+          <p:nvPr/>
+        </p:nvPicPr>
+        <p:blipFill>
+          <a:blip r:embed="rId4">
+            <a:extLst>
+              <a:ext uri="{28A0092B-C50C-407E-A947-70E740481C1C}">
+                <a14:useLocalDpi xmlns:a14="http://schemas.microsoft.com/office/drawing/2010/main" val="0"/>
+              </a:ext>
+            </a:extLst>
+          </a:blip>
+          <a:srcRect/>
+          <a:stretch>
+            <a:fillRect/>
+          </a:stretch>
+        </p:blipFill>
+        <p:spPr bwMode="auto">
+          <a:xfrm>
+            <a:off x="4572000" y="634137"/>
+            <a:ext cx="4572000" cy="2598125"/>
+          </a:xfrm>
+          <a:prstGeom prst="rect">
+            <a:avLst/>
+          </a:prstGeom>
+          <a:noFill/>
+          <a:ln>
+            <a:noFill/>
+          </a:ln>
+        </p:spPr>
+      </p:pic>
+      <p:pic>
+        <p:nvPicPr>
+          <p:cNvPr id="4" name="Picture 3"/>
+          <p:cNvPicPr>
+            <a:picLocks noChangeAspect="1"/>
+          </p:cNvPicPr>
+          <p:nvPr/>
+        </p:nvPicPr>
+        <p:blipFill>
+          <a:blip r:embed="rId5"/>
+          <a:stretch>
+            <a:fillRect/>
+          </a:stretch>
+        </p:blipFill>
+        <p:spPr>
+          <a:xfrm>
+            <a:off x="1143000" y="3564254"/>
+            <a:ext cx="6858000" cy="2020035"/>
+          </a:xfrm>
+          <a:prstGeom prst="rect">
+            <a:avLst/>
+          </a:prstGeom>
+        </p:spPr>
+      </p:pic>
+      <p:cxnSp>
+        <p:nvCxnSpPr>
+          <p:cNvPr id="6" name="Straight Connector 5"/>
+          <p:cNvCxnSpPr/>
+          <p:nvPr/>
+        </p:nvCxnSpPr>
+        <p:spPr>
+          <a:xfrm>
+            <a:off x="4537710" y="205740"/>
+            <a:ext cx="0" cy="3086100"/>
+          </a:xfrm>
+          <a:prstGeom prst="line">
+            <a:avLst/>
+          </a:prstGeom>
+          <a:ln w="19050">
+            <a:prstDash val="dash"/>
+          </a:ln>
+        </p:spPr>
+        <p:style>
+          <a:lnRef idx="1">
+            <a:schemeClr val="accent1"/>
+          </a:lnRef>
+          <a:fillRef idx="0">
+            <a:schemeClr val="accent1"/>
+          </a:fillRef>
+          <a:effectRef idx="0">
+            <a:schemeClr val="accent1"/>
+          </a:effectRef>
+          <a:fontRef idx="minor">
+            <a:schemeClr val="tx1"/>
+          </a:fontRef>
+        </p:style>
+      </p:cxnSp>
+      <p:sp>
+        <p:nvSpPr>
+          <p:cNvPr id="7" name="TextBox 6"/>
+          <p:cNvSpPr txBox="1"/>
+          <p:nvPr/>
+        </p:nvSpPr>
+        <p:spPr>
+          <a:xfrm>
+            <a:off x="1377315" y="32516"/>
+            <a:ext cx="1817370" cy="369332"/>
+          </a:xfrm>
+          <a:prstGeom prst="rect">
+            <a:avLst/>
+          </a:prstGeom>
+          <a:noFill/>
+        </p:spPr>
+        <p:txBody>
+          <a:bodyPr wrap="square" rtlCol="0">
+            <a:spAutoFit/>
+          </a:bodyPr>
+          <a:lstStyle/>
+          <a:p>
+            <a:pPr algn="ctr"/>
+            <a:r>
+              <a:rPr lang="en-US" dirty="0" smtClean="0"/>
+              <a:t>Original Model</a:t>
+            </a:r>
+            <a:endParaRPr lang="en-US" dirty="0"/>
+          </a:p>
+        </p:txBody>
+      </p:sp>
+      <p:sp>
+        <p:nvSpPr>
+          <p:cNvPr id="8" name="TextBox 7"/>
+          <p:cNvSpPr txBox="1"/>
+          <p:nvPr/>
+        </p:nvSpPr>
+        <p:spPr>
+          <a:xfrm>
+            <a:off x="5949315" y="32516"/>
+            <a:ext cx="1817370" cy="369332"/>
+          </a:xfrm>
+          <a:prstGeom prst="rect">
+            <a:avLst/>
+          </a:prstGeom>
+          <a:noFill/>
+        </p:spPr>
+        <p:txBody>
+          <a:bodyPr wrap="square" rtlCol="0">
+            <a:spAutoFit/>
+          </a:bodyPr>
+          <a:lstStyle/>
+          <a:p>
+            <a:pPr algn="ctr"/>
+            <a:r>
+              <a:rPr lang="en-US" dirty="0" smtClean="0"/>
+              <a:t>Revised Model</a:t>
+            </a:r>
+            <a:endParaRPr lang="en-US" dirty="0"/>
+          </a:p>
+        </p:txBody>
+      </p:sp>
+    </p:spTree>
+    <p:extLst>
+      <p:ext uri="{BB962C8B-B14F-4D97-AF65-F5344CB8AC3E}">
+        <p14:creationId xmlns:p14="http://schemas.microsoft.com/office/powerpoint/2010/main" val="350246097"/>
+      </p:ext>
+    </p:extLst>
+  </p:cSld>
+  <p:clrMapOvr>
+    <a:masterClrMapping/>
+  </p:clrMapOvr>
+  <p:timing>
+    <p:tnLst>
+      <p:par>
+        <p:cTn id="1" dur="indefinite" restart="never" nodeType="tmRoot"/>
+      </p:par>
+    </p:tnLst>
+  </p:timing>
+</p:sld>
+</file>
+
+<file path=ppt/slides/slide21.xml><?xml version="1.0" encoding="utf-8"?>
+<p:sld xmlns:a="http://schemas.openxmlformats.org/drawingml/2006/main" xmlns:r="http://schemas.openxmlformats.org/officeDocument/2006/relationships" xmlns:p="http://schemas.openxmlformats.org/presentationml/2006/main">
+  <p:cSld>
+    <p:spTree>
+      <p:nvGrpSpPr>
+        <p:cNvPr id="1" name=""/>
+        <p:cNvGrpSpPr/>
+        <p:nvPr/>
+      </p:nvGrpSpPr>
+      <p:grpSpPr>
+        <a:xfrm>
+          <a:off x="0" y="0"/>
+          <a:ext cx="0" cy="0"/>
+          <a:chOff x="0" y="0"/>
+          <a:chExt cx="0" cy="0"/>
+        </a:xfrm>
+      </p:grpSpPr>
+      <p:sp>
+        <p:nvSpPr>
+          <p:cNvPr id="2" name="TextBox 1"/>
+          <p:cNvSpPr txBox="1"/>
+          <p:nvPr/>
+        </p:nvSpPr>
+        <p:spPr>
+          <a:xfrm>
+            <a:off x="0" y="1920240"/>
+            <a:ext cx="9144000" cy="523220"/>
+          </a:xfrm>
+          <a:prstGeom prst="rect">
+            <a:avLst/>
+          </a:prstGeom>
+          <a:noFill/>
+        </p:spPr>
+        <p:txBody>
+          <a:bodyPr wrap="square" rtlCol="0">
+            <a:spAutoFit/>
+          </a:bodyPr>
+          <a:lstStyle/>
+          <a:p>
+            <a:pPr algn="ctr"/>
+            <a:r>
+              <a:rPr lang="en-US" sz="2800" b="1" dirty="0" smtClean="0"/>
+              <a:t>Binary Logistic Regression</a:t>
+            </a:r>
+            <a:endParaRPr lang="en-US" sz="2800" b="1" dirty="0"/>
+          </a:p>
+        </p:txBody>
+      </p:sp>
+    </p:spTree>
+    <p:extLst>
+      <p:ext uri="{BB962C8B-B14F-4D97-AF65-F5344CB8AC3E}">
+        <p14:creationId xmlns:p14="http://schemas.microsoft.com/office/powerpoint/2010/main" val="3648361403"/>
+      </p:ext>
+    </p:extLst>
+  </p:cSld>
+  <p:clrMapOvr>
+    <a:masterClrMapping/>
+  </p:clrMapOvr>
+  <p:timing>
+    <p:tnLst>
+      <p:par>
+        <p:cTn id="1" dur="indefinite" restart="never" nodeType="tmRoot"/>
+      </p:par>
+    </p:tnLst>
+  </p:timing>
+</p:sld>
+</file>
+
+<file path=ppt/slides/slide22.xml><?xml version="1.0" encoding="utf-8"?>
 <p:sld xmlns:a="http://schemas.openxmlformats.org/drawingml/2006/main" xmlns:r="http://schemas.openxmlformats.org/officeDocument/2006/relationships" xmlns:p="http://schemas.openxmlformats.org/presentationml/2006/main">
   <p:cSld>
     <p:spTree>
@@ -19002,6 +19625,139 @@
           </a:extLst>
         </p:spPr>
       </p:pic>
+      <p:sp>
+        <p:nvSpPr>
+          <p:cNvPr id="10" name="TextBox 9"/>
+          <p:cNvSpPr txBox="1"/>
+          <p:nvPr/>
+        </p:nvSpPr>
+        <p:spPr>
+          <a:xfrm>
+            <a:off x="-40944" y="4774709"/>
+            <a:ext cx="2399048" cy="600164"/>
+          </a:xfrm>
+          <a:prstGeom prst="rect">
+            <a:avLst/>
+          </a:prstGeom>
+          <a:noFill/>
+        </p:spPr>
+        <p:txBody>
+          <a:bodyPr wrap="square" rtlCol="0">
+            <a:spAutoFit/>
+          </a:bodyPr>
+          <a:lstStyle/>
+          <a:p>
+            <a:r>
+              <a:rPr lang="en-US" sz="1100" dirty="0" smtClean="0">
+                <a:solidFill>
+                  <a:schemeClr val="bg1"/>
+                </a:solidFill>
+                <a:latin typeface="Arial" panose="020B0604020202020204" pitchFamily="34" charset="0"/>
+                <a:cs typeface="Arial" panose="020B0604020202020204" pitchFamily="34" charset="0"/>
+              </a:rPr>
+              <a:t>Dependent </a:t>
+            </a:r>
+            <a:r>
+              <a:rPr lang="en-US" sz="1100" dirty="0" smtClean="0">
+                <a:solidFill>
+                  <a:schemeClr val="bg1"/>
+                </a:solidFill>
+                <a:latin typeface="Arial" panose="020B0604020202020204" pitchFamily="34" charset="0"/>
+                <a:cs typeface="Arial" panose="020B0604020202020204" pitchFamily="34" charset="0"/>
+              </a:rPr>
+              <a:t>variable: CRECBINARY </a:t>
+            </a:r>
+          </a:p>
+          <a:p>
+            <a:r>
+              <a:rPr lang="en-US" sz="1100" dirty="0" smtClean="0">
+                <a:solidFill>
+                  <a:schemeClr val="bg1"/>
+                </a:solidFill>
+                <a:latin typeface="Arial" panose="020B0604020202020204" pitchFamily="34" charset="0"/>
+                <a:cs typeface="Arial" panose="020B0604020202020204" pitchFamily="34" charset="0"/>
+              </a:rPr>
+              <a:t>1 </a:t>
+            </a:r>
+            <a:r>
+              <a:rPr lang="en-US" sz="1100" dirty="0" smtClean="0">
+                <a:solidFill>
+                  <a:schemeClr val="bg1"/>
+                </a:solidFill>
+                <a:latin typeface="Arial" panose="020B0604020202020204" pitchFamily="34" charset="0"/>
+                <a:cs typeface="Arial" panose="020B0604020202020204" pitchFamily="34" charset="0"/>
+              </a:rPr>
+              <a:t>= </a:t>
+            </a:r>
+            <a:r>
+              <a:rPr lang="en-US" sz="1100" dirty="0" smtClean="0">
+                <a:solidFill>
+                  <a:schemeClr val="bg1"/>
+                </a:solidFill>
+                <a:latin typeface="Arial" panose="020B0604020202020204" pitchFamily="34" charset="0"/>
+                <a:cs typeface="Arial" panose="020B0604020202020204" pitchFamily="34" charset="0"/>
+              </a:rPr>
+              <a:t>2 </a:t>
+            </a:r>
+            <a:r>
+              <a:rPr lang="en-US" sz="1100" dirty="0" smtClean="0">
+                <a:solidFill>
+                  <a:schemeClr val="bg1"/>
+                </a:solidFill>
+                <a:latin typeface="Arial" panose="020B0604020202020204" pitchFamily="34" charset="0"/>
+                <a:cs typeface="Arial" panose="020B0604020202020204" pitchFamily="34" charset="0"/>
+              </a:rPr>
+              <a:t>or fewer citations</a:t>
+            </a:r>
+            <a:endParaRPr lang="en-US" sz="1100" dirty="0">
+              <a:solidFill>
+                <a:schemeClr val="bg1"/>
+              </a:solidFill>
+              <a:latin typeface="Arial" panose="020B0604020202020204" pitchFamily="34" charset="0"/>
+              <a:cs typeface="Arial" panose="020B0604020202020204" pitchFamily="34" charset="0"/>
+            </a:endParaRPr>
+          </a:p>
+          <a:p>
+            <a:r>
+              <a:rPr lang="en-US" sz="1100" dirty="0" smtClean="0">
+                <a:solidFill>
+                  <a:schemeClr val="bg1"/>
+                </a:solidFill>
+                <a:latin typeface="Arial" panose="020B0604020202020204" pitchFamily="34" charset="0"/>
+                <a:cs typeface="Arial" panose="020B0604020202020204" pitchFamily="34" charset="0"/>
+              </a:rPr>
+              <a:t>2 </a:t>
+            </a:r>
+            <a:r>
+              <a:rPr lang="en-US" sz="1100" dirty="0" smtClean="0">
+                <a:solidFill>
+                  <a:schemeClr val="bg1"/>
+                </a:solidFill>
+                <a:latin typeface="Arial" panose="020B0604020202020204" pitchFamily="34" charset="0"/>
+                <a:cs typeface="Arial" panose="020B0604020202020204" pitchFamily="34" charset="0"/>
+              </a:rPr>
+              <a:t>= </a:t>
+            </a:r>
+            <a:r>
+              <a:rPr lang="en-US" sz="1100" dirty="0" smtClean="0">
+                <a:solidFill>
+                  <a:schemeClr val="bg1"/>
+                </a:solidFill>
+                <a:latin typeface="Arial" panose="020B0604020202020204" pitchFamily="34" charset="0"/>
+                <a:cs typeface="Arial" panose="020B0604020202020204" pitchFamily="34" charset="0"/>
+              </a:rPr>
+              <a:t>3 or more citations</a:t>
+            </a:r>
+            <a:endParaRPr lang="en-US" sz="1100" dirty="0" smtClean="0">
+              <a:solidFill>
+                <a:schemeClr val="bg1"/>
+              </a:solidFill>
+              <a:latin typeface="Arial" panose="020B0604020202020204" pitchFamily="34" charset="0"/>
+              <a:cs typeface="Arial" panose="020B0604020202020204" pitchFamily="34" charset="0"/>
+            </a:endParaRPr>
+          </a:p>
+        </p:txBody>
+      </p:sp>
     </p:spTree>
     <p:extLst>
       <p:ext uri="{BB962C8B-B14F-4D97-AF65-F5344CB8AC3E}">
@@ -19012,10 +19768,17 @@
   <p:clrMapOvr>
     <a:masterClrMapping/>
   </p:clrMapOvr>
+  <p:timing>
+    <p:tnLst>
+      <p:par>
+        <p:cTn id="1" dur="indefinite" restart="never" nodeType="tmRoot"/>
+      </p:par>
+    </p:tnLst>
+  </p:timing>
 </p:sld>
 </file>
 
-<file path=ppt/slides/slide21.xml><?xml version="1.0" encoding="utf-8"?>
+<file path=ppt/slides/slide23.xml><?xml version="1.0" encoding="utf-8"?>
 <p:sld xmlns:a="http://schemas.openxmlformats.org/drawingml/2006/main" xmlns:r="http://schemas.openxmlformats.org/officeDocument/2006/relationships" xmlns:p="http://schemas.openxmlformats.org/presentationml/2006/main">
   <p:cSld>
     <p:spTree>
@@ -19032,6 +19795,183 @@
           <a:chExt cx="0" cy="0"/>
         </a:xfrm>
       </p:grpSpPr>
+      <p:grpSp>
+        <p:nvGrpSpPr>
+          <p:cNvPr id="4" name="Group 3"/>
+          <p:cNvGrpSpPr/>
+          <p:nvPr/>
+        </p:nvGrpSpPr>
+        <p:grpSpPr>
+          <a:xfrm>
+            <a:off x="685800" y="376360"/>
+            <a:ext cx="7772400" cy="2612992"/>
+            <a:chOff x="685800" y="376360"/>
+            <a:chExt cx="7772400" cy="2612992"/>
+          </a:xfrm>
+        </p:grpSpPr>
+        <p:pic>
+          <p:nvPicPr>
+            <p:cNvPr id="11266" name="Picture 2"/>
+            <p:cNvPicPr>
+              <a:picLocks noChangeAspect="1" noChangeArrowheads="1"/>
+            </p:cNvPicPr>
+            <p:nvPr/>
+          </p:nvPicPr>
+          <p:blipFill>
+            <a:blip r:embed="rId3">
+              <a:extLst>
+                <a:ext uri="{28A0092B-C50C-407E-A947-70E740481C1C}">
+                  <a14:useLocalDpi xmlns:a14="http://schemas.microsoft.com/office/drawing/2010/main" val="0"/>
+                </a:ext>
+              </a:extLst>
+            </a:blip>
+            <a:srcRect/>
+            <a:stretch>
+              <a:fillRect/>
+            </a:stretch>
+          </p:blipFill>
+          <p:spPr bwMode="auto">
+            <a:xfrm>
+              <a:off x="685800" y="376360"/>
+              <a:ext cx="7772400" cy="2401961"/>
+            </a:xfrm>
+            <a:prstGeom prst="rect">
+              <a:avLst/>
+            </a:prstGeom>
+            <a:noFill/>
+            <a:ln>
+              <a:noFill/>
+            </a:ln>
+            <a:effectLst/>
+            <a:extLst>
+              <a:ext uri="{909E8E84-426E-40DD-AFC4-6F175D3DCCD1}">
+                <a14:hiddenFill xmlns:a14="http://schemas.microsoft.com/office/drawing/2010/main">
+                  <a:solidFill>
+                    <a:schemeClr val="accent1"/>
+                  </a:solidFill>
+                </a14:hiddenFill>
+              </a:ext>
+              <a:ext uri="{91240B29-F687-4F45-9708-019B960494DF}">
+                <a14:hiddenLine xmlns:a14="http://schemas.microsoft.com/office/drawing/2010/main" w="9525">
+                  <a:solidFill>
+                    <a:schemeClr val="tx1"/>
+                  </a:solidFill>
+                  <a:miter lim="800000"/>
+                  <a:headEnd/>
+                  <a:tailEnd/>
+                </a14:hiddenLine>
+              </a:ext>
+              <a:ext uri="{AF507438-7753-43E0-B8FC-AC1667EBCBE1}">
+                <a14:hiddenEffects xmlns:a14="http://schemas.microsoft.com/office/drawing/2010/main">
+                  <a:effectLst>
+                    <a:outerShdw dist="35921" dir="2700000" algn="ctr" rotWithShape="0">
+                      <a:schemeClr val="bg2"/>
+                    </a:outerShdw>
+                  </a:effectLst>
+                </a14:hiddenEffects>
+              </a:ext>
+            </a:extLst>
+          </p:spPr>
+        </p:pic>
+        <p:sp>
+          <p:nvSpPr>
+            <p:cNvPr id="3" name="TextBox 2"/>
+            <p:cNvSpPr txBox="1"/>
+            <p:nvPr/>
+          </p:nvSpPr>
+          <p:spPr>
+            <a:xfrm>
+              <a:off x="1062990" y="2727742"/>
+              <a:ext cx="7315200" cy="261610"/>
+            </a:xfrm>
+            <a:prstGeom prst="rect">
+              <a:avLst/>
+            </a:prstGeom>
+            <a:noFill/>
+          </p:spPr>
+          <p:txBody>
+            <a:bodyPr wrap="square" rtlCol="0">
+              <a:spAutoFit/>
+            </a:bodyPr>
+            <a:lstStyle/>
+            <a:p>
+              <a:r>
+                <a:rPr lang="en-US" sz="1100" dirty="0" smtClean="0">
+                  <a:latin typeface="Arial" panose="020B0604020202020204" pitchFamily="34" charset="0"/>
+                  <a:cs typeface="Arial" panose="020B0604020202020204" pitchFamily="34" charset="0"/>
+                </a:rPr>
+                <a:t>Dependent variable: CRECBINARY (1 = </a:t>
+              </a:r>
+              <a:r>
+                <a:rPr lang="en-US" sz="1100" dirty="0" smtClean="0">
+                  <a:latin typeface="Arial" panose="020B0604020202020204" pitchFamily="34" charset="0"/>
+                  <a:cs typeface="Arial" panose="020B0604020202020204" pitchFamily="34" charset="0"/>
+                </a:rPr>
+                <a:t>2 or fewer citations; </a:t>
+              </a:r>
+              <a:r>
+                <a:rPr lang="en-US" sz="1100" dirty="0" smtClean="0">
+                  <a:latin typeface="Arial" panose="020B0604020202020204" pitchFamily="34" charset="0"/>
+                  <a:cs typeface="Arial" panose="020B0604020202020204" pitchFamily="34" charset="0"/>
+                </a:rPr>
+                <a:t>2 = </a:t>
+              </a:r>
+              <a:r>
+                <a:rPr lang="en-US" sz="1100" dirty="0" smtClean="0">
+                  <a:latin typeface="Arial" panose="020B0604020202020204" pitchFamily="34" charset="0"/>
+                  <a:cs typeface="Arial" panose="020B0604020202020204" pitchFamily="34" charset="0"/>
+                </a:rPr>
+                <a:t>3 or more citations)</a:t>
+              </a:r>
+              <a:endParaRPr lang="en-US" sz="1100" dirty="0" smtClean="0">
+                <a:latin typeface="Arial" panose="020B0604020202020204" pitchFamily="34" charset="0"/>
+                <a:cs typeface="Arial" panose="020B0604020202020204" pitchFamily="34" charset="0"/>
+              </a:endParaRPr>
+            </a:p>
+          </p:txBody>
+        </p:sp>
+        <p:pic>
+          <p:nvPicPr>
+            <p:cNvPr id="8" name="Picture 3" descr="C:\Users\townesm\Downloads\clipart886407.png"/>
+            <p:cNvPicPr>
+              <a:picLocks noChangeArrowheads="1"/>
+            </p:cNvPicPr>
+            <p:nvPr/>
+          </p:nvPicPr>
+          <p:blipFill>
+            <a:blip r:embed="rId4" cstate="print">
+              <a:extLst>
+                <a:ext uri="{28A0092B-C50C-407E-A947-70E740481C1C}">
+                  <a14:useLocalDpi xmlns:a14="http://schemas.microsoft.com/office/drawing/2010/main" val="0"/>
+                </a:ext>
+              </a:extLst>
+            </a:blip>
+            <a:srcRect/>
+            <a:stretch>
+              <a:fillRect/>
+            </a:stretch>
+          </p:blipFill>
+          <p:spPr bwMode="auto">
+            <a:xfrm>
+              <a:off x="6042374" y="1689422"/>
+              <a:ext cx="914400" cy="365760"/>
+            </a:xfrm>
+            <a:prstGeom prst="rect">
+              <a:avLst/>
+            </a:prstGeom>
+            <a:noFill/>
+            <a:extLst>
+              <a:ext uri="{909E8E84-426E-40DD-AFC4-6F175D3DCCD1}">
+                <a14:hiddenFill xmlns:a14="http://schemas.microsoft.com/office/drawing/2010/main">
+                  <a:solidFill>
+                    <a:srgbClr val="FFFFFF"/>
+                  </a:solidFill>
+                </a14:hiddenFill>
+              </a:ext>
+            </a:extLst>
+          </p:spPr>
+        </p:pic>
+      </p:grpSp>
       <mc:AlternateContent xmlns:mc="http://schemas.openxmlformats.org/markup-compatibility/2006" xmlns:a14="http://schemas.microsoft.com/office/drawing/2010/main">
         <mc:Choice Requires="a14">
           <p:sp>
@@ -19472,7 +20412,7 @@
                 <a:avLst/>
               </a:prstGeom>
               <a:blipFill rotWithShape="1">
-                <a:blip r:embed="rId3"/>
+                <a:blip r:embed="rId5"/>
                 <a:stretch>
                   <a:fillRect b="-5618"/>
                 </a:stretch>
@@ -19493,117 +20433,6 @@
           </p:sp>
         </mc:Fallback>
       </mc:AlternateContent>
-      <p:grpSp>
-        <p:nvGrpSpPr>
-          <p:cNvPr id="5" name="Group 4"/>
-          <p:cNvGrpSpPr/>
-          <p:nvPr/>
-        </p:nvGrpSpPr>
-        <p:grpSpPr>
-          <a:xfrm>
-            <a:off x="685800" y="376360"/>
-            <a:ext cx="7772400" cy="2612992"/>
-            <a:chOff x="685800" y="376360"/>
-            <a:chExt cx="7772400" cy="2612992"/>
-          </a:xfrm>
-        </p:grpSpPr>
-        <p:pic>
-          <p:nvPicPr>
-            <p:cNvPr id="11266" name="Picture 2"/>
-            <p:cNvPicPr>
-              <a:picLocks noChangeAspect="1" noChangeArrowheads="1"/>
-            </p:cNvPicPr>
-            <p:nvPr/>
-          </p:nvPicPr>
-          <p:blipFill>
-            <a:blip r:embed="rId4">
-              <a:extLst>
-                <a:ext uri="{28A0092B-C50C-407E-A947-70E740481C1C}">
-                  <a14:useLocalDpi xmlns:a14="http://schemas.microsoft.com/office/drawing/2010/main" val="0"/>
-                </a:ext>
-              </a:extLst>
-            </a:blip>
-            <a:srcRect/>
-            <a:stretch>
-              <a:fillRect/>
-            </a:stretch>
-          </p:blipFill>
-          <p:spPr bwMode="auto">
-            <a:xfrm>
-              <a:off x="685800" y="376360"/>
-              <a:ext cx="7772400" cy="2401961"/>
-            </a:xfrm>
-            <a:prstGeom prst="rect">
-              <a:avLst/>
-            </a:prstGeom>
-            <a:noFill/>
-            <a:ln>
-              <a:noFill/>
-            </a:ln>
-            <a:effectLst/>
-            <a:extLst>
-              <a:ext uri="{909E8E84-426E-40DD-AFC4-6F175D3DCCD1}">
-                <a14:hiddenFill xmlns:a14="http://schemas.microsoft.com/office/drawing/2010/main">
-                  <a:solidFill>
-                    <a:schemeClr val="accent1"/>
-                  </a:solidFill>
-                </a14:hiddenFill>
-              </a:ext>
-              <a:ext uri="{91240B29-F687-4F45-9708-019B960494DF}">
-                <a14:hiddenLine xmlns:a14="http://schemas.microsoft.com/office/drawing/2010/main" w="9525">
-                  <a:solidFill>
-                    <a:schemeClr val="tx1"/>
-                  </a:solidFill>
-                  <a:miter lim="800000"/>
-                  <a:headEnd/>
-                  <a:tailEnd/>
-                </a14:hiddenLine>
-              </a:ext>
-              <a:ext uri="{AF507438-7753-43E0-B8FC-AC1667EBCBE1}">
-                <a14:hiddenEffects xmlns:a14="http://schemas.microsoft.com/office/drawing/2010/main">
-                  <a:effectLst>
-                    <a:outerShdw dist="35921" dir="2700000" algn="ctr" rotWithShape="0">
-                      <a:schemeClr val="bg2"/>
-                    </a:outerShdw>
-                  </a:effectLst>
-                </a14:hiddenEffects>
-              </a:ext>
-            </a:extLst>
-          </p:spPr>
-        </p:pic>
-        <p:sp>
-          <p:nvSpPr>
-            <p:cNvPr id="3" name="TextBox 2"/>
-            <p:cNvSpPr txBox="1"/>
-            <p:nvPr/>
-          </p:nvSpPr>
-          <p:spPr>
-            <a:xfrm>
-              <a:off x="1062990" y="2727742"/>
-              <a:ext cx="7315200" cy="261610"/>
-            </a:xfrm>
-            <a:prstGeom prst="rect">
-              <a:avLst/>
-            </a:prstGeom>
-            <a:noFill/>
-          </p:spPr>
-          <p:txBody>
-            <a:bodyPr wrap="square" rtlCol="0">
-              <a:spAutoFit/>
-            </a:bodyPr>
-            <a:lstStyle/>
-            <a:p>
-              <a:r>
-                <a:rPr lang="en-US" sz="1100" dirty="0" smtClean="0">
-                  <a:latin typeface="Arial" panose="020B0604020202020204" pitchFamily="34" charset="0"/>
-                  <a:cs typeface="Arial" panose="020B0604020202020204" pitchFamily="34" charset="0"/>
-                </a:rPr>
-                <a:t>Dependent variable: CRECBINARY (1 = No; 2 = Yes)</a:t>
-              </a:r>
-            </a:p>
-          </p:txBody>
-        </p:sp>
-      </p:grpSp>
       <p:sp>
         <p:nvSpPr>
           <p:cNvPr id="7" name="Rectangle 6"/>
@@ -19691,10 +20520,17 @@
   <p:clrMapOvr>
     <a:masterClrMapping/>
   </p:clrMapOvr>
+  <p:timing>
+    <p:tnLst>
+      <p:par>
+        <p:cTn id="1" dur="indefinite" restart="never" nodeType="tmRoot"/>
+      </p:par>
+    </p:tnLst>
+  </p:timing>
 </p:sld>
 </file>
 
-<file path=ppt/slides/slide22.xml><?xml version="1.0" encoding="utf-8"?>
+<file path=ppt/slides/slide24.xml><?xml version="1.0" encoding="utf-8"?>
 <p:sld xmlns:a="http://schemas.openxmlformats.org/drawingml/2006/main" xmlns:r="http://schemas.openxmlformats.org/officeDocument/2006/relationships" xmlns:p="http://schemas.openxmlformats.org/presentationml/2006/main">
   <p:cSld>
     <p:spTree>
@@ -19835,11 +20671,7 @@
             </a:pPr>
             <a:r>
               <a:rPr lang="en-US" dirty="0" smtClean="0"/>
-              <a:t>Obtain </a:t>
-            </a:r>
-            <a:r>
-              <a:rPr lang="en-US" dirty="0" smtClean="0"/>
-              <a:t>more current data.</a:t>
+              <a:t>Obtain more current data.</a:t>
             </a:r>
           </a:p>
           <a:p>
@@ -19852,15 +20684,7 @@
             </a:pPr>
             <a:r>
               <a:rPr lang="en-US" dirty="0" smtClean="0"/>
-              <a:t>Buffer the sample </a:t>
-            </a:r>
-            <a:r>
-              <a:rPr lang="en-US" dirty="0" smtClean="0"/>
-              <a:t>data on </a:t>
-            </a:r>
-            <a:r>
-              <a:rPr lang="en-US" dirty="0" smtClean="0"/>
-              <a:t>the front and back time period to minimize truncation.</a:t>
+              <a:t>Buffer the sample data on the front and back time period to minimize truncation.</a:t>
             </a:r>
           </a:p>
           <a:p>
@@ -19873,19 +20697,7 @@
             </a:pPr>
             <a:r>
               <a:rPr lang="en-US" dirty="0" smtClean="0"/>
-              <a:t>Separate dependent claims and independents claims </a:t>
-            </a:r>
-            <a:r>
-              <a:rPr lang="en-US" dirty="0" smtClean="0"/>
-              <a:t>as distinct </a:t>
-            </a:r>
-            <a:r>
-              <a:rPr lang="en-US" dirty="0" smtClean="0"/>
-              <a:t>variables</a:t>
-            </a:r>
-            <a:r>
-              <a:rPr lang="en-US" dirty="0" smtClean="0"/>
-              <a:t>.</a:t>
+              <a:t>Separate dependent claims and independents claims as distinct variables.</a:t>
             </a:r>
           </a:p>
           <a:p>
@@ -19924,13 +20736,8 @@
             </a:pPr>
             <a:r>
               <a:rPr lang="en-US" dirty="0" smtClean="0"/>
-              <a:t>Consider the effects of technology readiness level (TRL</a:t>
-            </a:r>
-            <a:r>
-              <a:rPr lang="en-US" dirty="0" smtClean="0"/>
-              <a:t>).</a:t>
-            </a:r>
-            <a:endParaRPr lang="en-US" dirty="0" smtClean="0"/>
+              <a:t>Consider the effects of technology readiness level (TRL).</a:t>
+            </a:r>
           </a:p>
         </p:txBody>
       </p:sp>
@@ -19944,10 +20751,213 @@
   <p:clrMapOvr>
     <a:masterClrMapping/>
   </p:clrMapOvr>
+  <p:timing>
+    <p:tnLst>
+      <p:par>
+        <p:cTn id="1" dur="indefinite" restart="never" nodeType="tmRoot"/>
+      </p:par>
+    </p:tnLst>
+  </p:timing>
 </p:sld>
 </file>
 
-<file path=ppt/slides/slide23.xml><?xml version="1.0" encoding="utf-8"?>
+<file path=ppt/slides/slide25.xml><?xml version="1.0" encoding="utf-8"?>
+<p:sld xmlns:a="http://schemas.openxmlformats.org/drawingml/2006/main" xmlns:r="http://schemas.openxmlformats.org/officeDocument/2006/relationships" xmlns:p="http://schemas.openxmlformats.org/presentationml/2006/main">
+  <p:cSld>
+    <p:spTree>
+      <p:nvGrpSpPr>
+        <p:cNvPr id="1" name=""/>
+        <p:cNvGrpSpPr/>
+        <p:nvPr/>
+      </p:nvGrpSpPr>
+      <p:grpSpPr>
+        <a:xfrm>
+          <a:off x="0" y="0"/>
+          <a:ext cx="0" cy="0"/>
+          <a:chOff x="0" y="0"/>
+          <a:chExt cx="0" cy="0"/>
+        </a:xfrm>
+      </p:grpSpPr>
+      <p:sp>
+        <p:nvSpPr>
+          <p:cNvPr id="2" name="TextBox 1"/>
+          <p:cNvSpPr txBox="1"/>
+          <p:nvPr/>
+        </p:nvSpPr>
+        <p:spPr>
+          <a:xfrm>
+            <a:off x="0" y="365760"/>
+            <a:ext cx="9144000" cy="523220"/>
+          </a:xfrm>
+          <a:prstGeom prst="rect">
+            <a:avLst/>
+          </a:prstGeom>
+          <a:noFill/>
+        </p:spPr>
+        <p:txBody>
+          <a:bodyPr wrap="square" rtlCol="0">
+            <a:spAutoFit/>
+          </a:bodyPr>
+          <a:lstStyle/>
+          <a:p>
+            <a:pPr algn="ctr"/>
+            <a:r>
+              <a:rPr lang="en-US" sz="2800" b="1" dirty="0" smtClean="0"/>
+              <a:t>Policy Implications</a:t>
+            </a:r>
+            <a:endParaRPr lang="en-US" sz="2800" b="1" dirty="0"/>
+          </a:p>
+        </p:txBody>
+      </p:sp>
+      <p:sp>
+        <p:nvSpPr>
+          <p:cNvPr id="3" name="TextBox 2"/>
+          <p:cNvSpPr txBox="1"/>
+          <p:nvPr/>
+        </p:nvSpPr>
+        <p:spPr>
+          <a:xfrm>
+            <a:off x="0" y="1097280"/>
+            <a:ext cx="9144000" cy="2893100"/>
+          </a:xfrm>
+          <a:prstGeom prst="rect">
+            <a:avLst/>
+          </a:prstGeom>
+          <a:noFill/>
+        </p:spPr>
+        <p:txBody>
+          <a:bodyPr wrap="square" lIns="457200" rtlCol="0">
+            <a:spAutoFit/>
+          </a:bodyPr>
+          <a:lstStyle/>
+          <a:p>
+            <a:pPr marL="285750" indent="-285750">
+              <a:spcAft>
+                <a:spcPts val="600"/>
+              </a:spcAft>
+              <a:buFont typeface="Arial" panose="020B0604020202020204" pitchFamily="34" charset="0"/>
+              <a:buChar char="•"/>
+            </a:pPr>
+            <a:r>
+              <a:rPr lang="en-US" dirty="0"/>
+              <a:t>P</a:t>
+            </a:r>
+            <a:r>
+              <a:rPr lang="en-US" dirty="0" smtClean="0"/>
+              <a:t>rovides </a:t>
+            </a:r>
+            <a:r>
+              <a:rPr lang="en-US" dirty="0"/>
+              <a:t>information to help both </a:t>
+            </a:r>
+            <a:r>
+              <a:rPr lang="en-US" dirty="0" smtClean="0"/>
+              <a:t>industry professionals and </a:t>
+            </a:r>
+            <a:r>
+              <a:rPr lang="en-US" dirty="0"/>
+              <a:t>policymakers better understand the drivers of the technology transfer </a:t>
+            </a:r>
+            <a:r>
+              <a:rPr lang="en-US" dirty="0" smtClean="0"/>
+              <a:t>outcomes.</a:t>
+            </a:r>
+          </a:p>
+          <a:p>
+            <a:pPr marL="285750" indent="-285750">
+              <a:spcAft>
+                <a:spcPts val="600"/>
+              </a:spcAft>
+              <a:buFont typeface="Arial" panose="020B0604020202020204" pitchFamily="34" charset="0"/>
+              <a:buChar char="•"/>
+            </a:pPr>
+            <a:r>
+              <a:rPr lang="en-US" dirty="0" smtClean="0"/>
+              <a:t>Identifies </a:t>
+            </a:r>
+            <a:r>
+              <a:rPr lang="en-US" dirty="0"/>
+              <a:t>possible factors that should be considered when forming public policy regarding technology transfer.  </a:t>
+            </a:r>
+            <a:endParaRPr lang="en-US" dirty="0" smtClean="0"/>
+          </a:p>
+          <a:p>
+            <a:pPr marL="285750" indent="-285750">
+              <a:spcAft>
+                <a:spcPts val="600"/>
+              </a:spcAft>
+              <a:buFont typeface="Arial" panose="020B0604020202020204" pitchFamily="34" charset="0"/>
+              <a:buChar char="•"/>
+            </a:pPr>
+            <a:r>
+              <a:rPr lang="en-US" dirty="0" smtClean="0"/>
+              <a:t>Suggests that considering </a:t>
+            </a:r>
+            <a:r>
+              <a:rPr lang="en-US" dirty="0"/>
+              <a:t>non-transactional measures of knowledge transfer may be feasible.  </a:t>
+            </a:r>
+            <a:endParaRPr lang="en-US" dirty="0" smtClean="0"/>
+          </a:p>
+          <a:p>
+            <a:pPr marL="285750" indent="-285750">
+              <a:spcAft>
+                <a:spcPts val="600"/>
+              </a:spcAft>
+              <a:buFont typeface="Arial" panose="020B0604020202020204" pitchFamily="34" charset="0"/>
+              <a:buChar char="•"/>
+            </a:pPr>
+            <a:r>
+              <a:rPr lang="en-US" dirty="0" smtClean="0"/>
+              <a:t>Affect </a:t>
+            </a:r>
+            <a:r>
+              <a:rPr lang="en-US" dirty="0"/>
+              <a:t>the objectives of policymakers with regard to technology transfer.  </a:t>
+            </a:r>
+            <a:endParaRPr lang="en-US" dirty="0"/>
+          </a:p>
+          <a:p>
+            <a:pPr marL="285750" indent="-285750">
+              <a:spcAft>
+                <a:spcPts val="600"/>
+              </a:spcAft>
+              <a:buFont typeface="Arial" panose="020B0604020202020204" pitchFamily="34" charset="0"/>
+              <a:buChar char="•"/>
+            </a:pPr>
+            <a:r>
+              <a:rPr lang="en-US" dirty="0" smtClean="0"/>
+              <a:t>Influence </a:t>
+            </a:r>
+            <a:r>
+              <a:rPr lang="en-US" dirty="0"/>
+              <a:t>how policymakers think about technology transfer and how they formulate public policy to increase the transfer of federally-funded research to the private sector.</a:t>
+            </a:r>
+            <a:endParaRPr lang="en-US" dirty="0" smtClean="0"/>
+          </a:p>
+        </p:txBody>
+      </p:sp>
+    </p:spTree>
+    <p:extLst>
+      <p:ext uri="{BB962C8B-B14F-4D97-AF65-F5344CB8AC3E}">
+        <p14:creationId xmlns:p14="http://schemas.microsoft.com/office/powerpoint/2010/main" val="3352192620"/>
+      </p:ext>
+    </p:extLst>
+  </p:cSld>
+  <p:clrMapOvr>
+    <a:masterClrMapping/>
+  </p:clrMapOvr>
+  <p:timing>
+    <p:tnLst>
+      <p:par>
+        <p:cTn id="1" dur="indefinite" restart="never" nodeType="tmRoot"/>
+      </p:par>
+    </p:tnLst>
+  </p:timing>
+</p:sld>
+</file>
+
+<file path=ppt/slides/slide26.xml><?xml version="1.0" encoding="utf-8"?>
 <p:sld xmlns:a="http://schemas.openxmlformats.org/drawingml/2006/main" xmlns:r="http://schemas.openxmlformats.org/officeDocument/2006/relationships" xmlns:p="http://schemas.openxmlformats.org/presentationml/2006/main">
   <p:cSld>
     <p:spTree>
@@ -20020,10 +21030,17 @@
   <p:clrMapOvr>
     <a:masterClrMapping/>
   </p:clrMapOvr>
+  <p:timing>
+    <p:tnLst>
+      <p:par>
+        <p:cTn id="1" dur="indefinite" restart="never" nodeType="tmRoot"/>
+      </p:par>
+    </p:tnLst>
+  </p:timing>
 </p:sld>
 </file>
 
-<file path=ppt/slides/slide24.xml><?xml version="1.0" encoding="utf-8"?>
+<file path=ppt/slides/slide27.xml><?xml version="1.0" encoding="utf-8"?>
 <p:sld xmlns:a="http://schemas.openxmlformats.org/drawingml/2006/main" xmlns:r="http://schemas.openxmlformats.org/officeDocument/2006/relationships" xmlns:p="http://schemas.openxmlformats.org/presentationml/2006/main">
   <p:cSld>
     <p:spTree>
@@ -20433,10 +21450,17 @@
   <p:clrMapOvr>
     <a:masterClrMapping/>
   </p:clrMapOvr>
+  <p:timing>
+    <p:tnLst>
+      <p:par>
+        <p:cTn id="1" dur="indefinite" restart="never" nodeType="tmRoot"/>
+      </p:par>
+    </p:tnLst>
+  </p:timing>
 </p:sld>
 </file>
 
-<file path=ppt/slides/slide25.xml><?xml version="1.0" encoding="utf-8"?>
+<file path=ppt/slides/slide28.xml><?xml version="1.0" encoding="utf-8"?>
 <p:sld xmlns:a="http://schemas.openxmlformats.org/drawingml/2006/main" xmlns:r="http://schemas.openxmlformats.org/officeDocument/2006/relationships" xmlns:p="http://schemas.openxmlformats.org/presentationml/2006/main">
   <p:cSld>
     <p:spTree>
@@ -20866,10 +21890,17 @@
   <p:clrMapOvr>
     <a:masterClrMapping/>
   </p:clrMapOvr>
+  <p:timing>
+    <p:tnLst>
+      <p:par>
+        <p:cTn id="1" dur="indefinite" restart="never" nodeType="tmRoot"/>
+      </p:par>
+    </p:tnLst>
+  </p:timing>
 </p:sld>
 </file>
 
-<file path=ppt/slides/slide26.xml><?xml version="1.0" encoding="utf-8"?>
+<file path=ppt/slides/slide29.xml><?xml version="1.0" encoding="utf-8"?>
 <p:sld xmlns:a="http://schemas.openxmlformats.org/drawingml/2006/main" xmlns:r="http://schemas.openxmlformats.org/officeDocument/2006/relationships" xmlns:p="http://schemas.openxmlformats.org/presentationml/2006/main">
   <p:cSld>
     <p:spTree>
@@ -21248,627 +22279,13 @@
   <p:clrMapOvr>
     <a:masterClrMapping/>
   </p:clrMapOvr>
-</p:sld>
-</file>
-
-<file path=ppt/slides/slide27.xml><?xml version="1.0" encoding="utf-8"?>
-<p:sld xmlns:a="http://schemas.openxmlformats.org/drawingml/2006/main" xmlns:r="http://schemas.openxmlformats.org/officeDocument/2006/relationships" xmlns:p="http://schemas.openxmlformats.org/presentationml/2006/main">
-  <p:cSld>
-    <p:spTree>
-      <p:nvGrpSpPr>
-        <p:cNvPr id="1" name=""/>
-        <p:cNvGrpSpPr/>
-        <p:nvPr/>
-      </p:nvGrpSpPr>
-      <p:grpSpPr>
-        <a:xfrm>
-          <a:off x="0" y="0"/>
-          <a:ext cx="0" cy="0"/>
-          <a:chOff x="0" y="0"/>
-          <a:chExt cx="0" cy="0"/>
-        </a:xfrm>
-      </p:grpSpPr>
-      <p:sp>
-        <p:nvSpPr>
-          <p:cNvPr id="2" name="Rectangle 1"/>
-          <p:cNvSpPr/>
-          <p:nvPr/>
-        </p:nvSpPr>
-        <p:spPr>
-          <a:xfrm>
-            <a:off x="173844" y="399249"/>
-            <a:ext cx="8686800" cy="4247317"/>
-          </a:xfrm>
-          <a:prstGeom prst="rect">
-            <a:avLst/>
-          </a:prstGeom>
-        </p:spPr>
-        <p:txBody>
-          <a:bodyPr>
-            <a:spAutoFit/>
-          </a:bodyPr>
-          <a:lstStyle/>
-          <a:p>
-            <a:pPr marL="457200" marR="0" indent="-457200">
-              <a:spcBef>
-                <a:spcPts val="0"/>
-              </a:spcBef>
-              <a:spcAft>
-                <a:spcPts val="0"/>
-              </a:spcAft>
-            </a:pPr>
-            <a:r>
-              <a:rPr lang="en-US" dirty="0" err="1" smtClean="0">
-                <a:latin typeface="Times New Roman"/>
-                <a:ea typeface="Calibri"/>
-                <a:cs typeface="Times New Roman"/>
-              </a:rPr>
-              <a:t>Raut</a:t>
-            </a:r>
-            <a:r>
-              <a:rPr lang="en-US" dirty="0">
-                <a:latin typeface="Times New Roman"/>
-                <a:ea typeface="Calibri"/>
-                <a:cs typeface="Times New Roman"/>
-              </a:rPr>
-              <a:t>, R. D., </a:t>
-            </a:r>
-            <a:r>
-              <a:rPr lang="en-US" dirty="0" err="1">
-                <a:latin typeface="Times New Roman"/>
-                <a:ea typeface="Calibri"/>
-                <a:cs typeface="Times New Roman"/>
-              </a:rPr>
-              <a:t>Priyadarshinee</a:t>
-            </a:r>
-            <a:r>
-              <a:rPr lang="en-US" dirty="0">
-                <a:latin typeface="Times New Roman"/>
-                <a:ea typeface="Calibri"/>
-                <a:cs typeface="Times New Roman"/>
-              </a:rPr>
-              <a:t>, P., </a:t>
-            </a:r>
-            <a:r>
-              <a:rPr lang="en-US" dirty="0" err="1">
-                <a:latin typeface="Times New Roman"/>
-                <a:ea typeface="Calibri"/>
-                <a:cs typeface="Times New Roman"/>
-              </a:rPr>
-              <a:t>Gardas</a:t>
-            </a:r>
-            <a:r>
-              <a:rPr lang="en-US" dirty="0">
-                <a:latin typeface="Times New Roman"/>
-                <a:ea typeface="Calibri"/>
-                <a:cs typeface="Times New Roman"/>
-              </a:rPr>
-              <a:t>, B. B., &amp; </a:t>
-            </a:r>
-            <a:r>
-              <a:rPr lang="en-US" dirty="0" err="1">
-                <a:latin typeface="Times New Roman"/>
-                <a:ea typeface="Calibri"/>
-                <a:cs typeface="Times New Roman"/>
-              </a:rPr>
-              <a:t>Jha</a:t>
-            </a:r>
-            <a:r>
-              <a:rPr lang="en-US" dirty="0">
-                <a:latin typeface="Times New Roman"/>
-                <a:ea typeface="Calibri"/>
-                <a:cs typeface="Times New Roman"/>
-              </a:rPr>
-              <a:t>, M. K. (2018). Analyzing the factors influencing cloud computing adoption using three stage hybrid SEM-ANN-ISM (SEANIS) approach. </a:t>
-            </a:r>
-            <a:r>
-              <a:rPr lang="en-US" i="1" dirty="0">
-                <a:latin typeface="Times New Roman"/>
-                <a:ea typeface="Calibri"/>
-                <a:cs typeface="Times New Roman"/>
-              </a:rPr>
-              <a:t>Technological Forecasting &amp; Social Change</a:t>
-            </a:r>
-            <a:r>
-              <a:rPr lang="en-US" dirty="0">
-                <a:latin typeface="Times New Roman"/>
-                <a:ea typeface="Calibri"/>
-                <a:cs typeface="Times New Roman"/>
-              </a:rPr>
-              <a:t>, 134, 98–123. https://doi.org/10.1016/j.techfore.2018.05.020</a:t>
-            </a:r>
-            <a:endParaRPr lang="en-US" sz="1600" dirty="0">
-              <a:ea typeface="Calibri"/>
-              <a:cs typeface="Times New Roman"/>
-            </a:endParaRPr>
-          </a:p>
-          <a:p>
-            <a:pPr marL="457200" marR="0" indent="-457200">
-              <a:spcBef>
-                <a:spcPts val="0"/>
-              </a:spcBef>
-              <a:spcAft>
-                <a:spcPts val="0"/>
-              </a:spcAft>
-            </a:pPr>
-            <a:r>
-              <a:rPr lang="en-US" dirty="0">
-                <a:latin typeface="Times New Roman"/>
-                <a:ea typeface="Calibri"/>
-                <a:cs typeface="Times New Roman"/>
-              </a:rPr>
-              <a:t>Sharma, P., &amp; </a:t>
-            </a:r>
-            <a:r>
-              <a:rPr lang="en-US" dirty="0" err="1">
-                <a:latin typeface="Times New Roman"/>
-                <a:ea typeface="Calibri"/>
-                <a:cs typeface="Times New Roman"/>
-              </a:rPr>
-              <a:t>Tripathi</a:t>
-            </a:r>
-            <a:r>
-              <a:rPr lang="en-US" dirty="0">
-                <a:latin typeface="Times New Roman"/>
-                <a:ea typeface="Calibri"/>
-                <a:cs typeface="Times New Roman"/>
-              </a:rPr>
-              <a:t>, R. C. (2017). Patent citation: A technique for measuring the knowledge flow of information and innovation. </a:t>
-            </a:r>
-            <a:r>
-              <a:rPr lang="en-US" i="1" dirty="0">
-                <a:latin typeface="Times New Roman"/>
-                <a:ea typeface="Calibri"/>
-                <a:cs typeface="Times New Roman"/>
-              </a:rPr>
-              <a:t>World Patent Information</a:t>
-            </a:r>
-            <a:r>
-              <a:rPr lang="en-US" dirty="0">
-                <a:latin typeface="Times New Roman"/>
-                <a:ea typeface="Calibri"/>
-                <a:cs typeface="Times New Roman"/>
-              </a:rPr>
-              <a:t>, 51, 31–42. https://</a:t>
-            </a:r>
-            <a:r>
-              <a:rPr lang="en-US" dirty="0" smtClean="0">
-                <a:latin typeface="Times New Roman"/>
-                <a:ea typeface="Calibri"/>
-                <a:cs typeface="Times New Roman"/>
-              </a:rPr>
-              <a:t>doi.org/10.1016/j.wpi.2017.11.002</a:t>
-            </a:r>
-          </a:p>
-          <a:p>
-            <a:pPr marL="457200" marR="0" indent="-457200">
-              <a:spcBef>
-                <a:spcPts val="0"/>
-              </a:spcBef>
-              <a:spcAft>
-                <a:spcPts val="0"/>
-              </a:spcAft>
-            </a:pPr>
-            <a:r>
-              <a:rPr lang="en-US" dirty="0">
-                <a:latin typeface="Times New Roman" panose="02020603050405020304" pitchFamily="18" charset="0"/>
-                <a:cs typeface="Times New Roman" panose="02020603050405020304" pitchFamily="18" charset="0"/>
-              </a:rPr>
-              <a:t>Tseng, A</a:t>
-            </a:r>
-            <a:r>
-              <a:rPr lang="en-US" dirty="0" smtClean="0">
-                <a:latin typeface="Times New Roman" panose="02020603050405020304" pitchFamily="18" charset="0"/>
-                <a:cs typeface="Times New Roman" panose="02020603050405020304" pitchFamily="18" charset="0"/>
-              </a:rPr>
-              <a:t>. </a:t>
-            </a:r>
-            <a:r>
-              <a:rPr lang="en-US" dirty="0">
-                <a:latin typeface="Times New Roman" panose="02020603050405020304" pitchFamily="18" charset="0"/>
-                <a:cs typeface="Times New Roman" panose="02020603050405020304" pitchFamily="18" charset="0"/>
-              </a:rPr>
-              <a:t>&amp; </a:t>
-            </a:r>
-            <a:r>
-              <a:rPr lang="en-US" dirty="0" err="1">
-                <a:latin typeface="Times New Roman" panose="02020603050405020304" pitchFamily="18" charset="0"/>
-                <a:cs typeface="Times New Roman" panose="02020603050405020304" pitchFamily="18" charset="0"/>
-              </a:rPr>
-              <a:t>Raudensky</a:t>
-            </a:r>
-            <a:r>
-              <a:rPr lang="en-US" dirty="0">
-                <a:latin typeface="Times New Roman" panose="02020603050405020304" pitchFamily="18" charset="0"/>
-                <a:cs typeface="Times New Roman" panose="02020603050405020304" pitchFamily="18" charset="0"/>
-              </a:rPr>
-              <a:t>, M. (2014). Assessments of technology transfer activities of </a:t>
-            </a:r>
-            <a:r>
-              <a:rPr lang="en-US" dirty="0" smtClean="0">
-                <a:latin typeface="Times New Roman" panose="02020603050405020304" pitchFamily="18" charset="0"/>
-                <a:cs typeface="Times New Roman" panose="02020603050405020304" pitchFamily="18" charset="0"/>
-              </a:rPr>
-              <a:t>U.S. </a:t>
-            </a:r>
-            <a:r>
-              <a:rPr lang="en-US" dirty="0">
-                <a:latin typeface="Times New Roman" panose="02020603050405020304" pitchFamily="18" charset="0"/>
-                <a:cs typeface="Times New Roman" panose="02020603050405020304" pitchFamily="18" charset="0"/>
-              </a:rPr>
-              <a:t>universities and associated impact of Bayh-Dole Act. </a:t>
-            </a:r>
-            <a:r>
-              <a:rPr lang="en-US" i="1" dirty="0" err="1">
-                <a:latin typeface="Times New Roman" panose="02020603050405020304" pitchFamily="18" charset="0"/>
-                <a:cs typeface="Times New Roman" panose="02020603050405020304" pitchFamily="18" charset="0"/>
-              </a:rPr>
-              <a:t>Scientometrics</a:t>
-            </a:r>
-            <a:r>
-              <a:rPr lang="en-US" i="1" dirty="0">
-                <a:latin typeface="Times New Roman" panose="02020603050405020304" pitchFamily="18" charset="0"/>
-                <a:cs typeface="Times New Roman" panose="02020603050405020304" pitchFamily="18" charset="0"/>
-              </a:rPr>
-              <a:t>, 101</a:t>
-            </a:r>
-            <a:r>
-              <a:rPr lang="en-US" dirty="0">
-                <a:latin typeface="Times New Roman" panose="02020603050405020304" pitchFamily="18" charset="0"/>
-                <a:cs typeface="Times New Roman" panose="02020603050405020304" pitchFamily="18" charset="0"/>
-              </a:rPr>
-              <a:t>(3), 1851-1869. </a:t>
-            </a:r>
-            <a:endParaRPr lang="en-US" dirty="0">
-              <a:latin typeface="Times New Roman" panose="02020603050405020304" pitchFamily="18" charset="0"/>
-              <a:ea typeface="Calibri"/>
-              <a:cs typeface="Times New Roman" panose="02020603050405020304" pitchFamily="18" charset="0"/>
-            </a:endParaRPr>
-          </a:p>
-          <a:p>
-            <a:pPr marL="457200" indent="-457200"/>
-            <a:r>
-              <a:rPr lang="en-US" dirty="0">
-                <a:latin typeface="Times New Roman"/>
-                <a:ea typeface="Calibri"/>
-                <a:cs typeface="Times New Roman"/>
-              </a:rPr>
-              <a:t>United Nations. (2017). </a:t>
-            </a:r>
-            <a:r>
-              <a:rPr lang="en-US" i="1" dirty="0">
-                <a:latin typeface="Times New Roman"/>
-                <a:ea typeface="Calibri"/>
-                <a:cs typeface="Times New Roman"/>
-              </a:rPr>
-              <a:t>GDP and its breakdown at current prices in U.S. dollars</a:t>
-            </a:r>
-            <a:r>
-              <a:rPr lang="en-US" dirty="0">
-                <a:latin typeface="Times New Roman"/>
-                <a:ea typeface="Calibri"/>
-                <a:cs typeface="Times New Roman"/>
-              </a:rPr>
-              <a:t> [Data file]. Retrieved from http://unstats.un.org/unsd/snaama/dnltransfer.asp?fID=2</a:t>
-            </a:r>
-            <a:endParaRPr lang="en-US" sz="1600" dirty="0">
-              <a:ea typeface="Calibri"/>
-              <a:cs typeface="Times New Roman"/>
-            </a:endParaRPr>
-          </a:p>
-          <a:p>
-            <a:pPr marL="457200" marR="0" indent="-457200">
-              <a:spcBef>
-                <a:spcPts val="0"/>
-              </a:spcBef>
-              <a:spcAft>
-                <a:spcPts val="0"/>
-              </a:spcAft>
-            </a:pPr>
-            <a:r>
-              <a:rPr lang="en-US" dirty="0" err="1" smtClean="0">
-                <a:latin typeface="Times New Roman"/>
-                <a:ea typeface="Calibri"/>
-                <a:cs typeface="Times New Roman"/>
-              </a:rPr>
-              <a:t>Vagnani</a:t>
-            </a:r>
-            <a:r>
-              <a:rPr lang="en-US" dirty="0">
-                <a:latin typeface="Times New Roman"/>
-                <a:ea typeface="Calibri"/>
-                <a:cs typeface="Times New Roman"/>
-              </a:rPr>
-              <a:t>, G., &amp; Volpe, L. (2017). Innovation attributes and managers’ decisions about the adoption of innovations in organizations: A meta-analytical review. </a:t>
-            </a:r>
-            <a:r>
-              <a:rPr lang="en-US" i="1" dirty="0">
-                <a:latin typeface="Times New Roman"/>
-                <a:ea typeface="Calibri"/>
-                <a:cs typeface="Times New Roman"/>
-              </a:rPr>
-              <a:t>International Journal of Innovation Studies</a:t>
-            </a:r>
-            <a:r>
-              <a:rPr lang="en-US" dirty="0">
-                <a:latin typeface="Times New Roman"/>
-                <a:ea typeface="Calibri"/>
-                <a:cs typeface="Times New Roman"/>
-              </a:rPr>
-              <a:t>, 1, 107–133. https://</a:t>
-            </a:r>
-            <a:r>
-              <a:rPr lang="en-US" dirty="0" smtClean="0">
-                <a:latin typeface="Times New Roman"/>
-                <a:ea typeface="Calibri"/>
-                <a:cs typeface="Times New Roman"/>
-              </a:rPr>
-              <a:t>doi.org/10.1016/j.ijis.2017.10.001</a:t>
-            </a:r>
-            <a:endParaRPr lang="en-US" sz="1600" dirty="0" smtClean="0">
-              <a:ea typeface="Calibri"/>
-              <a:cs typeface="Times New Roman"/>
-            </a:endParaRPr>
-          </a:p>
-        </p:txBody>
-      </p:sp>
-      <p:sp>
-        <p:nvSpPr>
-          <p:cNvPr id="3" name="TextBox 2"/>
-          <p:cNvSpPr txBox="1"/>
-          <p:nvPr/>
-        </p:nvSpPr>
-        <p:spPr>
-          <a:xfrm>
-            <a:off x="0" y="7136"/>
-            <a:ext cx="9144000" cy="369332"/>
-          </a:xfrm>
-          <a:prstGeom prst="rect">
-            <a:avLst/>
-          </a:prstGeom>
-          <a:noFill/>
-        </p:spPr>
-        <p:txBody>
-          <a:bodyPr wrap="square" rtlCol="0">
-            <a:spAutoFit/>
-          </a:bodyPr>
-          <a:lstStyle/>
-          <a:p>
-            <a:pPr algn="ctr"/>
-            <a:r>
-              <a:rPr lang="en-US" dirty="0" smtClean="0">
-                <a:latin typeface="Times New Roman" panose="02020603050405020304" pitchFamily="18" charset="0"/>
-                <a:cs typeface="Times New Roman" panose="02020603050405020304" pitchFamily="18" charset="0"/>
-              </a:rPr>
-              <a:t>References</a:t>
-            </a:r>
-            <a:endParaRPr lang="en-US" dirty="0">
-              <a:latin typeface="Times New Roman" panose="02020603050405020304" pitchFamily="18" charset="0"/>
-              <a:cs typeface="Times New Roman" panose="02020603050405020304" pitchFamily="18" charset="0"/>
-            </a:endParaRPr>
-          </a:p>
-        </p:txBody>
-      </p:sp>
-    </p:spTree>
-    <p:extLst>
-      <p:ext uri="{BB962C8B-B14F-4D97-AF65-F5344CB8AC3E}">
-        <p14:creationId xmlns:p14="http://schemas.microsoft.com/office/powerpoint/2010/main" val="3125866011"/>
-      </p:ext>
-    </p:extLst>
-  </p:cSld>
-  <p:clrMapOvr>
-    <a:masterClrMapping/>
-  </p:clrMapOvr>
-</p:sld>
-</file>
-
-<file path=ppt/slides/slide28.xml><?xml version="1.0" encoding="utf-8"?>
-<p:sld xmlns:a="http://schemas.openxmlformats.org/drawingml/2006/main" xmlns:r="http://schemas.openxmlformats.org/officeDocument/2006/relationships" xmlns:p="http://schemas.openxmlformats.org/presentationml/2006/main">
-  <p:cSld>
-    <p:spTree>
-      <p:nvGrpSpPr>
-        <p:cNvPr id="1" name=""/>
-        <p:cNvGrpSpPr/>
-        <p:nvPr/>
-      </p:nvGrpSpPr>
-      <p:grpSpPr>
-        <a:xfrm>
-          <a:off x="0" y="0"/>
-          <a:ext cx="0" cy="0"/>
-          <a:chOff x="0" y="0"/>
-          <a:chExt cx="0" cy="0"/>
-        </a:xfrm>
-      </p:grpSpPr>
-      <p:sp>
-        <p:nvSpPr>
-          <p:cNvPr id="2" name="Rectangle 1"/>
-          <p:cNvSpPr/>
-          <p:nvPr/>
-        </p:nvSpPr>
-        <p:spPr>
-          <a:xfrm>
-            <a:off x="173844" y="399249"/>
-            <a:ext cx="8686800" cy="2031325"/>
-          </a:xfrm>
-          <a:prstGeom prst="rect">
-            <a:avLst/>
-          </a:prstGeom>
-        </p:spPr>
-        <p:txBody>
-          <a:bodyPr>
-            <a:spAutoFit/>
-          </a:bodyPr>
-          <a:lstStyle/>
-          <a:p>
-            <a:pPr marL="457200" marR="0" indent="-457200">
-              <a:spcBef>
-                <a:spcPts val="0"/>
-              </a:spcBef>
-              <a:spcAft>
-                <a:spcPts val="0"/>
-              </a:spcAft>
-            </a:pPr>
-            <a:r>
-              <a:rPr lang="en-US" dirty="0" smtClean="0">
-                <a:latin typeface="Times New Roman"/>
-                <a:ea typeface="Calibri"/>
-                <a:cs typeface="Times New Roman"/>
-              </a:rPr>
-              <a:t>Yan</a:t>
-            </a:r>
-            <a:r>
-              <a:rPr lang="en-US" dirty="0">
-                <a:latin typeface="Times New Roman"/>
-                <a:ea typeface="Calibri"/>
-                <a:cs typeface="Times New Roman"/>
-              </a:rPr>
-              <a:t>, E., &amp; Yu, Q. (2016). Using path-based approaches to examine the dynamic structure of discipline-level citation networks: 1997-2011. </a:t>
-            </a:r>
-            <a:r>
-              <a:rPr lang="en-US" i="1" dirty="0">
-                <a:latin typeface="Times New Roman"/>
-                <a:ea typeface="Calibri"/>
-                <a:cs typeface="Times New Roman"/>
-              </a:rPr>
-              <a:t>Journal of the Association for Information Science &amp; Technology</a:t>
-            </a:r>
-            <a:r>
-              <a:rPr lang="en-US" dirty="0">
-                <a:latin typeface="Times New Roman"/>
-                <a:ea typeface="Calibri"/>
-                <a:cs typeface="Times New Roman"/>
-              </a:rPr>
-              <a:t>, 67(8), 1943–1955. https://</a:t>
-            </a:r>
-            <a:r>
-              <a:rPr lang="en-US" dirty="0" smtClean="0">
-                <a:latin typeface="Times New Roman"/>
-                <a:ea typeface="Calibri"/>
-                <a:cs typeface="Times New Roman"/>
-              </a:rPr>
-              <a:t>doi.org/10.1002/asi.23516</a:t>
-            </a:r>
-          </a:p>
-          <a:p>
-            <a:pPr marL="457200" marR="0" indent="-457200">
-              <a:spcBef>
-                <a:spcPts val="0"/>
-              </a:spcBef>
-              <a:spcAft>
-                <a:spcPts val="0"/>
-              </a:spcAft>
-            </a:pPr>
-            <a:r>
-              <a:rPr lang="en-US" dirty="0" err="1">
-                <a:latin typeface="Times New Roman" panose="02020603050405020304" pitchFamily="18" charset="0"/>
-                <a:ea typeface="Calibri"/>
-                <a:cs typeface="Times New Roman" panose="02020603050405020304" pitchFamily="18" charset="0"/>
-              </a:rPr>
-              <a:t>Yoshikane</a:t>
-            </a:r>
-            <a:r>
-              <a:rPr lang="en-US" dirty="0">
-                <a:latin typeface="Times New Roman" panose="02020603050405020304" pitchFamily="18" charset="0"/>
-                <a:ea typeface="Calibri"/>
-                <a:cs typeface="Times New Roman" panose="02020603050405020304" pitchFamily="18" charset="0"/>
-              </a:rPr>
-              <a:t>, F. (2013). Multiple regression analysis of a patent’s citation frequency and quantitative characteristics: the case of Japanese patents. </a:t>
-            </a:r>
-            <a:r>
-              <a:rPr lang="en-US" i="1" dirty="0" err="1">
-                <a:latin typeface="Times New Roman" panose="02020603050405020304" pitchFamily="18" charset="0"/>
-                <a:ea typeface="Calibri"/>
-                <a:cs typeface="Times New Roman" panose="02020603050405020304" pitchFamily="18" charset="0"/>
-              </a:rPr>
-              <a:t>Scientometrics</a:t>
-            </a:r>
-            <a:r>
-              <a:rPr lang="en-US" dirty="0">
-                <a:latin typeface="Times New Roman" panose="02020603050405020304" pitchFamily="18" charset="0"/>
-                <a:ea typeface="Calibri"/>
-                <a:cs typeface="Times New Roman" panose="02020603050405020304" pitchFamily="18" charset="0"/>
-              </a:rPr>
-              <a:t>, </a:t>
-            </a:r>
-            <a:r>
-              <a:rPr lang="en-US" i="1" dirty="0">
-                <a:latin typeface="Times New Roman" panose="02020603050405020304" pitchFamily="18" charset="0"/>
-                <a:ea typeface="Calibri"/>
-                <a:cs typeface="Times New Roman" panose="02020603050405020304" pitchFamily="18" charset="0"/>
-              </a:rPr>
-              <a:t>96</a:t>
-            </a:r>
-            <a:r>
-              <a:rPr lang="en-US" dirty="0">
-                <a:latin typeface="Times New Roman" panose="02020603050405020304" pitchFamily="18" charset="0"/>
-                <a:ea typeface="Calibri"/>
-                <a:cs typeface="Times New Roman" panose="02020603050405020304" pitchFamily="18" charset="0"/>
-              </a:rPr>
-              <a:t>(1), 365–379. https://</a:t>
-            </a:r>
-            <a:r>
-              <a:rPr lang="en-US" dirty="0" smtClean="0">
-                <a:latin typeface="Times New Roman" panose="02020603050405020304" pitchFamily="18" charset="0"/>
-                <a:ea typeface="Calibri"/>
-                <a:cs typeface="Times New Roman" panose="02020603050405020304" pitchFamily="18" charset="0"/>
-              </a:rPr>
-              <a:t>doi.org/10.1007/s11192-013-0953-4</a:t>
-            </a:r>
-            <a:endParaRPr lang="en-US" dirty="0">
-              <a:latin typeface="Times New Roman" panose="02020603050405020304" pitchFamily="18" charset="0"/>
-              <a:ea typeface="Calibri"/>
-              <a:cs typeface="Times New Roman" panose="02020603050405020304" pitchFamily="18" charset="0"/>
-            </a:endParaRPr>
-          </a:p>
-        </p:txBody>
-      </p:sp>
-      <p:sp>
-        <p:nvSpPr>
-          <p:cNvPr id="3" name="TextBox 2"/>
-          <p:cNvSpPr txBox="1"/>
-          <p:nvPr/>
-        </p:nvSpPr>
-        <p:spPr>
-          <a:xfrm>
-            <a:off x="0" y="7136"/>
-            <a:ext cx="9144000" cy="369332"/>
-          </a:xfrm>
-          <a:prstGeom prst="rect">
-            <a:avLst/>
-          </a:prstGeom>
-          <a:noFill/>
-        </p:spPr>
-        <p:txBody>
-          <a:bodyPr wrap="square" rtlCol="0">
-            <a:spAutoFit/>
-          </a:bodyPr>
-          <a:lstStyle/>
-          <a:p>
-            <a:pPr algn="ctr"/>
-            <a:r>
-              <a:rPr lang="en-US" dirty="0" smtClean="0">
-                <a:latin typeface="Times New Roman" panose="02020603050405020304" pitchFamily="18" charset="0"/>
-                <a:cs typeface="Times New Roman" panose="02020603050405020304" pitchFamily="18" charset="0"/>
-              </a:rPr>
-              <a:t>References</a:t>
-            </a:r>
-            <a:endParaRPr lang="en-US" dirty="0">
-              <a:latin typeface="Times New Roman" panose="02020603050405020304" pitchFamily="18" charset="0"/>
-              <a:cs typeface="Times New Roman" panose="02020603050405020304" pitchFamily="18" charset="0"/>
-            </a:endParaRPr>
-          </a:p>
-        </p:txBody>
-      </p:sp>
-    </p:spTree>
-    <p:extLst>
-      <p:ext uri="{BB962C8B-B14F-4D97-AF65-F5344CB8AC3E}">
-        <p14:creationId xmlns:p14="http://schemas.microsoft.com/office/powerpoint/2010/main" val="4270090173"/>
-      </p:ext>
-    </p:extLst>
-  </p:cSld>
-  <p:clrMapOvr>
-    <a:masterClrMapping/>
-  </p:clrMapOvr>
+  <p:timing>
+    <p:tnLst>
+      <p:par>
+        <p:cTn id="1" dur="indefinite" restart="never" nodeType="tmRoot"/>
+      </p:par>
+    </p:tnLst>
+  </p:timing>
 </p:sld>
 </file>
 
@@ -21999,7 +22416,7 @@
           <p:nvPr>
             <p:extLst>
               <p:ext uri="{D42A27DB-BD31-4B8C-83A1-F6EECF244321}">
-                <p14:modId xmlns:p14="http://schemas.microsoft.com/office/powerpoint/2010/main" val="2773340877"/>
+                <p14:modId xmlns:p14="http://schemas.microsoft.com/office/powerpoint/2010/main" val="3799545787"/>
               </p:ext>
             </p:extLst>
           </p:nvPr>
@@ -22012,12 +22429,12 @@
           <a:graphicData uri="http://schemas.openxmlformats.org/presentationml/2006/ole">
             <mc:AlternateContent xmlns:mc="http://schemas.openxmlformats.org/markup-compatibility/2006">
               <mc:Choice xmlns:v="urn:schemas-microsoft-com:vml" Requires="v">
-                <p:oleObj spid="_x0000_s3187" name="Chart" r:id="rId4" imgW="7038854" imgH="4086180" progId="Excel.Chart.8">
+                <p:oleObj spid="_x0000_s3219" name="Worksheet" r:id="rId4" imgW="7038978" imgH="4086255" progId="Excel.Sheet.8">
                   <p:embed followColorScheme="full"/>
                 </p:oleObj>
               </mc:Choice>
               <mc:Fallback>
-                <p:oleObj name="Chart" r:id="rId4" imgW="7038854" imgH="4086180" progId="Excel.Chart.8">
+                <p:oleObj name="Worksheet" r:id="rId4" imgW="7038978" imgH="4086255" progId="Excel.Sheet.8">
                   <p:embed followColorScheme="full"/>
                   <p:pic>
                     <p:nvPicPr>
@@ -22067,7 +22484,1079 @@
 </p:sld>
 </file>
 
+<file path=ppt/slides/slide30.xml><?xml version="1.0" encoding="utf-8"?>
+<p:sld xmlns:a="http://schemas.openxmlformats.org/drawingml/2006/main" xmlns:r="http://schemas.openxmlformats.org/officeDocument/2006/relationships" xmlns:p="http://schemas.openxmlformats.org/presentationml/2006/main">
+  <p:cSld>
+    <p:spTree>
+      <p:nvGrpSpPr>
+        <p:cNvPr id="1" name=""/>
+        <p:cNvGrpSpPr/>
+        <p:nvPr/>
+      </p:nvGrpSpPr>
+      <p:grpSpPr>
+        <a:xfrm>
+          <a:off x="0" y="0"/>
+          <a:ext cx="0" cy="0"/>
+          <a:chOff x="0" y="0"/>
+          <a:chExt cx="0" cy="0"/>
+        </a:xfrm>
+      </p:grpSpPr>
+      <p:sp>
+        <p:nvSpPr>
+          <p:cNvPr id="2" name="Rectangle 1"/>
+          <p:cNvSpPr/>
+          <p:nvPr/>
+        </p:nvSpPr>
+        <p:spPr>
+          <a:xfrm>
+            <a:off x="173844" y="399249"/>
+            <a:ext cx="8686800" cy="4247317"/>
+          </a:xfrm>
+          <a:prstGeom prst="rect">
+            <a:avLst/>
+          </a:prstGeom>
+        </p:spPr>
+        <p:txBody>
+          <a:bodyPr>
+            <a:spAutoFit/>
+          </a:bodyPr>
+          <a:lstStyle/>
+          <a:p>
+            <a:pPr marL="457200" marR="0" indent="-457200">
+              <a:spcBef>
+                <a:spcPts val="0"/>
+              </a:spcBef>
+              <a:spcAft>
+                <a:spcPts val="0"/>
+              </a:spcAft>
+            </a:pPr>
+            <a:r>
+              <a:rPr lang="en-US" dirty="0" err="1" smtClean="0">
+                <a:latin typeface="Times New Roman"/>
+                <a:ea typeface="Calibri"/>
+                <a:cs typeface="Times New Roman"/>
+              </a:rPr>
+              <a:t>Raut</a:t>
+            </a:r>
+            <a:r>
+              <a:rPr lang="en-US" dirty="0">
+                <a:latin typeface="Times New Roman"/>
+                <a:ea typeface="Calibri"/>
+                <a:cs typeface="Times New Roman"/>
+              </a:rPr>
+              <a:t>, R. D., </a:t>
+            </a:r>
+            <a:r>
+              <a:rPr lang="en-US" dirty="0" err="1">
+                <a:latin typeface="Times New Roman"/>
+                <a:ea typeface="Calibri"/>
+                <a:cs typeface="Times New Roman"/>
+              </a:rPr>
+              <a:t>Priyadarshinee</a:t>
+            </a:r>
+            <a:r>
+              <a:rPr lang="en-US" dirty="0">
+                <a:latin typeface="Times New Roman"/>
+                <a:ea typeface="Calibri"/>
+                <a:cs typeface="Times New Roman"/>
+              </a:rPr>
+              <a:t>, P., </a:t>
+            </a:r>
+            <a:r>
+              <a:rPr lang="en-US" dirty="0" err="1">
+                <a:latin typeface="Times New Roman"/>
+                <a:ea typeface="Calibri"/>
+                <a:cs typeface="Times New Roman"/>
+              </a:rPr>
+              <a:t>Gardas</a:t>
+            </a:r>
+            <a:r>
+              <a:rPr lang="en-US" dirty="0">
+                <a:latin typeface="Times New Roman"/>
+                <a:ea typeface="Calibri"/>
+                <a:cs typeface="Times New Roman"/>
+              </a:rPr>
+              <a:t>, B. B., &amp; </a:t>
+            </a:r>
+            <a:r>
+              <a:rPr lang="en-US" dirty="0" err="1">
+                <a:latin typeface="Times New Roman"/>
+                <a:ea typeface="Calibri"/>
+                <a:cs typeface="Times New Roman"/>
+              </a:rPr>
+              <a:t>Jha</a:t>
+            </a:r>
+            <a:r>
+              <a:rPr lang="en-US" dirty="0">
+                <a:latin typeface="Times New Roman"/>
+                <a:ea typeface="Calibri"/>
+                <a:cs typeface="Times New Roman"/>
+              </a:rPr>
+              <a:t>, M. K. (2018). Analyzing the factors influencing cloud computing adoption using three stage hybrid SEM-ANN-ISM (SEANIS) approach. </a:t>
+            </a:r>
+            <a:r>
+              <a:rPr lang="en-US" i="1" dirty="0">
+                <a:latin typeface="Times New Roman"/>
+                <a:ea typeface="Calibri"/>
+                <a:cs typeface="Times New Roman"/>
+              </a:rPr>
+              <a:t>Technological Forecasting &amp; Social Change</a:t>
+            </a:r>
+            <a:r>
+              <a:rPr lang="en-US" dirty="0">
+                <a:latin typeface="Times New Roman"/>
+                <a:ea typeface="Calibri"/>
+                <a:cs typeface="Times New Roman"/>
+              </a:rPr>
+              <a:t>, 134, 98–123. https://doi.org/10.1016/j.techfore.2018.05.020</a:t>
+            </a:r>
+            <a:endParaRPr lang="en-US" sz="1600" dirty="0">
+              <a:ea typeface="Calibri"/>
+              <a:cs typeface="Times New Roman"/>
+            </a:endParaRPr>
+          </a:p>
+          <a:p>
+            <a:pPr marL="457200" marR="0" indent="-457200">
+              <a:spcBef>
+                <a:spcPts val="0"/>
+              </a:spcBef>
+              <a:spcAft>
+                <a:spcPts val="0"/>
+              </a:spcAft>
+            </a:pPr>
+            <a:r>
+              <a:rPr lang="en-US" dirty="0">
+                <a:latin typeface="Times New Roman"/>
+                <a:ea typeface="Calibri"/>
+                <a:cs typeface="Times New Roman"/>
+              </a:rPr>
+              <a:t>Sharma, P., &amp; </a:t>
+            </a:r>
+            <a:r>
+              <a:rPr lang="en-US" dirty="0" err="1">
+                <a:latin typeface="Times New Roman"/>
+                <a:ea typeface="Calibri"/>
+                <a:cs typeface="Times New Roman"/>
+              </a:rPr>
+              <a:t>Tripathi</a:t>
+            </a:r>
+            <a:r>
+              <a:rPr lang="en-US" dirty="0">
+                <a:latin typeface="Times New Roman"/>
+                <a:ea typeface="Calibri"/>
+                <a:cs typeface="Times New Roman"/>
+              </a:rPr>
+              <a:t>, R. C. (2017). Patent citation: A technique for measuring the knowledge flow of information and innovation. </a:t>
+            </a:r>
+            <a:r>
+              <a:rPr lang="en-US" i="1" dirty="0">
+                <a:latin typeface="Times New Roman"/>
+                <a:ea typeface="Calibri"/>
+                <a:cs typeface="Times New Roman"/>
+              </a:rPr>
+              <a:t>World Patent Information</a:t>
+            </a:r>
+            <a:r>
+              <a:rPr lang="en-US" dirty="0">
+                <a:latin typeface="Times New Roman"/>
+                <a:ea typeface="Calibri"/>
+                <a:cs typeface="Times New Roman"/>
+              </a:rPr>
+              <a:t>, 51, 31–42. https://</a:t>
+            </a:r>
+            <a:r>
+              <a:rPr lang="en-US" dirty="0" smtClean="0">
+                <a:latin typeface="Times New Roman"/>
+                <a:ea typeface="Calibri"/>
+                <a:cs typeface="Times New Roman"/>
+              </a:rPr>
+              <a:t>doi.org/10.1016/j.wpi.2017.11.002</a:t>
+            </a:r>
+          </a:p>
+          <a:p>
+            <a:pPr marL="457200" marR="0" indent="-457200">
+              <a:spcBef>
+                <a:spcPts val="0"/>
+              </a:spcBef>
+              <a:spcAft>
+                <a:spcPts val="0"/>
+              </a:spcAft>
+            </a:pPr>
+            <a:r>
+              <a:rPr lang="en-US" dirty="0">
+                <a:latin typeface="Times New Roman" panose="02020603050405020304" pitchFamily="18" charset="0"/>
+                <a:cs typeface="Times New Roman" panose="02020603050405020304" pitchFamily="18" charset="0"/>
+              </a:rPr>
+              <a:t>Tseng, A</a:t>
+            </a:r>
+            <a:r>
+              <a:rPr lang="en-US" dirty="0" smtClean="0">
+                <a:latin typeface="Times New Roman" panose="02020603050405020304" pitchFamily="18" charset="0"/>
+                <a:cs typeface="Times New Roman" panose="02020603050405020304" pitchFamily="18" charset="0"/>
+              </a:rPr>
+              <a:t>. </a:t>
+            </a:r>
+            <a:r>
+              <a:rPr lang="en-US" dirty="0">
+                <a:latin typeface="Times New Roman" panose="02020603050405020304" pitchFamily="18" charset="0"/>
+                <a:cs typeface="Times New Roman" panose="02020603050405020304" pitchFamily="18" charset="0"/>
+              </a:rPr>
+              <a:t>&amp; </a:t>
+            </a:r>
+            <a:r>
+              <a:rPr lang="en-US" dirty="0" err="1">
+                <a:latin typeface="Times New Roman" panose="02020603050405020304" pitchFamily="18" charset="0"/>
+                <a:cs typeface="Times New Roman" panose="02020603050405020304" pitchFamily="18" charset="0"/>
+              </a:rPr>
+              <a:t>Raudensky</a:t>
+            </a:r>
+            <a:r>
+              <a:rPr lang="en-US" dirty="0">
+                <a:latin typeface="Times New Roman" panose="02020603050405020304" pitchFamily="18" charset="0"/>
+                <a:cs typeface="Times New Roman" panose="02020603050405020304" pitchFamily="18" charset="0"/>
+              </a:rPr>
+              <a:t>, M. (2014). Assessments of technology transfer activities of </a:t>
+            </a:r>
+            <a:r>
+              <a:rPr lang="en-US" dirty="0" smtClean="0">
+                <a:latin typeface="Times New Roman" panose="02020603050405020304" pitchFamily="18" charset="0"/>
+                <a:cs typeface="Times New Roman" panose="02020603050405020304" pitchFamily="18" charset="0"/>
+              </a:rPr>
+              <a:t>U.S. </a:t>
+            </a:r>
+            <a:r>
+              <a:rPr lang="en-US" dirty="0">
+                <a:latin typeface="Times New Roman" panose="02020603050405020304" pitchFamily="18" charset="0"/>
+                <a:cs typeface="Times New Roman" panose="02020603050405020304" pitchFamily="18" charset="0"/>
+              </a:rPr>
+              <a:t>universities and associated impact of Bayh-Dole Act. </a:t>
+            </a:r>
+            <a:r>
+              <a:rPr lang="en-US" i="1" dirty="0" err="1">
+                <a:latin typeface="Times New Roman" panose="02020603050405020304" pitchFamily="18" charset="0"/>
+                <a:cs typeface="Times New Roman" panose="02020603050405020304" pitchFamily="18" charset="0"/>
+              </a:rPr>
+              <a:t>Scientometrics</a:t>
+            </a:r>
+            <a:r>
+              <a:rPr lang="en-US" i="1" dirty="0">
+                <a:latin typeface="Times New Roman" panose="02020603050405020304" pitchFamily="18" charset="0"/>
+                <a:cs typeface="Times New Roman" panose="02020603050405020304" pitchFamily="18" charset="0"/>
+              </a:rPr>
+              <a:t>, 101</a:t>
+            </a:r>
+            <a:r>
+              <a:rPr lang="en-US" dirty="0">
+                <a:latin typeface="Times New Roman" panose="02020603050405020304" pitchFamily="18" charset="0"/>
+                <a:cs typeface="Times New Roman" panose="02020603050405020304" pitchFamily="18" charset="0"/>
+              </a:rPr>
+              <a:t>(3), 1851-1869. </a:t>
+            </a:r>
+            <a:endParaRPr lang="en-US" dirty="0">
+              <a:latin typeface="Times New Roman" panose="02020603050405020304" pitchFamily="18" charset="0"/>
+              <a:ea typeface="Calibri"/>
+              <a:cs typeface="Times New Roman" panose="02020603050405020304" pitchFamily="18" charset="0"/>
+            </a:endParaRPr>
+          </a:p>
+          <a:p>
+            <a:pPr marL="457200" indent="-457200"/>
+            <a:r>
+              <a:rPr lang="en-US" dirty="0">
+                <a:latin typeface="Times New Roman"/>
+                <a:ea typeface="Calibri"/>
+                <a:cs typeface="Times New Roman"/>
+              </a:rPr>
+              <a:t>United Nations. (2017). </a:t>
+            </a:r>
+            <a:r>
+              <a:rPr lang="en-US" i="1" dirty="0">
+                <a:latin typeface="Times New Roman"/>
+                <a:ea typeface="Calibri"/>
+                <a:cs typeface="Times New Roman"/>
+              </a:rPr>
+              <a:t>GDP and its breakdown at current prices in U.S. dollars</a:t>
+            </a:r>
+            <a:r>
+              <a:rPr lang="en-US" dirty="0">
+                <a:latin typeface="Times New Roman"/>
+                <a:ea typeface="Calibri"/>
+                <a:cs typeface="Times New Roman"/>
+              </a:rPr>
+              <a:t> [Data file]. Retrieved from http://unstats.un.org/unsd/snaama/dnltransfer.asp?fID=2</a:t>
+            </a:r>
+            <a:endParaRPr lang="en-US" sz="1600" dirty="0">
+              <a:ea typeface="Calibri"/>
+              <a:cs typeface="Times New Roman"/>
+            </a:endParaRPr>
+          </a:p>
+          <a:p>
+            <a:pPr marL="457200" marR="0" indent="-457200">
+              <a:spcBef>
+                <a:spcPts val="0"/>
+              </a:spcBef>
+              <a:spcAft>
+                <a:spcPts val="0"/>
+              </a:spcAft>
+            </a:pPr>
+            <a:r>
+              <a:rPr lang="en-US" dirty="0" err="1" smtClean="0">
+                <a:latin typeface="Times New Roman"/>
+                <a:ea typeface="Calibri"/>
+                <a:cs typeface="Times New Roman"/>
+              </a:rPr>
+              <a:t>Vagnani</a:t>
+            </a:r>
+            <a:r>
+              <a:rPr lang="en-US" dirty="0">
+                <a:latin typeface="Times New Roman"/>
+                <a:ea typeface="Calibri"/>
+                <a:cs typeface="Times New Roman"/>
+              </a:rPr>
+              <a:t>, G., &amp; Volpe, L. (2017). Innovation attributes and managers’ decisions about the adoption of innovations in organizations: A meta-analytical review. </a:t>
+            </a:r>
+            <a:r>
+              <a:rPr lang="en-US" i="1" dirty="0">
+                <a:latin typeface="Times New Roman"/>
+                <a:ea typeface="Calibri"/>
+                <a:cs typeface="Times New Roman"/>
+              </a:rPr>
+              <a:t>International Journal of Innovation Studies</a:t>
+            </a:r>
+            <a:r>
+              <a:rPr lang="en-US" dirty="0">
+                <a:latin typeface="Times New Roman"/>
+                <a:ea typeface="Calibri"/>
+                <a:cs typeface="Times New Roman"/>
+              </a:rPr>
+              <a:t>, 1, 107–133. https://</a:t>
+            </a:r>
+            <a:r>
+              <a:rPr lang="en-US" dirty="0" smtClean="0">
+                <a:latin typeface="Times New Roman"/>
+                <a:ea typeface="Calibri"/>
+                <a:cs typeface="Times New Roman"/>
+              </a:rPr>
+              <a:t>doi.org/10.1016/j.ijis.2017.10.001</a:t>
+            </a:r>
+            <a:endParaRPr lang="en-US" sz="1600" dirty="0" smtClean="0">
+              <a:ea typeface="Calibri"/>
+              <a:cs typeface="Times New Roman"/>
+            </a:endParaRPr>
+          </a:p>
+        </p:txBody>
+      </p:sp>
+      <p:sp>
+        <p:nvSpPr>
+          <p:cNvPr id="3" name="TextBox 2"/>
+          <p:cNvSpPr txBox="1"/>
+          <p:nvPr/>
+        </p:nvSpPr>
+        <p:spPr>
+          <a:xfrm>
+            <a:off x="0" y="7136"/>
+            <a:ext cx="9144000" cy="369332"/>
+          </a:xfrm>
+          <a:prstGeom prst="rect">
+            <a:avLst/>
+          </a:prstGeom>
+          <a:noFill/>
+        </p:spPr>
+        <p:txBody>
+          <a:bodyPr wrap="square" rtlCol="0">
+            <a:spAutoFit/>
+          </a:bodyPr>
+          <a:lstStyle/>
+          <a:p>
+            <a:pPr algn="ctr"/>
+            <a:r>
+              <a:rPr lang="en-US" dirty="0" smtClean="0">
+                <a:latin typeface="Times New Roman" panose="02020603050405020304" pitchFamily="18" charset="0"/>
+                <a:cs typeface="Times New Roman" panose="02020603050405020304" pitchFamily="18" charset="0"/>
+              </a:rPr>
+              <a:t>References</a:t>
+            </a:r>
+            <a:endParaRPr lang="en-US" dirty="0">
+              <a:latin typeface="Times New Roman" panose="02020603050405020304" pitchFamily="18" charset="0"/>
+              <a:cs typeface="Times New Roman" panose="02020603050405020304" pitchFamily="18" charset="0"/>
+            </a:endParaRPr>
+          </a:p>
+        </p:txBody>
+      </p:sp>
+    </p:spTree>
+    <p:extLst>
+      <p:ext uri="{BB962C8B-B14F-4D97-AF65-F5344CB8AC3E}">
+        <p14:creationId xmlns:p14="http://schemas.microsoft.com/office/powerpoint/2010/main" val="3125866011"/>
+      </p:ext>
+    </p:extLst>
+  </p:cSld>
+  <p:clrMapOvr>
+    <a:masterClrMapping/>
+  </p:clrMapOvr>
+  <p:timing>
+    <p:tnLst>
+      <p:par>
+        <p:cTn id="1" dur="indefinite" restart="never" nodeType="tmRoot"/>
+      </p:par>
+    </p:tnLst>
+  </p:timing>
+</p:sld>
+</file>
+
+<file path=ppt/slides/slide31.xml><?xml version="1.0" encoding="utf-8"?>
+<p:sld xmlns:a="http://schemas.openxmlformats.org/drawingml/2006/main" xmlns:r="http://schemas.openxmlformats.org/officeDocument/2006/relationships" xmlns:p="http://schemas.openxmlformats.org/presentationml/2006/main">
+  <p:cSld>
+    <p:spTree>
+      <p:nvGrpSpPr>
+        <p:cNvPr id="1" name=""/>
+        <p:cNvGrpSpPr/>
+        <p:nvPr/>
+      </p:nvGrpSpPr>
+      <p:grpSpPr>
+        <a:xfrm>
+          <a:off x="0" y="0"/>
+          <a:ext cx="0" cy="0"/>
+          <a:chOff x="0" y="0"/>
+          <a:chExt cx="0" cy="0"/>
+        </a:xfrm>
+      </p:grpSpPr>
+      <p:sp>
+        <p:nvSpPr>
+          <p:cNvPr id="2" name="Rectangle 1"/>
+          <p:cNvSpPr/>
+          <p:nvPr/>
+        </p:nvSpPr>
+        <p:spPr>
+          <a:xfrm>
+            <a:off x="173844" y="399249"/>
+            <a:ext cx="8686800" cy="2031325"/>
+          </a:xfrm>
+          <a:prstGeom prst="rect">
+            <a:avLst/>
+          </a:prstGeom>
+        </p:spPr>
+        <p:txBody>
+          <a:bodyPr>
+            <a:spAutoFit/>
+          </a:bodyPr>
+          <a:lstStyle/>
+          <a:p>
+            <a:pPr marL="457200" marR="0" indent="-457200">
+              <a:spcBef>
+                <a:spcPts val="0"/>
+              </a:spcBef>
+              <a:spcAft>
+                <a:spcPts val="0"/>
+              </a:spcAft>
+            </a:pPr>
+            <a:r>
+              <a:rPr lang="en-US" dirty="0" smtClean="0">
+                <a:latin typeface="Times New Roman"/>
+                <a:ea typeface="Calibri"/>
+                <a:cs typeface="Times New Roman"/>
+              </a:rPr>
+              <a:t>Yan</a:t>
+            </a:r>
+            <a:r>
+              <a:rPr lang="en-US" dirty="0">
+                <a:latin typeface="Times New Roman"/>
+                <a:ea typeface="Calibri"/>
+                <a:cs typeface="Times New Roman"/>
+              </a:rPr>
+              <a:t>, E., &amp; Yu, Q. (2016). Using path-based approaches to examine the dynamic structure of discipline-level citation networks: 1997-2011. </a:t>
+            </a:r>
+            <a:r>
+              <a:rPr lang="en-US" i="1" dirty="0">
+                <a:latin typeface="Times New Roman"/>
+                <a:ea typeface="Calibri"/>
+                <a:cs typeface="Times New Roman"/>
+              </a:rPr>
+              <a:t>Journal of the Association for Information Science &amp; Technology</a:t>
+            </a:r>
+            <a:r>
+              <a:rPr lang="en-US" dirty="0">
+                <a:latin typeface="Times New Roman"/>
+                <a:ea typeface="Calibri"/>
+                <a:cs typeface="Times New Roman"/>
+              </a:rPr>
+              <a:t>, 67(8), 1943–1955. https://</a:t>
+            </a:r>
+            <a:r>
+              <a:rPr lang="en-US" dirty="0" smtClean="0">
+                <a:latin typeface="Times New Roman"/>
+                <a:ea typeface="Calibri"/>
+                <a:cs typeface="Times New Roman"/>
+              </a:rPr>
+              <a:t>doi.org/10.1002/asi.23516</a:t>
+            </a:r>
+          </a:p>
+          <a:p>
+            <a:pPr marL="457200" marR="0" indent="-457200">
+              <a:spcBef>
+                <a:spcPts val="0"/>
+              </a:spcBef>
+              <a:spcAft>
+                <a:spcPts val="0"/>
+              </a:spcAft>
+            </a:pPr>
+            <a:r>
+              <a:rPr lang="en-US" dirty="0" err="1">
+                <a:latin typeface="Times New Roman" panose="02020603050405020304" pitchFamily="18" charset="0"/>
+                <a:ea typeface="Calibri"/>
+                <a:cs typeface="Times New Roman" panose="02020603050405020304" pitchFamily="18" charset="0"/>
+              </a:rPr>
+              <a:t>Yoshikane</a:t>
+            </a:r>
+            <a:r>
+              <a:rPr lang="en-US" dirty="0">
+                <a:latin typeface="Times New Roman" panose="02020603050405020304" pitchFamily="18" charset="0"/>
+                <a:ea typeface="Calibri"/>
+                <a:cs typeface="Times New Roman" panose="02020603050405020304" pitchFamily="18" charset="0"/>
+              </a:rPr>
+              <a:t>, F. (2013). Multiple regression analysis of a patent’s citation frequency and quantitative characteristics: the case of Japanese patents. </a:t>
+            </a:r>
+            <a:r>
+              <a:rPr lang="en-US" i="1" dirty="0" err="1">
+                <a:latin typeface="Times New Roman" panose="02020603050405020304" pitchFamily="18" charset="0"/>
+                <a:ea typeface="Calibri"/>
+                <a:cs typeface="Times New Roman" panose="02020603050405020304" pitchFamily="18" charset="0"/>
+              </a:rPr>
+              <a:t>Scientometrics</a:t>
+            </a:r>
+            <a:r>
+              <a:rPr lang="en-US" dirty="0">
+                <a:latin typeface="Times New Roman" panose="02020603050405020304" pitchFamily="18" charset="0"/>
+                <a:ea typeface="Calibri"/>
+                <a:cs typeface="Times New Roman" panose="02020603050405020304" pitchFamily="18" charset="0"/>
+              </a:rPr>
+              <a:t>, </a:t>
+            </a:r>
+            <a:r>
+              <a:rPr lang="en-US" i="1" dirty="0">
+                <a:latin typeface="Times New Roman" panose="02020603050405020304" pitchFamily="18" charset="0"/>
+                <a:ea typeface="Calibri"/>
+                <a:cs typeface="Times New Roman" panose="02020603050405020304" pitchFamily="18" charset="0"/>
+              </a:rPr>
+              <a:t>96</a:t>
+            </a:r>
+            <a:r>
+              <a:rPr lang="en-US" dirty="0">
+                <a:latin typeface="Times New Roman" panose="02020603050405020304" pitchFamily="18" charset="0"/>
+                <a:ea typeface="Calibri"/>
+                <a:cs typeface="Times New Roman" panose="02020603050405020304" pitchFamily="18" charset="0"/>
+              </a:rPr>
+              <a:t>(1), 365–379. https://</a:t>
+            </a:r>
+            <a:r>
+              <a:rPr lang="en-US" dirty="0" smtClean="0">
+                <a:latin typeface="Times New Roman" panose="02020603050405020304" pitchFamily="18" charset="0"/>
+                <a:ea typeface="Calibri"/>
+                <a:cs typeface="Times New Roman" panose="02020603050405020304" pitchFamily="18" charset="0"/>
+              </a:rPr>
+              <a:t>doi.org/10.1007/s11192-013-0953-4</a:t>
+            </a:r>
+            <a:endParaRPr lang="en-US" dirty="0">
+              <a:latin typeface="Times New Roman" panose="02020603050405020304" pitchFamily="18" charset="0"/>
+              <a:ea typeface="Calibri"/>
+              <a:cs typeface="Times New Roman" panose="02020603050405020304" pitchFamily="18" charset="0"/>
+            </a:endParaRPr>
+          </a:p>
+        </p:txBody>
+      </p:sp>
+      <p:sp>
+        <p:nvSpPr>
+          <p:cNvPr id="3" name="TextBox 2"/>
+          <p:cNvSpPr txBox="1"/>
+          <p:nvPr/>
+        </p:nvSpPr>
+        <p:spPr>
+          <a:xfrm>
+            <a:off x="0" y="7136"/>
+            <a:ext cx="9144000" cy="369332"/>
+          </a:xfrm>
+          <a:prstGeom prst="rect">
+            <a:avLst/>
+          </a:prstGeom>
+          <a:noFill/>
+        </p:spPr>
+        <p:txBody>
+          <a:bodyPr wrap="square" rtlCol="0">
+            <a:spAutoFit/>
+          </a:bodyPr>
+          <a:lstStyle/>
+          <a:p>
+            <a:pPr algn="ctr"/>
+            <a:r>
+              <a:rPr lang="en-US" dirty="0" smtClean="0">
+                <a:latin typeface="Times New Roman" panose="02020603050405020304" pitchFamily="18" charset="0"/>
+                <a:cs typeface="Times New Roman" panose="02020603050405020304" pitchFamily="18" charset="0"/>
+              </a:rPr>
+              <a:t>References</a:t>
+            </a:r>
+            <a:endParaRPr lang="en-US" dirty="0">
+              <a:latin typeface="Times New Roman" panose="02020603050405020304" pitchFamily="18" charset="0"/>
+              <a:cs typeface="Times New Roman" panose="02020603050405020304" pitchFamily="18" charset="0"/>
+            </a:endParaRPr>
+          </a:p>
+        </p:txBody>
+      </p:sp>
+    </p:spTree>
+    <p:extLst>
+      <p:ext uri="{BB962C8B-B14F-4D97-AF65-F5344CB8AC3E}">
+        <p14:creationId xmlns:p14="http://schemas.microsoft.com/office/powerpoint/2010/main" val="4270090173"/>
+      </p:ext>
+    </p:extLst>
+  </p:cSld>
+  <p:clrMapOvr>
+    <a:masterClrMapping/>
+  </p:clrMapOvr>
+  <p:timing>
+    <p:tnLst>
+      <p:par>
+        <p:cTn id="1" dur="indefinite" restart="never" nodeType="tmRoot"/>
+      </p:par>
+    </p:tnLst>
+  </p:timing>
+</p:sld>
+</file>
+
 <file path=ppt/slides/slide4.xml><?xml version="1.0" encoding="utf-8"?>
+<p:sld xmlns:a="http://schemas.openxmlformats.org/drawingml/2006/main" xmlns:r="http://schemas.openxmlformats.org/officeDocument/2006/relationships" xmlns:p="http://schemas.openxmlformats.org/presentationml/2006/main">
+  <p:cSld>
+    <p:spTree>
+      <p:nvGrpSpPr>
+        <p:cNvPr id="1" name=""/>
+        <p:cNvGrpSpPr/>
+        <p:nvPr/>
+      </p:nvGrpSpPr>
+      <p:grpSpPr>
+        <a:xfrm>
+          <a:off x="0" y="0"/>
+          <a:ext cx="0" cy="0"/>
+          <a:chOff x="0" y="0"/>
+          <a:chExt cx="0" cy="0"/>
+        </a:xfrm>
+      </p:grpSpPr>
+      <p:sp>
+        <p:nvSpPr>
+          <p:cNvPr id="2" name="Rectangle 1"/>
+          <p:cNvSpPr/>
+          <p:nvPr/>
+        </p:nvSpPr>
+        <p:spPr>
+          <a:xfrm>
+            <a:off x="0" y="1204436"/>
+            <a:ext cx="9144000" cy="4278094"/>
+          </a:xfrm>
+          <a:prstGeom prst="rect">
+            <a:avLst/>
+          </a:prstGeom>
+        </p:spPr>
+        <p:txBody>
+          <a:bodyPr wrap="square">
+            <a:spAutoFit/>
+          </a:bodyPr>
+          <a:lstStyle/>
+          <a:p>
+            <a:pPr marL="457200" indent="-457200">
+              <a:spcAft>
+                <a:spcPts val="1200"/>
+              </a:spcAft>
+            </a:pPr>
+            <a:r>
+              <a:rPr lang="en-US" b="1" dirty="0"/>
+              <a:t>Anderson, </a:t>
+            </a:r>
+            <a:r>
+              <a:rPr lang="en-US" b="1" dirty="0" err="1"/>
+              <a:t>Daim</a:t>
+            </a:r>
+            <a:r>
+              <a:rPr lang="en-US" b="1" dirty="0"/>
+              <a:t> &amp; Lavoie (2007) </a:t>
+            </a:r>
+            <a:r>
+              <a:rPr lang="en-US" dirty="0" smtClean="0"/>
+              <a:t/>
+            </a:r>
+            <a:br>
+              <a:rPr lang="en-US" dirty="0" smtClean="0"/>
+            </a:br>
+            <a:r>
+              <a:rPr lang="en-US" dirty="0" smtClean="0"/>
+              <a:t>Used an approach based on data envelopment analysis (DEA) to evaluate University Technology Transfer (UTT) productivity.  Their study </a:t>
+            </a:r>
+            <a:r>
+              <a:rPr lang="en-US" u="sng" dirty="0" smtClean="0"/>
+              <a:t>included </a:t>
+            </a:r>
+            <a:r>
+              <a:rPr lang="en-US" u="sng" dirty="0"/>
+              <a:t>patent applications and patents allowed as outputs</a:t>
+            </a:r>
+            <a:r>
+              <a:rPr lang="en-US" dirty="0"/>
+              <a:t>. </a:t>
+            </a:r>
+            <a:endParaRPr lang="en-US" dirty="0" smtClean="0"/>
+          </a:p>
+          <a:p>
+            <a:pPr marL="457200" indent="-457200">
+              <a:spcAft>
+                <a:spcPts val="1200"/>
+              </a:spcAft>
+            </a:pPr>
+            <a:r>
+              <a:rPr lang="en-US" b="1" dirty="0"/>
+              <a:t>Choi, Jang, Jun &amp; Park (2015) </a:t>
+            </a:r>
+            <a:r>
+              <a:rPr lang="en-US" u="sng" dirty="0"/>
+              <a:t/>
+            </a:r>
+            <a:br>
+              <a:rPr lang="en-US" u="sng" dirty="0"/>
+            </a:br>
+            <a:r>
+              <a:rPr lang="en-US" dirty="0"/>
+              <a:t>Developed a predictive model based on patent analysis for evaluating the transfer potential of a technology and determining the relationship between technology transfer and a range of patent data variables.  Their study included a </a:t>
+            </a:r>
+            <a:r>
+              <a:rPr lang="en-US" u="sng" dirty="0"/>
+              <a:t>multiple regression analysis</a:t>
+            </a:r>
+            <a:r>
+              <a:rPr lang="en-US" dirty="0"/>
+              <a:t>.  Three of the four models they developed </a:t>
+            </a:r>
+            <a:r>
+              <a:rPr lang="en-US" u="sng" dirty="0"/>
+              <a:t>included patent citation variables as statistically significant contributors</a:t>
+            </a:r>
+            <a:r>
+              <a:rPr lang="en-US" dirty="0"/>
+              <a:t>. </a:t>
+            </a:r>
+          </a:p>
+          <a:p>
+            <a:pPr marL="457200" indent="-457200">
+              <a:spcAft>
+                <a:spcPts val="1200"/>
+              </a:spcAft>
+            </a:pPr>
+            <a:r>
+              <a:rPr lang="en-US" b="1" dirty="0" smtClean="0"/>
+              <a:t>Ho</a:t>
+            </a:r>
+            <a:r>
+              <a:rPr lang="en-US" b="1" dirty="0"/>
+              <a:t>, Liu, Lu &amp; Huang (2014) </a:t>
+            </a:r>
+            <a:r>
+              <a:rPr lang="en-US" dirty="0" smtClean="0"/>
+              <a:t/>
+            </a:r>
+            <a:br>
+              <a:rPr lang="en-US" dirty="0" smtClean="0"/>
+            </a:br>
+            <a:r>
+              <a:rPr lang="en-US" dirty="0" smtClean="0"/>
+              <a:t>Investigated </a:t>
+            </a:r>
+            <a:r>
+              <a:rPr lang="en-US" dirty="0"/>
+              <a:t>the efficiency of UTT in different stages of the technology transfer process.  Their approach included </a:t>
+            </a:r>
+            <a:r>
+              <a:rPr lang="en-US" u="sng" dirty="0"/>
+              <a:t>patent applications and patents allowed among the intermediate input factors</a:t>
+            </a:r>
+            <a:r>
+              <a:rPr lang="en-US" dirty="0"/>
+              <a:t> in a two-stage, networked-based DEA model</a:t>
+            </a:r>
+            <a:r>
+              <a:rPr lang="en-US" dirty="0" smtClean="0"/>
+              <a:t>.</a:t>
+            </a:r>
+          </a:p>
+        </p:txBody>
+      </p:sp>
+      <p:sp>
+        <p:nvSpPr>
+          <p:cNvPr id="3" name="TextBox 2"/>
+          <p:cNvSpPr txBox="1"/>
+          <p:nvPr/>
+        </p:nvSpPr>
+        <p:spPr>
+          <a:xfrm>
+            <a:off x="0" y="365760"/>
+            <a:ext cx="9144000" cy="523220"/>
+          </a:xfrm>
+          <a:prstGeom prst="rect">
+            <a:avLst/>
+          </a:prstGeom>
+          <a:noFill/>
+        </p:spPr>
+        <p:txBody>
+          <a:bodyPr wrap="square" rtlCol="0">
+            <a:spAutoFit/>
+          </a:bodyPr>
+          <a:lstStyle/>
+          <a:p>
+            <a:pPr algn="ctr"/>
+            <a:r>
+              <a:rPr lang="en-US" sz="2800" b="1" dirty="0" smtClean="0"/>
+              <a:t>Literature Review</a:t>
+            </a:r>
+            <a:endParaRPr lang="en-US" sz="2800" b="1" dirty="0"/>
+          </a:p>
+        </p:txBody>
+      </p:sp>
+    </p:spTree>
+    <p:extLst>
+      <p:ext uri="{BB962C8B-B14F-4D97-AF65-F5344CB8AC3E}">
+        <p14:creationId xmlns:p14="http://schemas.microsoft.com/office/powerpoint/2010/main" val="210183458"/>
+      </p:ext>
+    </p:extLst>
+  </p:cSld>
+  <p:clrMapOvr>
+    <a:masterClrMapping/>
+  </p:clrMapOvr>
+</p:sld>
+</file>
+
+<file path=ppt/slides/slide5.xml><?xml version="1.0" encoding="utf-8"?>
+<p:sld xmlns:a="http://schemas.openxmlformats.org/drawingml/2006/main" xmlns:r="http://schemas.openxmlformats.org/officeDocument/2006/relationships" xmlns:p="http://schemas.openxmlformats.org/presentationml/2006/main">
+  <p:cSld>
+    <p:spTree>
+      <p:nvGrpSpPr>
+        <p:cNvPr id="1" name=""/>
+        <p:cNvGrpSpPr/>
+        <p:nvPr/>
+      </p:nvGrpSpPr>
+      <p:grpSpPr>
+        <a:xfrm>
+          <a:off x="0" y="0"/>
+          <a:ext cx="0" cy="0"/>
+          <a:chOff x="0" y="0"/>
+          <a:chExt cx="0" cy="0"/>
+        </a:xfrm>
+      </p:grpSpPr>
+      <p:sp>
+        <p:nvSpPr>
+          <p:cNvPr id="2" name="Rectangle 1"/>
+          <p:cNvSpPr/>
+          <p:nvPr/>
+        </p:nvSpPr>
+        <p:spPr>
+          <a:xfrm>
+            <a:off x="0" y="1204436"/>
+            <a:ext cx="9144000" cy="3170099"/>
+          </a:xfrm>
+          <a:prstGeom prst="rect">
+            <a:avLst/>
+          </a:prstGeom>
+        </p:spPr>
+        <p:txBody>
+          <a:bodyPr wrap="square">
+            <a:spAutoFit/>
+          </a:bodyPr>
+          <a:lstStyle/>
+          <a:p>
+            <a:pPr marL="457200" indent="-457200">
+              <a:spcAft>
+                <a:spcPts val="1200"/>
+              </a:spcAft>
+            </a:pPr>
+            <a:r>
+              <a:rPr lang="en-US" b="1" dirty="0" smtClean="0"/>
+              <a:t>Ji</a:t>
+            </a:r>
+            <a:r>
+              <a:rPr lang="en-US" b="1" dirty="0"/>
+              <a:t>, Lim, &amp; Park (2016) </a:t>
+            </a:r>
+            <a:r>
+              <a:rPr lang="en-US" dirty="0"/>
+              <a:t/>
+            </a:r>
+            <a:br>
+              <a:rPr lang="en-US" dirty="0"/>
+            </a:br>
+            <a:r>
+              <a:rPr lang="en-US" dirty="0"/>
+              <a:t>Used </a:t>
+            </a:r>
+            <a:r>
+              <a:rPr lang="en-US" u="sng" dirty="0"/>
+              <a:t>patent citation data to identify</a:t>
+            </a:r>
+            <a:r>
+              <a:rPr lang="en-US" dirty="0"/>
+              <a:t> potential cases of </a:t>
+            </a:r>
+            <a:r>
+              <a:rPr lang="en-US" u="sng" dirty="0"/>
+              <a:t>technology transfer</a:t>
+            </a:r>
+            <a:r>
+              <a:rPr lang="en-US" dirty="0"/>
+              <a:t>.  </a:t>
+            </a:r>
+          </a:p>
+          <a:p>
+            <a:pPr marL="457200" indent="-457200">
+              <a:spcAft>
+                <a:spcPts val="1200"/>
+              </a:spcAft>
+            </a:pPr>
+            <a:r>
+              <a:rPr lang="en-US" b="1" dirty="0" err="1" smtClean="0"/>
+              <a:t>Markman</a:t>
+            </a:r>
+            <a:r>
+              <a:rPr lang="en-US" b="1" dirty="0" smtClean="0"/>
+              <a:t>, </a:t>
+            </a:r>
+            <a:r>
+              <a:rPr lang="en-US" b="1" dirty="0" err="1" smtClean="0"/>
+              <a:t>Gioniodis</a:t>
+            </a:r>
+            <a:r>
+              <a:rPr lang="en-US" b="1" dirty="0" smtClean="0"/>
+              <a:t> &amp; Phan </a:t>
+            </a:r>
+            <a:r>
+              <a:rPr lang="en-US" b="1" dirty="0"/>
+              <a:t>(</a:t>
+            </a:r>
+            <a:r>
+              <a:rPr lang="en-US" b="1" dirty="0" smtClean="0"/>
+              <a:t>2009) </a:t>
+            </a:r>
+            <a:r>
+              <a:rPr lang="en-US" dirty="0" smtClean="0"/>
+              <a:t/>
+            </a:r>
+            <a:br>
+              <a:rPr lang="en-US" dirty="0" smtClean="0"/>
+            </a:br>
+            <a:r>
+              <a:rPr lang="en-US" dirty="0" smtClean="0"/>
+              <a:t>Used </a:t>
+            </a:r>
+            <a:r>
+              <a:rPr lang="en-US" u="sng" dirty="0"/>
+              <a:t>hierarchical regression analysis to isolate various drivers of technology transfer</a:t>
+            </a:r>
+            <a:r>
+              <a:rPr lang="en-US" dirty="0"/>
+              <a:t>.  They found that several factors were associated with </a:t>
+            </a:r>
+            <a:r>
+              <a:rPr lang="en-US" u="sng" dirty="0"/>
+              <a:t>patent license income and university spin-out company formation</a:t>
+            </a:r>
+            <a:r>
+              <a:rPr lang="en-US" dirty="0"/>
+              <a:t>. However, their analysis indicated that </a:t>
+            </a:r>
+            <a:r>
+              <a:rPr lang="en-US" u="sng" dirty="0"/>
+              <a:t>patent data variables were either not significant or did not improve their existing model</a:t>
+            </a:r>
+            <a:r>
+              <a:rPr lang="en-US" dirty="0"/>
+              <a:t>.  </a:t>
+            </a:r>
+            <a:endParaRPr lang="en-US" dirty="0" smtClean="0"/>
+          </a:p>
+          <a:p>
+            <a:pPr marL="457200" indent="-457200">
+              <a:spcAft>
+                <a:spcPts val="1200"/>
+              </a:spcAft>
+            </a:pPr>
+            <a:r>
+              <a:rPr lang="en-US" b="1" dirty="0" smtClean="0"/>
+              <a:t>Sharma </a:t>
+            </a:r>
+            <a:r>
+              <a:rPr lang="en-US" b="1" dirty="0"/>
+              <a:t>(2017) </a:t>
+            </a:r>
+            <a:r>
+              <a:rPr lang="en-US" dirty="0" smtClean="0"/>
+              <a:t/>
+            </a:r>
+            <a:br>
+              <a:rPr lang="en-US" dirty="0" smtClean="0"/>
+            </a:br>
+            <a:r>
+              <a:rPr lang="en-US" dirty="0" smtClean="0"/>
+              <a:t>Conducted </a:t>
+            </a:r>
+            <a:r>
+              <a:rPr lang="en-US" dirty="0"/>
+              <a:t>a </a:t>
+            </a:r>
+            <a:r>
+              <a:rPr lang="en-US" u="sng" dirty="0"/>
+              <a:t>survey of patent citation analysis </a:t>
+            </a:r>
+            <a:r>
+              <a:rPr lang="en-US" dirty="0"/>
+              <a:t>and presented a methodology for generating patent citation networks. </a:t>
+            </a:r>
+            <a:endParaRPr lang="en-US" dirty="0"/>
+          </a:p>
+        </p:txBody>
+      </p:sp>
+      <p:sp>
+        <p:nvSpPr>
+          <p:cNvPr id="3" name="TextBox 2"/>
+          <p:cNvSpPr txBox="1"/>
+          <p:nvPr/>
+        </p:nvSpPr>
+        <p:spPr>
+          <a:xfrm>
+            <a:off x="0" y="365760"/>
+            <a:ext cx="9144000" cy="523220"/>
+          </a:xfrm>
+          <a:prstGeom prst="rect">
+            <a:avLst/>
+          </a:prstGeom>
+          <a:noFill/>
+        </p:spPr>
+        <p:txBody>
+          <a:bodyPr wrap="square" rtlCol="0">
+            <a:spAutoFit/>
+          </a:bodyPr>
+          <a:lstStyle/>
+          <a:p>
+            <a:pPr algn="ctr"/>
+            <a:r>
+              <a:rPr lang="en-US" sz="2800" b="1" dirty="0" smtClean="0"/>
+              <a:t>Literature Review</a:t>
+            </a:r>
+            <a:endParaRPr lang="en-US" sz="2800" b="1" dirty="0"/>
+          </a:p>
+        </p:txBody>
+      </p:sp>
+    </p:spTree>
+    <p:extLst>
+      <p:ext uri="{BB962C8B-B14F-4D97-AF65-F5344CB8AC3E}">
+        <p14:creationId xmlns:p14="http://schemas.microsoft.com/office/powerpoint/2010/main" val="2865847050"/>
+      </p:ext>
+    </p:extLst>
+  </p:cSld>
+  <p:clrMapOvr>
+    <a:masterClrMapping/>
+  </p:clrMapOvr>
+</p:sld>
+</file>
+
+<file path=ppt/slides/slide6.xml><?xml version="1.0" encoding="utf-8"?>
 <p:sld xmlns:a="http://schemas.openxmlformats.org/drawingml/2006/main" xmlns:r="http://schemas.openxmlformats.org/officeDocument/2006/relationships" xmlns:p="http://schemas.openxmlformats.org/presentationml/2006/main">
   <p:cSld>
     <p:spTree>
@@ -22111,7 +23600,7 @@
               </a:spcAft>
             </a:pPr>
             <a:r>
-              <a:rPr lang="en-US" dirty="0" smtClean="0"/>
+              <a:rPr lang="en-US" u="sng" dirty="0" smtClean="0"/>
               <a:t>Research Questions</a:t>
             </a:r>
           </a:p>
@@ -22123,15 +23612,7 @@
             </a:pPr>
             <a:r>
               <a:rPr lang="en-US" dirty="0" smtClean="0"/>
-              <a:t>1</a:t>
-            </a:r>
-            <a:r>
-              <a:rPr lang="en-US" dirty="0" smtClean="0"/>
-              <a:t>. 	</a:t>
-            </a:r>
-            <a:r>
-              <a:rPr lang="en-US" dirty="0" smtClean="0"/>
-              <a:t>Can </a:t>
+              <a:t>1. 	Can </a:t>
             </a:r>
             <a:r>
               <a:rPr lang="en-US" dirty="0"/>
@@ -22176,8 +23657,8 @@
         </p:nvSpPr>
         <p:spPr>
           <a:xfrm>
-            <a:off x="1343974" y="570663"/>
-            <a:ext cx="2103120" cy="1188720"/>
+            <a:off x="170246" y="570663"/>
+            <a:ext cx="2926080" cy="1188720"/>
           </a:xfrm>
           <a:prstGeom prst="rect">
             <a:avLst/>
@@ -22220,8 +23701,8 @@
         </p:nvSpPr>
         <p:spPr>
           <a:xfrm>
-            <a:off x="1343974" y="1813546"/>
-            <a:ext cx="2103120" cy="1188720"/>
+            <a:off x="170246" y="1813546"/>
+            <a:ext cx="2926080" cy="1188720"/>
           </a:xfrm>
           <a:prstGeom prst="rect">
             <a:avLst/>
@@ -22262,8 +23743,8 @@
         </p:nvSpPr>
         <p:spPr>
           <a:xfrm>
-            <a:off x="1343973" y="3056429"/>
-            <a:ext cx="2103120" cy="1188720"/>
+            <a:off x="170245" y="3056429"/>
+            <a:ext cx="2926080" cy="1188720"/>
           </a:xfrm>
           <a:prstGeom prst="rect">
             <a:avLst/>
@@ -22306,8 +23787,8 @@
         </p:nvSpPr>
         <p:spPr>
           <a:xfrm>
-            <a:off x="3520440" y="570663"/>
-            <a:ext cx="2103120" cy="1188720"/>
+            <a:off x="3138296" y="570663"/>
+            <a:ext cx="2926080" cy="1188720"/>
           </a:xfrm>
           <a:prstGeom prst="rect">
             <a:avLst/>
@@ -22364,8 +23845,8 @@
         </p:nvSpPr>
         <p:spPr>
           <a:xfrm>
-            <a:off x="3520440" y="1812223"/>
-            <a:ext cx="2103120" cy="1188720"/>
+            <a:off x="3138296" y="1812223"/>
+            <a:ext cx="2926080" cy="1188720"/>
           </a:xfrm>
           <a:prstGeom prst="rect">
             <a:avLst/>
@@ -22427,8 +23908,8 @@
         </p:nvSpPr>
         <p:spPr>
           <a:xfrm>
-            <a:off x="3520440" y="3056429"/>
-            <a:ext cx="2103120" cy="1188720"/>
+            <a:off x="3138296" y="3056429"/>
+            <a:ext cx="2926080" cy="1188720"/>
           </a:xfrm>
           <a:prstGeom prst="rect">
             <a:avLst/>
@@ -22478,8 +23959,8 @@
         </p:nvSpPr>
         <p:spPr>
           <a:xfrm>
-            <a:off x="5696907" y="570663"/>
-            <a:ext cx="2103120" cy="1188720"/>
+            <a:off x="6106347" y="570663"/>
+            <a:ext cx="2926080" cy="1188720"/>
           </a:xfrm>
           <a:prstGeom prst="rect">
             <a:avLst/>
@@ -22508,7 +23989,18 @@
             <a:pPr algn="ctr"/>
             <a:r>
               <a:rPr lang="en-US" dirty="0" smtClean="0"/>
-              <a:t>License agreements</a:t>
+              <a:t>License </a:t>
+            </a:r>
+            <a:r>
+              <a:rPr lang="en-US" dirty="0" smtClean="0"/>
+              <a:t>agreements</a:t>
+            </a:r>
+          </a:p>
+          <a:p>
+            <a:pPr algn="ctr"/>
+            <a:r>
+              <a:rPr lang="en-US" dirty="0" smtClean="0"/>
+              <a:t>License income</a:t>
             </a:r>
             <a:endParaRPr lang="en-US" dirty="0" smtClean="0"/>
           </a:p>
@@ -22516,13 +24008,8 @@
             <a:pPr algn="ctr"/>
             <a:r>
               <a:rPr lang="en-US" dirty="0" smtClean="0"/>
-              <a:t>New </a:t>
-            </a:r>
-            <a:r>
-              <a:rPr lang="en-US" dirty="0" smtClean="0"/>
-              <a:t>ventures</a:t>
-            </a:r>
-            <a:endParaRPr lang="en-US" dirty="0" smtClean="0"/>
+              <a:t>New ventures</a:t>
+            </a:r>
           </a:p>
           <a:p>
             <a:pPr algn="ctr"/>
@@ -22542,8 +24029,8 @@
         </p:nvSpPr>
         <p:spPr>
           <a:xfrm>
-            <a:off x="5696907" y="1812223"/>
-            <a:ext cx="2103120" cy="1188720"/>
+            <a:off x="6106347" y="1812223"/>
+            <a:ext cx="2926080" cy="1188720"/>
           </a:xfrm>
           <a:prstGeom prst="rect">
             <a:avLst/>
@@ -22605,8 +24092,8 @@
         </p:nvSpPr>
         <p:spPr>
           <a:xfrm>
-            <a:off x="5696907" y="3056429"/>
-            <a:ext cx="2103120" cy="1188720"/>
+            <a:off x="6106347" y="3056429"/>
+            <a:ext cx="2926080" cy="1188720"/>
           </a:xfrm>
           <a:prstGeom prst="rect">
             <a:avLst/>
@@ -22655,8 +24142,8 @@
         </p:nvSpPr>
         <p:spPr>
           <a:xfrm>
-            <a:off x="1343973" y="25758"/>
-            <a:ext cx="2103120" cy="490742"/>
+            <a:off x="170245" y="25758"/>
+            <a:ext cx="2926080" cy="490742"/>
           </a:xfrm>
           <a:prstGeom prst="rect">
             <a:avLst/>
@@ -22699,8 +24186,8 @@
         </p:nvSpPr>
         <p:spPr>
           <a:xfrm>
-            <a:off x="3520440" y="25758"/>
-            <a:ext cx="2103120" cy="490742"/>
+            <a:off x="3138296" y="25758"/>
+            <a:ext cx="2926080" cy="490742"/>
           </a:xfrm>
           <a:prstGeom prst="rect">
             <a:avLst/>
@@ -22743,8 +24230,8 @@
         </p:nvSpPr>
         <p:spPr>
           <a:xfrm>
-            <a:off x="5696907" y="25758"/>
-            <a:ext cx="2103120" cy="490742"/>
+            <a:off x="6106347" y="25758"/>
+            <a:ext cx="2926080" cy="490742"/>
           </a:xfrm>
           <a:prstGeom prst="rect">
             <a:avLst/>
@@ -22773,7 +24260,7 @@
             <a:pPr algn="ctr"/>
             <a:r>
               <a:rPr lang="en-US" dirty="0" smtClean="0"/>
-              <a:t>Indicators</a:t>
+              <a:t>Measureable Indicators</a:t>
             </a:r>
             <a:endParaRPr lang="en-US" dirty="0"/>
           </a:p>
@@ -22802,8 +24289,8 @@
         </p:blipFill>
         <p:spPr bwMode="auto">
           <a:xfrm>
-            <a:off x="5623559" y="584740"/>
-            <a:ext cx="2176467" cy="813235"/>
+            <a:off x="6288040" y="344975"/>
+            <a:ext cx="2468880" cy="1280160"/>
           </a:xfrm>
           <a:prstGeom prst="rect">
             <a:avLst/>
@@ -22843,7 +24330,7 @@
         </p:blipFill>
         <p:spPr bwMode="auto">
           <a:xfrm>
-            <a:off x="5971227" y="2057947"/>
+            <a:off x="6926587" y="2057947"/>
             <a:ext cx="1554480" cy="171097"/>
           </a:xfrm>
           <a:prstGeom prst="rect">
@@ -22881,7 +24368,7 @@
 </p:sld>
 </file>
 
-<file path=ppt/slides/slide5.xml><?xml version="1.0" encoding="utf-8"?>
+<file path=ppt/slides/slide7.xml><?xml version="1.0" encoding="utf-8"?>
 <p:sld xmlns:a="http://schemas.openxmlformats.org/drawingml/2006/main" xmlns:r="http://schemas.openxmlformats.org/officeDocument/2006/relationships" xmlns:p="http://schemas.openxmlformats.org/presentationml/2006/main">
   <p:cSld>
     <p:spTree>
@@ -26508,7 +27995,7 @@
 </p:sld>
 </file>
 
-<file path=ppt/slides/slide6.xml><?xml version="1.0" encoding="utf-8"?>
+<file path=ppt/slides/slide8.xml><?xml version="1.0" encoding="utf-8"?>
 <p:sld xmlns:a="http://schemas.openxmlformats.org/drawingml/2006/main" xmlns:r="http://schemas.openxmlformats.org/officeDocument/2006/relationships" xmlns:p="http://schemas.openxmlformats.org/presentationml/2006/main">
   <p:cSld>
     <p:spTree>
@@ -30464,7 +31951,7 @@
 </p:sld>
 </file>
 
-<file path=ppt/slides/slide7.xml><?xml version="1.0" encoding="utf-8"?>
+<file path=ppt/slides/slide9.xml><?xml version="1.0" encoding="utf-8"?>
 <p:sld xmlns:a="http://schemas.openxmlformats.org/drawingml/2006/main" xmlns:r="http://schemas.openxmlformats.org/officeDocument/2006/relationships" xmlns:p="http://schemas.openxmlformats.org/presentationml/2006/main">
   <p:cSld>
     <p:spTree>
@@ -32118,301 +33605,6 @@
     <p:extLst>
       <p:ext uri="{BB962C8B-B14F-4D97-AF65-F5344CB8AC3E}">
         <p14:creationId xmlns:p14="http://schemas.microsoft.com/office/powerpoint/2010/main" val="3411190122"/>
-      </p:ext>
-    </p:extLst>
-  </p:cSld>
-  <p:clrMapOvr>
-    <a:masterClrMapping/>
-  </p:clrMapOvr>
-  <p:timing>
-    <p:tnLst>
-      <p:par>
-        <p:cTn id="1" dur="indefinite" restart="never" nodeType="tmRoot"/>
-      </p:par>
-    </p:tnLst>
-  </p:timing>
-</p:sld>
-</file>
-
-<file path=ppt/slides/slide8.xml><?xml version="1.0" encoding="utf-8"?>
-<p:sld xmlns:a="http://schemas.openxmlformats.org/drawingml/2006/main" xmlns:r="http://schemas.openxmlformats.org/officeDocument/2006/relationships" xmlns:p="http://schemas.openxmlformats.org/presentationml/2006/main">
-  <p:cSld>
-    <p:spTree>
-      <p:nvGrpSpPr>
-        <p:cNvPr id="1" name=""/>
-        <p:cNvGrpSpPr/>
-        <p:nvPr/>
-      </p:nvGrpSpPr>
-      <p:grpSpPr>
-        <a:xfrm>
-          <a:off x="0" y="0"/>
-          <a:ext cx="0" cy="0"/>
-          <a:chOff x="0" y="0"/>
-          <a:chExt cx="0" cy="0"/>
-        </a:xfrm>
-      </p:grpSpPr>
-      <p:pic>
-        <p:nvPicPr>
-          <p:cNvPr id="4099" name="Picture 3"/>
-          <p:cNvPicPr>
-            <a:picLocks noChangeAspect="1" noChangeArrowheads="1"/>
-          </p:cNvPicPr>
-          <p:nvPr/>
-        </p:nvPicPr>
-        <p:blipFill rotWithShape="1">
-          <a:blip r:embed="rId3">
-            <a:extLst>
-              <a:ext uri="{28A0092B-C50C-407E-A947-70E740481C1C}">
-                <a14:useLocalDpi xmlns:a14="http://schemas.microsoft.com/office/drawing/2010/main" val="0"/>
-              </a:ext>
-            </a:extLst>
-          </a:blip>
-          <a:srcRect r="12062"/>
-          <a:stretch/>
-        </p:blipFill>
-        <p:spPr bwMode="auto">
-          <a:xfrm>
-            <a:off x="3518530" y="83820"/>
-            <a:ext cx="4087590" cy="2743200"/>
-          </a:xfrm>
-          <a:prstGeom prst="rect">
-            <a:avLst/>
-          </a:prstGeom>
-          <a:noFill/>
-          <a:ln>
-            <a:noFill/>
-          </a:ln>
-          <a:effectLst/>
-          <a:extLst>
-            <a:ext uri="{909E8E84-426E-40DD-AFC4-6F175D3DCCD1}">
-              <a14:hiddenFill xmlns:a14="http://schemas.microsoft.com/office/drawing/2010/main">
-                <a:solidFill>
-                  <a:schemeClr val="accent1"/>
-                </a:solidFill>
-              </a14:hiddenFill>
-            </a:ext>
-            <a:ext uri="{91240B29-F687-4F45-9708-019B960494DF}">
-              <a14:hiddenLine xmlns:a14="http://schemas.microsoft.com/office/drawing/2010/main" w="9525">
-                <a:solidFill>
-                  <a:schemeClr val="tx1"/>
-                </a:solidFill>
-                <a:miter lim="800000"/>
-                <a:headEnd/>
-                <a:tailEnd/>
-              </a14:hiddenLine>
-            </a:ext>
-            <a:ext uri="{AF507438-7753-43E0-B8FC-AC1667EBCBE1}">
-              <a14:hiddenEffects xmlns:a14="http://schemas.microsoft.com/office/drawing/2010/main">
-                <a:effectLst>
-                  <a:outerShdw dist="35921" dir="2700000" algn="ctr" rotWithShape="0">
-                    <a:schemeClr val="bg2"/>
-                  </a:outerShdw>
-                </a:effectLst>
-              </a14:hiddenEffects>
-            </a:ext>
-          </a:extLst>
-        </p:spPr>
-      </p:pic>
-      <p:pic>
-        <p:nvPicPr>
-          <p:cNvPr id="4100" name="Picture 4"/>
-          <p:cNvPicPr>
-            <a:picLocks noChangeAspect="1" noChangeArrowheads="1"/>
-          </p:cNvPicPr>
-          <p:nvPr/>
-        </p:nvPicPr>
-        <p:blipFill>
-          <a:blip r:embed="rId4">
-            <a:extLst>
-              <a:ext uri="{28A0092B-C50C-407E-A947-70E740481C1C}">
-                <a14:useLocalDpi xmlns:a14="http://schemas.microsoft.com/office/drawing/2010/main" val="0"/>
-              </a:ext>
-            </a:extLst>
-          </a:blip>
-          <a:srcRect/>
-          <a:stretch>
-            <a:fillRect/>
-          </a:stretch>
-        </p:blipFill>
-        <p:spPr bwMode="auto">
-          <a:xfrm>
-            <a:off x="3518530" y="2899410"/>
-            <a:ext cx="4648209" cy="2743200"/>
-          </a:xfrm>
-          <a:prstGeom prst="rect">
-            <a:avLst/>
-          </a:prstGeom>
-          <a:noFill/>
-          <a:ln>
-            <a:noFill/>
-          </a:ln>
-          <a:effectLst/>
-          <a:extLst>
-            <a:ext uri="{909E8E84-426E-40DD-AFC4-6F175D3DCCD1}">
-              <a14:hiddenFill xmlns:a14="http://schemas.microsoft.com/office/drawing/2010/main">
-                <a:solidFill>
-                  <a:schemeClr val="accent1"/>
-                </a:solidFill>
-              </a14:hiddenFill>
-            </a:ext>
-            <a:ext uri="{91240B29-F687-4F45-9708-019B960494DF}">
-              <a14:hiddenLine xmlns:a14="http://schemas.microsoft.com/office/drawing/2010/main" w="9525">
-                <a:solidFill>
-                  <a:schemeClr val="tx1"/>
-                </a:solidFill>
-                <a:miter lim="800000"/>
-                <a:headEnd/>
-                <a:tailEnd/>
-              </a14:hiddenLine>
-            </a:ext>
-            <a:ext uri="{AF507438-7753-43E0-B8FC-AC1667EBCBE1}">
-              <a14:hiddenEffects xmlns:a14="http://schemas.microsoft.com/office/drawing/2010/main">
-                <a:effectLst>
-                  <a:outerShdw dist="35921" dir="2700000" algn="ctr" rotWithShape="0">
-                    <a:schemeClr val="bg2"/>
-                  </a:outerShdw>
-                </a:effectLst>
-              </a14:hiddenEffects>
-            </a:ext>
-          </a:extLst>
-        </p:spPr>
-      </p:pic>
-      <p:pic>
-        <p:nvPicPr>
-          <p:cNvPr id="4098" name="Picture 2"/>
-          <p:cNvPicPr>
-            <a:picLocks noChangeAspect="1" noChangeArrowheads="1"/>
-          </p:cNvPicPr>
-          <p:nvPr/>
-        </p:nvPicPr>
-        <p:blipFill>
-          <a:blip r:embed="rId5">
-            <a:extLst>
-              <a:ext uri="{28A0092B-C50C-407E-A947-70E740481C1C}">
-                <a14:useLocalDpi xmlns:a14="http://schemas.microsoft.com/office/drawing/2010/main" val="0"/>
-              </a:ext>
-            </a:extLst>
-          </a:blip>
-          <a:srcRect/>
-          <a:stretch>
-            <a:fillRect/>
-          </a:stretch>
-        </p:blipFill>
-        <p:spPr bwMode="auto">
-          <a:xfrm>
-            <a:off x="411478" y="800100"/>
-            <a:ext cx="2343739" cy="4114800"/>
-          </a:xfrm>
-          <a:prstGeom prst="rect">
-            <a:avLst/>
-          </a:prstGeom>
-          <a:noFill/>
-          <a:ln>
-            <a:noFill/>
-          </a:ln>
-          <a:effectLst/>
-          <a:extLst>
-            <a:ext uri="{909E8E84-426E-40DD-AFC4-6F175D3DCCD1}">
-              <a14:hiddenFill xmlns:a14="http://schemas.microsoft.com/office/drawing/2010/main">
-                <a:solidFill>
-                  <a:schemeClr val="accent1"/>
-                </a:solidFill>
-              </a14:hiddenFill>
-            </a:ext>
-            <a:ext uri="{91240B29-F687-4F45-9708-019B960494DF}">
-              <a14:hiddenLine xmlns:a14="http://schemas.microsoft.com/office/drawing/2010/main" w="9525">
-                <a:solidFill>
-                  <a:schemeClr val="tx1"/>
-                </a:solidFill>
-                <a:miter lim="800000"/>
-                <a:headEnd/>
-                <a:tailEnd/>
-              </a14:hiddenLine>
-            </a:ext>
-            <a:ext uri="{AF507438-7753-43E0-B8FC-AC1667EBCBE1}">
-              <a14:hiddenEffects xmlns:a14="http://schemas.microsoft.com/office/drawing/2010/main">
-                <a:effectLst>
-                  <a:outerShdw dist="35921" dir="2700000" algn="ctr" rotWithShape="0">
-                    <a:schemeClr val="bg2"/>
-                  </a:outerShdw>
-                </a:effectLst>
-              </a14:hiddenEffects>
-            </a:ext>
-          </a:extLst>
-        </p:spPr>
-      </p:pic>
-    </p:spTree>
-    <p:extLst>
-      <p:ext uri="{BB962C8B-B14F-4D97-AF65-F5344CB8AC3E}">
-        <p14:creationId xmlns:p14="http://schemas.microsoft.com/office/powerpoint/2010/main" val="727059619"/>
-      </p:ext>
-    </p:extLst>
-  </p:cSld>
-  <p:clrMapOvr>
-    <a:masterClrMapping/>
-  </p:clrMapOvr>
-  <p:timing>
-    <p:tnLst>
-      <p:par>
-        <p:cTn id="1" dur="indefinite" restart="never" nodeType="tmRoot"/>
-      </p:par>
-    </p:tnLst>
-  </p:timing>
-</p:sld>
-</file>
-
-<file path=ppt/slides/slide9.xml><?xml version="1.0" encoding="utf-8"?>
-<p:sld xmlns:a="http://schemas.openxmlformats.org/drawingml/2006/main" xmlns:r="http://schemas.openxmlformats.org/officeDocument/2006/relationships" xmlns:p="http://schemas.openxmlformats.org/presentationml/2006/main">
-  <p:cSld>
-    <p:spTree>
-      <p:nvGrpSpPr>
-        <p:cNvPr id="1" name=""/>
-        <p:cNvGrpSpPr/>
-        <p:nvPr/>
-      </p:nvGrpSpPr>
-      <p:grpSpPr>
-        <a:xfrm>
-          <a:off x="0" y="0"/>
-          <a:ext cx="0" cy="0"/>
-          <a:chOff x="0" y="0"/>
-          <a:chExt cx="0" cy="0"/>
-        </a:xfrm>
-      </p:grpSpPr>
-      <p:sp>
-        <p:nvSpPr>
-          <p:cNvPr id="2" name="TextBox 1"/>
-          <p:cNvSpPr txBox="1"/>
-          <p:nvPr/>
-        </p:nvSpPr>
-        <p:spPr>
-          <a:xfrm>
-            <a:off x="0" y="1920240"/>
-            <a:ext cx="9144000" cy="523220"/>
-          </a:xfrm>
-          <a:prstGeom prst="rect">
-            <a:avLst/>
-          </a:prstGeom>
-          <a:noFill/>
-        </p:spPr>
-        <p:txBody>
-          <a:bodyPr wrap="square" rtlCol="0">
-            <a:spAutoFit/>
-          </a:bodyPr>
-          <a:lstStyle/>
-          <a:p>
-            <a:pPr algn="ctr"/>
-            <a:r>
-              <a:rPr lang="en-US" sz="2800" b="1" dirty="0" smtClean="0"/>
-              <a:t>Multiple Regression Analysis</a:t>
-            </a:r>
-            <a:endParaRPr lang="en-US" sz="2800" b="1" dirty="0"/>
-          </a:p>
-        </p:txBody>
-      </p:sp>
-    </p:spTree>
-    <p:extLst>
-      <p:ext uri="{BB962C8B-B14F-4D97-AF65-F5344CB8AC3E}">
-        <p14:creationId xmlns:p14="http://schemas.microsoft.com/office/powerpoint/2010/main" val="397209135"/>
       </p:ext>
     </p:extLst>
   </p:cSld>

</xml_diff>

<commit_message>
Minor edit to Presentation 02
</commit_message>
<xml_diff>
--- a/Presentations/Presentation02/Townes_SOC6100_Presentation02.pptx
+++ b/Presentations/Presentation02/Townes_SOC6100_Presentation02.pptx
@@ -1245,7 +1245,6 @@
               <a:rPr lang="en-US" dirty="0" smtClean="0"/>
               <a:t>The p-value was 0.003 which is not much above the 0.001 significance level. </a:t>
             </a:r>
-            <a:endParaRPr lang="en-US" dirty="0" smtClean="0"/>
           </a:p>
           <a:p>
             <a:endParaRPr lang="en-US" dirty="0" smtClean="0"/>
@@ -20869,7 +20868,6 @@
               <a:rPr lang="en-US" dirty="0" smtClean="0"/>
               <a:t>Repeat binary logistic regression using a mean split instead of median split.</a:t>
             </a:r>
-            <a:endParaRPr lang="en-US" dirty="0" smtClean="0"/>
           </a:p>
           <a:p>
             <a:pPr marL="285750" indent="-285750">
@@ -20881,11 +20879,7 @@
             </a:pPr>
             <a:r>
               <a:rPr lang="en-US" dirty="0" smtClean="0"/>
-              <a:t>Modify path model using the measure of generality as the primary endogenous independent </a:t>
-            </a:r>
-            <a:r>
-              <a:rPr lang="en-US" dirty="0" smtClean="0"/>
-              <a:t>variable</a:t>
+              <a:t>Modify path model using the measure of generality as the primary endogenous independent variable</a:t>
             </a:r>
             <a:r>
               <a:rPr lang="en-US" dirty="0"/>
@@ -20919,11 +20913,7 @@
             </a:r>
             <a:r>
               <a:rPr lang="en-US" dirty="0" smtClean="0"/>
-              <a:t>as </a:t>
-            </a:r>
-            <a:r>
-              <a:rPr lang="en-US" dirty="0" smtClean="0"/>
-              <a:t>distinct variables.</a:t>
+              <a:t>as distinct variables.</a:t>
             </a:r>
           </a:p>
           <a:p>
@@ -21121,7 +21111,19 @@
             </a:r>
             <a:r>
               <a:rPr lang="en-US" dirty="0"/>
-              <a:t>non-transactional measures of knowledge transfer may be feasible.  </a:t>
+              <a:t>non-transactional measures </a:t>
+            </a:r>
+            <a:r>
+              <a:rPr lang="en-US"/>
+              <a:t>of </a:t>
+            </a:r>
+            <a:r>
+              <a:rPr lang="en-US" smtClean="0"/>
+              <a:t>technology </a:t>
+            </a:r>
+            <a:r>
+              <a:rPr lang="en-US" dirty="0"/>
+              <a:t>transfer may be feasible.  </a:t>
             </a:r>
             <a:endParaRPr lang="en-US" dirty="0" smtClean="0"/>
           </a:p>
@@ -22654,12 +22656,12 @@
           <a:graphicData uri="http://schemas.openxmlformats.org/presentationml/2006/ole">
             <mc:AlternateContent xmlns:mc="http://schemas.openxmlformats.org/markup-compatibility/2006">
               <mc:Choice xmlns:v="urn:schemas-microsoft-com:vml" Requires="v">
-                <p:oleObj spid="_x0000_s3234" name="Worksheet" r:id="rId4" imgW="7038978" imgH="4086255" progId="Excel.Sheet.8">
+                <p:oleObj spid="_x0000_s3235" name="Worksheet" r:id="rId5" imgW="7038978" imgH="4086255" progId="Excel.Sheet.8">
                   <p:embed followColorScheme="full"/>
                 </p:oleObj>
               </mc:Choice>
               <mc:Fallback>
-                <p:oleObj name="Worksheet" r:id="rId4" imgW="7038978" imgH="4086255" progId="Excel.Sheet.8">
+                <p:oleObj name="Worksheet" r:id="rId5" imgW="7038978" imgH="4086255" progId="Excel.Sheet.8">
                   <p:embed followColorScheme="full"/>
                   <p:pic>
                     <p:nvPicPr>
@@ -22668,7 +22670,7 @@
                       <p:nvPr/>
                     </p:nvPicPr>
                     <p:blipFill>
-                      <a:blip r:embed="rId5"/>
+                      <a:blip r:embed="rId6"/>
                       <a:stretch>
                         <a:fillRect/>
                       </a:stretch>
@@ -23547,6 +23549,13 @@
   <p:clrMapOvr>
     <a:masterClrMapping/>
   </p:clrMapOvr>
+  <p:timing>
+    <p:tnLst>
+      <p:par>
+        <p:cTn id="1" dur="indefinite" restart="never" nodeType="tmRoot"/>
+      </p:par>
+    </p:tnLst>
+  </p:timing>
 </p:sld>
 </file>
 
@@ -23777,6 +23786,13 @@
   <p:clrMapOvr>
     <a:masterClrMapping/>
   </p:clrMapOvr>
+  <p:timing>
+    <p:tnLst>
+      <p:par>
+        <p:cTn id="1" dur="indefinite" restart="never" nodeType="tmRoot"/>
+      </p:par>
+    </p:tnLst>
+  </p:timing>
 </p:sld>
 </file>
 
@@ -24162,11 +24178,7 @@
             <a:pPr algn="ctr"/>
             <a:r>
               <a:rPr lang="en-US" dirty="0" smtClean="0"/>
-              <a:t>Consulting </a:t>
-            </a:r>
-            <a:r>
-              <a:rPr lang="en-US" dirty="0" smtClean="0"/>
-              <a:t>services</a:t>
+              <a:t>Consulting services</a:t>
             </a:r>
           </a:p>
           <a:p>
@@ -24175,7 +24187,6 @@
               <a:rPr lang="en-US" dirty="0" smtClean="0"/>
               <a:t>Contract services</a:t>
             </a:r>
-            <a:endParaRPr lang="en-US" dirty="0" smtClean="0"/>
           </a:p>
           <a:p>
             <a:pPr algn="ctr"/>
@@ -24353,13 +24364,8 @@
             <a:pPr algn="ctr"/>
             <a:r>
               <a:rPr lang="en-US" dirty="0" smtClean="0"/>
-              <a:t>Outside interest d</a:t>
-            </a:r>
-            <a:r>
-              <a:rPr lang="en-US" dirty="0" smtClean="0"/>
-              <a:t>isclosures</a:t>
-            </a:r>
-            <a:endParaRPr lang="en-US" dirty="0" smtClean="0"/>
+              <a:t>Outside interest disclosures</a:t>
+            </a:r>
           </a:p>
           <a:p>
             <a:pPr algn="ctr"/>
@@ -24374,7 +24380,6 @@
               <a:rPr lang="en-US" dirty="0" smtClean="0"/>
               <a:t>Service invoices</a:t>
             </a:r>
-            <a:endParaRPr lang="en-US" dirty="0" smtClean="0"/>
           </a:p>
           <a:p>
             <a:pPr algn="ctr"/>
@@ -24382,7 +24387,6 @@
               <a:rPr lang="en-US" dirty="0" smtClean="0"/>
               <a:t>SR agreements</a:t>
             </a:r>
-            <a:endParaRPr lang="en-US" dirty="0" smtClean="0"/>
           </a:p>
         </p:txBody>
       </p:sp>

</xml_diff>

<commit_message>
Added references to Presentation 02 slide notes
</commit_message>
<xml_diff>
--- a/Presentations/Presentation02/Townes_SOC6100_Presentation02.pptx
+++ b/Presentations/Presentation02/Townes_SOC6100_Presentation02.pptx
@@ -1301,6 +1301,34 @@
             <a:endParaRPr lang="en-US" dirty="0" smtClean="0"/>
           </a:p>
           <a:p>
+            <a:r>
+              <a:rPr lang="en-US" dirty="0" smtClean="0"/>
+              <a:t>-2 log likelihood statistic is a measure of how “poorly” the model predicts the data;</a:t>
+            </a:r>
+            <a:r>
+              <a:rPr lang="en-US" baseline="0" dirty="0" smtClean="0"/>
+              <a:t> t</a:t>
+            </a:r>
+            <a:r>
+              <a:rPr lang="en-US" dirty="0" smtClean="0"/>
+              <a:t>he smaller the statistic the better the model.</a:t>
+            </a:r>
+          </a:p>
+          <a:p>
+            <a:r>
+              <a:rPr lang="en-US" dirty="0" smtClean="0"/>
+              <a:t>The deviance, or -2 log-likelihood (-2LL) statistic</a:t>
+            </a:r>
+            <a:r>
+              <a:rPr lang="en-US" smtClean="0"/>
+              <a:t>, is </a:t>
+            </a:r>
+            <a:r>
+              <a:rPr lang="en-US" dirty="0" smtClean="0"/>
+              <a:t>basically a measure of how much unexplained variation there is in our logistic regression model – the higher the value the less accurate the model.</a:t>
+            </a:r>
+          </a:p>
+          <a:p>
             <a:endParaRPr lang="en-US" dirty="0" smtClean="0"/>
           </a:p>
           <a:p>
@@ -1330,8 +1358,25 @@
           <a:p>
             <a:r>
               <a:rPr lang="en-US" dirty="0" smtClean="0"/>
-              <a:t>https://www.revolvy.com/page/Omnibus-test</a:t>
-            </a:r>
+              <a:t>https://</a:t>
+            </a:r>
+            <a:r>
+              <a:rPr lang="en-US" dirty="0" smtClean="0"/>
+              <a:t>www.revolvy.com/page/Omnibus-test</a:t>
+            </a:r>
+          </a:p>
+          <a:p>
+            <a:r>
+              <a:rPr lang="en-US" dirty="0" smtClean="0"/>
+              <a:t>http://www.restore.ac.uk/srme/www/fac/soc/wie/research-new/srme/modules/mod4/6/index.html</a:t>
+            </a:r>
+          </a:p>
+          <a:p>
+            <a:r>
+              <a:rPr lang="en-US" dirty="0" smtClean="0"/>
+              <a:t>http://www.restore.ac.uk/srme/www/fac/soc/wie/research-new/srme/glossary/index1695.html?selectedLetter=D#deviance-2ll</a:t>
+            </a:r>
+            <a:endParaRPr lang="en-US" dirty="0" smtClean="0"/>
           </a:p>
         </p:txBody>
       </p:sp>
@@ -22656,12 +22701,12 @@
           <a:graphicData uri="http://schemas.openxmlformats.org/presentationml/2006/ole">
             <mc:AlternateContent xmlns:mc="http://schemas.openxmlformats.org/markup-compatibility/2006">
               <mc:Choice xmlns:v="urn:schemas-microsoft-com:vml" Requires="v">
-                <p:oleObj spid="_x0000_s3235" name="Worksheet" r:id="rId5" imgW="7038978" imgH="4086255" progId="Excel.Sheet.8">
+                <p:oleObj spid="_x0000_s3237" name="Worksheet" r:id="rId4" imgW="7038978" imgH="4086255" progId="Excel.Sheet.8">
                   <p:embed followColorScheme="full"/>
                 </p:oleObj>
               </mc:Choice>
               <mc:Fallback>
-                <p:oleObj name="Worksheet" r:id="rId5" imgW="7038978" imgH="4086255" progId="Excel.Sheet.8">
+                <p:oleObj name="Worksheet" r:id="rId4" imgW="7038978" imgH="4086255" progId="Excel.Sheet.8">
                   <p:embed followColorScheme="full"/>
                   <p:pic>
                     <p:nvPicPr>
@@ -22670,7 +22715,7 @@
                       <p:nvPr/>
                     </p:nvPicPr>
                     <p:blipFill>
-                      <a:blip r:embed="rId6"/>
+                      <a:blip r:embed="rId5"/>
                       <a:stretch>
                         <a:fillRect/>
                       </a:stretch>

</xml_diff>

<commit_message>
Added to Final Paper
</commit_message>
<xml_diff>
--- a/Presentations/Presentation02/Townes_SOC6100_Presentation02.pptx
+++ b/Presentations/Presentation02/Townes_SOC6100_Presentation02.pptx
@@ -225,7 +225,7 @@
           <a:p>
             <a:fld id="{DA0FC191-2DC4-4A3C-B384-0C651DCE00E9}" type="datetimeFigureOut">
               <a:rPr lang="en-US" smtClean="0"/>
-              <a:t>11/28/2018</a:t>
+              <a:t>12/08/2018</a:t>
             </a:fld>
             <a:endParaRPr lang="en-US"/>
           </a:p>
@@ -390,7 +390,7 @@
           <a:p>
             <a:fld id="{0F42D459-5C80-4371-BDC6-89835A09395D}" type="datetimeFigureOut">
               <a:rPr lang="en-US" smtClean="0"/>
-              <a:t>11/28/2018</a:t>
+              <a:t>12/08/2018</a:t>
             </a:fld>
             <a:endParaRPr lang="en-US"/>
           </a:p>
@@ -720,12 +720,20 @@
               <a:t>US Spending. </a:t>
             </a:r>
             <a:r>
+              <a:rPr lang="en-US" baseline="0" dirty="0" smtClean="0"/>
+              <a:t>(</a:t>
+            </a:r>
+            <a:r>
               <a:rPr lang="en-US" baseline="0" dirty="0" err="1" smtClean="0"/>
-              <a:t>nd</a:t>
+              <a:t>n.d.</a:t>
             </a:r>
             <a:r>
               <a:rPr lang="en-US" baseline="0" dirty="0" smtClean="0"/>
-              <a:t>. USGovernmentSpending.com. Retrieved from https://www.usgovernmentspending.com/year_spending_2018USbn_20bs2n_4041_605#usgs302</a:t>
+              <a:t>) </a:t>
+            </a:r>
+            <a:r>
+              <a:rPr lang="en-US" baseline="0" dirty="0" smtClean="0"/>
+              <a:t>USGovernmentSpending.com. Retrieved from https://www.usgovernmentspending.com/year_spending_2018USbn_20bs2n_4041_605#usgs302</a:t>
             </a:r>
             <a:endParaRPr lang="en-US" dirty="0"/>
           </a:p>
@@ -1358,11 +1366,7 @@
           <a:p>
             <a:r>
               <a:rPr lang="en-US" dirty="0" smtClean="0"/>
-              <a:t>https://</a:t>
-            </a:r>
-            <a:r>
-              <a:rPr lang="en-US" dirty="0" smtClean="0"/>
-              <a:t>www.revolvy.com/page/Omnibus-test</a:t>
+              <a:t>https://www.revolvy.com/page/Omnibus-test</a:t>
             </a:r>
           </a:p>
           <a:p>
@@ -1376,7 +1380,6 @@
               <a:rPr lang="en-US" dirty="0" smtClean="0"/>
               <a:t>http://www.restore.ac.uk/srme/www/fac/soc/wie/research-new/srme/glossary/index1695.html?selectedLetter=D#deviance-2ll</a:t>
             </a:r>
-            <a:endParaRPr lang="en-US" dirty="0" smtClean="0"/>
           </a:p>
         </p:txBody>
       </p:sp>
@@ -2579,7 +2582,7 @@
           <a:p>
             <a:fld id="{FC1FCE38-2186-4D26-B7FB-3342183A2F51}" type="datetimeFigureOut">
               <a:rPr lang="en-US" smtClean="0"/>
-              <a:t>11/28/2018</a:t>
+              <a:t>12/08/2018</a:t>
             </a:fld>
             <a:endParaRPr lang="en-US"/>
           </a:p>
@@ -2749,7 +2752,7 @@
           <a:p>
             <a:fld id="{FC1FCE38-2186-4D26-B7FB-3342183A2F51}" type="datetimeFigureOut">
               <a:rPr lang="en-US" smtClean="0"/>
-              <a:t>11/28/2018</a:t>
+              <a:t>12/08/2018</a:t>
             </a:fld>
             <a:endParaRPr lang="en-US"/>
           </a:p>
@@ -2929,7 +2932,7 @@
           <a:p>
             <a:fld id="{FC1FCE38-2186-4D26-B7FB-3342183A2F51}" type="datetimeFigureOut">
               <a:rPr lang="en-US" smtClean="0"/>
-              <a:t>11/28/2018</a:t>
+              <a:t>12/08/2018</a:t>
             </a:fld>
             <a:endParaRPr lang="en-US"/>
           </a:p>
@@ -3099,7 +3102,7 @@
           <a:p>
             <a:fld id="{FC1FCE38-2186-4D26-B7FB-3342183A2F51}" type="datetimeFigureOut">
               <a:rPr lang="en-US" smtClean="0"/>
-              <a:t>11/28/2018</a:t>
+              <a:t>12/08/2018</a:t>
             </a:fld>
             <a:endParaRPr lang="en-US"/>
           </a:p>
@@ -3345,7 +3348,7 @@
           <a:p>
             <a:fld id="{FC1FCE38-2186-4D26-B7FB-3342183A2F51}" type="datetimeFigureOut">
               <a:rPr lang="en-US" smtClean="0"/>
-              <a:t>11/28/2018</a:t>
+              <a:t>12/08/2018</a:t>
             </a:fld>
             <a:endParaRPr lang="en-US"/>
           </a:p>
@@ -3633,7 +3636,7 @@
           <a:p>
             <a:fld id="{FC1FCE38-2186-4D26-B7FB-3342183A2F51}" type="datetimeFigureOut">
               <a:rPr lang="en-US" smtClean="0"/>
-              <a:t>11/28/2018</a:t>
+              <a:t>12/08/2018</a:t>
             </a:fld>
             <a:endParaRPr lang="en-US"/>
           </a:p>
@@ -4060,7 +4063,7 @@
           <a:p>
             <a:fld id="{FC1FCE38-2186-4D26-B7FB-3342183A2F51}" type="datetimeFigureOut">
               <a:rPr lang="en-US" smtClean="0"/>
-              <a:t>11/28/2018</a:t>
+              <a:t>12/08/2018</a:t>
             </a:fld>
             <a:endParaRPr lang="en-US"/>
           </a:p>
@@ -4178,7 +4181,7 @@
           <a:p>
             <a:fld id="{FC1FCE38-2186-4D26-B7FB-3342183A2F51}" type="datetimeFigureOut">
               <a:rPr lang="en-US" smtClean="0"/>
-              <a:t>11/28/2018</a:t>
+              <a:t>12/08/2018</a:t>
             </a:fld>
             <a:endParaRPr lang="en-US"/>
           </a:p>
@@ -4273,7 +4276,7 @@
           <a:p>
             <a:fld id="{FC1FCE38-2186-4D26-B7FB-3342183A2F51}" type="datetimeFigureOut">
               <a:rPr lang="en-US" smtClean="0"/>
-              <a:t>11/28/2018</a:t>
+              <a:t>12/08/2018</a:t>
             </a:fld>
             <a:endParaRPr lang="en-US"/>
           </a:p>
@@ -4550,7 +4553,7 @@
           <a:p>
             <a:fld id="{FC1FCE38-2186-4D26-B7FB-3342183A2F51}" type="datetimeFigureOut">
               <a:rPr lang="en-US" smtClean="0"/>
-              <a:t>11/28/2018</a:t>
+              <a:t>12/08/2018</a:t>
             </a:fld>
             <a:endParaRPr lang="en-US"/>
           </a:p>
@@ -4803,7 +4806,7 @@
           <a:p>
             <a:fld id="{FC1FCE38-2186-4D26-B7FB-3342183A2F51}" type="datetimeFigureOut">
               <a:rPr lang="en-US" smtClean="0"/>
-              <a:t>11/28/2018</a:t>
+              <a:t>12/08/2018</a:t>
             </a:fld>
             <a:endParaRPr lang="en-US"/>
           </a:p>
@@ -5016,7 +5019,7 @@
           <a:p>
             <a:fld id="{FC1FCE38-2186-4D26-B7FB-3342183A2F51}" type="datetimeFigureOut">
               <a:rPr lang="en-US" smtClean="0"/>
-              <a:t>11/28/2018</a:t>
+              <a:t>12/08/2018</a:t>
             </a:fld>
             <a:endParaRPr lang="en-US"/>
           </a:p>
@@ -22701,7 +22704,7 @@
           <a:graphicData uri="http://schemas.openxmlformats.org/presentationml/2006/ole">
             <mc:AlternateContent xmlns:mc="http://schemas.openxmlformats.org/markup-compatibility/2006">
               <mc:Choice xmlns:v="urn:schemas-microsoft-com:vml" Requires="v">
-                <p:oleObj spid="_x0000_s3237" name="Worksheet" r:id="rId4" imgW="7038978" imgH="4086255" progId="Excel.Sheet.8">
+                <p:oleObj spid="_x0000_s3240" name="Worksheet" r:id="rId4" imgW="7038978" imgH="4086255" progId="Excel.Sheet.8">
                   <p:embed followColorScheme="full"/>
                 </p:oleObj>
               </mc:Choice>
@@ -23934,639 +23937,654 @@
           </a:p>
         </p:txBody>
       </p:sp>
-      <p:sp>
-        <p:nvSpPr>
-          <p:cNvPr id="5" name="Rectangle 4"/>
-          <p:cNvSpPr/>
+      <p:grpSp>
+        <p:nvGrpSpPr>
+          <p:cNvPr id="2" name="Group 1"/>
+          <p:cNvGrpSpPr/>
           <p:nvPr/>
-        </p:nvSpPr>
-        <p:spPr>
-          <a:xfrm>
-            <a:off x="135742" y="570663"/>
-            <a:ext cx="2926080" cy="1188720"/>
-          </a:xfrm>
-          <a:prstGeom prst="rect">
-            <a:avLst/>
-          </a:prstGeom>
-        </p:spPr>
-        <p:style>
-          <a:lnRef idx="2">
-            <a:schemeClr val="accent1">
-              <a:shade val="50000"/>
-            </a:schemeClr>
-          </a:lnRef>
-          <a:fillRef idx="1">
-            <a:schemeClr val="accent1"/>
-          </a:fillRef>
-          <a:effectRef idx="0">
-            <a:schemeClr val="accent1"/>
-          </a:effectRef>
-          <a:fontRef idx="minor">
-            <a:schemeClr val="lt1"/>
-          </a:fontRef>
-        </p:style>
-        <p:txBody>
-          <a:bodyPr rtlCol="0" anchor="ctr"/>
-          <a:lstStyle/>
-          <a:p>
-            <a:pPr algn="ctr"/>
-            <a:r>
-              <a:rPr lang="en-US" dirty="0" smtClean="0"/>
-              <a:t>Asset-based</a:t>
-            </a:r>
-            <a:endParaRPr lang="en-US" dirty="0"/>
-          </a:p>
-        </p:txBody>
-      </p:sp>
-      <p:sp>
-        <p:nvSpPr>
-          <p:cNvPr id="6" name="Rectangle 5"/>
-          <p:cNvSpPr/>
-          <p:nvPr/>
-        </p:nvSpPr>
-        <p:spPr>
-          <a:xfrm>
-            <a:off x="135742" y="1813546"/>
-            <a:ext cx="2926080" cy="1188720"/>
-          </a:xfrm>
-          <a:prstGeom prst="rect">
-            <a:avLst/>
-          </a:prstGeom>
-        </p:spPr>
-        <p:style>
-          <a:lnRef idx="1">
-            <a:schemeClr val="dk1"/>
-          </a:lnRef>
-          <a:fillRef idx="2">
-            <a:schemeClr val="dk1"/>
-          </a:fillRef>
-          <a:effectRef idx="1">
-            <a:schemeClr val="dk1"/>
-          </a:effectRef>
-          <a:fontRef idx="minor">
-            <a:schemeClr val="dk1"/>
-          </a:fontRef>
-        </p:style>
-        <p:txBody>
-          <a:bodyPr rtlCol="0" anchor="ctr"/>
-          <a:lstStyle/>
-          <a:p>
-            <a:pPr algn="ctr"/>
-            <a:r>
-              <a:rPr lang="en-US" dirty="0" smtClean="0"/>
-              <a:t>Information-based</a:t>
-            </a:r>
-            <a:endParaRPr lang="en-US" dirty="0"/>
-          </a:p>
-        </p:txBody>
-      </p:sp>
-      <p:sp>
-        <p:nvSpPr>
-          <p:cNvPr id="7" name="Rectangle 6"/>
-          <p:cNvSpPr/>
-          <p:nvPr/>
-        </p:nvSpPr>
-        <p:spPr>
-          <a:xfrm>
-            <a:off x="135741" y="3056429"/>
-            <a:ext cx="2926080" cy="1188720"/>
-          </a:xfrm>
-          <a:prstGeom prst="rect">
-            <a:avLst/>
-          </a:prstGeom>
-        </p:spPr>
-        <p:style>
-          <a:lnRef idx="2">
-            <a:schemeClr val="accent1">
-              <a:shade val="50000"/>
-            </a:schemeClr>
-          </a:lnRef>
-          <a:fillRef idx="1">
-            <a:schemeClr val="accent1"/>
-          </a:fillRef>
-          <a:effectRef idx="0">
-            <a:schemeClr val="accent1"/>
-          </a:effectRef>
-          <a:fontRef idx="minor">
-            <a:schemeClr val="lt1"/>
-          </a:fontRef>
-        </p:style>
-        <p:txBody>
-          <a:bodyPr rtlCol="0" anchor="ctr"/>
-          <a:lstStyle/>
-          <a:p>
-            <a:pPr algn="ctr"/>
-            <a:r>
-              <a:rPr lang="en-US" dirty="0" smtClean="0"/>
-              <a:t>Service-based</a:t>
-            </a:r>
-            <a:endParaRPr lang="en-US" dirty="0"/>
-          </a:p>
-        </p:txBody>
-      </p:sp>
-      <p:sp>
-        <p:nvSpPr>
-          <p:cNvPr id="8" name="Rectangle 7"/>
-          <p:cNvSpPr/>
-          <p:nvPr/>
-        </p:nvSpPr>
-        <p:spPr>
-          <a:xfrm>
-            <a:off x="3103792" y="570663"/>
-            <a:ext cx="2926080" cy="1188720"/>
-          </a:xfrm>
-          <a:prstGeom prst="rect">
-            <a:avLst/>
-          </a:prstGeom>
-        </p:spPr>
-        <p:style>
-          <a:lnRef idx="2">
-            <a:schemeClr val="accent1">
-              <a:shade val="50000"/>
-            </a:schemeClr>
-          </a:lnRef>
-          <a:fillRef idx="1">
-            <a:schemeClr val="accent1"/>
-          </a:fillRef>
-          <a:effectRef idx="0">
-            <a:schemeClr val="accent1"/>
-          </a:effectRef>
-          <a:fontRef idx="minor">
-            <a:schemeClr val="lt1"/>
-          </a:fontRef>
-        </p:style>
-        <p:txBody>
-          <a:bodyPr rtlCol="0" anchor="ctr"/>
-          <a:lstStyle/>
-          <a:p>
-            <a:pPr algn="ctr"/>
-            <a:r>
-              <a:rPr lang="en-US" dirty="0" smtClean="0"/>
-              <a:t>Patent rights</a:t>
-            </a:r>
-          </a:p>
-          <a:p>
-            <a:pPr algn="ctr"/>
-            <a:r>
-              <a:rPr lang="en-US" dirty="0" smtClean="0"/>
-              <a:t>Trade secrets</a:t>
-            </a:r>
-          </a:p>
-          <a:p>
-            <a:pPr algn="ctr"/>
-            <a:r>
-              <a:rPr lang="en-US" dirty="0" smtClean="0"/>
-              <a:t>Copyright</a:t>
-            </a:r>
-            <a:endParaRPr lang="en-US" dirty="0"/>
-          </a:p>
-        </p:txBody>
-      </p:sp>
-      <p:sp>
-        <p:nvSpPr>
-          <p:cNvPr id="9" name="Rectangle 8"/>
-          <p:cNvSpPr/>
-          <p:nvPr/>
-        </p:nvSpPr>
-        <p:spPr>
-          <a:xfrm>
-            <a:off x="3103792" y="1812223"/>
-            <a:ext cx="2926080" cy="1188720"/>
-          </a:xfrm>
-          <a:prstGeom prst="rect">
-            <a:avLst/>
-          </a:prstGeom>
-        </p:spPr>
-        <p:style>
-          <a:lnRef idx="1">
-            <a:schemeClr val="dk1"/>
-          </a:lnRef>
-          <a:fillRef idx="2">
-            <a:schemeClr val="dk1"/>
-          </a:fillRef>
-          <a:effectRef idx="1">
-            <a:schemeClr val="dk1"/>
-          </a:effectRef>
-          <a:fontRef idx="minor">
-            <a:schemeClr val="dk1"/>
-          </a:fontRef>
-        </p:style>
-        <p:txBody>
-          <a:bodyPr rtlCol="0" anchor="ctr"/>
-          <a:lstStyle/>
-          <a:p>
-            <a:pPr algn="ctr"/>
-            <a:r>
-              <a:rPr lang="en-US" dirty="0" smtClean="0"/>
-              <a:t>Patent documents</a:t>
-            </a:r>
-          </a:p>
-          <a:p>
-            <a:pPr algn="ctr"/>
-            <a:r>
-              <a:rPr lang="en-US" dirty="0" smtClean="0"/>
-              <a:t>Patent applications</a:t>
-            </a:r>
-          </a:p>
-          <a:p>
-            <a:pPr algn="ctr"/>
-            <a:r>
-              <a:rPr lang="en-US" dirty="0" smtClean="0"/>
-              <a:t>Journal articles</a:t>
-            </a:r>
-          </a:p>
-          <a:p>
-            <a:pPr algn="ctr"/>
-            <a:r>
-              <a:rPr lang="en-US" dirty="0" smtClean="0"/>
-              <a:t>Presentations</a:t>
-            </a:r>
-            <a:endParaRPr lang="en-US" dirty="0"/>
-          </a:p>
-        </p:txBody>
-      </p:sp>
-      <p:sp>
-        <p:nvSpPr>
-          <p:cNvPr id="10" name="Rectangle 9"/>
-          <p:cNvSpPr/>
-          <p:nvPr/>
-        </p:nvSpPr>
-        <p:spPr>
-          <a:xfrm>
-            <a:off x="3103792" y="3056429"/>
-            <a:ext cx="2926080" cy="1188720"/>
-          </a:xfrm>
-          <a:prstGeom prst="rect">
-            <a:avLst/>
-          </a:prstGeom>
-        </p:spPr>
-        <p:style>
-          <a:lnRef idx="2">
-            <a:schemeClr val="accent1">
-              <a:shade val="50000"/>
-            </a:schemeClr>
-          </a:lnRef>
-          <a:fillRef idx="1">
-            <a:schemeClr val="accent1"/>
-          </a:fillRef>
-          <a:effectRef idx="0">
-            <a:schemeClr val="accent1"/>
-          </a:effectRef>
-          <a:fontRef idx="minor">
-            <a:schemeClr val="lt1"/>
-          </a:fontRef>
-        </p:style>
-        <p:txBody>
-          <a:bodyPr rtlCol="0" anchor="ctr"/>
-          <a:lstStyle/>
-          <a:p>
-            <a:pPr algn="ctr"/>
-            <a:r>
-              <a:rPr lang="en-US" dirty="0" smtClean="0"/>
-              <a:t>Consulting services</a:t>
-            </a:r>
-          </a:p>
-          <a:p>
-            <a:pPr algn="ctr"/>
-            <a:r>
-              <a:rPr lang="en-US" dirty="0" smtClean="0"/>
-              <a:t>Contract services</a:t>
-            </a:r>
-          </a:p>
-          <a:p>
-            <a:pPr algn="ctr"/>
-            <a:r>
-              <a:rPr lang="en-US" dirty="0" smtClean="0"/>
-              <a:t>Sponsored research</a:t>
-            </a:r>
-            <a:endParaRPr lang="en-US" dirty="0"/>
-          </a:p>
-        </p:txBody>
-      </p:sp>
-      <p:sp>
-        <p:nvSpPr>
-          <p:cNvPr id="11" name="Rectangle 10"/>
-          <p:cNvSpPr/>
-          <p:nvPr/>
-        </p:nvSpPr>
-        <p:spPr>
-          <a:xfrm>
-            <a:off x="6071843" y="570663"/>
-            <a:ext cx="2926080" cy="1188720"/>
-          </a:xfrm>
-          <a:prstGeom prst="rect">
-            <a:avLst/>
-          </a:prstGeom>
-        </p:spPr>
-        <p:style>
-          <a:lnRef idx="2">
-            <a:schemeClr val="accent1">
-              <a:shade val="50000"/>
-            </a:schemeClr>
-          </a:lnRef>
-          <a:fillRef idx="1">
-            <a:schemeClr val="accent1"/>
-          </a:fillRef>
-          <a:effectRef idx="0">
-            <a:schemeClr val="accent1"/>
-          </a:effectRef>
-          <a:fontRef idx="minor">
-            <a:schemeClr val="lt1"/>
-          </a:fontRef>
-        </p:style>
-        <p:txBody>
-          <a:bodyPr rtlCol="0" anchor="ctr"/>
-          <a:lstStyle/>
-          <a:p>
-            <a:pPr algn="ctr"/>
-            <a:r>
-              <a:rPr lang="en-US" dirty="0" smtClean="0"/>
-              <a:t>License agreements</a:t>
-            </a:r>
-          </a:p>
-          <a:p>
-            <a:pPr algn="ctr"/>
-            <a:r>
-              <a:rPr lang="en-US" dirty="0" smtClean="0"/>
-              <a:t>License income</a:t>
-            </a:r>
-          </a:p>
-          <a:p>
-            <a:pPr algn="ctr"/>
-            <a:r>
-              <a:rPr lang="en-US" dirty="0" smtClean="0"/>
-              <a:t>New ventures</a:t>
-            </a:r>
-          </a:p>
-          <a:p>
-            <a:pPr algn="ctr"/>
-            <a:r>
-              <a:rPr lang="en-US" dirty="0" smtClean="0"/>
-              <a:t>Acquisitions</a:t>
-            </a:r>
-            <a:endParaRPr lang="en-US" dirty="0"/>
-          </a:p>
-        </p:txBody>
-      </p:sp>
-      <p:sp>
-        <p:nvSpPr>
-          <p:cNvPr id="12" name="Rectangle 11"/>
-          <p:cNvSpPr/>
-          <p:nvPr/>
-        </p:nvSpPr>
-        <p:spPr>
-          <a:xfrm>
-            <a:off x="6071843" y="1812223"/>
-            <a:ext cx="2926080" cy="1188720"/>
-          </a:xfrm>
-          <a:prstGeom prst="rect">
-            <a:avLst/>
-          </a:prstGeom>
-        </p:spPr>
-        <p:style>
-          <a:lnRef idx="1">
-            <a:schemeClr val="dk1"/>
-          </a:lnRef>
-          <a:fillRef idx="2">
-            <a:schemeClr val="dk1"/>
-          </a:fillRef>
-          <a:effectRef idx="1">
-            <a:schemeClr val="dk1"/>
-          </a:effectRef>
-          <a:fontRef idx="minor">
-            <a:schemeClr val="dk1"/>
-          </a:fontRef>
-        </p:style>
-        <p:txBody>
-          <a:bodyPr rtlCol="0" anchor="ctr"/>
-          <a:lstStyle/>
-          <a:p>
-            <a:pPr algn="ctr"/>
-            <a:r>
-              <a:rPr lang="en-US" dirty="0" smtClean="0"/>
-              <a:t>Citations</a:t>
-            </a:r>
-          </a:p>
-          <a:p>
-            <a:pPr algn="ctr"/>
-            <a:r>
-              <a:rPr lang="en-US" dirty="0" smtClean="0"/>
-              <a:t>Downloads</a:t>
-            </a:r>
-          </a:p>
-          <a:p>
-            <a:pPr algn="ctr"/>
-            <a:r>
-              <a:rPr lang="en-US" dirty="0" smtClean="0"/>
-              <a:t>Readings</a:t>
-            </a:r>
-          </a:p>
-          <a:p>
-            <a:pPr algn="ctr"/>
-            <a:r>
-              <a:rPr lang="en-US" dirty="0" smtClean="0"/>
-              <a:t>Event attendance</a:t>
-            </a:r>
-            <a:endParaRPr lang="en-US" dirty="0"/>
-          </a:p>
-        </p:txBody>
-      </p:sp>
-      <p:sp>
-        <p:nvSpPr>
-          <p:cNvPr id="13" name="Rectangle 12"/>
-          <p:cNvSpPr/>
-          <p:nvPr/>
-        </p:nvSpPr>
-        <p:spPr>
-          <a:xfrm>
-            <a:off x="6071843" y="3056429"/>
-            <a:ext cx="2926080" cy="1188720"/>
-          </a:xfrm>
-          <a:prstGeom prst="rect">
-            <a:avLst/>
-          </a:prstGeom>
-        </p:spPr>
-        <p:style>
-          <a:lnRef idx="2">
-            <a:schemeClr val="accent1">
-              <a:shade val="50000"/>
-            </a:schemeClr>
-          </a:lnRef>
-          <a:fillRef idx="1">
-            <a:schemeClr val="accent1"/>
-          </a:fillRef>
-          <a:effectRef idx="0">
-            <a:schemeClr val="accent1"/>
-          </a:effectRef>
-          <a:fontRef idx="minor">
-            <a:schemeClr val="lt1"/>
-          </a:fontRef>
-        </p:style>
-        <p:txBody>
-          <a:bodyPr rtlCol="0" anchor="ctr"/>
-          <a:lstStyle/>
-          <a:p>
-            <a:pPr algn="ctr"/>
-            <a:r>
-              <a:rPr lang="en-US" dirty="0" smtClean="0"/>
-              <a:t>Outside interest disclosures</a:t>
-            </a:r>
-          </a:p>
-          <a:p>
-            <a:pPr algn="ctr"/>
-            <a:r>
-              <a:rPr lang="en-US" dirty="0" smtClean="0"/>
-              <a:t>Contracts</a:t>
-            </a:r>
-          </a:p>
-          <a:p>
-            <a:pPr algn="ctr"/>
-            <a:r>
-              <a:rPr lang="en-US" dirty="0" smtClean="0"/>
-              <a:t>Service invoices</a:t>
-            </a:r>
-          </a:p>
-          <a:p>
-            <a:pPr algn="ctr"/>
-            <a:r>
-              <a:rPr lang="en-US" dirty="0" smtClean="0"/>
-              <a:t>SR agreements</a:t>
-            </a:r>
-          </a:p>
-        </p:txBody>
-      </p:sp>
-      <p:sp>
-        <p:nvSpPr>
-          <p:cNvPr id="14" name="Rectangle 13"/>
-          <p:cNvSpPr/>
-          <p:nvPr/>
-        </p:nvSpPr>
-        <p:spPr>
+        </p:nvGrpSpPr>
+        <p:grpSpPr>
           <a:xfrm>
             <a:off x="135741" y="25758"/>
-            <a:ext cx="2926080" cy="490742"/>
+            <a:ext cx="8862182" cy="4219391"/>
+            <a:chOff x="135741" y="25758"/>
+            <a:chExt cx="8862182" cy="4219391"/>
           </a:xfrm>
-          <a:prstGeom prst="rect">
-            <a:avLst/>
-          </a:prstGeom>
-        </p:spPr>
-        <p:style>
-          <a:lnRef idx="2">
-            <a:schemeClr val="dk1">
-              <a:shade val="50000"/>
-            </a:schemeClr>
-          </a:lnRef>
-          <a:fillRef idx="1">
-            <a:schemeClr val="dk1"/>
-          </a:fillRef>
-          <a:effectRef idx="0">
-            <a:schemeClr val="dk1"/>
-          </a:effectRef>
-          <a:fontRef idx="minor">
-            <a:schemeClr val="lt1"/>
-          </a:fontRef>
-        </p:style>
-        <p:txBody>
-          <a:bodyPr rtlCol="0" anchor="ctr"/>
-          <a:lstStyle/>
-          <a:p>
-            <a:pPr algn="ctr"/>
-            <a:r>
-              <a:rPr lang="en-US" dirty="0" smtClean="0"/>
-              <a:t>Category</a:t>
-            </a:r>
-            <a:endParaRPr lang="en-US" dirty="0"/>
-          </a:p>
-        </p:txBody>
-      </p:sp>
-      <p:sp>
-        <p:nvSpPr>
-          <p:cNvPr id="15" name="Rectangle 14"/>
-          <p:cNvSpPr/>
-          <p:nvPr/>
-        </p:nvSpPr>
-        <p:spPr>
-          <a:xfrm>
-            <a:off x="3103792" y="25758"/>
-            <a:ext cx="2926080" cy="490742"/>
-          </a:xfrm>
-          <a:prstGeom prst="rect">
-            <a:avLst/>
-          </a:prstGeom>
-        </p:spPr>
-        <p:style>
-          <a:lnRef idx="2">
-            <a:schemeClr val="dk1">
-              <a:shade val="50000"/>
-            </a:schemeClr>
-          </a:lnRef>
-          <a:fillRef idx="1">
-            <a:schemeClr val="dk1"/>
-          </a:fillRef>
-          <a:effectRef idx="0">
-            <a:schemeClr val="dk1"/>
-          </a:effectRef>
-          <a:fontRef idx="minor">
-            <a:schemeClr val="lt1"/>
-          </a:fontRef>
-        </p:style>
-        <p:txBody>
-          <a:bodyPr rtlCol="0" anchor="ctr"/>
-          <a:lstStyle/>
-          <a:p>
-            <a:pPr algn="ctr"/>
-            <a:r>
-              <a:rPr lang="en-US" dirty="0" smtClean="0"/>
-              <a:t>Embodiment</a:t>
-            </a:r>
-            <a:endParaRPr lang="en-US" dirty="0"/>
-          </a:p>
-        </p:txBody>
-      </p:sp>
-      <p:sp>
-        <p:nvSpPr>
-          <p:cNvPr id="16" name="Rectangle 15"/>
-          <p:cNvSpPr/>
-          <p:nvPr/>
-        </p:nvSpPr>
-        <p:spPr>
-          <a:xfrm>
-            <a:off x="6071843" y="25758"/>
-            <a:ext cx="2926080" cy="490742"/>
-          </a:xfrm>
-          <a:prstGeom prst="rect">
-            <a:avLst/>
-          </a:prstGeom>
-        </p:spPr>
-        <p:style>
-          <a:lnRef idx="2">
-            <a:schemeClr val="dk1">
-              <a:shade val="50000"/>
-            </a:schemeClr>
-          </a:lnRef>
-          <a:fillRef idx="1">
-            <a:schemeClr val="dk1"/>
-          </a:fillRef>
-          <a:effectRef idx="0">
-            <a:schemeClr val="dk1"/>
-          </a:effectRef>
-          <a:fontRef idx="minor">
-            <a:schemeClr val="lt1"/>
-          </a:fontRef>
-        </p:style>
-        <p:txBody>
-          <a:bodyPr rtlCol="0" anchor="ctr"/>
-          <a:lstStyle/>
-          <a:p>
-            <a:pPr algn="ctr"/>
-            <a:r>
-              <a:rPr lang="en-US" dirty="0" smtClean="0"/>
-              <a:t>Measureable Indicators</a:t>
-            </a:r>
-            <a:endParaRPr lang="en-US" dirty="0"/>
-          </a:p>
-        </p:txBody>
-      </p:sp>
+        </p:grpSpPr>
+        <p:sp>
+          <p:nvSpPr>
+            <p:cNvPr id="5" name="Rectangle 4"/>
+            <p:cNvSpPr/>
+            <p:nvPr/>
+          </p:nvSpPr>
+          <p:spPr>
+            <a:xfrm>
+              <a:off x="135742" y="570663"/>
+              <a:ext cx="2926080" cy="1188720"/>
+            </a:xfrm>
+            <a:prstGeom prst="rect">
+              <a:avLst/>
+            </a:prstGeom>
+          </p:spPr>
+          <p:style>
+            <a:lnRef idx="2">
+              <a:schemeClr val="accent1">
+                <a:shade val="50000"/>
+              </a:schemeClr>
+            </a:lnRef>
+            <a:fillRef idx="1">
+              <a:schemeClr val="accent1"/>
+            </a:fillRef>
+            <a:effectRef idx="0">
+              <a:schemeClr val="accent1"/>
+            </a:effectRef>
+            <a:fontRef idx="minor">
+              <a:schemeClr val="lt1"/>
+            </a:fontRef>
+          </p:style>
+          <p:txBody>
+            <a:bodyPr rtlCol="0" anchor="ctr"/>
+            <a:lstStyle/>
+            <a:p>
+              <a:pPr algn="ctr"/>
+              <a:r>
+                <a:rPr lang="en-US" dirty="0" smtClean="0"/>
+                <a:t>Asset-based</a:t>
+              </a:r>
+              <a:endParaRPr lang="en-US" dirty="0"/>
+            </a:p>
+          </p:txBody>
+        </p:sp>
+        <p:sp>
+          <p:nvSpPr>
+            <p:cNvPr id="6" name="Rectangle 5"/>
+            <p:cNvSpPr/>
+            <p:nvPr/>
+          </p:nvSpPr>
+          <p:spPr>
+            <a:xfrm>
+              <a:off x="135742" y="1813546"/>
+              <a:ext cx="2926080" cy="1188720"/>
+            </a:xfrm>
+            <a:prstGeom prst="rect">
+              <a:avLst/>
+            </a:prstGeom>
+          </p:spPr>
+          <p:style>
+            <a:lnRef idx="1">
+              <a:schemeClr val="dk1"/>
+            </a:lnRef>
+            <a:fillRef idx="2">
+              <a:schemeClr val="dk1"/>
+            </a:fillRef>
+            <a:effectRef idx="1">
+              <a:schemeClr val="dk1"/>
+            </a:effectRef>
+            <a:fontRef idx="minor">
+              <a:schemeClr val="dk1"/>
+            </a:fontRef>
+          </p:style>
+          <p:txBody>
+            <a:bodyPr rtlCol="0" anchor="ctr"/>
+            <a:lstStyle/>
+            <a:p>
+              <a:pPr algn="ctr"/>
+              <a:r>
+                <a:rPr lang="en-US" dirty="0" smtClean="0"/>
+                <a:t>Information-based</a:t>
+              </a:r>
+              <a:endParaRPr lang="en-US" dirty="0"/>
+            </a:p>
+          </p:txBody>
+        </p:sp>
+        <p:sp>
+          <p:nvSpPr>
+            <p:cNvPr id="7" name="Rectangle 6"/>
+            <p:cNvSpPr/>
+            <p:nvPr/>
+          </p:nvSpPr>
+          <p:spPr>
+            <a:xfrm>
+              <a:off x="135741" y="3056429"/>
+              <a:ext cx="2926080" cy="1188720"/>
+            </a:xfrm>
+            <a:prstGeom prst="rect">
+              <a:avLst/>
+            </a:prstGeom>
+          </p:spPr>
+          <p:style>
+            <a:lnRef idx="2">
+              <a:schemeClr val="accent1">
+                <a:shade val="50000"/>
+              </a:schemeClr>
+            </a:lnRef>
+            <a:fillRef idx="1">
+              <a:schemeClr val="accent1"/>
+            </a:fillRef>
+            <a:effectRef idx="0">
+              <a:schemeClr val="accent1"/>
+            </a:effectRef>
+            <a:fontRef idx="minor">
+              <a:schemeClr val="lt1"/>
+            </a:fontRef>
+          </p:style>
+          <p:txBody>
+            <a:bodyPr rtlCol="0" anchor="ctr"/>
+            <a:lstStyle/>
+            <a:p>
+              <a:pPr algn="ctr"/>
+              <a:r>
+                <a:rPr lang="en-US" dirty="0" smtClean="0"/>
+                <a:t>Service-based</a:t>
+              </a:r>
+              <a:endParaRPr lang="en-US" dirty="0"/>
+            </a:p>
+          </p:txBody>
+        </p:sp>
+        <p:sp>
+          <p:nvSpPr>
+            <p:cNvPr id="8" name="Rectangle 7"/>
+            <p:cNvSpPr/>
+            <p:nvPr/>
+          </p:nvSpPr>
+          <p:spPr>
+            <a:xfrm>
+              <a:off x="3103792" y="570663"/>
+              <a:ext cx="2926080" cy="1188720"/>
+            </a:xfrm>
+            <a:prstGeom prst="rect">
+              <a:avLst/>
+            </a:prstGeom>
+          </p:spPr>
+          <p:style>
+            <a:lnRef idx="2">
+              <a:schemeClr val="accent1">
+                <a:shade val="50000"/>
+              </a:schemeClr>
+            </a:lnRef>
+            <a:fillRef idx="1">
+              <a:schemeClr val="accent1"/>
+            </a:fillRef>
+            <a:effectRef idx="0">
+              <a:schemeClr val="accent1"/>
+            </a:effectRef>
+            <a:fontRef idx="minor">
+              <a:schemeClr val="lt1"/>
+            </a:fontRef>
+          </p:style>
+          <p:txBody>
+            <a:bodyPr rtlCol="0" anchor="ctr"/>
+            <a:lstStyle/>
+            <a:p>
+              <a:pPr algn="ctr"/>
+              <a:r>
+                <a:rPr lang="en-US" dirty="0" smtClean="0"/>
+                <a:t>Patent rights</a:t>
+              </a:r>
+            </a:p>
+            <a:p>
+              <a:pPr algn="ctr"/>
+              <a:r>
+                <a:rPr lang="en-US" dirty="0" smtClean="0"/>
+                <a:t>Trade secrets</a:t>
+              </a:r>
+            </a:p>
+            <a:p>
+              <a:pPr algn="ctr"/>
+              <a:r>
+                <a:rPr lang="en-US" dirty="0" smtClean="0"/>
+                <a:t>Copyright</a:t>
+              </a:r>
+              <a:endParaRPr lang="en-US" dirty="0"/>
+            </a:p>
+          </p:txBody>
+        </p:sp>
+        <p:sp>
+          <p:nvSpPr>
+            <p:cNvPr id="9" name="Rectangle 8"/>
+            <p:cNvSpPr/>
+            <p:nvPr/>
+          </p:nvSpPr>
+          <p:spPr>
+            <a:xfrm>
+              <a:off x="3103792" y="1812223"/>
+              <a:ext cx="2926080" cy="1188720"/>
+            </a:xfrm>
+            <a:prstGeom prst="rect">
+              <a:avLst/>
+            </a:prstGeom>
+          </p:spPr>
+          <p:style>
+            <a:lnRef idx="1">
+              <a:schemeClr val="dk1"/>
+            </a:lnRef>
+            <a:fillRef idx="2">
+              <a:schemeClr val="dk1"/>
+            </a:fillRef>
+            <a:effectRef idx="1">
+              <a:schemeClr val="dk1"/>
+            </a:effectRef>
+            <a:fontRef idx="minor">
+              <a:schemeClr val="dk1"/>
+            </a:fontRef>
+          </p:style>
+          <p:txBody>
+            <a:bodyPr rtlCol="0" anchor="ctr"/>
+            <a:lstStyle/>
+            <a:p>
+              <a:pPr algn="ctr"/>
+              <a:r>
+                <a:rPr lang="en-US" dirty="0" smtClean="0"/>
+                <a:t>Patent documents</a:t>
+              </a:r>
+            </a:p>
+            <a:p>
+              <a:pPr algn="ctr"/>
+              <a:r>
+                <a:rPr lang="en-US" dirty="0" smtClean="0"/>
+                <a:t>Patent applications</a:t>
+              </a:r>
+            </a:p>
+            <a:p>
+              <a:pPr algn="ctr"/>
+              <a:r>
+                <a:rPr lang="en-US" dirty="0" smtClean="0"/>
+                <a:t>Journal articles</a:t>
+              </a:r>
+            </a:p>
+            <a:p>
+              <a:pPr algn="ctr"/>
+              <a:r>
+                <a:rPr lang="en-US" dirty="0" smtClean="0"/>
+                <a:t>Presentations</a:t>
+              </a:r>
+              <a:endParaRPr lang="en-US" dirty="0"/>
+            </a:p>
+          </p:txBody>
+        </p:sp>
+        <p:sp>
+          <p:nvSpPr>
+            <p:cNvPr id="10" name="Rectangle 9"/>
+            <p:cNvSpPr/>
+            <p:nvPr/>
+          </p:nvSpPr>
+          <p:spPr>
+            <a:xfrm>
+              <a:off x="3103792" y="3056429"/>
+              <a:ext cx="2926080" cy="1188720"/>
+            </a:xfrm>
+            <a:prstGeom prst="rect">
+              <a:avLst/>
+            </a:prstGeom>
+          </p:spPr>
+          <p:style>
+            <a:lnRef idx="2">
+              <a:schemeClr val="accent1">
+                <a:shade val="50000"/>
+              </a:schemeClr>
+            </a:lnRef>
+            <a:fillRef idx="1">
+              <a:schemeClr val="accent1"/>
+            </a:fillRef>
+            <a:effectRef idx="0">
+              <a:schemeClr val="accent1"/>
+            </a:effectRef>
+            <a:fontRef idx="minor">
+              <a:schemeClr val="lt1"/>
+            </a:fontRef>
+          </p:style>
+          <p:txBody>
+            <a:bodyPr rtlCol="0" anchor="ctr"/>
+            <a:lstStyle/>
+            <a:p>
+              <a:pPr algn="ctr"/>
+              <a:r>
+                <a:rPr lang="en-US" dirty="0" smtClean="0"/>
+                <a:t>Consulting services</a:t>
+              </a:r>
+            </a:p>
+            <a:p>
+              <a:pPr algn="ctr"/>
+              <a:r>
+                <a:rPr lang="en-US" dirty="0" smtClean="0"/>
+                <a:t>Contract services</a:t>
+              </a:r>
+            </a:p>
+            <a:p>
+              <a:pPr algn="ctr"/>
+              <a:r>
+                <a:rPr lang="en-US" dirty="0" smtClean="0"/>
+                <a:t>Sponsored research</a:t>
+              </a:r>
+              <a:endParaRPr lang="en-US" dirty="0"/>
+            </a:p>
+          </p:txBody>
+        </p:sp>
+        <p:sp>
+          <p:nvSpPr>
+            <p:cNvPr id="11" name="Rectangle 10"/>
+            <p:cNvSpPr/>
+            <p:nvPr/>
+          </p:nvSpPr>
+          <p:spPr>
+            <a:xfrm>
+              <a:off x="6071843" y="570663"/>
+              <a:ext cx="2926080" cy="1188720"/>
+            </a:xfrm>
+            <a:prstGeom prst="rect">
+              <a:avLst/>
+            </a:prstGeom>
+          </p:spPr>
+          <p:style>
+            <a:lnRef idx="2">
+              <a:schemeClr val="accent1">
+                <a:shade val="50000"/>
+              </a:schemeClr>
+            </a:lnRef>
+            <a:fillRef idx="1">
+              <a:schemeClr val="accent1"/>
+            </a:fillRef>
+            <a:effectRef idx="0">
+              <a:schemeClr val="accent1"/>
+            </a:effectRef>
+            <a:fontRef idx="minor">
+              <a:schemeClr val="lt1"/>
+            </a:fontRef>
+          </p:style>
+          <p:txBody>
+            <a:bodyPr rtlCol="0" anchor="ctr"/>
+            <a:lstStyle/>
+            <a:p>
+              <a:pPr algn="ctr"/>
+              <a:r>
+                <a:rPr lang="en-US" dirty="0" smtClean="0"/>
+                <a:t>License agreements</a:t>
+              </a:r>
+            </a:p>
+            <a:p>
+              <a:pPr algn="ctr"/>
+              <a:r>
+                <a:rPr lang="en-US" dirty="0" smtClean="0"/>
+                <a:t>License income</a:t>
+              </a:r>
+            </a:p>
+            <a:p>
+              <a:pPr algn="ctr"/>
+              <a:r>
+                <a:rPr lang="en-US" dirty="0" smtClean="0"/>
+                <a:t>New ventures</a:t>
+              </a:r>
+            </a:p>
+            <a:p>
+              <a:pPr algn="ctr"/>
+              <a:r>
+                <a:rPr lang="en-US" dirty="0" smtClean="0"/>
+                <a:t>Acquisitions</a:t>
+              </a:r>
+              <a:endParaRPr lang="en-US" dirty="0"/>
+            </a:p>
+          </p:txBody>
+        </p:sp>
+        <p:sp>
+          <p:nvSpPr>
+            <p:cNvPr id="12" name="Rectangle 11"/>
+            <p:cNvSpPr/>
+            <p:nvPr/>
+          </p:nvSpPr>
+          <p:spPr>
+            <a:xfrm>
+              <a:off x="6071843" y="1812223"/>
+              <a:ext cx="2926080" cy="1188720"/>
+            </a:xfrm>
+            <a:prstGeom prst="rect">
+              <a:avLst/>
+            </a:prstGeom>
+          </p:spPr>
+          <p:style>
+            <a:lnRef idx="1">
+              <a:schemeClr val="dk1"/>
+            </a:lnRef>
+            <a:fillRef idx="2">
+              <a:schemeClr val="dk1"/>
+            </a:fillRef>
+            <a:effectRef idx="1">
+              <a:schemeClr val="dk1"/>
+            </a:effectRef>
+            <a:fontRef idx="minor">
+              <a:schemeClr val="dk1"/>
+            </a:fontRef>
+          </p:style>
+          <p:txBody>
+            <a:bodyPr rtlCol="0" anchor="ctr"/>
+            <a:lstStyle/>
+            <a:p>
+              <a:pPr algn="ctr"/>
+              <a:r>
+                <a:rPr lang="en-US" dirty="0" smtClean="0"/>
+                <a:t>Citations</a:t>
+              </a:r>
+            </a:p>
+            <a:p>
+              <a:pPr algn="ctr"/>
+              <a:r>
+                <a:rPr lang="en-US" dirty="0" smtClean="0"/>
+                <a:t>Downloads</a:t>
+              </a:r>
+            </a:p>
+            <a:p>
+              <a:pPr algn="ctr"/>
+              <a:r>
+                <a:rPr lang="en-US" dirty="0" smtClean="0"/>
+                <a:t>Readings</a:t>
+              </a:r>
+            </a:p>
+            <a:p>
+              <a:pPr algn="ctr"/>
+              <a:r>
+                <a:rPr lang="en-US" dirty="0" smtClean="0"/>
+                <a:t>Event attendance</a:t>
+              </a:r>
+              <a:endParaRPr lang="en-US" dirty="0"/>
+            </a:p>
+          </p:txBody>
+        </p:sp>
+        <p:sp>
+          <p:nvSpPr>
+            <p:cNvPr id="13" name="Rectangle 12"/>
+            <p:cNvSpPr/>
+            <p:nvPr/>
+          </p:nvSpPr>
+          <p:spPr>
+            <a:xfrm>
+              <a:off x="6071843" y="3056429"/>
+              <a:ext cx="2926080" cy="1188720"/>
+            </a:xfrm>
+            <a:prstGeom prst="rect">
+              <a:avLst/>
+            </a:prstGeom>
+          </p:spPr>
+          <p:style>
+            <a:lnRef idx="2">
+              <a:schemeClr val="accent1">
+                <a:shade val="50000"/>
+              </a:schemeClr>
+            </a:lnRef>
+            <a:fillRef idx="1">
+              <a:schemeClr val="accent1"/>
+            </a:fillRef>
+            <a:effectRef idx="0">
+              <a:schemeClr val="accent1"/>
+            </a:effectRef>
+            <a:fontRef idx="minor">
+              <a:schemeClr val="lt1"/>
+            </a:fontRef>
+          </p:style>
+          <p:txBody>
+            <a:bodyPr rtlCol="0" anchor="ctr"/>
+            <a:lstStyle/>
+            <a:p>
+              <a:pPr algn="ctr"/>
+              <a:r>
+                <a:rPr lang="en-US" dirty="0" smtClean="0"/>
+                <a:t>Outside interest disclosures</a:t>
+              </a:r>
+            </a:p>
+            <a:p>
+              <a:pPr algn="ctr"/>
+              <a:r>
+                <a:rPr lang="en-US" dirty="0" smtClean="0"/>
+                <a:t>Contracts</a:t>
+              </a:r>
+            </a:p>
+            <a:p>
+              <a:pPr algn="ctr"/>
+              <a:r>
+                <a:rPr lang="en-US" dirty="0" smtClean="0"/>
+                <a:t>Service invoices</a:t>
+              </a:r>
+            </a:p>
+            <a:p>
+              <a:pPr algn="ctr"/>
+              <a:r>
+                <a:rPr lang="en-US" dirty="0" smtClean="0"/>
+                <a:t>SR agreements</a:t>
+              </a:r>
+            </a:p>
+          </p:txBody>
+        </p:sp>
+        <p:sp>
+          <p:nvSpPr>
+            <p:cNvPr id="14" name="Rectangle 13"/>
+            <p:cNvSpPr/>
+            <p:nvPr/>
+          </p:nvSpPr>
+          <p:spPr>
+            <a:xfrm>
+              <a:off x="135741" y="25758"/>
+              <a:ext cx="2926080" cy="490742"/>
+            </a:xfrm>
+            <a:prstGeom prst="rect">
+              <a:avLst/>
+            </a:prstGeom>
+          </p:spPr>
+          <p:style>
+            <a:lnRef idx="2">
+              <a:schemeClr val="dk1">
+                <a:shade val="50000"/>
+              </a:schemeClr>
+            </a:lnRef>
+            <a:fillRef idx="1">
+              <a:schemeClr val="dk1"/>
+            </a:fillRef>
+            <a:effectRef idx="0">
+              <a:schemeClr val="dk1"/>
+            </a:effectRef>
+            <a:fontRef idx="minor">
+              <a:schemeClr val="lt1"/>
+            </a:fontRef>
+          </p:style>
+          <p:txBody>
+            <a:bodyPr rtlCol="0" anchor="ctr"/>
+            <a:lstStyle/>
+            <a:p>
+              <a:pPr algn="ctr"/>
+              <a:r>
+                <a:rPr lang="en-US" dirty="0" smtClean="0"/>
+                <a:t>Category</a:t>
+              </a:r>
+              <a:endParaRPr lang="en-US" dirty="0"/>
+            </a:p>
+          </p:txBody>
+        </p:sp>
+        <p:sp>
+          <p:nvSpPr>
+            <p:cNvPr id="15" name="Rectangle 14"/>
+            <p:cNvSpPr/>
+            <p:nvPr/>
+          </p:nvSpPr>
+          <p:spPr>
+            <a:xfrm>
+              <a:off x="3103792" y="25758"/>
+              <a:ext cx="2926080" cy="490742"/>
+            </a:xfrm>
+            <a:prstGeom prst="rect">
+              <a:avLst/>
+            </a:prstGeom>
+          </p:spPr>
+          <p:style>
+            <a:lnRef idx="2">
+              <a:schemeClr val="dk1">
+                <a:shade val="50000"/>
+              </a:schemeClr>
+            </a:lnRef>
+            <a:fillRef idx="1">
+              <a:schemeClr val="dk1"/>
+            </a:fillRef>
+            <a:effectRef idx="0">
+              <a:schemeClr val="dk1"/>
+            </a:effectRef>
+            <a:fontRef idx="minor">
+              <a:schemeClr val="lt1"/>
+            </a:fontRef>
+          </p:style>
+          <p:txBody>
+            <a:bodyPr rtlCol="0" anchor="ctr"/>
+            <a:lstStyle/>
+            <a:p>
+              <a:pPr algn="ctr"/>
+              <a:r>
+                <a:rPr lang="en-US" dirty="0" smtClean="0"/>
+                <a:t>Embodiment</a:t>
+              </a:r>
+              <a:endParaRPr lang="en-US" dirty="0"/>
+            </a:p>
+          </p:txBody>
+        </p:sp>
+        <p:sp>
+          <p:nvSpPr>
+            <p:cNvPr id="16" name="Rectangle 15"/>
+            <p:cNvSpPr/>
+            <p:nvPr/>
+          </p:nvSpPr>
+          <p:spPr>
+            <a:xfrm>
+              <a:off x="6071843" y="25758"/>
+              <a:ext cx="2926080" cy="490742"/>
+            </a:xfrm>
+            <a:prstGeom prst="rect">
+              <a:avLst/>
+            </a:prstGeom>
+          </p:spPr>
+          <p:style>
+            <a:lnRef idx="2">
+              <a:schemeClr val="dk1">
+                <a:shade val="50000"/>
+              </a:schemeClr>
+            </a:lnRef>
+            <a:fillRef idx="1">
+              <a:schemeClr val="dk1"/>
+            </a:fillRef>
+            <a:effectRef idx="0">
+              <a:schemeClr val="dk1"/>
+            </a:effectRef>
+            <a:fontRef idx="minor">
+              <a:schemeClr val="lt1"/>
+            </a:fontRef>
+          </p:style>
+          <p:txBody>
+            <a:bodyPr rtlCol="0" anchor="ctr"/>
+            <a:lstStyle/>
+            <a:p>
+              <a:pPr algn="ctr"/>
+              <a:r>
+                <a:rPr lang="en-US" dirty="0" smtClean="0"/>
+                <a:t>Measureable Indicators</a:t>
+              </a:r>
+              <a:endParaRPr lang="en-US" dirty="0"/>
+            </a:p>
+          </p:txBody>
+        </p:sp>
+      </p:grpSp>
       <p:pic>
         <p:nvPicPr>
           <p:cNvPr id="4099" name="Picture 3" descr="C:\Users\townesm\Downloads\clipart886407.png"/>

</xml_diff>